<commit_message>
Fiddle with the design
</commit_message>
<xml_diff>
--- a/presentation/Resync Studie.pptx
+++ b/presentation/Resync Studie.pptx
@@ -14,13 +14,12 @@
     <p:sldId id="271" r:id="rId8"/>
     <p:sldId id="259" r:id="rId9"/>
     <p:sldId id="260" r:id="rId10"/>
-    <p:sldId id="261" r:id="rId11"/>
-    <p:sldId id="262" r:id="rId12"/>
-    <p:sldId id="263" r:id="rId13"/>
-    <p:sldId id="265" r:id="rId14"/>
-    <p:sldId id="264" r:id="rId15"/>
-    <p:sldId id="266" r:id="rId16"/>
-    <p:sldId id="267" r:id="rId17"/>
+    <p:sldId id="273" r:id="rId11"/>
+    <p:sldId id="272" r:id="rId12"/>
+    <p:sldId id="265" r:id="rId13"/>
+    <p:sldId id="264" r:id="rId14"/>
+    <p:sldId id="266" r:id="rId15"/>
+    <p:sldId id="267" r:id="rId16"/>
   </p:sldIdLst>
   <p:sldSz cx="12192000" cy="6858000"/>
   <p:notesSz cx="6858000" cy="9144000"/>
@@ -119,6 +118,11 @@
       </a:defRPr>
     </a:lvl9pPr>
   </p:defaultTextStyle>
+  <p:extLst>
+    <p:ext uri="{EFAFB233-063F-42B5-8137-9DF3F51BA10A}">
+      <p15:sldGuideLst xmlns:p15="http://schemas.microsoft.com/office/powerpoint/2012/main"/>
+    </p:ext>
+  </p:extLst>
 </p:presentation>
 </file>
 
@@ -164,10 +168,9 @@
           </a:lstStyle>
           <a:p>
             <a:r>
-              <a:rPr lang="de-DE" smtClean="0"/>
+              <a:rPr lang="de-DE"/>
               <a:t>Titelmasterformat durch Klicken bearbeiten</a:t>
             </a:r>
-            <a:endParaRPr lang="de-DE"/>
           </a:p>
         </p:txBody>
       </p:sp>
@@ -229,10 +232,9 @@
           </a:lstStyle>
           <a:p>
             <a:r>
-              <a:rPr lang="de-DE" smtClean="0"/>
+              <a:rPr lang="de-DE"/>
               <a:t>Formatvorlage des Untertitelmasters durch Klicken bearbeiten</a:t>
             </a:r>
-            <a:endParaRPr lang="de-DE"/>
           </a:p>
         </p:txBody>
       </p:sp>
@@ -253,7 +255,7 @@
           <a:p>
             <a:fld id="{41257651-B64F-43FB-9868-05B8EA16BD84}" type="datetimeFigureOut">
               <a:rPr lang="de-DE" smtClean="0"/>
-              <a:t>06.12.2019</a:t>
+              <a:t>14.12.2019</a:t>
             </a:fld>
             <a:endParaRPr lang="de-DE"/>
           </a:p>
@@ -347,10 +349,9 @@
           <a:lstStyle/>
           <a:p>
             <a:r>
-              <a:rPr lang="de-DE" smtClean="0"/>
+              <a:rPr lang="de-DE"/>
               <a:t>Titelmasterformat durch Klicken bearbeiten</a:t>
             </a:r>
-            <a:endParaRPr lang="de-DE"/>
           </a:p>
         </p:txBody>
       </p:sp>
@@ -371,38 +372,37 @@
           <a:p>
             <a:pPr lvl="0"/>
             <a:r>
-              <a:rPr lang="de-DE" smtClean="0"/>
+              <a:rPr lang="de-DE"/>
               <a:t>Formatvorlagen des Textmasters bearbeiten</a:t>
             </a:r>
           </a:p>
           <a:p>
             <a:pPr lvl="1"/>
             <a:r>
-              <a:rPr lang="de-DE" smtClean="0"/>
+              <a:rPr lang="de-DE"/>
               <a:t>Zweite Ebene</a:t>
             </a:r>
           </a:p>
           <a:p>
             <a:pPr lvl="2"/>
             <a:r>
-              <a:rPr lang="de-DE" smtClean="0"/>
+              <a:rPr lang="de-DE"/>
               <a:t>Dritte Ebene</a:t>
             </a:r>
           </a:p>
           <a:p>
             <a:pPr lvl="3"/>
             <a:r>
-              <a:rPr lang="de-DE" smtClean="0"/>
+              <a:rPr lang="de-DE"/>
               <a:t>Vierte Ebene</a:t>
             </a:r>
           </a:p>
           <a:p>
             <a:pPr lvl="4"/>
             <a:r>
-              <a:rPr lang="de-DE" smtClean="0"/>
+              <a:rPr lang="de-DE"/>
               <a:t>Fünfte Ebene</a:t>
             </a:r>
-            <a:endParaRPr lang="de-DE"/>
           </a:p>
         </p:txBody>
       </p:sp>
@@ -423,7 +423,7 @@
           <a:p>
             <a:fld id="{41257651-B64F-43FB-9868-05B8EA16BD84}" type="datetimeFigureOut">
               <a:rPr lang="de-DE" smtClean="0"/>
-              <a:t>06.12.2019</a:t>
+              <a:t>14.12.2019</a:t>
             </a:fld>
             <a:endParaRPr lang="de-DE"/>
           </a:p>
@@ -522,10 +522,9 @@
           <a:lstStyle/>
           <a:p>
             <a:r>
-              <a:rPr lang="de-DE" smtClean="0"/>
+              <a:rPr lang="de-DE"/>
               <a:t>Titelmasterformat durch Klicken bearbeiten</a:t>
             </a:r>
-            <a:endParaRPr lang="de-DE"/>
           </a:p>
         </p:txBody>
       </p:sp>
@@ -551,38 +550,37 @@
           <a:p>
             <a:pPr lvl="0"/>
             <a:r>
-              <a:rPr lang="de-DE" smtClean="0"/>
+              <a:rPr lang="de-DE"/>
               <a:t>Formatvorlagen des Textmasters bearbeiten</a:t>
             </a:r>
           </a:p>
           <a:p>
             <a:pPr lvl="1"/>
             <a:r>
-              <a:rPr lang="de-DE" smtClean="0"/>
+              <a:rPr lang="de-DE"/>
               <a:t>Zweite Ebene</a:t>
             </a:r>
           </a:p>
           <a:p>
             <a:pPr lvl="2"/>
             <a:r>
-              <a:rPr lang="de-DE" smtClean="0"/>
+              <a:rPr lang="de-DE"/>
               <a:t>Dritte Ebene</a:t>
             </a:r>
           </a:p>
           <a:p>
             <a:pPr lvl="3"/>
             <a:r>
-              <a:rPr lang="de-DE" smtClean="0"/>
+              <a:rPr lang="de-DE"/>
               <a:t>Vierte Ebene</a:t>
             </a:r>
           </a:p>
           <a:p>
             <a:pPr lvl="4"/>
             <a:r>
-              <a:rPr lang="de-DE" smtClean="0"/>
+              <a:rPr lang="de-DE"/>
               <a:t>Fünfte Ebene</a:t>
             </a:r>
-            <a:endParaRPr lang="de-DE"/>
           </a:p>
         </p:txBody>
       </p:sp>
@@ -603,7 +601,7 @@
           <a:p>
             <a:fld id="{41257651-B64F-43FB-9868-05B8EA16BD84}" type="datetimeFigureOut">
               <a:rPr lang="de-DE" smtClean="0"/>
-              <a:t>06.12.2019</a:t>
+              <a:t>14.12.2019</a:t>
             </a:fld>
             <a:endParaRPr lang="de-DE"/>
           </a:p>
@@ -694,13 +692,20 @@
         <p:spPr/>
         <p:txBody>
           <a:bodyPr/>
-          <a:lstStyle/>
-          <a:p>
-            <a:r>
-              <a:rPr lang="de-DE" smtClean="0"/>
+          <a:lstStyle>
+            <a:lvl1pPr>
+              <a:defRPr>
+                <a:solidFill>
+                  <a:srgbClr val="036564"/>
+                </a:solidFill>
+              </a:defRPr>
+            </a:lvl1pPr>
+          </a:lstStyle>
+          <a:p>
+            <a:r>
+              <a:rPr lang="de-DE" dirty="0"/>
               <a:t>Titelmasterformat durch Klicken bearbeiten</a:t>
             </a:r>
-            <a:endParaRPr lang="de-DE"/>
           </a:p>
         </p:txBody>
       </p:sp>
@@ -717,42 +722,82 @@
         <p:spPr/>
         <p:txBody>
           <a:bodyPr/>
-          <a:lstStyle/>
+          <a:lstStyle>
+            <a:lvl1pPr marL="228600" indent="-228600">
+              <a:buClr>
+                <a:srgbClr val="E8DDCB"/>
+              </a:buClr>
+              <a:buFont typeface="Futura Lt BT" panose="020B0402020204020303" pitchFamily="34" charset="0"/>
+              <a:buChar char="∙"/>
+              <a:defRPr/>
+            </a:lvl1pPr>
+            <a:lvl2pPr marL="685800" indent="-228600">
+              <a:buClr>
+                <a:srgbClr val="E8DDCB"/>
+              </a:buClr>
+              <a:buFont typeface="Futura Lt BT" panose="020B0402020204020303" pitchFamily="34" charset="0"/>
+              <a:buChar char="∙"/>
+              <a:defRPr/>
+            </a:lvl2pPr>
+            <a:lvl3pPr marL="1143000" indent="-228600">
+              <a:buClr>
+                <a:srgbClr val="E8DDCB"/>
+              </a:buClr>
+              <a:buFont typeface="Futura Lt BT" panose="020B0402020204020303" pitchFamily="34" charset="0"/>
+              <a:buChar char="∙"/>
+              <a:defRPr/>
+            </a:lvl3pPr>
+            <a:lvl4pPr marL="1600200" indent="-228600">
+              <a:buClr>
+                <a:srgbClr val="E8DDCB"/>
+              </a:buClr>
+              <a:buFont typeface="Futura Lt BT" panose="020B0402020204020303" pitchFamily="34" charset="0"/>
+              <a:buChar char="∙"/>
+              <a:defRPr/>
+            </a:lvl4pPr>
+            <a:lvl5pPr marL="2057400" indent="-228600">
+              <a:buClr>
+                <a:srgbClr val="E8DDCB"/>
+              </a:buClr>
+              <a:buFont typeface="Futura Lt BT" panose="020B0402020204020303" pitchFamily="34" charset="0"/>
+              <a:buChar char="∙"/>
+              <a:defRPr/>
+            </a:lvl5pPr>
+          </a:lstStyle>
           <a:p>
             <a:pPr lvl="0"/>
             <a:r>
-              <a:rPr lang="de-DE" smtClean="0"/>
+              <a:rPr lang="de-DE" dirty="0"/>
               <a:t>Formatvorlagen des Textmasters bearbeiten</a:t>
             </a:r>
           </a:p>
           <a:p>
             <a:pPr lvl="1"/>
             <a:r>
-              <a:rPr lang="de-DE" smtClean="0"/>
+              <a:rPr lang="de-DE" dirty="0"/>
               <a:t>Zweite Ebene</a:t>
             </a:r>
           </a:p>
           <a:p>
             <a:pPr lvl="2"/>
             <a:r>
-              <a:rPr lang="de-DE" smtClean="0"/>
+              <a:rPr lang="de-DE" dirty="0"/>
               <a:t>Dritte Ebene</a:t>
             </a:r>
           </a:p>
           <a:p>
             <a:pPr lvl="3"/>
             <a:r>
-              <a:rPr lang="de-DE" smtClean="0"/>
+              <a:rPr lang="de-DE" dirty="0"/>
               <a:t>Vierte Ebene</a:t>
             </a:r>
           </a:p>
           <a:p>
             <a:pPr lvl="4"/>
             <a:r>
-              <a:rPr lang="de-DE" smtClean="0"/>
+              <a:rPr lang="de-DE" dirty="0"/>
               <a:t>Fünfte Ebene</a:t>
             </a:r>
-            <a:endParaRPr lang="de-DE"/>
           </a:p>
         </p:txBody>
       </p:sp>
@@ -773,7 +818,7 @@
           <a:p>
             <a:fld id="{41257651-B64F-43FB-9868-05B8EA16BD84}" type="datetimeFigureOut">
               <a:rPr lang="de-DE" smtClean="0"/>
-              <a:t>06.12.2019</a:t>
+              <a:t>14.12.2019</a:t>
             </a:fld>
             <a:endParaRPr lang="de-DE"/>
           </a:p>
@@ -821,6 +866,47 @@
           </a:p>
         </p:txBody>
       </p:sp>
+      <p:cxnSp>
+        <p:nvCxnSpPr>
+          <p:cNvPr id="9" name="Gerader Verbinder 8">
+            <a:extLst>
+              <a:ext uri="{FF2B5EF4-FFF2-40B4-BE49-F238E27FC236}">
+                <a16:creationId xmlns:a16="http://schemas.microsoft.com/office/drawing/2014/main" id="{0D546910-4736-4FE3-9936-AE372EE789DA}"/>
+              </a:ext>
+            </a:extLst>
+          </p:cNvPr>
+          <p:cNvCxnSpPr/>
+          <p:nvPr userDrawn="1"/>
+        </p:nvCxnSpPr>
+        <p:spPr>
+          <a:xfrm>
+            <a:off x="0" y="1283918"/>
+            <a:ext cx="7509353" cy="0"/>
+          </a:xfrm>
+          <a:prstGeom prst="line">
+            <a:avLst/>
+          </a:prstGeom>
+          <a:ln w="57150">
+            <a:solidFill>
+              <a:srgbClr val="CDB380"/>
+            </a:solidFill>
+          </a:ln>
+        </p:spPr>
+        <p:style>
+          <a:lnRef idx="1">
+            <a:schemeClr val="accent1"/>
+          </a:lnRef>
+          <a:fillRef idx="0">
+            <a:schemeClr val="accent1"/>
+          </a:fillRef>
+          <a:effectRef idx="0">
+            <a:schemeClr val="accent1"/>
+          </a:effectRef>
+          <a:fontRef idx="minor">
+            <a:schemeClr val="tx1"/>
+          </a:fontRef>
+        </p:style>
+      </p:cxnSp>
     </p:spTree>
     <p:extLst>
       <p:ext uri="{BB962C8B-B14F-4D97-AF65-F5344CB8AC3E}">
@@ -876,10 +962,9 @@
           </a:lstStyle>
           <a:p>
             <a:r>
-              <a:rPr lang="de-DE" smtClean="0"/>
+              <a:rPr lang="de-DE"/>
               <a:t>Titelmasterformat durch Klicken bearbeiten</a:t>
             </a:r>
-            <a:endParaRPr lang="de-DE"/>
           </a:p>
         </p:txBody>
       </p:sp>
@@ -996,7 +1081,7 @@
           <a:p>
             <a:pPr lvl="0"/>
             <a:r>
-              <a:rPr lang="de-DE" smtClean="0"/>
+              <a:rPr lang="de-DE"/>
               <a:t>Formatvorlagen des Textmasters bearbeiten</a:t>
             </a:r>
           </a:p>
@@ -1019,7 +1104,7 @@
           <a:p>
             <a:fld id="{41257651-B64F-43FB-9868-05B8EA16BD84}" type="datetimeFigureOut">
               <a:rPr lang="de-DE" smtClean="0"/>
-              <a:t>06.12.2019</a:t>
+              <a:t>14.12.2019</a:t>
             </a:fld>
             <a:endParaRPr lang="de-DE"/>
           </a:p>
@@ -1113,10 +1198,9 @@
           <a:lstStyle/>
           <a:p>
             <a:r>
-              <a:rPr lang="de-DE" smtClean="0"/>
+              <a:rPr lang="de-DE"/>
               <a:t>Titelmasterformat durch Klicken bearbeiten</a:t>
             </a:r>
-            <a:endParaRPr lang="de-DE"/>
           </a:p>
         </p:txBody>
       </p:sp>
@@ -1142,38 +1226,37 @@
           <a:p>
             <a:pPr lvl="0"/>
             <a:r>
-              <a:rPr lang="de-DE" smtClean="0"/>
+              <a:rPr lang="de-DE"/>
               <a:t>Formatvorlagen des Textmasters bearbeiten</a:t>
             </a:r>
           </a:p>
           <a:p>
             <a:pPr lvl="1"/>
             <a:r>
-              <a:rPr lang="de-DE" smtClean="0"/>
+              <a:rPr lang="de-DE"/>
               <a:t>Zweite Ebene</a:t>
             </a:r>
           </a:p>
           <a:p>
             <a:pPr lvl="2"/>
             <a:r>
-              <a:rPr lang="de-DE" smtClean="0"/>
+              <a:rPr lang="de-DE"/>
               <a:t>Dritte Ebene</a:t>
             </a:r>
           </a:p>
           <a:p>
             <a:pPr lvl="3"/>
             <a:r>
-              <a:rPr lang="de-DE" smtClean="0"/>
+              <a:rPr lang="de-DE"/>
               <a:t>Vierte Ebene</a:t>
             </a:r>
           </a:p>
           <a:p>
             <a:pPr lvl="4"/>
             <a:r>
-              <a:rPr lang="de-DE" smtClean="0"/>
+              <a:rPr lang="de-DE"/>
               <a:t>Fünfte Ebene</a:t>
             </a:r>
-            <a:endParaRPr lang="de-DE"/>
           </a:p>
         </p:txBody>
       </p:sp>
@@ -1199,38 +1282,37 @@
           <a:p>
             <a:pPr lvl="0"/>
             <a:r>
-              <a:rPr lang="de-DE" smtClean="0"/>
+              <a:rPr lang="de-DE"/>
               <a:t>Formatvorlagen des Textmasters bearbeiten</a:t>
             </a:r>
           </a:p>
           <a:p>
             <a:pPr lvl="1"/>
             <a:r>
-              <a:rPr lang="de-DE" smtClean="0"/>
+              <a:rPr lang="de-DE"/>
               <a:t>Zweite Ebene</a:t>
             </a:r>
           </a:p>
           <a:p>
             <a:pPr lvl="2"/>
             <a:r>
-              <a:rPr lang="de-DE" smtClean="0"/>
+              <a:rPr lang="de-DE"/>
               <a:t>Dritte Ebene</a:t>
             </a:r>
           </a:p>
           <a:p>
             <a:pPr lvl="3"/>
             <a:r>
-              <a:rPr lang="de-DE" smtClean="0"/>
+              <a:rPr lang="de-DE"/>
               <a:t>Vierte Ebene</a:t>
             </a:r>
           </a:p>
           <a:p>
             <a:pPr lvl="4"/>
             <a:r>
-              <a:rPr lang="de-DE" smtClean="0"/>
+              <a:rPr lang="de-DE"/>
               <a:t>Fünfte Ebene</a:t>
             </a:r>
-            <a:endParaRPr lang="de-DE"/>
           </a:p>
         </p:txBody>
       </p:sp>
@@ -1251,7 +1333,7 @@
           <a:p>
             <a:fld id="{41257651-B64F-43FB-9868-05B8EA16BD84}" type="datetimeFigureOut">
               <a:rPr lang="de-DE" smtClean="0"/>
-              <a:t>06.12.2019</a:t>
+              <a:t>14.12.2019</a:t>
             </a:fld>
             <a:endParaRPr lang="de-DE"/>
           </a:p>
@@ -1350,10 +1432,9 @@
           <a:lstStyle/>
           <a:p>
             <a:r>
-              <a:rPr lang="de-DE" smtClean="0"/>
+              <a:rPr lang="de-DE"/>
               <a:t>Titelmasterformat durch Klicken bearbeiten</a:t>
             </a:r>
-            <a:endParaRPr lang="de-DE"/>
           </a:p>
         </p:txBody>
       </p:sp>
@@ -1416,7 +1497,7 @@
           <a:p>
             <a:pPr lvl="0"/>
             <a:r>
-              <a:rPr lang="de-DE" smtClean="0"/>
+              <a:rPr lang="de-DE"/>
               <a:t>Formatvorlagen des Textmasters bearbeiten</a:t>
             </a:r>
           </a:p>
@@ -1444,38 +1525,37 @@
           <a:p>
             <a:pPr lvl="0"/>
             <a:r>
-              <a:rPr lang="de-DE" smtClean="0"/>
+              <a:rPr lang="de-DE"/>
               <a:t>Formatvorlagen des Textmasters bearbeiten</a:t>
             </a:r>
           </a:p>
           <a:p>
             <a:pPr lvl="1"/>
             <a:r>
-              <a:rPr lang="de-DE" smtClean="0"/>
+              <a:rPr lang="de-DE"/>
               <a:t>Zweite Ebene</a:t>
             </a:r>
           </a:p>
           <a:p>
             <a:pPr lvl="2"/>
             <a:r>
-              <a:rPr lang="de-DE" smtClean="0"/>
+              <a:rPr lang="de-DE"/>
               <a:t>Dritte Ebene</a:t>
             </a:r>
           </a:p>
           <a:p>
             <a:pPr lvl="3"/>
             <a:r>
-              <a:rPr lang="de-DE" smtClean="0"/>
+              <a:rPr lang="de-DE"/>
               <a:t>Vierte Ebene</a:t>
             </a:r>
           </a:p>
           <a:p>
             <a:pPr lvl="4"/>
             <a:r>
-              <a:rPr lang="de-DE" smtClean="0"/>
+              <a:rPr lang="de-DE"/>
               <a:t>Fünfte Ebene</a:t>
             </a:r>
-            <a:endParaRPr lang="de-DE"/>
           </a:p>
         </p:txBody>
       </p:sp>
@@ -1538,7 +1618,7 @@
           <a:p>
             <a:pPr lvl="0"/>
             <a:r>
-              <a:rPr lang="de-DE" smtClean="0"/>
+              <a:rPr lang="de-DE"/>
               <a:t>Formatvorlagen des Textmasters bearbeiten</a:t>
             </a:r>
           </a:p>
@@ -1566,38 +1646,37 @@
           <a:p>
             <a:pPr lvl="0"/>
             <a:r>
-              <a:rPr lang="de-DE" smtClean="0"/>
+              <a:rPr lang="de-DE"/>
               <a:t>Formatvorlagen des Textmasters bearbeiten</a:t>
             </a:r>
           </a:p>
           <a:p>
             <a:pPr lvl="1"/>
             <a:r>
-              <a:rPr lang="de-DE" smtClean="0"/>
+              <a:rPr lang="de-DE"/>
               <a:t>Zweite Ebene</a:t>
             </a:r>
           </a:p>
           <a:p>
             <a:pPr lvl="2"/>
             <a:r>
-              <a:rPr lang="de-DE" smtClean="0"/>
+              <a:rPr lang="de-DE"/>
               <a:t>Dritte Ebene</a:t>
             </a:r>
           </a:p>
           <a:p>
             <a:pPr lvl="3"/>
             <a:r>
-              <a:rPr lang="de-DE" smtClean="0"/>
+              <a:rPr lang="de-DE"/>
               <a:t>Vierte Ebene</a:t>
             </a:r>
           </a:p>
           <a:p>
             <a:pPr lvl="4"/>
             <a:r>
-              <a:rPr lang="de-DE" smtClean="0"/>
+              <a:rPr lang="de-DE"/>
               <a:t>Fünfte Ebene</a:t>
             </a:r>
-            <a:endParaRPr lang="de-DE"/>
           </a:p>
         </p:txBody>
       </p:sp>
@@ -1618,7 +1697,7 @@
           <a:p>
             <a:fld id="{41257651-B64F-43FB-9868-05B8EA16BD84}" type="datetimeFigureOut">
               <a:rPr lang="de-DE" smtClean="0"/>
-              <a:t>06.12.2019</a:t>
+              <a:t>14.12.2019</a:t>
             </a:fld>
             <a:endParaRPr lang="de-DE"/>
           </a:p>
@@ -1712,10 +1791,9 @@
           <a:lstStyle/>
           <a:p>
             <a:r>
-              <a:rPr lang="de-DE" smtClean="0"/>
+              <a:rPr lang="de-DE"/>
               <a:t>Titelmasterformat durch Klicken bearbeiten</a:t>
             </a:r>
-            <a:endParaRPr lang="de-DE"/>
           </a:p>
         </p:txBody>
       </p:sp>
@@ -1736,7 +1814,7 @@
           <a:p>
             <a:fld id="{41257651-B64F-43FB-9868-05B8EA16BD84}" type="datetimeFigureOut">
               <a:rPr lang="de-DE" smtClean="0"/>
-              <a:t>06.12.2019</a:t>
+              <a:t>14.12.2019</a:t>
             </a:fld>
             <a:endParaRPr lang="de-DE"/>
           </a:p>
@@ -1831,7 +1909,7 @@
           <a:p>
             <a:fld id="{41257651-B64F-43FB-9868-05B8EA16BD84}" type="datetimeFigureOut">
               <a:rPr lang="de-DE" smtClean="0"/>
-              <a:t>06.12.2019</a:t>
+              <a:t>14.12.2019</a:t>
             </a:fld>
             <a:endParaRPr lang="de-DE"/>
           </a:p>
@@ -1934,10 +2012,9 @@
           </a:lstStyle>
           <a:p>
             <a:r>
-              <a:rPr lang="de-DE" smtClean="0"/>
+              <a:rPr lang="de-DE"/>
               <a:t>Titelmasterformat durch Klicken bearbeiten</a:t>
             </a:r>
-            <a:endParaRPr lang="de-DE"/>
           </a:p>
         </p:txBody>
       </p:sp>
@@ -1991,38 +2068,37 @@
           <a:p>
             <a:pPr lvl="0"/>
             <a:r>
-              <a:rPr lang="de-DE" smtClean="0"/>
+              <a:rPr lang="de-DE"/>
               <a:t>Formatvorlagen des Textmasters bearbeiten</a:t>
             </a:r>
           </a:p>
           <a:p>
             <a:pPr lvl="1"/>
             <a:r>
-              <a:rPr lang="de-DE" smtClean="0"/>
+              <a:rPr lang="de-DE"/>
               <a:t>Zweite Ebene</a:t>
             </a:r>
           </a:p>
           <a:p>
             <a:pPr lvl="2"/>
             <a:r>
-              <a:rPr lang="de-DE" smtClean="0"/>
+              <a:rPr lang="de-DE"/>
               <a:t>Dritte Ebene</a:t>
             </a:r>
           </a:p>
           <a:p>
             <a:pPr lvl="3"/>
             <a:r>
-              <a:rPr lang="de-DE" smtClean="0"/>
+              <a:rPr lang="de-DE"/>
               <a:t>Vierte Ebene</a:t>
             </a:r>
           </a:p>
           <a:p>
             <a:pPr lvl="4"/>
             <a:r>
-              <a:rPr lang="de-DE" smtClean="0"/>
+              <a:rPr lang="de-DE"/>
               <a:t>Fünfte Ebene</a:t>
             </a:r>
-            <a:endParaRPr lang="de-DE"/>
           </a:p>
         </p:txBody>
       </p:sp>
@@ -2085,7 +2161,7 @@
           <a:p>
             <a:pPr lvl="0"/>
             <a:r>
-              <a:rPr lang="de-DE" smtClean="0"/>
+              <a:rPr lang="de-DE"/>
               <a:t>Formatvorlagen des Textmasters bearbeiten</a:t>
             </a:r>
           </a:p>
@@ -2108,7 +2184,7 @@
           <a:p>
             <a:fld id="{41257651-B64F-43FB-9868-05B8EA16BD84}" type="datetimeFigureOut">
               <a:rPr lang="de-DE" smtClean="0"/>
-              <a:t>06.12.2019</a:t>
+              <a:t>14.12.2019</a:t>
             </a:fld>
             <a:endParaRPr lang="de-DE"/>
           </a:p>
@@ -2211,10 +2287,9 @@
           </a:lstStyle>
           <a:p>
             <a:r>
-              <a:rPr lang="de-DE" smtClean="0"/>
+              <a:rPr lang="de-DE"/>
               <a:t>Titelmasterformat durch Klicken bearbeiten</a:t>
             </a:r>
-            <a:endParaRPr lang="de-DE"/>
           </a:p>
         </p:txBody>
       </p:sp>
@@ -2338,7 +2413,7 @@
           <a:p>
             <a:pPr lvl="0"/>
             <a:r>
-              <a:rPr lang="de-DE" smtClean="0"/>
+              <a:rPr lang="de-DE"/>
               <a:t>Formatvorlagen des Textmasters bearbeiten</a:t>
             </a:r>
           </a:p>
@@ -2361,7 +2436,7 @@
           <a:p>
             <a:fld id="{41257651-B64F-43FB-9868-05B8EA16BD84}" type="datetimeFigureOut">
               <a:rPr lang="de-DE" smtClean="0"/>
-              <a:t>06.12.2019</a:t>
+              <a:t>14.12.2019</a:t>
             </a:fld>
             <a:endParaRPr lang="de-DE"/>
           </a:p>
@@ -2426,9 +2501,12 @@
 <p:sldMaster xmlns:a="http://schemas.openxmlformats.org/drawingml/2006/main" xmlns:r="http://schemas.openxmlformats.org/officeDocument/2006/relationships" xmlns:p="http://schemas.openxmlformats.org/presentationml/2006/main">
   <p:cSld>
     <p:bg>
-      <p:bgRef idx="1001">
-        <a:schemeClr val="bg1"/>
-      </p:bgRef>
+      <p:bgPr>
+        <a:solidFill>
+          <a:srgbClr val="031634"/>
+        </a:solidFill>
+        <a:effectLst/>
+      </p:bgPr>
     </p:bg>
     <p:spTree>
       <p:nvGrpSpPr>
@@ -2470,10 +2548,9 @@
           <a:lstStyle/>
           <a:p>
             <a:r>
-              <a:rPr lang="de-DE" smtClean="0"/>
+              <a:rPr lang="de-DE" dirty="0"/>
               <a:t>Titelmasterformat durch Klicken bearbeiten</a:t>
             </a:r>
-            <a:endParaRPr lang="de-DE"/>
           </a:p>
         </p:txBody>
       </p:sp>
@@ -2504,38 +2581,37 @@
           <a:p>
             <a:pPr lvl="0"/>
             <a:r>
-              <a:rPr lang="de-DE" smtClean="0"/>
+              <a:rPr lang="de-DE" dirty="0"/>
               <a:t>Formatvorlagen des Textmasters bearbeiten</a:t>
             </a:r>
           </a:p>
           <a:p>
             <a:pPr lvl="1"/>
             <a:r>
-              <a:rPr lang="de-DE" smtClean="0"/>
+              <a:rPr lang="de-DE" dirty="0"/>
               <a:t>Zweite Ebene</a:t>
             </a:r>
           </a:p>
           <a:p>
             <a:pPr lvl="2"/>
             <a:r>
-              <a:rPr lang="de-DE" smtClean="0"/>
+              <a:rPr lang="de-DE" dirty="0"/>
               <a:t>Dritte Ebene</a:t>
             </a:r>
           </a:p>
           <a:p>
             <a:pPr lvl="3"/>
             <a:r>
-              <a:rPr lang="de-DE" smtClean="0"/>
+              <a:rPr lang="de-DE" dirty="0"/>
               <a:t>Vierte Ebene</a:t>
             </a:r>
           </a:p>
           <a:p>
             <a:pPr lvl="4"/>
             <a:r>
-              <a:rPr lang="de-DE" smtClean="0"/>
+              <a:rPr lang="de-DE" dirty="0"/>
               <a:t>Fünfte Ebene</a:t>
             </a:r>
-            <a:endParaRPr lang="de-DE"/>
           </a:p>
         </p:txBody>
       </p:sp>
@@ -2564,17 +2640,17 @@
             <a:lvl1pPr algn="l">
               <a:defRPr sz="1200">
                 <a:solidFill>
-                  <a:schemeClr val="tx1">
-                    <a:tint val="75000"/>
-                  </a:schemeClr>
+                  <a:srgbClr val="E8DDCB"/>
                 </a:solidFill>
+                <a:latin typeface="Futura Lt BT" panose="020B0402020204020303" pitchFamily="34" charset="0"/>
               </a:defRPr>
             </a:lvl1pPr>
           </a:lstStyle>
           <a:p>
             <a:fld id="{41257651-B64F-43FB-9868-05B8EA16BD84}" type="datetimeFigureOut">
               <a:rPr lang="de-DE" smtClean="0"/>
-              <a:t>06.12.2019</a:t>
+              <a:pPr/>
+              <a:t>14.12.2019</a:t>
             </a:fld>
             <a:endParaRPr lang="de-DE"/>
           </a:p>
@@ -2605,10 +2681,9 @@
             <a:lvl1pPr algn="ctr">
               <a:defRPr sz="1200">
                 <a:solidFill>
-                  <a:schemeClr val="tx1">
-                    <a:tint val="75000"/>
-                  </a:schemeClr>
+                  <a:srgbClr val="E8DDCB"/>
                 </a:solidFill>
+                <a:latin typeface="Futura Lt BT" panose="020B0402020204020303" pitchFamily="34" charset="0"/>
               </a:defRPr>
             </a:lvl1pPr>
           </a:lstStyle>
@@ -2642,16 +2717,16 @@
             <a:lvl1pPr algn="r">
               <a:defRPr sz="1200">
                 <a:solidFill>
-                  <a:schemeClr val="tx1">
-                    <a:tint val="75000"/>
-                  </a:schemeClr>
+                  <a:srgbClr val="E8DDCB"/>
                 </a:solidFill>
+                <a:latin typeface="Futura Lt BT" panose="020B0402020204020303" pitchFamily="34" charset="0"/>
               </a:defRPr>
             </a:lvl1pPr>
           </a:lstStyle>
           <a:p>
             <a:fld id="{108E1901-7B93-4501-9C96-12B6809ED28B}" type="slidenum">
               <a:rPr lang="de-DE" smtClean="0"/>
+              <a:pPr/>
               <a:t>‹Nr.›</a:t>
             </a:fld>
             <a:endParaRPr lang="de-DE"/>
@@ -2691,9 +2766,9 @@
         <a:buNone/>
         <a:defRPr sz="4400" kern="1200">
           <a:solidFill>
-            <a:schemeClr val="tx1"/>
+            <a:srgbClr val="E8DDCB"/>
           </a:solidFill>
-          <a:latin typeface="+mj-lt"/>
+          <a:latin typeface="Futura Lt BT" panose="020B0402020204020303" pitchFamily="34" charset="0"/>
           <a:ea typeface="+mj-ea"/>
           <a:cs typeface="+mj-cs"/>
         </a:defRPr>
@@ -2707,13 +2782,13 @@
         <a:spcBef>
           <a:spcPts val="1000"/>
         </a:spcBef>
-        <a:buFont typeface="Arial" panose="020B0604020202020204" pitchFamily="34" charset="0"/>
-        <a:buChar char="•"/>
+        <a:buFont typeface="Futura Lt BT" panose="020B0402020204020303" pitchFamily="34" charset="0"/>
+        <a:buChar char="∙"/>
         <a:defRPr sz="2800" kern="1200">
           <a:solidFill>
-            <a:schemeClr val="tx1"/>
+            <a:srgbClr val="E8DDCB"/>
           </a:solidFill>
-          <a:latin typeface="+mn-lt"/>
+          <a:latin typeface="Futura Lt BT" panose="020B0402020204020303" pitchFamily="34" charset="0"/>
           <a:ea typeface="+mn-ea"/>
           <a:cs typeface="+mn-cs"/>
         </a:defRPr>
@@ -2725,13 +2800,13 @@
         <a:spcBef>
           <a:spcPts val="500"/>
         </a:spcBef>
-        <a:buFont typeface="Arial" panose="020B0604020202020204" pitchFamily="34" charset="0"/>
-        <a:buChar char="•"/>
+        <a:buFont typeface="Futura Lt BT" panose="020B0402020204020303" pitchFamily="34" charset="0"/>
+        <a:buChar char="∙"/>
         <a:defRPr sz="2400" kern="1200">
           <a:solidFill>
-            <a:schemeClr val="tx1"/>
+            <a:srgbClr val="E8DDCB"/>
           </a:solidFill>
-          <a:latin typeface="+mn-lt"/>
+          <a:latin typeface="Futura Lt BT" panose="020B0402020204020303" pitchFamily="34" charset="0"/>
           <a:ea typeface="+mn-ea"/>
           <a:cs typeface="+mn-cs"/>
         </a:defRPr>
@@ -2743,13 +2818,13 @@
         <a:spcBef>
           <a:spcPts val="500"/>
         </a:spcBef>
-        <a:buFont typeface="Arial" panose="020B0604020202020204" pitchFamily="34" charset="0"/>
-        <a:buChar char="•"/>
+        <a:buFont typeface="Futura Lt BT" panose="020B0402020204020303" pitchFamily="34" charset="0"/>
+        <a:buChar char="∙"/>
         <a:defRPr sz="2000" kern="1200">
           <a:solidFill>
-            <a:schemeClr val="tx1"/>
+            <a:srgbClr val="E8DDCB"/>
           </a:solidFill>
-          <a:latin typeface="+mn-lt"/>
+          <a:latin typeface="Futura Lt BT" panose="020B0402020204020303" pitchFamily="34" charset="0"/>
           <a:ea typeface="+mn-ea"/>
           <a:cs typeface="+mn-cs"/>
         </a:defRPr>
@@ -2761,13 +2836,13 @@
         <a:spcBef>
           <a:spcPts val="500"/>
         </a:spcBef>
-        <a:buFont typeface="Arial" panose="020B0604020202020204" pitchFamily="34" charset="0"/>
-        <a:buChar char="•"/>
+        <a:buFont typeface="Futura Lt BT" panose="020B0402020204020303" pitchFamily="34" charset="0"/>
+        <a:buChar char="∙"/>
         <a:defRPr sz="1800" kern="1200">
           <a:solidFill>
-            <a:schemeClr val="tx1"/>
+            <a:srgbClr val="E8DDCB"/>
           </a:solidFill>
-          <a:latin typeface="+mn-lt"/>
+          <a:latin typeface="Futura Lt BT" panose="020B0402020204020303" pitchFamily="34" charset="0"/>
           <a:ea typeface="+mn-ea"/>
           <a:cs typeface="+mn-cs"/>
         </a:defRPr>
@@ -2779,13 +2854,13 @@
         <a:spcBef>
           <a:spcPts val="500"/>
         </a:spcBef>
-        <a:buFont typeface="Arial" panose="020B0604020202020204" pitchFamily="34" charset="0"/>
-        <a:buChar char="•"/>
+        <a:buFont typeface="Futura Lt BT" panose="020B0402020204020303" pitchFamily="34" charset="0"/>
+        <a:buChar char="∙"/>
         <a:defRPr sz="1800" kern="1200">
           <a:solidFill>
-            <a:schemeClr val="tx1"/>
+            <a:srgbClr val="E8DDCB"/>
           </a:solidFill>
-          <a:latin typeface="+mn-lt"/>
+          <a:latin typeface="Futura Lt BT" panose="020B0402020204020303" pitchFamily="34" charset="0"/>
           <a:ea typeface="+mn-ea"/>
           <a:cs typeface="+mn-cs"/>
         </a:defRPr>
@@ -2991,7 +3066,7 @@
         </p:nvSpPr>
         <p:spPr>
           <a:xfrm>
-            <a:off x="1524000" y="1122363"/>
+            <a:off x="1524000" y="2745289"/>
             <a:ext cx="9144000" cy="856749"/>
           </a:xfrm>
         </p:spPr>
@@ -3002,20 +3077,22 @@
           <a:lstStyle/>
           <a:p>
             <a:r>
-              <a:rPr lang="de-DE" dirty="0" err="1" smtClean="0"/>
+              <a:rPr lang="de-DE" dirty="0" err="1"/>
               <a:t>Resync</a:t>
             </a:r>
-            <a:r>
-              <a:rPr lang="de-DE" dirty="0" smtClean="0"/>
-              <a:t> – Die Überführung ins Bewusstsein</a:t>
-            </a:r>
             <a:endParaRPr lang="de-DE" dirty="0"/>
           </a:p>
         </p:txBody>
       </p:sp>
       <p:sp>
         <p:nvSpPr>
-          <p:cNvPr id="3" name="Untertitel 2"/>
+          <p:cNvPr id="6" name="Untertitel 5">
+            <a:extLst>
+              <a:ext uri="{FF2B5EF4-FFF2-40B4-BE49-F238E27FC236}">
+                <a16:creationId xmlns:a16="http://schemas.microsoft.com/office/drawing/2014/main" id="{14395941-269A-477F-A379-FDB8CDD9FD3C}"/>
+              </a:ext>
+            </a:extLst>
+          </p:cNvPr>
           <p:cNvSpPr>
             <a:spLocks noGrp="1"/>
           </p:cNvSpPr>
@@ -3025,34 +3102,15 @@
         </p:nvSpPr>
         <p:spPr/>
         <p:txBody>
-          <a:bodyPr/>
-          <a:lstStyle/>
-          <a:p>
-            <a:r>
-              <a:rPr lang="de-DE" dirty="0" smtClean="0"/>
-              <a:t>Hier 1 </a:t>
-            </a:r>
-            <a:r>
-              <a:rPr lang="de-DE" dirty="0" err="1" smtClean="0"/>
-              <a:t>fancy</a:t>
-            </a:r>
-            <a:r>
-              <a:rPr lang="de-DE" dirty="0" smtClean="0"/>
-              <a:t> </a:t>
-            </a:r>
-            <a:r>
-              <a:rPr lang="de-DE" dirty="0" err="1" smtClean="0"/>
-              <a:t>picc</a:t>
-            </a:r>
-            <a:r>
-              <a:rPr lang="de-DE" dirty="0" smtClean="0"/>
-              <a:t> hin </a:t>
-            </a:r>
-            <a:r>
-              <a:rPr lang="de-DE" dirty="0" err="1" smtClean="0"/>
-              <a:t>mayBe</a:t>
-            </a:r>
-            <a:endParaRPr lang="de-DE" dirty="0"/>
+          <a:bodyPr>
+            <a:normAutofit/>
+          </a:bodyPr>
+          <a:lstStyle/>
+          <a:p>
+            <a:r>
+              <a:rPr lang="de-DE" sz="1800" dirty="0"/>
+              <a:t>Die Überführung ins Bewusstsein</a:t>
+            </a:r>
           </a:p>
         </p:txBody>
       </p:sp>
@@ -3066,13 +3124,6 @@
   <p:clrMapOvr>
     <a:masterClrMapping/>
   </p:clrMapOvr>
-  <p:timing>
-    <p:tnLst>
-      <p:par>
-        <p:cTn id="1" dur="indefinite" restart="never" nodeType="tmRoot"/>
-      </p:par>
-    </p:tnLst>
-  </p:timing>
 </p:sld>
 </file>
 
@@ -3108,58 +3159,57 @@
           <a:bodyPr/>
           <a:lstStyle/>
           <a:p>
-            <a:endParaRPr lang="de-DE"/>
-          </a:p>
-        </p:txBody>
-      </p:sp>
-      <p:sp>
-        <p:nvSpPr>
-          <p:cNvPr id="3" name="Inhaltsplatzhalter 2"/>
-          <p:cNvSpPr>
-            <a:spLocks noGrp="1"/>
-          </p:cNvSpPr>
+            <a:r>
+              <a:rPr lang="de-DE" dirty="0"/>
+              <a:t>Aufgaben (2/4)</a:t>
+            </a:r>
+          </a:p>
+        </p:txBody>
+      </p:sp>
+      <p:pic>
+        <p:nvPicPr>
+          <p:cNvPr id="9" name="Inhaltsplatzhalter 8">
+            <a:extLst>
+              <a:ext uri="{FF2B5EF4-FFF2-40B4-BE49-F238E27FC236}">
+                <a16:creationId xmlns:a16="http://schemas.microsoft.com/office/drawing/2014/main" id="{5E2E5E09-3C09-46C6-861F-AE1C45040B82}"/>
+              </a:ext>
+            </a:extLst>
+          </p:cNvPr>
+          <p:cNvPicPr>
+            <a:picLocks noGrp="1" noChangeAspect="1"/>
+          </p:cNvPicPr>
           <p:nvPr>
             <p:ph idx="1"/>
           </p:nvPr>
-        </p:nvSpPr>
-        <p:spPr/>
-        <p:txBody>
-          <a:bodyPr/>
-          <a:lstStyle/>
-          <a:p>
-            <a:r>
-              <a:rPr lang="de-DE" dirty="0" smtClean="0"/>
-              <a:t>Aufgabe 2: </a:t>
-            </a:r>
-            <a:r>
-              <a:rPr lang="de-DE" dirty="0" err="1" smtClean="0"/>
-              <a:t>Stroop</a:t>
-            </a:r>
-            <a:r>
-              <a:rPr lang="de-DE" dirty="0" smtClean="0"/>
-              <a:t>-Effekt</a:t>
-            </a:r>
-            <a:endParaRPr lang="de-DE" dirty="0"/>
-          </a:p>
-        </p:txBody>
-      </p:sp>
+        </p:nvPicPr>
+        <p:blipFill>
+          <a:blip r:embed="rId2">
+            <a:extLst>
+              <a:ext uri="{28A0092B-C50C-407E-A947-70E740481C1C}">
+                <a14:useLocalDpi xmlns:a14="http://schemas.microsoft.com/office/drawing/2010/main" val="0"/>
+              </a:ext>
+            </a:extLst>
+          </a:blip>
+          <a:srcRect/>
+          <a:stretch/>
+        </p:blipFill>
+        <p:spPr>
+          <a:xfrm>
+            <a:off x="1572016" y="1418096"/>
+            <a:ext cx="9047967" cy="5742598"/>
+          </a:xfrm>
+        </p:spPr>
+      </p:pic>
     </p:spTree>
     <p:extLst>
       <p:ext uri="{BB962C8B-B14F-4D97-AF65-F5344CB8AC3E}">
-        <p14:creationId xmlns:p14="http://schemas.microsoft.com/office/powerpoint/2010/main" val="1078823217"/>
+        <p14:creationId xmlns:p14="http://schemas.microsoft.com/office/powerpoint/2010/main" val="1151443220"/>
       </p:ext>
     </p:extLst>
   </p:cSld>
   <p:clrMapOvr>
     <a:masterClrMapping/>
   </p:clrMapOvr>
-  <p:timing>
-    <p:tnLst>
-      <p:par>
-        <p:cTn id="1" dur="indefinite" restart="never" nodeType="tmRoot"/>
-      </p:par>
-    </p:tnLst>
-  </p:timing>
 </p:sld>
 </file>
 
@@ -3195,50 +3245,57 @@
           <a:bodyPr/>
           <a:lstStyle/>
           <a:p>
-            <a:endParaRPr lang="de-DE"/>
-          </a:p>
-        </p:txBody>
-      </p:sp>
-      <p:sp>
-        <p:nvSpPr>
-          <p:cNvPr id="3" name="Inhaltsplatzhalter 2"/>
-          <p:cNvSpPr>
-            <a:spLocks noGrp="1"/>
-          </p:cNvSpPr>
+            <a:r>
+              <a:rPr lang="de-DE" dirty="0"/>
+              <a:t>Aufgaben (3/4)</a:t>
+            </a:r>
+          </a:p>
+        </p:txBody>
+      </p:sp>
+      <p:pic>
+        <p:nvPicPr>
+          <p:cNvPr id="9" name="Inhaltsplatzhalter 8">
+            <a:extLst>
+              <a:ext uri="{FF2B5EF4-FFF2-40B4-BE49-F238E27FC236}">
+                <a16:creationId xmlns:a16="http://schemas.microsoft.com/office/drawing/2014/main" id="{5E2E5E09-3C09-46C6-861F-AE1C45040B82}"/>
+              </a:ext>
+            </a:extLst>
+          </p:cNvPr>
+          <p:cNvPicPr>
+            <a:picLocks noGrp="1" noChangeAspect="1"/>
+          </p:cNvPicPr>
           <p:nvPr>
             <p:ph idx="1"/>
           </p:nvPr>
-        </p:nvSpPr>
-        <p:spPr/>
-        <p:txBody>
-          <a:bodyPr/>
-          <a:lstStyle/>
-          <a:p>
-            <a:r>
-              <a:rPr lang="de-DE" dirty="0" smtClean="0"/>
-              <a:t>Aufgabe 3: Boxen zählen</a:t>
-            </a:r>
-            <a:endParaRPr lang="de-DE" dirty="0"/>
-          </a:p>
-        </p:txBody>
-      </p:sp>
+        </p:nvPicPr>
+        <p:blipFill>
+          <a:blip r:embed="rId2">
+            <a:extLst>
+              <a:ext uri="{28A0092B-C50C-407E-A947-70E740481C1C}">
+                <a14:useLocalDpi xmlns:a14="http://schemas.microsoft.com/office/drawing/2010/main" val="0"/>
+              </a:ext>
+            </a:extLst>
+          </a:blip>
+          <a:srcRect/>
+          <a:stretch/>
+        </p:blipFill>
+        <p:spPr>
+          <a:xfrm>
+            <a:off x="1572016" y="1418096"/>
+            <a:ext cx="9047967" cy="5742598"/>
+          </a:xfrm>
+        </p:spPr>
+      </p:pic>
     </p:spTree>
     <p:extLst>
       <p:ext uri="{BB962C8B-B14F-4D97-AF65-F5344CB8AC3E}">
-        <p14:creationId xmlns:p14="http://schemas.microsoft.com/office/powerpoint/2010/main" val="2178666697"/>
+        <p14:creationId xmlns:p14="http://schemas.microsoft.com/office/powerpoint/2010/main" val="763508232"/>
       </p:ext>
     </p:extLst>
   </p:cSld>
   <p:clrMapOvr>
     <a:masterClrMapping/>
   </p:clrMapOvr>
-  <p:timing>
-    <p:tnLst>
-      <p:par>
-        <p:cTn id="1" dur="indefinite" restart="never" nodeType="tmRoot"/>
-      </p:par>
-    </p:tnLst>
-  </p:timing>
 </p:sld>
 </file>
 
@@ -3261,7 +3318,13 @@
       </p:grpSpPr>
       <p:sp>
         <p:nvSpPr>
-          <p:cNvPr id="2" name="Titel 1"/>
+          <p:cNvPr id="5" name="Titel 4">
+            <a:extLst>
+              <a:ext uri="{FF2B5EF4-FFF2-40B4-BE49-F238E27FC236}">
+                <a16:creationId xmlns:a16="http://schemas.microsoft.com/office/drawing/2014/main" id="{D3B3AA58-6A5E-4BF4-8CA0-E6B0BBBF57BD}"/>
+              </a:ext>
+            </a:extLst>
+          </p:cNvPr>
           <p:cNvSpPr>
             <a:spLocks noGrp="1"/>
           </p:cNvSpPr>
@@ -3275,24 +3338,21 @@
           <a:lstStyle/>
           <a:p>
             <a:r>
-              <a:rPr lang="de-DE" dirty="0" smtClean="0">
-                <a:solidFill>
-                  <a:schemeClr val="accent2"/>
-                </a:solidFill>
-              </a:rPr>
-              <a:t>Implementierung</a:t>
-            </a:r>
-            <a:endParaRPr lang="de-DE" dirty="0">
-              <a:solidFill>
-                <a:schemeClr val="accent2"/>
-              </a:solidFill>
-            </a:endParaRPr>
-          </a:p>
-        </p:txBody>
-      </p:sp>
-      <p:sp>
-        <p:nvSpPr>
-          <p:cNvPr id="3" name="Inhaltsplatzhalter 2"/>
+              <a:rPr lang="de-DE" dirty="0"/>
+              <a:t>Aufgaben (4/4)</a:t>
+            </a:r>
+          </a:p>
+        </p:txBody>
+      </p:sp>
+      <p:sp>
+        <p:nvSpPr>
+          <p:cNvPr id="3" name="Inhaltsplatzhalter 2">
+            <a:extLst>
+              <a:ext uri="{FF2B5EF4-FFF2-40B4-BE49-F238E27FC236}">
+                <a16:creationId xmlns:a16="http://schemas.microsoft.com/office/drawing/2014/main" id="{CA552B51-2B65-4706-BCBA-EFA42B1145C0}"/>
+              </a:ext>
+            </a:extLst>
+          </p:cNvPr>
           <p:cNvSpPr>
             <a:spLocks noGrp="1"/>
           </p:cNvSpPr>
@@ -3305,48 +3365,26 @@
           <a:bodyPr/>
           <a:lstStyle/>
           <a:p>
-            <a:pPr marL="0" indent="0">
-              <a:buNone/>
-            </a:pPr>
-            <a:r>
-              <a:rPr lang="de-DE" dirty="0" smtClean="0">
-                <a:hlinkClick r:id="rId2" action="ppaction://hlinkfile"/>
-              </a:rPr>
-              <a:t>\\todo</a:t>
-            </a:r>
-            <a:r>
-              <a:rPr lang="de-DE" dirty="0" smtClean="0"/>
-              <a:t>: </a:t>
-            </a:r>
-            <a:r>
-              <a:rPr lang="de-DE" dirty="0" err="1" smtClean="0"/>
-              <a:t>Implentierung</a:t>
-            </a:r>
-            <a:r>
-              <a:rPr lang="de-DE" dirty="0" smtClean="0"/>
-              <a:t> kurz</a:t>
-            </a:r>
-            <a:endParaRPr lang="de-DE" dirty="0"/>
+            <a:r>
+              <a:rPr lang="de-DE"/>
+              <a:t>Video</a:t>
+            </a:r>
+          </a:p>
+          <a:p>
+            <a:endParaRPr lang="de-DE"/>
           </a:p>
         </p:txBody>
       </p:sp>
     </p:spTree>
     <p:extLst>
       <p:ext uri="{BB962C8B-B14F-4D97-AF65-F5344CB8AC3E}">
-        <p14:creationId xmlns:p14="http://schemas.microsoft.com/office/powerpoint/2010/main" val="2577495292"/>
+        <p14:creationId xmlns:p14="http://schemas.microsoft.com/office/powerpoint/2010/main" val="182811933"/>
       </p:ext>
     </p:extLst>
   </p:cSld>
   <p:clrMapOvr>
     <a:masterClrMapping/>
   </p:clrMapOvr>
-  <p:timing>
-    <p:tnLst>
-      <p:par>
-        <p:cTn id="1" dur="indefinite" restart="never" nodeType="tmRoot"/>
-      </p:par>
-    </p:tnLst>
-  </p:timing>
 </p:sld>
 </file>
 
@@ -3382,7 +3420,10 @@
           <a:bodyPr/>
           <a:lstStyle/>
           <a:p>
-            <a:endParaRPr lang="de-DE"/>
+            <a:r>
+              <a:rPr lang="de-DE" dirty="0"/>
+              <a:t>Ergebnisse</a:t>
+            </a:r>
           </a:p>
         </p:txBody>
       </p:sp>
@@ -3402,38 +3443,78 @@
           <a:lstStyle/>
           <a:p>
             <a:r>
-              <a:rPr lang="de-DE" dirty="0" smtClean="0"/>
-              <a:t>**hier </a:t>
-            </a:r>
-            <a:r>
-              <a:rPr lang="de-DE" dirty="0" err="1" smtClean="0"/>
-              <a:t>video</a:t>
-            </a:r>
-            <a:r>
-              <a:rPr lang="de-DE" dirty="0" smtClean="0"/>
-              <a:t> zeigen**</a:t>
-            </a:r>
-            <a:endParaRPr lang="de-DE" dirty="0"/>
+              <a:rPr lang="de-DE" dirty="0"/>
+              <a:t>Demografisch (Alter, Erfahrung, Geschlecht)</a:t>
+            </a:r>
+          </a:p>
+          <a:p>
+            <a:r>
+              <a:rPr lang="de-DE" dirty="0"/>
+              <a:t>Umgebungsvariablen (Stuhleinstellungen)</a:t>
+            </a:r>
+          </a:p>
+          <a:p>
+            <a:r>
+              <a:rPr lang="de-DE" dirty="0"/>
+              <a:t>Dauer des </a:t>
+            </a:r>
+            <a:r>
+              <a:rPr lang="de-DE" dirty="0" err="1"/>
+              <a:t>Wecktons</a:t>
+            </a:r>
+            <a:r>
+              <a:rPr lang="de-DE" dirty="0"/>
+              <a:t> zum Abstellen</a:t>
+            </a:r>
+          </a:p>
+          <a:p>
+            <a:r>
+              <a:rPr lang="de-DE" dirty="0"/>
+              <a:t>Aufgabenergebnisse (Fehlerraten, Zeiten in Gruppen)</a:t>
+            </a:r>
+          </a:p>
+          <a:p>
+            <a:r>
+              <a:rPr lang="de-DE" dirty="0"/>
+              <a:t>Fragebögen (Sam, RSME)</a:t>
+            </a:r>
+          </a:p>
+          <a:p>
+            <a:r>
+              <a:rPr lang="de-DE" dirty="0"/>
+              <a:t>Schlafstatus</a:t>
+            </a:r>
+          </a:p>
+          <a:p>
+            <a:r>
+              <a:rPr lang="de-DE" dirty="0" err="1"/>
+              <a:t>Limesurvey</a:t>
+            </a:r>
+            <a:r>
+              <a:rPr lang="de-DE" dirty="0"/>
+              <a:t> (Müdigkeit vorher/</a:t>
+            </a:r>
+            <a:r>
+              <a:rPr lang="de-DE" dirty="0" err="1"/>
+              <a:t>nachehr</a:t>
+            </a:r>
+            <a:r>
+              <a:rPr lang="de-DE" dirty="0"/>
+              <a:t>, Aufgabenschwierigkeit, Komfort mit VR Brille, ..)</a:t>
+            </a:r>
           </a:p>
         </p:txBody>
       </p:sp>
     </p:spTree>
     <p:extLst>
       <p:ext uri="{BB962C8B-B14F-4D97-AF65-F5344CB8AC3E}">
-        <p14:creationId xmlns:p14="http://schemas.microsoft.com/office/powerpoint/2010/main" val="182811933"/>
+        <p14:creationId xmlns:p14="http://schemas.microsoft.com/office/powerpoint/2010/main" val="2021924618"/>
       </p:ext>
     </p:extLst>
   </p:cSld>
   <p:clrMapOvr>
     <a:masterClrMapping/>
   </p:clrMapOvr>
-  <p:timing>
-    <p:tnLst>
-      <p:par>
-        <p:cTn id="1" dur="indefinite" restart="never" nodeType="tmRoot"/>
-      </p:par>
-    </p:tnLst>
-  </p:timing>
 </p:sld>
 </file>
 
@@ -3470,18 +3551,9 @@
           <a:lstStyle/>
           <a:p>
             <a:r>
-              <a:rPr lang="de-DE" dirty="0" smtClean="0">
-                <a:solidFill>
-                  <a:schemeClr val="accent2"/>
-                </a:solidFill>
-              </a:rPr>
-              <a:t>Ergebnisse</a:t>
-            </a:r>
-            <a:endParaRPr lang="de-DE" dirty="0">
-              <a:solidFill>
-                <a:schemeClr val="accent2"/>
-              </a:solidFill>
-            </a:endParaRPr>
+              <a:rPr lang="de-DE" dirty="0"/>
+              <a:t>Diskussion</a:t>
+            </a:r>
           </a:p>
         </p:txBody>
       </p:sp>
@@ -3501,85 +3573,59 @@
           <a:lstStyle/>
           <a:p>
             <a:r>
-              <a:rPr lang="de-DE" dirty="0" smtClean="0"/>
-              <a:t>Demografisch (Alter, Erfahrung, Geschlecht)</a:t>
-            </a:r>
-          </a:p>
-          <a:p>
-            <a:r>
-              <a:rPr lang="de-DE" dirty="0" smtClean="0"/>
-              <a:t>Umgebungsvariablen (Stuhleinstellungen)</a:t>
-            </a:r>
-          </a:p>
-          <a:p>
-            <a:r>
-              <a:rPr lang="de-DE" dirty="0" smtClean="0"/>
-              <a:t>Dauer des </a:t>
-            </a:r>
-            <a:r>
-              <a:rPr lang="de-DE" dirty="0" err="1" smtClean="0"/>
-              <a:t>Wecktons</a:t>
-            </a:r>
-            <a:r>
-              <a:rPr lang="de-DE" dirty="0" smtClean="0"/>
-              <a:t> zum Abstellen</a:t>
-            </a:r>
-          </a:p>
-          <a:p>
-            <a:r>
-              <a:rPr lang="de-DE" dirty="0" smtClean="0"/>
-              <a:t>Aufgabenergebnisse (Fehlerraten, Zeiten in Gruppen)</a:t>
-            </a:r>
-          </a:p>
-          <a:p>
-            <a:r>
-              <a:rPr lang="de-DE" dirty="0" smtClean="0"/>
-              <a:t>Fragebögen (Sam, RSME)</a:t>
-            </a:r>
-          </a:p>
-          <a:p>
-            <a:r>
-              <a:rPr lang="de-DE" dirty="0" smtClean="0"/>
-              <a:t>Schlafstatus</a:t>
-            </a:r>
-          </a:p>
-          <a:p>
-            <a:r>
-              <a:rPr lang="de-DE" dirty="0" err="1" smtClean="0"/>
-              <a:t>Limesurvey</a:t>
-            </a:r>
-            <a:r>
-              <a:rPr lang="de-DE" dirty="0" smtClean="0"/>
-              <a:t> (Müdigkeit vorher/</a:t>
-            </a:r>
-            <a:r>
-              <a:rPr lang="de-DE" dirty="0" err="1" smtClean="0"/>
-              <a:t>nachehr</a:t>
-            </a:r>
-            <a:r>
-              <a:rPr lang="de-DE" dirty="0" smtClean="0"/>
-              <a:t>, Aufgabenschwierigkeit, Komfort mit VR Brille, ..)</a:t>
-            </a:r>
+              <a:rPr lang="de-DE" dirty="0"/>
+              <a:t>Art und Weise des Aufwachens beeinträchtigt die anschließende Aufgabenbewältigung nicht signifikant</a:t>
+            </a:r>
+          </a:p>
+          <a:p>
+            <a:r>
+              <a:rPr lang="de-DE" dirty="0"/>
+              <a:t>Demografie</a:t>
+            </a:r>
+          </a:p>
+          <a:p>
+            <a:r>
+              <a:rPr lang="de-DE" dirty="0"/>
+              <a:t>Studiendurchführung und Umgebung</a:t>
+            </a:r>
+          </a:p>
+          <a:p>
+            <a:r>
+              <a:rPr lang="de-DE" dirty="0"/>
+              <a:t>Aufgaben gut gewählt, warum diese Ergebnisse?</a:t>
+            </a:r>
+          </a:p>
+          <a:p>
+            <a:r>
+              <a:rPr lang="de-DE" dirty="0" err="1"/>
+              <a:t>Implentierung</a:t>
+            </a:r>
+            <a:r>
+              <a:rPr lang="de-DE" dirty="0"/>
+              <a:t> gut gemacht? </a:t>
+            </a:r>
+          </a:p>
+          <a:p>
+            <a:r>
+              <a:rPr lang="de-DE" dirty="0"/>
+              <a:t>Zukunftsaussicht</a:t>
+            </a:r>
+          </a:p>
+          <a:p>
+            <a:endParaRPr lang="de-DE" dirty="0"/>
           </a:p>
         </p:txBody>
       </p:sp>
     </p:spTree>
     <p:extLst>
       <p:ext uri="{BB962C8B-B14F-4D97-AF65-F5344CB8AC3E}">
-        <p14:creationId xmlns:p14="http://schemas.microsoft.com/office/powerpoint/2010/main" val="2021924618"/>
+        <p14:creationId xmlns:p14="http://schemas.microsoft.com/office/powerpoint/2010/main" val="1692567459"/>
       </p:ext>
     </p:extLst>
   </p:cSld>
   <p:clrMapOvr>
     <a:masterClrMapping/>
   </p:clrMapOvr>
-  <p:timing>
-    <p:tnLst>
-      <p:par>
-        <p:cTn id="1" dur="indefinite" restart="never" nodeType="tmRoot"/>
-      </p:par>
-    </p:tnLst>
-  </p:timing>
 </p:sld>
 </file>
 
@@ -3616,18 +3662,9 @@
           <a:lstStyle/>
           <a:p>
             <a:r>
-              <a:rPr lang="de-DE" dirty="0" smtClean="0">
-                <a:solidFill>
-                  <a:schemeClr val="accent2"/>
-                </a:solidFill>
-              </a:rPr>
-              <a:t>Diskussion</a:t>
-            </a:r>
-            <a:endParaRPr lang="de-DE" dirty="0">
-              <a:solidFill>
-                <a:schemeClr val="accent2"/>
-              </a:solidFill>
-            </a:endParaRPr>
+              <a:rPr lang="de-DE" dirty="0"/>
+              <a:t>Schlussfolgerung</a:t>
+            </a:r>
           </a:p>
         </p:txBody>
       </p:sp>
@@ -3647,165 +3684,29 @@
           <a:lstStyle/>
           <a:p>
             <a:r>
-              <a:rPr lang="de-DE" dirty="0" smtClean="0"/>
-              <a:t>Art und Weise des Aufwachens beeinträchtigt die anschließende Aufgabenbewältigung nicht signifikant</a:t>
-            </a:r>
-          </a:p>
-          <a:p>
-            <a:r>
-              <a:rPr lang="de-DE" dirty="0" smtClean="0"/>
-              <a:t>Demografie</a:t>
-            </a:r>
-          </a:p>
-          <a:p>
-            <a:r>
-              <a:rPr lang="de-DE" dirty="0" smtClean="0"/>
-              <a:t>Studiendurchführung und Umgebung</a:t>
-            </a:r>
-          </a:p>
-          <a:p>
-            <a:r>
-              <a:rPr lang="de-DE" dirty="0" smtClean="0"/>
-              <a:t>Aufgaben gut gewählt, warum diese Ergebnisse?</a:t>
-            </a:r>
-          </a:p>
-          <a:p>
-            <a:r>
-              <a:rPr lang="de-DE" dirty="0" err="1" smtClean="0"/>
-              <a:t>Implentierung</a:t>
-            </a:r>
-            <a:r>
-              <a:rPr lang="de-DE" dirty="0" smtClean="0"/>
-              <a:t> gut gemacht? </a:t>
-            </a:r>
-            <a:endParaRPr lang="de-DE" dirty="0"/>
-          </a:p>
-          <a:p>
-            <a:r>
-              <a:rPr lang="de-DE" dirty="0" smtClean="0"/>
-              <a:t>Zukunftsaussicht</a:t>
-            </a:r>
-          </a:p>
-          <a:p>
-            <a:endParaRPr lang="de-DE" dirty="0"/>
-          </a:p>
-        </p:txBody>
-      </p:sp>
-    </p:spTree>
-    <p:extLst>
-      <p:ext uri="{BB962C8B-B14F-4D97-AF65-F5344CB8AC3E}">
-        <p14:creationId xmlns:p14="http://schemas.microsoft.com/office/powerpoint/2010/main" val="1692567459"/>
-      </p:ext>
-    </p:extLst>
-  </p:cSld>
-  <p:clrMapOvr>
-    <a:masterClrMapping/>
-  </p:clrMapOvr>
-  <p:timing>
-    <p:tnLst>
-      <p:par>
-        <p:cTn id="1" dur="indefinite" restart="never" nodeType="tmRoot"/>
-      </p:par>
-    </p:tnLst>
-  </p:timing>
-</p:sld>
-</file>
-
-<file path=ppt/slides/slide16.xml><?xml version="1.0" encoding="utf-8"?>
-<p:sld xmlns:a="http://schemas.openxmlformats.org/drawingml/2006/main" xmlns:r="http://schemas.openxmlformats.org/officeDocument/2006/relationships" xmlns:p="http://schemas.openxmlformats.org/presentationml/2006/main">
-  <p:cSld>
-    <p:spTree>
-      <p:nvGrpSpPr>
-        <p:cNvPr id="1" name=""/>
-        <p:cNvGrpSpPr/>
-        <p:nvPr/>
-      </p:nvGrpSpPr>
-      <p:grpSpPr>
-        <a:xfrm>
-          <a:off x="0" y="0"/>
-          <a:ext cx="0" cy="0"/>
-          <a:chOff x="0" y="0"/>
-          <a:chExt cx="0" cy="0"/>
-        </a:xfrm>
-      </p:grpSpPr>
-      <p:sp>
-        <p:nvSpPr>
-          <p:cNvPr id="2" name="Titel 1"/>
-          <p:cNvSpPr>
-            <a:spLocks noGrp="1"/>
-          </p:cNvSpPr>
-          <p:nvPr>
-            <p:ph type="title"/>
-          </p:nvPr>
-        </p:nvSpPr>
-        <p:spPr/>
-        <p:txBody>
-          <a:bodyPr/>
-          <a:lstStyle/>
-          <a:p>
-            <a:r>
-              <a:rPr lang="de-DE" dirty="0" smtClean="0">
-                <a:solidFill>
-                  <a:schemeClr val="accent2"/>
-                </a:solidFill>
-              </a:rPr>
-              <a:t>Schlussfolgerung</a:t>
-            </a:r>
-            <a:endParaRPr lang="de-DE" dirty="0">
-              <a:solidFill>
-                <a:schemeClr val="accent2"/>
-              </a:solidFill>
-            </a:endParaRPr>
-          </a:p>
-        </p:txBody>
-      </p:sp>
-      <p:sp>
-        <p:nvSpPr>
-          <p:cNvPr id="3" name="Inhaltsplatzhalter 2"/>
-          <p:cNvSpPr>
-            <a:spLocks noGrp="1"/>
-          </p:cNvSpPr>
-          <p:nvPr>
-            <p:ph idx="1"/>
-          </p:nvPr>
-        </p:nvSpPr>
-        <p:spPr/>
-        <p:txBody>
-          <a:bodyPr/>
-          <a:lstStyle/>
-          <a:p>
-            <a:r>
-              <a:rPr lang="de-DE" dirty="0" smtClean="0"/>
+              <a:rPr lang="de-DE" dirty="0"/>
               <a:t>VR</a:t>
             </a:r>
           </a:p>
           <a:p>
             <a:r>
-              <a:rPr lang="de-DE" dirty="0" smtClean="0"/>
-              <a:t>Hypothesen und Parameter</a:t>
-            </a:r>
-            <a:r>
-              <a:rPr lang="de-DE" dirty="0"/>
-              <a:t> </a:t>
-            </a:r>
-            <a:r>
-              <a:rPr lang="de-DE" dirty="0" smtClean="0"/>
-              <a:t>und Gruppen</a:t>
-            </a:r>
-          </a:p>
-          <a:p>
-            <a:r>
-              <a:rPr lang="de-DE" dirty="0" smtClean="0"/>
+              <a:rPr lang="de-DE" dirty="0"/>
+              <a:t>Hypothesen und Parameter und Gruppen</a:t>
+            </a:r>
+          </a:p>
+          <a:p>
+            <a:r>
+              <a:rPr lang="de-DE" dirty="0"/>
               <a:t>Bewertung der Ergebnisse</a:t>
             </a:r>
           </a:p>
           <a:p>
             <a:r>
-              <a:rPr lang="de-DE" smtClean="0"/>
+              <a:rPr lang="de-DE"/>
               <a:t>Zukünftige </a:t>
             </a:r>
             <a:r>
-              <a:rPr lang="de-DE" dirty="0" smtClean="0"/>
+              <a:rPr lang="de-DE" dirty="0"/>
               <a:t>Forschung</a:t>
             </a:r>
           </a:p>
@@ -3821,13 +3722,6 @@
   <p:clrMapOvr>
     <a:masterClrMapping/>
   </p:clrMapOvr>
-  <p:timing>
-    <p:tnLst>
-      <p:par>
-        <p:cTn id="1" dur="indefinite" restart="never" nodeType="tmRoot"/>
-      </p:par>
-    </p:tnLst>
-  </p:timing>
 </p:sld>
 </file>
 
@@ -3850,7 +3744,13 @@
       </p:grpSpPr>
       <p:sp>
         <p:nvSpPr>
-          <p:cNvPr id="2" name="Titel 1"/>
+          <p:cNvPr id="5" name="Titel 4">
+            <a:extLst>
+              <a:ext uri="{FF2B5EF4-FFF2-40B4-BE49-F238E27FC236}">
+                <a16:creationId xmlns:a16="http://schemas.microsoft.com/office/drawing/2014/main" id="{820900B0-7EDA-42CC-A5BF-AB23E78F04F3}"/>
+              </a:ext>
+            </a:extLst>
+          </p:cNvPr>
           <p:cNvSpPr>
             <a:spLocks noGrp="1"/>
           </p:cNvSpPr>
@@ -3882,63 +3782,46 @@
           <a:bodyPr/>
           <a:lstStyle/>
           <a:p>
-            <a:pPr marL="0" indent="0">
-              <a:buNone/>
-            </a:pPr>
-            <a:r>
-              <a:rPr lang="de-DE" dirty="0" smtClean="0">
+            <a:r>
+              <a:rPr lang="de-DE" dirty="0">
                 <a:hlinkClick r:id="rId2" action="ppaction://hlinkfile"/>
               </a:rPr>
               <a:t>\\todo</a:t>
             </a:r>
             <a:r>
-              <a:rPr lang="de-DE" dirty="0" smtClean="0"/>
+              <a:rPr lang="de-DE" dirty="0"/>
               <a:t>: </a:t>
             </a:r>
           </a:p>
           <a:p>
-            <a:pPr marL="0" indent="0">
-              <a:buNone/>
-            </a:pPr>
-            <a:r>
-              <a:rPr lang="de-DE" dirty="0" smtClean="0"/>
-              <a:t>- gutes Hintergrund design</a:t>
-            </a:r>
-          </a:p>
-          <a:p>
-            <a:pPr marL="0" indent="0">
-              <a:buNone/>
-            </a:pPr>
-            <a:r>
-              <a:rPr lang="de-DE" dirty="0" smtClean="0"/>
-              <a:t>- Alles schön machen :3 :&gt;</a:t>
-            </a:r>
-          </a:p>
-          <a:p>
-            <a:pPr>
-              <a:buFontTx/>
-              <a:buChar char="-"/>
-            </a:pPr>
-            <a:r>
-              <a:rPr lang="de-DE" dirty="0" smtClean="0"/>
+            <a:r>
+              <a:rPr lang="de-DE" dirty="0"/>
+              <a:t>gutes Hintergrund design</a:t>
+            </a:r>
+          </a:p>
+          <a:p>
+            <a:r>
+              <a:rPr lang="de-DE" dirty="0"/>
+              <a:t>Alles schön machen :3 :&gt;</a:t>
+            </a:r>
+          </a:p>
+          <a:p>
+            <a:r>
+              <a:rPr lang="de-DE" dirty="0"/>
               <a:t>wer sagt was aufteilen</a:t>
             </a:r>
           </a:p>
           <a:p>
-            <a:pPr>
-              <a:buFontTx/>
-              <a:buChar char="-"/>
-            </a:pPr>
-            <a:r>
-              <a:rPr lang="de-DE" dirty="0" smtClean="0"/>
+            <a:r>
+              <a:rPr lang="de-DE" dirty="0"/>
               <a:t>Verwandte </a:t>
             </a:r>
             <a:r>
-              <a:rPr lang="de-DE" dirty="0" err="1" smtClean="0"/>
+              <a:rPr lang="de-DE" dirty="0" err="1"/>
               <a:t>forschung</a:t>
             </a:r>
             <a:r>
-              <a:rPr lang="de-DE" dirty="0" smtClean="0"/>
+              <a:rPr lang="de-DE" dirty="0"/>
               <a:t> in Motivation ansprechen?</a:t>
             </a:r>
           </a:p>
@@ -3954,13 +3837,6 @@
   <p:clrMapOvr>
     <a:masterClrMapping/>
   </p:clrMapOvr>
-  <p:timing>
-    <p:tnLst>
-      <p:par>
-        <p:cTn id="1" dur="indefinite" restart="never" nodeType="tmRoot"/>
-      </p:par>
-    </p:tnLst>
-  </p:timing>
 </p:sld>
 </file>
 
@@ -3997,18 +3873,9 @@
           <a:lstStyle/>
           <a:p>
             <a:r>
-              <a:rPr lang="de-DE" dirty="0" smtClean="0">
-                <a:solidFill>
-                  <a:schemeClr val="accent2"/>
-                </a:solidFill>
-              </a:rPr>
+              <a:rPr lang="de-DE" dirty="0"/>
               <a:t>Übersicht</a:t>
             </a:r>
-            <a:endParaRPr lang="de-DE" dirty="0">
-              <a:solidFill>
-                <a:schemeClr val="accent2"/>
-              </a:solidFill>
-            </a:endParaRPr>
           </a:p>
         </p:txBody>
       </p:sp>
@@ -4024,61 +3891,40 @@
         </p:nvSpPr>
         <p:spPr/>
         <p:txBody>
-          <a:bodyPr>
-            <a:normAutofit/>
-          </a:bodyPr>
-          <a:lstStyle/>
-          <a:p>
-            <a:r>
-              <a:rPr lang="de-DE" dirty="0" smtClean="0"/>
+          <a:bodyPr/>
+          <a:lstStyle/>
+          <a:p>
+            <a:r>
+              <a:rPr lang="de-DE" dirty="0"/>
               <a:t>Motivation</a:t>
             </a:r>
           </a:p>
           <a:p>
             <a:r>
-              <a:rPr lang="de-DE" dirty="0" smtClean="0"/>
+              <a:rPr lang="de-DE" dirty="0"/>
               <a:t>Herangehensweise</a:t>
             </a:r>
           </a:p>
           <a:p>
             <a:r>
-              <a:rPr lang="de-DE" dirty="0" smtClean="0"/>
-              <a:t>Lösungsansatz</a:t>
-            </a:r>
-          </a:p>
-          <a:p>
-            <a:r>
-              <a:rPr lang="de-DE" dirty="0" smtClean="0"/>
-              <a:t>Studiendesign</a:t>
-            </a:r>
-          </a:p>
-          <a:p>
-            <a:r>
-              <a:rPr lang="de-DE" dirty="0" err="1" smtClean="0"/>
-              <a:t>Implentierung</a:t>
-            </a:r>
-            <a:endParaRPr lang="de-DE" dirty="0" smtClean="0"/>
-          </a:p>
-          <a:p>
-            <a:r>
-              <a:rPr lang="de-DE" dirty="0" smtClean="0"/>
+              <a:rPr lang="de-DE" dirty="0"/>
               <a:t>Ergebnisse</a:t>
             </a:r>
           </a:p>
           <a:p>
             <a:r>
-              <a:rPr lang="de-DE" dirty="0" smtClean="0"/>
+              <a:rPr lang="de-DE" dirty="0"/>
               <a:t>Diskussion</a:t>
             </a:r>
           </a:p>
           <a:p>
             <a:r>
-              <a:rPr lang="de-DE" dirty="0" smtClean="0"/>
+              <a:rPr lang="de-DE" dirty="0"/>
               <a:t>Schlussfolgerung</a:t>
             </a:r>
           </a:p>
           <a:p>
-            <a:endParaRPr lang="de-DE" dirty="0" smtClean="0"/>
+            <a:endParaRPr lang="de-DE" dirty="0"/>
           </a:p>
         </p:txBody>
       </p:sp>
@@ -4092,13 +3938,6 @@
   <p:clrMapOvr>
     <a:masterClrMapping/>
   </p:clrMapOvr>
-  <p:timing>
-    <p:tnLst>
-      <p:par>
-        <p:cTn id="1" dur="indefinite" restart="never" nodeType="tmRoot"/>
-      </p:par>
-    </p:tnLst>
-  </p:timing>
 </p:sld>
 </file>
 
@@ -4135,18 +3974,9 @@
           <a:lstStyle/>
           <a:p>
             <a:r>
-              <a:rPr lang="de-DE" dirty="0" smtClean="0">
-                <a:solidFill>
-                  <a:schemeClr val="accent2"/>
-                </a:solidFill>
-              </a:rPr>
+              <a:rPr lang="de-DE" dirty="0"/>
               <a:t>Motivation</a:t>
             </a:r>
-            <a:endParaRPr lang="de-DE" dirty="0">
-              <a:solidFill>
-                <a:schemeClr val="accent2"/>
-              </a:solidFill>
-            </a:endParaRPr>
           </a:p>
         </p:txBody>
       </p:sp>
@@ -4168,76 +3998,68 @@
           <a:lstStyle/>
           <a:p>
             <a:r>
-              <a:rPr lang="de-DE" dirty="0" smtClean="0"/>
+              <a:rPr lang="de-DE" dirty="0"/>
               <a:t>Schnittstelle VR und Realität</a:t>
             </a:r>
           </a:p>
           <a:p>
             <a:r>
-              <a:rPr lang="de-DE" dirty="0" smtClean="0"/>
+              <a:rPr lang="de-DE" dirty="0"/>
               <a:t>AR/VR fester Bestandteil im Alltag</a:t>
             </a:r>
           </a:p>
           <a:p>
             <a:r>
-              <a:rPr lang="de-DE" dirty="0" smtClean="0"/>
+              <a:rPr lang="de-DE" dirty="0"/>
               <a:t>Smart-</a:t>
             </a:r>
             <a:r>
-              <a:rPr lang="de-DE" dirty="0" err="1" smtClean="0"/>
+              <a:rPr lang="de-DE" dirty="0" err="1"/>
               <a:t>Mirrors</a:t>
             </a:r>
             <a:r>
-              <a:rPr lang="de-DE" dirty="0" smtClean="0"/>
+              <a:rPr lang="de-DE" dirty="0"/>
               <a:t>, Head-</a:t>
             </a:r>
             <a:r>
               <a:rPr lang="de-DE" dirty="0" err="1"/>
-              <a:t>U</a:t>
-            </a:r>
-            <a:r>
-              <a:rPr lang="de-DE" dirty="0" err="1" smtClean="0"/>
-              <a:t>p</a:t>
-            </a:r>
-            <a:r>
-              <a:rPr lang="de-DE" dirty="0" smtClean="0"/>
+              <a:t>Up</a:t>
+            </a:r>
+            <a:r>
+              <a:rPr lang="de-DE" dirty="0"/>
               <a:t> Displays</a:t>
             </a:r>
           </a:p>
           <a:p>
             <a:r>
-              <a:rPr lang="de-DE" dirty="0" smtClean="0"/>
+              <a:rPr lang="de-DE" dirty="0"/>
               <a:t>Autonomes Fahren</a:t>
             </a:r>
           </a:p>
           <a:p>
-            <a:pPr marL="0" indent="0">
-              <a:buNone/>
-            </a:pPr>
-            <a:endParaRPr lang="de-DE" dirty="0" smtClean="0"/>
-          </a:p>
-          <a:p>
-            <a:r>
-              <a:rPr lang="de-DE" dirty="0" smtClean="0"/>
+            <a:endParaRPr lang="de-DE" dirty="0"/>
+          </a:p>
+          <a:p>
+            <a:r>
+              <a:rPr lang="de-DE" dirty="0"/>
               <a:t>Übergang Ruhephase und Arbeitsphase</a:t>
             </a:r>
           </a:p>
           <a:p>
             <a:r>
-              <a:rPr lang="de-DE" dirty="0" smtClean="0"/>
+              <a:rPr lang="de-DE" dirty="0"/>
               <a:t>Leistungsfähigkeit nach Ruhephase</a:t>
             </a:r>
           </a:p>
           <a:p>
             <a:r>
-              <a:rPr lang="de-DE" dirty="0" smtClean="0"/>
+              <a:rPr lang="de-DE" dirty="0"/>
               <a:t>Aufmerksamkeit, Wachsamkeit, Zuverlässigkeit</a:t>
             </a:r>
-            <a:endParaRPr lang="de-DE" dirty="0" smtClean="0"/>
-          </a:p>
-          <a:p>
-            <a:r>
-              <a:rPr lang="de-DE" dirty="0" smtClean="0"/>
+          </a:p>
+          <a:p>
+            <a:r>
+              <a:rPr lang="de-DE" dirty="0"/>
               <a:t>Vorbereitung auf Aufgabe</a:t>
             </a:r>
           </a:p>
@@ -4245,47 +4067,44 @@
             <a:endParaRPr lang="de-DE" dirty="0"/>
           </a:p>
           <a:p>
-            <a:pPr marL="0" indent="0">
-              <a:buNone/>
-            </a:pPr>
-            <a:r>
-              <a:rPr lang="de-DE" dirty="0" smtClean="0">
+            <a:r>
+              <a:rPr lang="de-DE" dirty="0">
                 <a:sym typeface="Wingdings" panose="05000000000000000000" pitchFamily="2" charset="2"/>
               </a:rPr>
               <a:t> </a:t>
             </a:r>
             <a:r>
-              <a:rPr lang="de-DE" dirty="0" err="1" smtClean="0">
+              <a:rPr lang="de-DE" dirty="0" err="1">
                 <a:sym typeface="Wingdings" panose="05000000000000000000" pitchFamily="2" charset="2"/>
               </a:rPr>
               <a:t>Paramter</a:t>
             </a:r>
             <a:r>
-              <a:rPr lang="de-DE" dirty="0" smtClean="0">
+              <a:rPr lang="de-DE" dirty="0">
                 <a:sym typeface="Wingdings" panose="05000000000000000000" pitchFamily="2" charset="2"/>
               </a:rPr>
               <a:t> Licht und Ton : </a:t>
             </a:r>
             <a:r>
-              <a:rPr lang="de-DE" dirty="0" err="1" smtClean="0">
+              <a:rPr lang="de-DE" dirty="0" err="1">
                 <a:sym typeface="Wingdings" panose="05000000000000000000" pitchFamily="2" charset="2"/>
               </a:rPr>
               <a:t>between</a:t>
             </a:r>
             <a:r>
-              <a:rPr lang="de-DE" dirty="0" smtClean="0">
+              <a:rPr lang="de-DE" dirty="0">
                 <a:sym typeface="Wingdings" panose="05000000000000000000" pitchFamily="2" charset="2"/>
               </a:rPr>
               <a:t> </a:t>
             </a:r>
             <a:r>
-              <a:rPr lang="de-DE" dirty="0" err="1" smtClean="0">
+              <a:rPr lang="de-DE" dirty="0" err="1">
                 <a:sym typeface="Wingdings" panose="05000000000000000000" pitchFamily="2" charset="2"/>
               </a:rPr>
               <a:t>subject</a:t>
             </a:r>
             <a:r>
-              <a:rPr lang="de-DE" dirty="0" smtClean="0">
+              <a:rPr lang="de-DE" dirty="0">
                 <a:sym typeface="Wingdings" panose="05000000000000000000" pitchFamily="2" charset="2"/>
               </a:rPr>
               <a:t> Studie</a:t>
@@ -4304,13 +4123,6 @@
   <p:clrMapOvr>
     <a:masterClrMapping/>
   </p:clrMapOvr>
-  <p:timing>
-    <p:tnLst>
-      <p:par>
-        <p:cTn id="1" dur="indefinite" restart="never" nodeType="tmRoot"/>
-      </p:par>
-    </p:tnLst>
-  </p:timing>
 </p:sld>
 </file>
 
@@ -4347,18 +4159,9 @@
           <a:lstStyle/>
           <a:p>
             <a:r>
-              <a:rPr lang="de-DE" dirty="0" smtClean="0">
-                <a:solidFill>
-                  <a:schemeClr val="accent2"/>
-                </a:solidFill>
-              </a:rPr>
+              <a:rPr lang="de-DE" dirty="0"/>
               <a:t>Herangehensweise</a:t>
             </a:r>
-            <a:endParaRPr lang="de-DE" dirty="0">
-              <a:solidFill>
-                <a:schemeClr val="accent2"/>
-              </a:solidFill>
-            </a:endParaRPr>
           </a:p>
         </p:txBody>
       </p:sp>
@@ -4378,56 +4181,56 @@
           <a:lstStyle/>
           <a:p>
             <a:r>
-              <a:rPr lang="de-DE" dirty="0" smtClean="0"/>
+              <a:rPr lang="de-DE" dirty="0"/>
               <a:t>VR Umgebung mit Kopfhörer</a:t>
             </a:r>
           </a:p>
           <a:p>
             <a:r>
-              <a:rPr lang="de-DE" dirty="0" smtClean="0"/>
+              <a:rPr lang="de-DE" dirty="0"/>
               <a:t>Werte aufzeichnen Kopfbewegung, Zeiten </a:t>
             </a:r>
             <a:r>
-              <a:rPr lang="de-DE" dirty="0" err="1" smtClean="0"/>
+              <a:rPr lang="de-DE" dirty="0" err="1"/>
               <a:t>etc</a:t>
             </a:r>
             <a:r>
-              <a:rPr lang="de-DE" dirty="0" smtClean="0"/>
+              <a:rPr lang="de-DE" dirty="0"/>
               <a:t> -&gt; </a:t>
             </a:r>
             <a:r>
-              <a:rPr lang="de-DE" dirty="0" err="1" smtClean="0"/>
+              <a:rPr lang="de-DE" dirty="0" err="1"/>
               <a:t>csv</a:t>
             </a:r>
             <a:r>
-              <a:rPr lang="de-DE" dirty="0" smtClean="0"/>
+              <a:rPr lang="de-DE" dirty="0"/>
               <a:t> Format</a:t>
             </a:r>
           </a:p>
           <a:p>
             <a:r>
-              <a:rPr lang="de-DE" dirty="0" smtClean="0"/>
+              <a:rPr lang="de-DE" dirty="0"/>
               <a:t>Gaming-Stuhl</a:t>
             </a:r>
           </a:p>
           <a:p>
             <a:r>
-              <a:rPr lang="de-DE" dirty="0" smtClean="0"/>
+              <a:rPr lang="de-DE" dirty="0"/>
               <a:t>Fragebögen SAM und RSME in VR, andere </a:t>
             </a:r>
             <a:r>
-              <a:rPr lang="de-DE" dirty="0" err="1" smtClean="0"/>
+              <a:rPr lang="de-DE" dirty="0" err="1"/>
               <a:t>limesurvey</a:t>
             </a:r>
-            <a:endParaRPr lang="de-DE" dirty="0" smtClean="0"/>
-          </a:p>
-          <a:p>
-            <a:r>
-              <a:rPr lang="de-DE" dirty="0" smtClean="0"/>
+            <a:endParaRPr lang="de-DE" dirty="0"/>
+          </a:p>
+          <a:p>
+            <a:r>
+              <a:rPr lang="de-DE" dirty="0"/>
               <a:t>Python, R Skripte, SPSS </a:t>
             </a:r>
             <a:r>
-              <a:rPr lang="de-DE" dirty="0" err="1" smtClean="0"/>
+              <a:rPr lang="de-DE" dirty="0" err="1"/>
               <a:t>etc</a:t>
             </a:r>
             <a:endParaRPr lang="de-DE" dirty="0"/>
@@ -4444,13 +4247,6 @@
   <p:clrMapOvr>
     <a:masterClrMapping/>
   </p:clrMapOvr>
-  <p:timing>
-    <p:tnLst>
-      <p:par>
-        <p:cTn id="1" dur="indefinite" restart="never" nodeType="tmRoot"/>
-      </p:par>
-    </p:tnLst>
-  </p:timing>
 </p:sld>
 </file>
 
@@ -4487,18 +4283,9 @@
           <a:lstStyle/>
           <a:p>
             <a:r>
-              <a:rPr lang="de-DE" dirty="0" smtClean="0">
-                <a:solidFill>
-                  <a:schemeClr val="accent2"/>
-                </a:solidFill>
-              </a:rPr>
+              <a:rPr lang="de-DE" dirty="0"/>
               <a:t>Lösungsansatz</a:t>
             </a:r>
-            <a:endParaRPr lang="de-DE" dirty="0">
-              <a:solidFill>
-                <a:schemeClr val="accent2"/>
-              </a:solidFill>
-            </a:endParaRPr>
           </a:p>
         </p:txBody>
       </p:sp>
@@ -4518,19 +4305,19 @@
           <a:lstStyle/>
           <a:p>
             <a:r>
-              <a:rPr lang="de-DE" dirty="0" smtClean="0"/>
+              <a:rPr lang="de-DE" dirty="0"/>
               <a:t>Übergang schläfriger Zustand, ohne kognitive Belastung, und wacher Zustand, in dem Aufgaben erledigt werden müssen</a:t>
             </a:r>
           </a:p>
           <a:p>
             <a:r>
-              <a:rPr lang="de-DE" dirty="0" smtClean="0"/>
+              <a:rPr lang="de-DE" dirty="0"/>
               <a:t>Hypothesen</a:t>
             </a:r>
           </a:p>
           <a:p>
             <a:r>
-              <a:rPr lang="de-DE" dirty="0" smtClean="0"/>
+              <a:rPr lang="de-DE" dirty="0"/>
               <a:t>Erfasste Parameter: Zeit, Fehlerrate, Blickrichtung</a:t>
             </a:r>
           </a:p>
@@ -4546,13 +4333,6 @@
   <p:clrMapOvr>
     <a:masterClrMapping/>
   </p:clrMapOvr>
-  <p:timing>
-    <p:tnLst>
-      <p:par>
-        <p:cTn id="1" dur="indefinite" restart="never" nodeType="tmRoot"/>
-      </p:par>
-    </p:tnLst>
-  </p:timing>
 </p:sld>
 </file>
 
@@ -4589,14 +4369,9 @@
           <a:lstStyle/>
           <a:p>
             <a:r>
-              <a:rPr lang="de-DE" dirty="0" smtClean="0">
-                <a:solidFill>
-                  <a:schemeClr val="accent2"/>
-                </a:solidFill>
-              </a:rPr>
+              <a:rPr lang="de-DE" dirty="0"/>
               <a:t>Studiendesign</a:t>
             </a:r>
-            <a:endParaRPr lang="de-DE" dirty="0"/>
           </a:p>
         </p:txBody>
       </p:sp>
@@ -4616,50 +4391,45 @@
           <a:lstStyle/>
           <a:p>
             <a:r>
-              <a:rPr lang="de-DE" dirty="0" smtClean="0"/>
+              <a:rPr lang="de-DE" dirty="0"/>
               <a:t>Studiendurchführung (Umgebung </a:t>
             </a:r>
             <a:r>
-              <a:rPr lang="de-DE" dirty="0" err="1" smtClean="0"/>
+              <a:rPr lang="de-DE" dirty="0" err="1"/>
               <a:t>etc</a:t>
             </a:r>
             <a:r>
-              <a:rPr lang="de-DE" dirty="0" smtClean="0"/>
+              <a:rPr lang="de-DE" dirty="0"/>
               <a:t>)</a:t>
             </a:r>
           </a:p>
           <a:p>
             <a:r>
-              <a:rPr lang="de-DE" dirty="0" smtClean="0"/>
-              <a:t>Studienablauf </a:t>
-            </a:r>
-            <a:r>
-              <a:rPr lang="de-DE" dirty="0" smtClean="0"/>
-              <a:t>: 1. Einführung 2. Ruhephase 3. Aufgaben 4. Fragebögen</a:t>
-            </a:r>
-          </a:p>
-          <a:p>
-            <a:r>
-              <a:rPr lang="de-DE" dirty="0" smtClean="0"/>
+              <a:rPr lang="de-DE" dirty="0"/>
+              <a:t>Studienablauf : 1. Einführung 2. Ruhephase 3. Aufgaben 4. Fragebögen</a:t>
+            </a:r>
+          </a:p>
+          <a:p>
+            <a:r>
+              <a:rPr lang="de-DE" dirty="0"/>
               <a:t>SAM und RSME (</a:t>
             </a:r>
             <a:r>
-              <a:rPr lang="de-DE" dirty="0" err="1" smtClean="0"/>
+              <a:rPr lang="de-DE" dirty="0" err="1"/>
               <a:t>maybe</a:t>
             </a:r>
             <a:r>
-              <a:rPr lang="de-DE" dirty="0" smtClean="0"/>
+              <a:rPr lang="de-DE" dirty="0"/>
               <a:t> mit </a:t>
             </a:r>
             <a:r>
-              <a:rPr lang="de-DE" dirty="0" err="1" smtClean="0"/>
+              <a:rPr lang="de-DE" dirty="0" err="1"/>
               <a:t>pic</a:t>
             </a:r>
             <a:r>
-              <a:rPr lang="de-DE" dirty="0" smtClean="0"/>
+              <a:rPr lang="de-DE" dirty="0"/>
               <a:t>)</a:t>
             </a:r>
-            <a:endParaRPr lang="de-DE" dirty="0" smtClean="0"/>
           </a:p>
           <a:p>
             <a:endParaRPr lang="de-DE" dirty="0"/>
@@ -4676,13 +4446,6 @@
   <p:clrMapOvr>
     <a:masterClrMapping/>
   </p:clrMapOvr>
-  <p:timing>
-    <p:tnLst>
-      <p:par>
-        <p:cTn id="1" dur="indefinite" restart="never" nodeType="tmRoot"/>
-      </p:par>
-    </p:tnLst>
-  </p:timing>
 </p:sld>
 </file>
 
@@ -4713,56 +4476,15 @@
             <p:ph type="title"/>
           </p:nvPr>
         </p:nvSpPr>
-        <p:spPr>
-          <a:xfrm>
-            <a:off x="911310" y="365125"/>
-            <a:ext cx="10442490" cy="1316347"/>
-          </a:xfrm>
-        </p:spPr>
-        <p:txBody>
-          <a:bodyPr>
-            <a:normAutofit/>
-          </a:bodyPr>
-          <a:lstStyle/>
-          <a:p>
-            <a:r>
-              <a:rPr lang="de-DE" sz="3200" b="1" dirty="0" smtClean="0"/>
+        <p:spPr/>
+        <p:txBody>
+          <a:bodyPr/>
+          <a:lstStyle/>
+          <a:p>
+            <a:r>
+              <a:rPr lang="de-DE" dirty="0"/>
               <a:t>45 Probanden in 3 Studiengruppen</a:t>
             </a:r>
-            <a:endParaRPr lang="de-DE" sz="3200" b="1" dirty="0"/>
-          </a:p>
-        </p:txBody>
-      </p:sp>
-      <p:sp>
-        <p:nvSpPr>
-          <p:cNvPr id="5" name="Inhaltsplatzhalter 4"/>
-          <p:cNvSpPr>
-            <a:spLocks noGrp="1"/>
-          </p:cNvSpPr>
-          <p:nvPr>
-            <p:ph idx="1"/>
-          </p:nvPr>
-        </p:nvSpPr>
-        <p:spPr>
-          <a:xfrm>
-            <a:off x="8282114" y="1929595"/>
-            <a:ext cx="1052386" cy="496569"/>
-          </a:xfrm>
-        </p:spPr>
-        <p:txBody>
-          <a:bodyPr>
-            <a:normAutofit/>
-          </a:bodyPr>
-          <a:lstStyle/>
-          <a:p>
-            <a:pPr marL="0" indent="0">
-              <a:buNone/>
-            </a:pPr>
-            <a:r>
-              <a:rPr lang="de-DE" dirty="0" err="1" smtClean="0"/>
-              <a:t>alarm</a:t>
-            </a:r>
-            <a:endParaRPr lang="de-DE" dirty="0"/>
           </a:p>
         </p:txBody>
       </p:sp>
@@ -4774,18 +4496,18 @@
         </p:nvSpPr>
         <p:spPr>
           <a:xfrm>
-            <a:off x="1242883" y="2450757"/>
-            <a:ext cx="1433384" cy="3188044"/>
+            <a:off x="958241" y="2450757"/>
+            <a:ext cx="3060000" cy="2880000"/>
           </a:xfrm>
           <a:prstGeom prst="rect">
             <a:avLst/>
           </a:prstGeom>
           <a:solidFill>
-            <a:schemeClr val="accent4">
-              <a:lumMod val="40000"/>
-              <a:lumOff val="60000"/>
-            </a:schemeClr>
+            <a:srgbClr val="3288BD"/>
           </a:solidFill>
+          <a:ln>
+            <a:noFill/>
+          </a:ln>
         </p:spPr>
         <p:style>
           <a:lnRef idx="2">
@@ -4808,7 +4530,12 @@
           <a:lstStyle/>
           <a:p>
             <a:pPr algn="ctr"/>
-            <a:endParaRPr lang="de-DE"/>
+            <a:endParaRPr lang="de-DE">
+              <a:solidFill>
+                <a:srgbClr val="FF0000"/>
+              </a:solidFill>
+              <a:latin typeface="Futura Lt BT" panose="020B0402020204020303" pitchFamily="34" charset="0"/>
+            </a:endParaRPr>
           </a:p>
         </p:txBody>
       </p:sp>
@@ -4820,12 +4547,18 @@
         </p:nvSpPr>
         <p:spPr>
           <a:xfrm>
-            <a:off x="4061252" y="2450757"/>
-            <a:ext cx="1433384" cy="3188044"/>
+            <a:off x="4018241" y="2450757"/>
+            <a:ext cx="3060000" cy="2880000"/>
           </a:xfrm>
           <a:prstGeom prst="rect">
             <a:avLst/>
           </a:prstGeom>
+          <a:solidFill>
+            <a:srgbClr val="D53E4F"/>
+          </a:solidFill>
+          <a:ln>
+            <a:noFill/>
+          </a:ln>
         </p:spPr>
         <p:style>
           <a:lnRef idx="2">
@@ -4848,7 +4581,12 @@
           <a:lstStyle/>
           <a:p>
             <a:pPr algn="ctr"/>
-            <a:endParaRPr lang="de-DE"/>
+            <a:endParaRPr lang="de-DE">
+              <a:solidFill>
+                <a:srgbClr val="FF0000"/>
+              </a:solidFill>
+              <a:latin typeface="Futura Lt BT" panose="020B0402020204020303" pitchFamily="34" charset="0"/>
+            </a:endParaRPr>
           </a:p>
         </p:txBody>
       </p:sp>
@@ -4860,15 +4598,18 @@
         </p:nvSpPr>
         <p:spPr>
           <a:xfrm>
-            <a:off x="8388177" y="2450757"/>
-            <a:ext cx="1433384" cy="3188044"/>
+            <a:off x="7078241" y="2450757"/>
+            <a:ext cx="3060000" cy="2880000"/>
           </a:xfrm>
           <a:prstGeom prst="rect">
             <a:avLst/>
           </a:prstGeom>
           <a:solidFill>
-            <a:srgbClr val="92D050"/>
+            <a:srgbClr val="FC8D59"/>
           </a:solidFill>
+          <a:ln>
+            <a:noFill/>
+          </a:ln>
         </p:spPr>
         <p:style>
           <a:lnRef idx="2">
@@ -4891,7 +4632,12 @@
           <a:lstStyle/>
           <a:p>
             <a:pPr algn="ctr"/>
-            <a:endParaRPr lang="de-DE"/>
+            <a:endParaRPr lang="de-DE" dirty="0">
+              <a:solidFill>
+                <a:srgbClr val="FF0000"/>
+              </a:solidFill>
+              <a:latin typeface="Futura Lt BT" panose="020B0402020204020303" pitchFamily="34" charset="0"/>
+            </a:endParaRPr>
           </a:p>
         </p:txBody>
       </p:sp>
@@ -4905,8 +4651,8 @@
         </p:nvSpPr>
         <p:spPr>
           <a:xfrm>
-            <a:off x="911310" y="2000460"/>
-            <a:ext cx="2386913" cy="421716"/>
+            <a:off x="958241" y="2119637"/>
+            <a:ext cx="2386913" cy="360000"/>
           </a:xfrm>
           <a:prstGeom prst="rect">
             <a:avLst/>
@@ -4914,7 +4660,7 @@
         </p:spPr>
         <p:txBody>
           <a:bodyPr vert="horz" lIns="91440" tIns="45720" rIns="91440" bIns="45720" rtlCol="0">
-            <a:normAutofit fontScale="92500" lnSpcReduction="10000"/>
+            <a:normAutofit lnSpcReduction="10000"/>
           </a:bodyPr>
           <a:lstStyle>
             <a:lvl1pPr marL="228600" indent="-228600" algn="l" defTabSz="914400" rtl="0" eaLnBrk="1" latinLnBrk="0" hangingPunct="1">
@@ -5086,18 +4832,32 @@
               <a:buNone/>
             </a:pPr>
             <a:r>
-              <a:rPr lang="de-DE" dirty="0" smtClean="0"/>
+              <a:rPr lang="de-DE" sz="2000" dirty="0">
+                <a:solidFill>
+                  <a:srgbClr val="CDB380"/>
+                </a:solidFill>
+                <a:latin typeface="Futura Lt BT" panose="020B0402020204020303" pitchFamily="34" charset="0"/>
+              </a:rPr>
               <a:t>5 </a:t>
             </a:r>
             <a:r>
-              <a:rPr lang="de-DE" dirty="0" err="1" smtClean="0"/>
+              <a:rPr lang="de-DE" sz="2000" dirty="0" err="1">
+                <a:solidFill>
+                  <a:srgbClr val="CDB380"/>
+                </a:solidFill>
+                <a:latin typeface="Futura Lt BT" panose="020B0402020204020303" pitchFamily="34" charset="0"/>
+              </a:rPr>
               <a:t>seconds</a:t>
             </a:r>
             <a:r>
-              <a:rPr lang="de-DE" dirty="0" smtClean="0"/>
+              <a:rPr lang="de-DE" sz="2000" dirty="0">
+                <a:solidFill>
+                  <a:srgbClr val="CDB380"/>
+                </a:solidFill>
+                <a:latin typeface="Futura Lt BT" panose="020B0402020204020303" pitchFamily="34" charset="0"/>
+              </a:rPr>
               <a:t> fade</a:t>
             </a:r>
-            <a:endParaRPr lang="de-DE" dirty="0"/>
           </a:p>
         </p:txBody>
       </p:sp>
@@ -5111,8 +4871,8 @@
         </p:nvSpPr>
         <p:spPr>
           <a:xfrm>
-            <a:off x="3548446" y="1925607"/>
-            <a:ext cx="2458995" cy="496569"/>
+            <a:off x="4018241" y="2119637"/>
+            <a:ext cx="2458995" cy="360000"/>
           </a:xfrm>
           <a:prstGeom prst="rect">
             <a:avLst/>
@@ -5120,7 +4880,7 @@
         </p:spPr>
         <p:txBody>
           <a:bodyPr vert="horz" lIns="91440" tIns="45720" rIns="91440" bIns="45720" rtlCol="0">
-            <a:normAutofit fontScale="92500"/>
+            <a:normAutofit lnSpcReduction="10000"/>
           </a:bodyPr>
           <a:lstStyle>
             <a:lvl1pPr marL="228600" indent="-228600" algn="l" defTabSz="914400" rtl="0" eaLnBrk="1" latinLnBrk="0" hangingPunct="1">
@@ -5292,33 +5052,53 @@
               <a:buNone/>
             </a:pPr>
             <a:r>
-              <a:rPr lang="de-DE" dirty="0" smtClean="0"/>
+              <a:rPr lang="de-DE" sz="2000" dirty="0">
+                <a:solidFill>
+                  <a:srgbClr val="CDB380"/>
+                </a:solidFill>
+                <a:latin typeface="Futura Lt BT" panose="020B0402020204020303" pitchFamily="34" charset="0"/>
+              </a:rPr>
               <a:t>20 </a:t>
             </a:r>
             <a:r>
-              <a:rPr lang="de-DE" dirty="0" err="1" smtClean="0"/>
+              <a:rPr lang="de-DE" sz="2000" dirty="0" err="1">
+                <a:solidFill>
+                  <a:srgbClr val="CDB380"/>
+                </a:solidFill>
+                <a:latin typeface="Futura Lt BT" panose="020B0402020204020303" pitchFamily="34" charset="0"/>
+              </a:rPr>
               <a:t>seconds</a:t>
             </a:r>
             <a:r>
-              <a:rPr lang="de-DE" dirty="0" smtClean="0"/>
+              <a:rPr lang="de-DE" sz="2000" dirty="0">
+                <a:solidFill>
+                  <a:srgbClr val="CDB380"/>
+                </a:solidFill>
+                <a:latin typeface="Futura Lt BT" panose="020B0402020204020303" pitchFamily="34" charset="0"/>
+              </a:rPr>
               <a:t> fade</a:t>
             </a:r>
-            <a:endParaRPr lang="de-DE" dirty="0"/>
-          </a:p>
-        </p:txBody>
-      </p:sp>
-      <p:sp>
-        <p:nvSpPr>
-          <p:cNvPr id="11" name="Inhaltsplatzhalter 4"/>
+          </a:p>
+        </p:txBody>
+      </p:sp>
+      <p:sp>
+        <p:nvSpPr>
+          <p:cNvPr id="15" name="Inhaltsplatzhalter 4">
+            <a:extLst>
+              <a:ext uri="{FF2B5EF4-FFF2-40B4-BE49-F238E27FC236}">
+                <a16:creationId xmlns:a16="http://schemas.microsoft.com/office/drawing/2014/main" id="{2B5225F9-A453-4D73-AE00-35BF68CAE4BB}"/>
+              </a:ext>
+            </a:extLst>
+          </p:cNvPr>
           <p:cNvSpPr txBox="1">
             <a:spLocks/>
           </p:cNvSpPr>
           <p:nvPr/>
         </p:nvSpPr>
         <p:spPr>
-          <a:xfrm rot="16200000">
-            <a:off x="730077" y="3646285"/>
-            <a:ext cx="2458995" cy="496569"/>
+          <a:xfrm>
+            <a:off x="7078241" y="2119637"/>
+            <a:ext cx="2458995" cy="360000"/>
           </a:xfrm>
           <a:prstGeom prst="rect">
             <a:avLst/>
@@ -5326,7 +5106,7 @@
         </p:spPr>
         <p:txBody>
           <a:bodyPr vert="horz" lIns="91440" tIns="45720" rIns="91440" bIns="45720" rtlCol="0">
-            <a:normAutofit/>
+            <a:normAutofit lnSpcReduction="10000"/>
           </a:bodyPr>
           <a:lstStyle>
             <a:lvl1pPr marL="228600" indent="-228600" algn="l" defTabSz="914400" rtl="0" eaLnBrk="1" latinLnBrk="0" hangingPunct="1">
@@ -5494,410 +5274,23 @@
           </a:lstStyle>
           <a:p>
             <a:pPr marL="0" indent="0">
-              <a:buFont typeface="Arial" panose="020B0604020202020204" pitchFamily="34" charset="0"/>
               <a:buNone/>
             </a:pPr>
             <a:r>
-              <a:rPr lang="de-DE" dirty="0" smtClean="0"/>
-              <a:t>15 Probanden</a:t>
-            </a:r>
-            <a:endParaRPr lang="de-DE" dirty="0"/>
-          </a:p>
-        </p:txBody>
-      </p:sp>
-      <p:sp>
-        <p:nvSpPr>
-          <p:cNvPr id="13" name="Inhaltsplatzhalter 4"/>
-          <p:cNvSpPr txBox="1">
-            <a:spLocks/>
-          </p:cNvSpPr>
-          <p:nvPr/>
-        </p:nvSpPr>
-        <p:spPr>
-          <a:xfrm rot="16200000">
-            <a:off x="3251884" y="3646285"/>
-            <a:ext cx="2458995" cy="496569"/>
-          </a:xfrm>
-          <a:prstGeom prst="rect">
-            <a:avLst/>
-          </a:prstGeom>
-        </p:spPr>
-        <p:txBody>
-          <a:bodyPr vert="horz" lIns="91440" tIns="45720" rIns="91440" bIns="45720" rtlCol="0">
-            <a:normAutofit/>
-          </a:bodyPr>
-          <a:lstStyle>
-            <a:lvl1pPr marL="228600" indent="-228600" algn="l" defTabSz="914400" rtl="0" eaLnBrk="1" latinLnBrk="0" hangingPunct="1">
-              <a:lnSpc>
-                <a:spcPct val="90000"/>
-              </a:lnSpc>
-              <a:spcBef>
-                <a:spcPts val="1000"/>
-              </a:spcBef>
-              <a:buFont typeface="Arial" panose="020B0604020202020204" pitchFamily="34" charset="0"/>
-              <a:buChar char="•"/>
-              <a:defRPr sz="2800" kern="1200">
+              <a:rPr lang="de-DE" sz="2000" dirty="0" err="1">
                 <a:solidFill>
-                  <a:schemeClr val="tx1"/>
+                  <a:srgbClr val="CDB380"/>
                 </a:solidFill>
-                <a:latin typeface="+mn-lt"/>
-                <a:ea typeface="+mn-ea"/>
-                <a:cs typeface="+mn-cs"/>
-              </a:defRPr>
-            </a:lvl1pPr>
-            <a:lvl2pPr marL="685800" indent="-228600" algn="l" defTabSz="914400" rtl="0" eaLnBrk="1" latinLnBrk="0" hangingPunct="1">
-              <a:lnSpc>
-                <a:spcPct val="90000"/>
-              </a:lnSpc>
-              <a:spcBef>
-                <a:spcPts val="500"/>
-              </a:spcBef>
-              <a:buFont typeface="Arial" panose="020B0604020202020204" pitchFamily="34" charset="0"/>
-              <a:buChar char="•"/>
-              <a:defRPr sz="2400" kern="1200">
-                <a:solidFill>
-                  <a:schemeClr val="tx1"/>
-                </a:solidFill>
-                <a:latin typeface="+mn-lt"/>
-                <a:ea typeface="+mn-ea"/>
-                <a:cs typeface="+mn-cs"/>
-              </a:defRPr>
-            </a:lvl2pPr>
-            <a:lvl3pPr marL="1143000" indent="-228600" algn="l" defTabSz="914400" rtl="0" eaLnBrk="1" latinLnBrk="0" hangingPunct="1">
-              <a:lnSpc>
-                <a:spcPct val="90000"/>
-              </a:lnSpc>
-              <a:spcBef>
-                <a:spcPts val="500"/>
-              </a:spcBef>
-              <a:buFont typeface="Arial" panose="020B0604020202020204" pitchFamily="34" charset="0"/>
-              <a:buChar char="•"/>
-              <a:defRPr sz="2000" kern="1200">
-                <a:solidFill>
-                  <a:schemeClr val="tx1"/>
-                </a:solidFill>
-                <a:latin typeface="+mn-lt"/>
-                <a:ea typeface="+mn-ea"/>
-                <a:cs typeface="+mn-cs"/>
-              </a:defRPr>
-            </a:lvl3pPr>
-            <a:lvl4pPr marL="1600200" indent="-228600" algn="l" defTabSz="914400" rtl="0" eaLnBrk="1" latinLnBrk="0" hangingPunct="1">
-              <a:lnSpc>
-                <a:spcPct val="90000"/>
-              </a:lnSpc>
-              <a:spcBef>
-                <a:spcPts val="500"/>
-              </a:spcBef>
-              <a:buFont typeface="Arial" panose="020B0604020202020204" pitchFamily="34" charset="0"/>
-              <a:buChar char="•"/>
-              <a:defRPr sz="1800" kern="1200">
-                <a:solidFill>
-                  <a:schemeClr val="tx1"/>
-                </a:solidFill>
-                <a:latin typeface="+mn-lt"/>
-                <a:ea typeface="+mn-ea"/>
-                <a:cs typeface="+mn-cs"/>
-              </a:defRPr>
-            </a:lvl4pPr>
-            <a:lvl5pPr marL="2057400" indent="-228600" algn="l" defTabSz="914400" rtl="0" eaLnBrk="1" latinLnBrk="0" hangingPunct="1">
-              <a:lnSpc>
-                <a:spcPct val="90000"/>
-              </a:lnSpc>
-              <a:spcBef>
-                <a:spcPts val="500"/>
-              </a:spcBef>
-              <a:buFont typeface="Arial" panose="020B0604020202020204" pitchFamily="34" charset="0"/>
-              <a:buChar char="•"/>
-              <a:defRPr sz="1800" kern="1200">
-                <a:solidFill>
-                  <a:schemeClr val="tx1"/>
-                </a:solidFill>
-                <a:latin typeface="+mn-lt"/>
-                <a:ea typeface="+mn-ea"/>
-                <a:cs typeface="+mn-cs"/>
-              </a:defRPr>
-            </a:lvl5pPr>
-            <a:lvl6pPr marL="2514600" indent="-228600" algn="l" defTabSz="914400" rtl="0" eaLnBrk="1" latinLnBrk="0" hangingPunct="1">
-              <a:lnSpc>
-                <a:spcPct val="90000"/>
-              </a:lnSpc>
-              <a:spcBef>
-                <a:spcPts val="500"/>
-              </a:spcBef>
-              <a:buFont typeface="Arial" panose="020B0604020202020204" pitchFamily="34" charset="0"/>
-              <a:buChar char="•"/>
-              <a:defRPr sz="1800" kern="1200">
-                <a:solidFill>
-                  <a:schemeClr val="tx1"/>
-                </a:solidFill>
-                <a:latin typeface="+mn-lt"/>
-                <a:ea typeface="+mn-ea"/>
-                <a:cs typeface="+mn-cs"/>
-              </a:defRPr>
-            </a:lvl6pPr>
-            <a:lvl7pPr marL="2971800" indent="-228600" algn="l" defTabSz="914400" rtl="0" eaLnBrk="1" latinLnBrk="0" hangingPunct="1">
-              <a:lnSpc>
-                <a:spcPct val="90000"/>
-              </a:lnSpc>
-              <a:spcBef>
-                <a:spcPts val="500"/>
-              </a:spcBef>
-              <a:buFont typeface="Arial" panose="020B0604020202020204" pitchFamily="34" charset="0"/>
-              <a:buChar char="•"/>
-              <a:defRPr sz="1800" kern="1200">
-                <a:solidFill>
-                  <a:schemeClr val="tx1"/>
-                </a:solidFill>
-                <a:latin typeface="+mn-lt"/>
-                <a:ea typeface="+mn-ea"/>
-                <a:cs typeface="+mn-cs"/>
-              </a:defRPr>
-            </a:lvl7pPr>
-            <a:lvl8pPr marL="3429000" indent="-228600" algn="l" defTabSz="914400" rtl="0" eaLnBrk="1" latinLnBrk="0" hangingPunct="1">
-              <a:lnSpc>
-                <a:spcPct val="90000"/>
-              </a:lnSpc>
-              <a:spcBef>
-                <a:spcPts val="500"/>
-              </a:spcBef>
-              <a:buFont typeface="Arial" panose="020B0604020202020204" pitchFamily="34" charset="0"/>
-              <a:buChar char="•"/>
-              <a:defRPr sz="1800" kern="1200">
-                <a:solidFill>
-                  <a:schemeClr val="tx1"/>
-                </a:solidFill>
-                <a:latin typeface="+mn-lt"/>
-                <a:ea typeface="+mn-ea"/>
-                <a:cs typeface="+mn-cs"/>
-              </a:defRPr>
-            </a:lvl8pPr>
-            <a:lvl9pPr marL="3886200" indent="-228600" algn="l" defTabSz="914400" rtl="0" eaLnBrk="1" latinLnBrk="0" hangingPunct="1">
-              <a:lnSpc>
-                <a:spcPct val="90000"/>
-              </a:lnSpc>
-              <a:spcBef>
-                <a:spcPts val="500"/>
-              </a:spcBef>
-              <a:buFont typeface="Arial" panose="020B0604020202020204" pitchFamily="34" charset="0"/>
-              <a:buChar char="•"/>
-              <a:defRPr sz="1800" kern="1200">
-                <a:solidFill>
-                  <a:schemeClr val="tx1"/>
-                </a:solidFill>
-                <a:latin typeface="+mn-lt"/>
-                <a:ea typeface="+mn-ea"/>
-                <a:cs typeface="+mn-cs"/>
-              </a:defRPr>
-            </a:lvl9pPr>
-          </a:lstStyle>
-          <a:p>
-            <a:pPr marL="0" indent="0">
-              <a:buFont typeface="Arial" panose="020B0604020202020204" pitchFamily="34" charset="0"/>
-              <a:buNone/>
-            </a:pPr>
-            <a:r>
-              <a:rPr lang="de-DE" dirty="0" smtClean="0"/>
-              <a:t>15 Probanden</a:t>
-            </a:r>
-            <a:endParaRPr lang="de-DE" dirty="0"/>
-          </a:p>
-        </p:txBody>
-      </p:sp>
-      <p:sp>
-        <p:nvSpPr>
-          <p:cNvPr id="14" name="Inhaltsplatzhalter 4"/>
-          <p:cNvSpPr txBox="1">
-            <a:spLocks/>
-          </p:cNvSpPr>
-          <p:nvPr/>
-        </p:nvSpPr>
-        <p:spPr>
-          <a:xfrm rot="16200000">
-            <a:off x="7578809" y="3646285"/>
-            <a:ext cx="2458995" cy="496569"/>
-          </a:xfrm>
-          <a:prstGeom prst="rect">
-            <a:avLst/>
-          </a:prstGeom>
-        </p:spPr>
-        <p:txBody>
-          <a:bodyPr vert="horz" lIns="91440" tIns="45720" rIns="91440" bIns="45720" rtlCol="0">
-            <a:normAutofit/>
-          </a:bodyPr>
-          <a:lstStyle>
-            <a:lvl1pPr marL="228600" indent="-228600" algn="l" defTabSz="914400" rtl="0" eaLnBrk="1" latinLnBrk="0" hangingPunct="1">
-              <a:lnSpc>
-                <a:spcPct val="90000"/>
-              </a:lnSpc>
-              <a:spcBef>
-                <a:spcPts val="1000"/>
-              </a:spcBef>
-              <a:buFont typeface="Arial" panose="020B0604020202020204" pitchFamily="34" charset="0"/>
-              <a:buChar char="•"/>
-              <a:defRPr sz="2800" kern="1200">
-                <a:solidFill>
-                  <a:schemeClr val="tx1"/>
-                </a:solidFill>
-                <a:latin typeface="+mn-lt"/>
-                <a:ea typeface="+mn-ea"/>
-                <a:cs typeface="+mn-cs"/>
-              </a:defRPr>
-            </a:lvl1pPr>
-            <a:lvl2pPr marL="685800" indent="-228600" algn="l" defTabSz="914400" rtl="0" eaLnBrk="1" latinLnBrk="0" hangingPunct="1">
-              <a:lnSpc>
-                <a:spcPct val="90000"/>
-              </a:lnSpc>
-              <a:spcBef>
-                <a:spcPts val="500"/>
-              </a:spcBef>
-              <a:buFont typeface="Arial" panose="020B0604020202020204" pitchFamily="34" charset="0"/>
-              <a:buChar char="•"/>
-              <a:defRPr sz="2400" kern="1200">
-                <a:solidFill>
-                  <a:schemeClr val="tx1"/>
-                </a:solidFill>
-                <a:latin typeface="+mn-lt"/>
-                <a:ea typeface="+mn-ea"/>
-                <a:cs typeface="+mn-cs"/>
-              </a:defRPr>
-            </a:lvl2pPr>
-            <a:lvl3pPr marL="1143000" indent="-228600" algn="l" defTabSz="914400" rtl="0" eaLnBrk="1" latinLnBrk="0" hangingPunct="1">
-              <a:lnSpc>
-                <a:spcPct val="90000"/>
-              </a:lnSpc>
-              <a:spcBef>
-                <a:spcPts val="500"/>
-              </a:spcBef>
-              <a:buFont typeface="Arial" panose="020B0604020202020204" pitchFamily="34" charset="0"/>
-              <a:buChar char="•"/>
-              <a:defRPr sz="2000" kern="1200">
-                <a:solidFill>
-                  <a:schemeClr val="tx1"/>
-                </a:solidFill>
-                <a:latin typeface="+mn-lt"/>
-                <a:ea typeface="+mn-ea"/>
-                <a:cs typeface="+mn-cs"/>
-              </a:defRPr>
-            </a:lvl3pPr>
-            <a:lvl4pPr marL="1600200" indent="-228600" algn="l" defTabSz="914400" rtl="0" eaLnBrk="1" latinLnBrk="0" hangingPunct="1">
-              <a:lnSpc>
-                <a:spcPct val="90000"/>
-              </a:lnSpc>
-              <a:spcBef>
-                <a:spcPts val="500"/>
-              </a:spcBef>
-              <a:buFont typeface="Arial" panose="020B0604020202020204" pitchFamily="34" charset="0"/>
-              <a:buChar char="•"/>
-              <a:defRPr sz="1800" kern="1200">
-                <a:solidFill>
-                  <a:schemeClr val="tx1"/>
-                </a:solidFill>
-                <a:latin typeface="+mn-lt"/>
-                <a:ea typeface="+mn-ea"/>
-                <a:cs typeface="+mn-cs"/>
-              </a:defRPr>
-            </a:lvl4pPr>
-            <a:lvl5pPr marL="2057400" indent="-228600" algn="l" defTabSz="914400" rtl="0" eaLnBrk="1" latinLnBrk="0" hangingPunct="1">
-              <a:lnSpc>
-                <a:spcPct val="90000"/>
-              </a:lnSpc>
-              <a:spcBef>
-                <a:spcPts val="500"/>
-              </a:spcBef>
-              <a:buFont typeface="Arial" panose="020B0604020202020204" pitchFamily="34" charset="0"/>
-              <a:buChar char="•"/>
-              <a:defRPr sz="1800" kern="1200">
-                <a:solidFill>
-                  <a:schemeClr val="tx1"/>
-                </a:solidFill>
-                <a:latin typeface="+mn-lt"/>
-                <a:ea typeface="+mn-ea"/>
-                <a:cs typeface="+mn-cs"/>
-              </a:defRPr>
-            </a:lvl5pPr>
-            <a:lvl6pPr marL="2514600" indent="-228600" algn="l" defTabSz="914400" rtl="0" eaLnBrk="1" latinLnBrk="0" hangingPunct="1">
-              <a:lnSpc>
-                <a:spcPct val="90000"/>
-              </a:lnSpc>
-              <a:spcBef>
-                <a:spcPts val="500"/>
-              </a:spcBef>
-              <a:buFont typeface="Arial" panose="020B0604020202020204" pitchFamily="34" charset="0"/>
-              <a:buChar char="•"/>
-              <a:defRPr sz="1800" kern="1200">
-                <a:solidFill>
-                  <a:schemeClr val="tx1"/>
-                </a:solidFill>
-                <a:latin typeface="+mn-lt"/>
-                <a:ea typeface="+mn-ea"/>
-                <a:cs typeface="+mn-cs"/>
-              </a:defRPr>
-            </a:lvl6pPr>
-            <a:lvl7pPr marL="2971800" indent="-228600" algn="l" defTabSz="914400" rtl="0" eaLnBrk="1" latinLnBrk="0" hangingPunct="1">
-              <a:lnSpc>
-                <a:spcPct val="90000"/>
-              </a:lnSpc>
-              <a:spcBef>
-                <a:spcPts val="500"/>
-              </a:spcBef>
-              <a:buFont typeface="Arial" panose="020B0604020202020204" pitchFamily="34" charset="0"/>
-              <a:buChar char="•"/>
-              <a:defRPr sz="1800" kern="1200">
-                <a:solidFill>
-                  <a:schemeClr val="tx1"/>
-                </a:solidFill>
-                <a:latin typeface="+mn-lt"/>
-                <a:ea typeface="+mn-ea"/>
-                <a:cs typeface="+mn-cs"/>
-              </a:defRPr>
-            </a:lvl7pPr>
-            <a:lvl8pPr marL="3429000" indent="-228600" algn="l" defTabSz="914400" rtl="0" eaLnBrk="1" latinLnBrk="0" hangingPunct="1">
-              <a:lnSpc>
-                <a:spcPct val="90000"/>
-              </a:lnSpc>
-              <a:spcBef>
-                <a:spcPts val="500"/>
-              </a:spcBef>
-              <a:buFont typeface="Arial" panose="020B0604020202020204" pitchFamily="34" charset="0"/>
-              <a:buChar char="•"/>
-              <a:defRPr sz="1800" kern="1200">
-                <a:solidFill>
-                  <a:schemeClr val="tx1"/>
-                </a:solidFill>
-                <a:latin typeface="+mn-lt"/>
-                <a:ea typeface="+mn-ea"/>
-                <a:cs typeface="+mn-cs"/>
-              </a:defRPr>
-            </a:lvl8pPr>
-            <a:lvl9pPr marL="3886200" indent="-228600" algn="l" defTabSz="914400" rtl="0" eaLnBrk="1" latinLnBrk="0" hangingPunct="1">
-              <a:lnSpc>
-                <a:spcPct val="90000"/>
-              </a:lnSpc>
-              <a:spcBef>
-                <a:spcPts val="500"/>
-              </a:spcBef>
-              <a:buFont typeface="Arial" panose="020B0604020202020204" pitchFamily="34" charset="0"/>
-              <a:buChar char="•"/>
-              <a:defRPr sz="1800" kern="1200">
-                <a:solidFill>
-                  <a:schemeClr val="tx1"/>
-                </a:solidFill>
-                <a:latin typeface="+mn-lt"/>
-                <a:ea typeface="+mn-ea"/>
-                <a:cs typeface="+mn-cs"/>
-              </a:defRPr>
-            </a:lvl9pPr>
-          </a:lstStyle>
-          <a:p>
-            <a:pPr marL="0" indent="0">
-              <a:buFont typeface="Arial" panose="020B0604020202020204" pitchFamily="34" charset="0"/>
-              <a:buNone/>
-            </a:pPr>
-            <a:r>
-              <a:rPr lang="de-DE" dirty="0" smtClean="0"/>
-              <a:t>15 Probanden</a:t>
-            </a:r>
-            <a:endParaRPr lang="de-DE" dirty="0"/>
+                <a:latin typeface="Futura Lt BT" panose="020B0402020204020303" pitchFamily="34" charset="0"/>
+              </a:rPr>
+              <a:t>alarm</a:t>
+            </a:r>
+            <a:endParaRPr lang="de-DE" sz="2000" dirty="0">
+              <a:solidFill>
+                <a:srgbClr val="CDB380"/>
+              </a:solidFill>
+              <a:latin typeface="Futura Lt BT" panose="020B0402020204020303" pitchFamily="34" charset="0"/>
+            </a:endParaRPr>
           </a:p>
         </p:txBody>
       </p:sp>
@@ -5914,9 +5307,163 @@
   <p:timing>
     <p:tnLst>
       <p:par>
-        <p:cTn id="1" dur="indefinite" restart="never" nodeType="tmRoot"/>
+        <p:cTn id="1" dur="indefinite" restart="never" nodeType="tmRoot">
+          <p:childTnLst>
+            <p:seq concurrent="1" nextAc="seek">
+              <p:cTn id="2" dur="indefinite" nodeType="mainSeq">
+                <p:childTnLst>
+                  <p:par>
+                    <p:cTn id="3" fill="hold">
+                      <p:stCondLst>
+                        <p:cond delay="indefinite"/>
+                        <p:cond evt="onBegin" delay="0">
+                          <p:tn val="2"/>
+                        </p:cond>
+                      </p:stCondLst>
+                      <p:childTnLst>
+                        <p:par>
+                          <p:cTn id="4" fill="hold">
+                            <p:stCondLst>
+                              <p:cond delay="0"/>
+                            </p:stCondLst>
+                            <p:childTnLst>
+                              <p:par>
+                                <p:cTn id="5" presetID="22" presetClass="entr" presetSubtype="8" fill="hold" grpId="0" nodeType="withEffect">
+                                  <p:stCondLst>
+                                    <p:cond delay="0"/>
+                                  </p:stCondLst>
+                                  <p:childTnLst>
+                                    <p:set>
+                                      <p:cBhvr>
+                                        <p:cTn id="6" dur="1" fill="hold">
+                                          <p:stCondLst>
+                                            <p:cond delay="0"/>
+                                          </p:stCondLst>
+                                        </p:cTn>
+                                        <p:tgtEl>
+                                          <p:spTgt spid="6"/>
+                                        </p:tgtEl>
+                                        <p:attrNameLst>
+                                          <p:attrName>style.visibility</p:attrName>
+                                        </p:attrNameLst>
+                                      </p:cBhvr>
+                                      <p:to>
+                                        <p:strVal val="visible"/>
+                                      </p:to>
+                                    </p:set>
+                                    <p:animEffect transition="in" filter="wipe(left)">
+                                      <p:cBhvr>
+                                        <p:cTn id="7" dur="400"/>
+                                        <p:tgtEl>
+                                          <p:spTgt spid="6"/>
+                                        </p:tgtEl>
+                                      </p:cBhvr>
+                                    </p:animEffect>
+                                  </p:childTnLst>
+                                </p:cTn>
+                              </p:par>
+                              <p:par>
+                                <p:cTn id="8" presetID="22" presetClass="entr" presetSubtype="8" fill="hold" grpId="0" nodeType="withEffect">
+                                  <p:stCondLst>
+                                    <p:cond delay="100"/>
+                                  </p:stCondLst>
+                                  <p:childTnLst>
+                                    <p:set>
+                                      <p:cBhvr>
+                                        <p:cTn id="9" dur="1" fill="hold">
+                                          <p:stCondLst>
+                                            <p:cond delay="0"/>
+                                          </p:stCondLst>
+                                        </p:cTn>
+                                        <p:tgtEl>
+                                          <p:spTgt spid="7"/>
+                                        </p:tgtEl>
+                                        <p:attrNameLst>
+                                          <p:attrName>style.visibility</p:attrName>
+                                        </p:attrNameLst>
+                                      </p:cBhvr>
+                                      <p:to>
+                                        <p:strVal val="visible"/>
+                                      </p:to>
+                                    </p:set>
+                                    <p:animEffect transition="in" filter="wipe(left)">
+                                      <p:cBhvr>
+                                        <p:cTn id="10" dur="400"/>
+                                        <p:tgtEl>
+                                          <p:spTgt spid="7"/>
+                                        </p:tgtEl>
+                                      </p:cBhvr>
+                                    </p:animEffect>
+                                  </p:childTnLst>
+                                </p:cTn>
+                              </p:par>
+                              <p:par>
+                                <p:cTn id="11" presetID="22" presetClass="entr" presetSubtype="8" fill="hold" grpId="0" nodeType="withEffect">
+                                  <p:stCondLst>
+                                    <p:cond delay="200"/>
+                                  </p:stCondLst>
+                                  <p:childTnLst>
+                                    <p:set>
+                                      <p:cBhvr>
+                                        <p:cTn id="12" dur="1" fill="hold">
+                                          <p:stCondLst>
+                                            <p:cond delay="0"/>
+                                          </p:stCondLst>
+                                        </p:cTn>
+                                        <p:tgtEl>
+                                          <p:spTgt spid="8"/>
+                                        </p:tgtEl>
+                                        <p:attrNameLst>
+                                          <p:attrName>style.visibility</p:attrName>
+                                        </p:attrNameLst>
+                                      </p:cBhvr>
+                                      <p:to>
+                                        <p:strVal val="visible"/>
+                                      </p:to>
+                                    </p:set>
+                                    <p:animEffect transition="in" filter="wipe(left)">
+                                      <p:cBhvr>
+                                        <p:cTn id="13" dur="400"/>
+                                        <p:tgtEl>
+                                          <p:spTgt spid="8"/>
+                                        </p:tgtEl>
+                                      </p:cBhvr>
+                                    </p:animEffect>
+                                  </p:childTnLst>
+                                </p:cTn>
+                              </p:par>
+                            </p:childTnLst>
+                          </p:cTn>
+                        </p:par>
+                      </p:childTnLst>
+                    </p:cTn>
+                  </p:par>
+                </p:childTnLst>
+              </p:cTn>
+              <p:prevCondLst>
+                <p:cond evt="onPrev" delay="0">
+                  <p:tgtEl>
+                    <p:sldTgt/>
+                  </p:tgtEl>
+                </p:cond>
+              </p:prevCondLst>
+              <p:nextCondLst>
+                <p:cond evt="onNext" delay="0">
+                  <p:tgtEl>
+                    <p:sldTgt/>
+                  </p:tgtEl>
+                </p:cond>
+              </p:nextCondLst>
+            </p:seq>
+          </p:childTnLst>
+        </p:cTn>
       </p:par>
     </p:tnLst>
+    <p:bldLst>
+      <p:bldP spid="6" grpId="0" animBg="1"/>
+      <p:bldP spid="7" grpId="0" animBg="1"/>
+      <p:bldP spid="8" grpId="0" animBg="1"/>
+    </p:bldLst>
   </p:timing>
 </p:sld>
 </file>
@@ -5950,72 +5497,51 @@
         </p:nvSpPr>
         <p:spPr/>
         <p:txBody>
-          <a:bodyPr>
-            <a:normAutofit/>
-          </a:bodyPr>
-          <a:lstStyle/>
-          <a:p>
-            <a:r>
-              <a:rPr lang="de-DE" sz="3200" b="1" dirty="0" smtClean="0"/>
-              <a:t>Aufgaben</a:t>
-            </a:r>
-            <a:endParaRPr lang="de-DE" sz="3200" b="1" dirty="0"/>
-          </a:p>
-        </p:txBody>
-      </p:sp>
-      <p:sp>
-        <p:nvSpPr>
-          <p:cNvPr id="3" name="Inhaltsplatzhalter 2"/>
-          <p:cNvSpPr>
-            <a:spLocks noGrp="1"/>
-          </p:cNvSpPr>
+          <a:bodyPr/>
+          <a:lstStyle/>
+          <a:p>
+            <a:r>
+              <a:rPr lang="de-DE" dirty="0"/>
+              <a:t>Aufgaben (1/4)</a:t>
+            </a:r>
+          </a:p>
+        </p:txBody>
+      </p:sp>
+      <p:pic>
+        <p:nvPicPr>
+          <p:cNvPr id="9" name="Inhaltsplatzhalter 8" descr="Ein Bild, das Fußball, Uhr, Ball, Foto enthält.&#10;&#10;Automatisch generierte Beschreibung">
+            <a:extLst>
+              <a:ext uri="{FF2B5EF4-FFF2-40B4-BE49-F238E27FC236}">
+                <a16:creationId xmlns:a16="http://schemas.microsoft.com/office/drawing/2014/main" id="{5E2E5E09-3C09-46C6-861F-AE1C45040B82}"/>
+              </a:ext>
+            </a:extLst>
+          </p:cNvPr>
+          <p:cNvPicPr>
+            <a:picLocks noGrp="1" noChangeAspect="1"/>
+          </p:cNvPicPr>
           <p:nvPr>
             <p:ph idx="1"/>
           </p:nvPr>
-        </p:nvSpPr>
-        <p:spPr/>
-        <p:txBody>
-          <a:bodyPr/>
-          <a:lstStyle/>
-          <a:p>
-            <a:r>
-              <a:rPr lang="de-DE" dirty="0" smtClean="0"/>
-              <a:t>Aufgabe 1: Zahlenfolge</a:t>
-            </a:r>
-          </a:p>
-          <a:p>
-            <a:endParaRPr lang="de-DE" dirty="0"/>
-          </a:p>
-          <a:p>
-            <a:pPr marL="0" indent="0">
-              <a:buNone/>
-            </a:pPr>
-            <a:r>
-              <a:rPr lang="de-DE" dirty="0" smtClean="0">
-                <a:hlinkClick r:id="rId2" action="ppaction://hlinkfile"/>
-              </a:rPr>
-              <a:t>\\todo</a:t>
-            </a:r>
-            <a:r>
-              <a:rPr lang="de-DE" dirty="0" smtClean="0"/>
-              <a:t>: Aufgaben beschreiben kurz &amp; </a:t>
-            </a:r>
-            <a:r>
-              <a:rPr lang="de-DE" dirty="0" err="1" smtClean="0"/>
-              <a:t>maybe</a:t>
-            </a:r>
-            <a:r>
-              <a:rPr lang="de-DE" dirty="0" smtClean="0"/>
-              <a:t> </a:t>
-            </a:r>
-            <a:r>
-              <a:rPr lang="de-DE" dirty="0" err="1" smtClean="0"/>
-              <a:t>pic</a:t>
-            </a:r>
-            <a:endParaRPr lang="de-DE" dirty="0"/>
-          </a:p>
-        </p:txBody>
-      </p:sp>
+        </p:nvPicPr>
+        <p:blipFill>
+          <a:blip r:embed="rId2">
+            <a:extLst>
+              <a:ext uri="{28A0092B-C50C-407E-A947-70E740481C1C}">
+                <a14:useLocalDpi xmlns:a14="http://schemas.microsoft.com/office/drawing/2010/main" val="0"/>
+              </a:ext>
+            </a:extLst>
+          </a:blip>
+          <a:stretch>
+            <a:fillRect/>
+          </a:stretch>
+        </p:blipFill>
+        <p:spPr>
+          <a:xfrm>
+            <a:off x="1572016" y="1418096"/>
+            <a:ext cx="9047968" cy="5742598"/>
+          </a:xfrm>
+        </p:spPr>
+      </p:pic>
     </p:spTree>
     <p:extLst>
       <p:ext uri="{BB962C8B-B14F-4D97-AF65-F5344CB8AC3E}">
@@ -6026,22 +5552,15 @@
   <p:clrMapOvr>
     <a:masterClrMapping/>
   </p:clrMapOvr>
-  <p:timing>
-    <p:tnLst>
-      <p:par>
-        <p:cTn id="1" dur="indefinite" restart="never" nodeType="tmRoot"/>
-      </p:par>
-    </p:tnLst>
-  </p:timing>
 </p:sld>
 </file>
 
 <file path=ppt/theme/theme1.xml><?xml version="1.0" encoding="utf-8"?>
 <a:theme xmlns:a="http://schemas.openxmlformats.org/drawingml/2006/main" name="Office">
   <a:themeElements>
-    <a:clrScheme name="Office">
+    <a:clrScheme name="Benutzerdefiniert 1">
       <a:dk1>
-        <a:sysClr val="windowText" lastClr="000000"/>
+        <a:srgbClr val="031634"/>
       </a:dk1>
       <a:lt1>
         <a:sysClr val="window" lastClr="FFFFFF"/>

</xml_diff>

<commit_message>
Add discussion and design
</commit_message>
<xml_diff>
--- a/presentation/Resync Studie.pptx
+++ b/presentation/Resync Studie.pptx
@@ -4,6 +4,9 @@
   <p:sldMasterIdLst>
     <p:sldMasterId id="2147483648" r:id="rId1"/>
   </p:sldMasterIdLst>
+  <p:notesMasterIdLst>
+    <p:notesMasterId r:id="rId21"/>
+  </p:notesMasterIdLst>
   <p:sldIdLst>
     <p:sldId id="256" r:id="rId2"/>
     <p:sldId id="268" r:id="rId3"/>
@@ -16,10 +19,14 @@
     <p:sldId id="260" r:id="rId10"/>
     <p:sldId id="273" r:id="rId11"/>
     <p:sldId id="272" r:id="rId12"/>
-    <p:sldId id="265" r:id="rId13"/>
-    <p:sldId id="264" r:id="rId14"/>
-    <p:sldId id="266" r:id="rId15"/>
-    <p:sldId id="267" r:id="rId16"/>
+    <p:sldId id="278" r:id="rId13"/>
+    <p:sldId id="265" r:id="rId14"/>
+    <p:sldId id="264" r:id="rId15"/>
+    <p:sldId id="274" r:id="rId16"/>
+    <p:sldId id="275" r:id="rId17"/>
+    <p:sldId id="276" r:id="rId18"/>
+    <p:sldId id="277" r:id="rId19"/>
+    <p:sldId id="267" r:id="rId20"/>
   </p:sldIdLst>
   <p:sldSz cx="12192000" cy="6858000"/>
   <p:notesSz cx="6858000" cy="9144000"/>
@@ -126,6 +133,440 @@
 </p:presentation>
 </file>
 
+<file path=ppt/notesMasters/notesMaster1.xml><?xml version="1.0" encoding="utf-8"?>
+<p:notesMaster xmlns:a="http://schemas.openxmlformats.org/drawingml/2006/main" xmlns:r="http://schemas.openxmlformats.org/officeDocument/2006/relationships" xmlns:p="http://schemas.openxmlformats.org/presentationml/2006/main">
+  <p:cSld>
+    <p:bg>
+      <p:bgRef idx="1001">
+        <a:schemeClr val="bg1"/>
+      </p:bgRef>
+    </p:bg>
+    <p:spTree>
+      <p:nvGrpSpPr>
+        <p:cNvPr id="1" name=""/>
+        <p:cNvGrpSpPr/>
+        <p:nvPr/>
+      </p:nvGrpSpPr>
+      <p:grpSpPr>
+        <a:xfrm>
+          <a:off x="0" y="0"/>
+          <a:ext cx="0" cy="0"/>
+          <a:chOff x="0" y="0"/>
+          <a:chExt cx="0" cy="0"/>
+        </a:xfrm>
+      </p:grpSpPr>
+      <p:sp>
+        <p:nvSpPr>
+          <p:cNvPr id="2" name="Kopfzeilenplatzhalter 1"/>
+          <p:cNvSpPr>
+            <a:spLocks noGrp="1"/>
+          </p:cNvSpPr>
+          <p:nvPr>
+            <p:ph type="hdr" sz="quarter"/>
+          </p:nvPr>
+        </p:nvSpPr>
+        <p:spPr>
+          <a:xfrm>
+            <a:off x="0" y="0"/>
+            <a:ext cx="2971800" cy="458788"/>
+          </a:xfrm>
+          <a:prstGeom prst="rect">
+            <a:avLst/>
+          </a:prstGeom>
+        </p:spPr>
+        <p:txBody>
+          <a:bodyPr vert="horz" lIns="91440" tIns="45720" rIns="91440" bIns="45720" rtlCol="0"/>
+          <a:lstStyle>
+            <a:lvl1pPr algn="l">
+              <a:defRPr sz="1200"/>
+            </a:lvl1pPr>
+          </a:lstStyle>
+          <a:p>
+            <a:endParaRPr lang="de-DE"/>
+          </a:p>
+        </p:txBody>
+      </p:sp>
+      <p:sp>
+        <p:nvSpPr>
+          <p:cNvPr id="3" name="Datumsplatzhalter 2"/>
+          <p:cNvSpPr>
+            <a:spLocks noGrp="1"/>
+          </p:cNvSpPr>
+          <p:nvPr>
+            <p:ph type="dt" idx="1"/>
+          </p:nvPr>
+        </p:nvSpPr>
+        <p:spPr>
+          <a:xfrm>
+            <a:off x="3884613" y="0"/>
+            <a:ext cx="2971800" cy="458788"/>
+          </a:xfrm>
+          <a:prstGeom prst="rect">
+            <a:avLst/>
+          </a:prstGeom>
+        </p:spPr>
+        <p:txBody>
+          <a:bodyPr vert="horz" lIns="91440" tIns="45720" rIns="91440" bIns="45720" rtlCol="0"/>
+          <a:lstStyle>
+            <a:lvl1pPr algn="r">
+              <a:defRPr sz="1200"/>
+            </a:lvl1pPr>
+          </a:lstStyle>
+          <a:p>
+            <a:fld id="{346CE5F2-0935-43F4-9601-8E8617C23CFE}" type="datetimeFigureOut">
+              <a:rPr lang="de-DE" smtClean="0"/>
+              <a:t>18.01.2020</a:t>
+            </a:fld>
+            <a:endParaRPr lang="de-DE"/>
+          </a:p>
+        </p:txBody>
+      </p:sp>
+      <p:sp>
+        <p:nvSpPr>
+          <p:cNvPr id="4" name="Folienbildplatzhalter 3"/>
+          <p:cNvSpPr>
+            <a:spLocks noGrp="1" noRot="1" noChangeAspect="1"/>
+          </p:cNvSpPr>
+          <p:nvPr>
+            <p:ph type="sldImg" idx="2"/>
+          </p:nvPr>
+        </p:nvSpPr>
+        <p:spPr>
+          <a:xfrm>
+            <a:off x="685800" y="1143000"/>
+            <a:ext cx="5486400" cy="3086100"/>
+          </a:xfrm>
+          <a:prstGeom prst="rect">
+            <a:avLst/>
+          </a:prstGeom>
+          <a:noFill/>
+          <a:ln w="12700">
+            <a:solidFill>
+              <a:prstClr val="black"/>
+            </a:solidFill>
+          </a:ln>
+        </p:spPr>
+        <p:txBody>
+          <a:bodyPr vert="horz" lIns="91440" tIns="45720" rIns="91440" bIns="45720" rtlCol="0" anchor="ctr"/>
+          <a:lstStyle/>
+          <a:p>
+            <a:endParaRPr lang="de-DE"/>
+          </a:p>
+        </p:txBody>
+      </p:sp>
+      <p:sp>
+        <p:nvSpPr>
+          <p:cNvPr id="5" name="Notizenplatzhalter 4"/>
+          <p:cNvSpPr>
+            <a:spLocks noGrp="1"/>
+          </p:cNvSpPr>
+          <p:nvPr>
+            <p:ph type="body" sz="quarter" idx="3"/>
+          </p:nvPr>
+        </p:nvSpPr>
+        <p:spPr>
+          <a:xfrm>
+            <a:off x="685800" y="4400550"/>
+            <a:ext cx="5486400" cy="3600450"/>
+          </a:xfrm>
+          <a:prstGeom prst="rect">
+            <a:avLst/>
+          </a:prstGeom>
+        </p:spPr>
+        <p:txBody>
+          <a:bodyPr vert="horz" lIns="91440" tIns="45720" rIns="91440" bIns="45720" rtlCol="0"/>
+          <a:lstStyle/>
+          <a:p>
+            <a:pPr lvl="0"/>
+            <a:r>
+              <a:rPr lang="de-DE" smtClean="0"/>
+              <a:t>Formatvorlagen des Textmasters bearbeiten</a:t>
+            </a:r>
+          </a:p>
+          <a:p>
+            <a:pPr lvl="1"/>
+            <a:r>
+              <a:rPr lang="de-DE" smtClean="0"/>
+              <a:t>Zweite Ebene</a:t>
+            </a:r>
+          </a:p>
+          <a:p>
+            <a:pPr lvl="2"/>
+            <a:r>
+              <a:rPr lang="de-DE" smtClean="0"/>
+              <a:t>Dritte Ebene</a:t>
+            </a:r>
+          </a:p>
+          <a:p>
+            <a:pPr lvl="3"/>
+            <a:r>
+              <a:rPr lang="de-DE" smtClean="0"/>
+              <a:t>Vierte Ebene</a:t>
+            </a:r>
+          </a:p>
+          <a:p>
+            <a:pPr lvl="4"/>
+            <a:r>
+              <a:rPr lang="de-DE" smtClean="0"/>
+              <a:t>Fünfte Ebene</a:t>
+            </a:r>
+            <a:endParaRPr lang="de-DE"/>
+          </a:p>
+        </p:txBody>
+      </p:sp>
+      <p:sp>
+        <p:nvSpPr>
+          <p:cNvPr id="6" name="Fußzeilenplatzhalter 5"/>
+          <p:cNvSpPr>
+            <a:spLocks noGrp="1"/>
+          </p:cNvSpPr>
+          <p:nvPr>
+            <p:ph type="ftr" sz="quarter" idx="4"/>
+          </p:nvPr>
+        </p:nvSpPr>
+        <p:spPr>
+          <a:xfrm>
+            <a:off x="0" y="8685213"/>
+            <a:ext cx="2971800" cy="458787"/>
+          </a:xfrm>
+          <a:prstGeom prst="rect">
+            <a:avLst/>
+          </a:prstGeom>
+        </p:spPr>
+        <p:txBody>
+          <a:bodyPr vert="horz" lIns="91440" tIns="45720" rIns="91440" bIns="45720" rtlCol="0" anchor="b"/>
+          <a:lstStyle>
+            <a:lvl1pPr algn="l">
+              <a:defRPr sz="1200"/>
+            </a:lvl1pPr>
+          </a:lstStyle>
+          <a:p>
+            <a:endParaRPr lang="de-DE"/>
+          </a:p>
+        </p:txBody>
+      </p:sp>
+      <p:sp>
+        <p:nvSpPr>
+          <p:cNvPr id="7" name="Foliennummernplatzhalter 6"/>
+          <p:cNvSpPr>
+            <a:spLocks noGrp="1"/>
+          </p:cNvSpPr>
+          <p:nvPr>
+            <p:ph type="sldNum" sz="quarter" idx="5"/>
+          </p:nvPr>
+        </p:nvSpPr>
+        <p:spPr>
+          <a:xfrm>
+            <a:off x="3884613" y="8685213"/>
+            <a:ext cx="2971800" cy="458787"/>
+          </a:xfrm>
+          <a:prstGeom prst="rect">
+            <a:avLst/>
+          </a:prstGeom>
+        </p:spPr>
+        <p:txBody>
+          <a:bodyPr vert="horz" lIns="91440" tIns="45720" rIns="91440" bIns="45720" rtlCol="0" anchor="b"/>
+          <a:lstStyle>
+            <a:lvl1pPr algn="r">
+              <a:defRPr sz="1200"/>
+            </a:lvl1pPr>
+          </a:lstStyle>
+          <a:p>
+            <a:fld id="{E122D142-E42D-4994-9E2C-07523AF9A7C9}" type="slidenum">
+              <a:rPr lang="de-DE" smtClean="0"/>
+              <a:t>‹Nr.›</a:t>
+            </a:fld>
+            <a:endParaRPr lang="de-DE"/>
+          </a:p>
+        </p:txBody>
+      </p:sp>
+    </p:spTree>
+    <p:extLst>
+      <p:ext uri="{BB962C8B-B14F-4D97-AF65-F5344CB8AC3E}">
+        <p14:creationId xmlns:p14="http://schemas.microsoft.com/office/powerpoint/2010/main" val="4142769965"/>
+      </p:ext>
+    </p:extLst>
+  </p:cSld>
+  <p:clrMap bg1="lt1" tx1="dk1" bg2="lt2" tx2="dk2" accent1="accent1" accent2="accent2" accent3="accent3" accent4="accent4" accent5="accent5" accent6="accent6" hlink="hlink" folHlink="folHlink"/>
+  <p:notesStyle>
+    <a:lvl1pPr marL="0" algn="l" defTabSz="914400" rtl="0" eaLnBrk="1" latinLnBrk="0" hangingPunct="1">
+      <a:defRPr sz="1200" kern="1200">
+        <a:solidFill>
+          <a:schemeClr val="tx1"/>
+        </a:solidFill>
+        <a:latin typeface="+mn-lt"/>
+        <a:ea typeface="+mn-ea"/>
+        <a:cs typeface="+mn-cs"/>
+      </a:defRPr>
+    </a:lvl1pPr>
+    <a:lvl2pPr marL="457200" algn="l" defTabSz="914400" rtl="0" eaLnBrk="1" latinLnBrk="0" hangingPunct="1">
+      <a:defRPr sz="1200" kern="1200">
+        <a:solidFill>
+          <a:schemeClr val="tx1"/>
+        </a:solidFill>
+        <a:latin typeface="+mn-lt"/>
+        <a:ea typeface="+mn-ea"/>
+        <a:cs typeface="+mn-cs"/>
+      </a:defRPr>
+    </a:lvl2pPr>
+    <a:lvl3pPr marL="914400" algn="l" defTabSz="914400" rtl="0" eaLnBrk="1" latinLnBrk="0" hangingPunct="1">
+      <a:defRPr sz="1200" kern="1200">
+        <a:solidFill>
+          <a:schemeClr val="tx1"/>
+        </a:solidFill>
+        <a:latin typeface="+mn-lt"/>
+        <a:ea typeface="+mn-ea"/>
+        <a:cs typeface="+mn-cs"/>
+      </a:defRPr>
+    </a:lvl3pPr>
+    <a:lvl4pPr marL="1371600" algn="l" defTabSz="914400" rtl="0" eaLnBrk="1" latinLnBrk="0" hangingPunct="1">
+      <a:defRPr sz="1200" kern="1200">
+        <a:solidFill>
+          <a:schemeClr val="tx1"/>
+        </a:solidFill>
+        <a:latin typeface="+mn-lt"/>
+        <a:ea typeface="+mn-ea"/>
+        <a:cs typeface="+mn-cs"/>
+      </a:defRPr>
+    </a:lvl4pPr>
+    <a:lvl5pPr marL="1828800" algn="l" defTabSz="914400" rtl="0" eaLnBrk="1" latinLnBrk="0" hangingPunct="1">
+      <a:defRPr sz="1200" kern="1200">
+        <a:solidFill>
+          <a:schemeClr val="tx1"/>
+        </a:solidFill>
+        <a:latin typeface="+mn-lt"/>
+        <a:ea typeface="+mn-ea"/>
+        <a:cs typeface="+mn-cs"/>
+      </a:defRPr>
+    </a:lvl5pPr>
+    <a:lvl6pPr marL="2286000" algn="l" defTabSz="914400" rtl="0" eaLnBrk="1" latinLnBrk="0" hangingPunct="1">
+      <a:defRPr sz="1200" kern="1200">
+        <a:solidFill>
+          <a:schemeClr val="tx1"/>
+        </a:solidFill>
+        <a:latin typeface="+mn-lt"/>
+        <a:ea typeface="+mn-ea"/>
+        <a:cs typeface="+mn-cs"/>
+      </a:defRPr>
+    </a:lvl6pPr>
+    <a:lvl7pPr marL="2743200" algn="l" defTabSz="914400" rtl="0" eaLnBrk="1" latinLnBrk="0" hangingPunct="1">
+      <a:defRPr sz="1200" kern="1200">
+        <a:solidFill>
+          <a:schemeClr val="tx1"/>
+        </a:solidFill>
+        <a:latin typeface="+mn-lt"/>
+        <a:ea typeface="+mn-ea"/>
+        <a:cs typeface="+mn-cs"/>
+      </a:defRPr>
+    </a:lvl7pPr>
+    <a:lvl8pPr marL="3200400" algn="l" defTabSz="914400" rtl="0" eaLnBrk="1" latinLnBrk="0" hangingPunct="1">
+      <a:defRPr sz="1200" kern="1200">
+        <a:solidFill>
+          <a:schemeClr val="tx1"/>
+        </a:solidFill>
+        <a:latin typeface="+mn-lt"/>
+        <a:ea typeface="+mn-ea"/>
+        <a:cs typeface="+mn-cs"/>
+      </a:defRPr>
+    </a:lvl8pPr>
+    <a:lvl9pPr marL="3657600" algn="l" defTabSz="914400" rtl="0" eaLnBrk="1" latinLnBrk="0" hangingPunct="1">
+      <a:defRPr sz="1200" kern="1200">
+        <a:solidFill>
+          <a:schemeClr val="tx1"/>
+        </a:solidFill>
+        <a:latin typeface="+mn-lt"/>
+        <a:ea typeface="+mn-ea"/>
+        <a:cs typeface="+mn-cs"/>
+      </a:defRPr>
+    </a:lvl9pPr>
+  </p:notesStyle>
+</p:notesMaster>
+</file>
+
+<file path=ppt/notesSlides/notesSlide1.xml><?xml version="1.0" encoding="utf-8"?>
+<p:notes xmlns:a="http://schemas.openxmlformats.org/drawingml/2006/main" xmlns:r="http://schemas.openxmlformats.org/officeDocument/2006/relationships" xmlns:p="http://schemas.openxmlformats.org/presentationml/2006/main">
+  <p:cSld>
+    <p:spTree>
+      <p:nvGrpSpPr>
+        <p:cNvPr id="1" name=""/>
+        <p:cNvGrpSpPr/>
+        <p:nvPr/>
+      </p:nvGrpSpPr>
+      <p:grpSpPr>
+        <a:xfrm>
+          <a:off x="0" y="0"/>
+          <a:ext cx="0" cy="0"/>
+          <a:chOff x="0" y="0"/>
+          <a:chExt cx="0" cy="0"/>
+        </a:xfrm>
+      </p:grpSpPr>
+      <p:sp>
+        <p:nvSpPr>
+          <p:cNvPr id="2" name="Folienbildplatzhalter 1"/>
+          <p:cNvSpPr>
+            <a:spLocks noGrp="1" noRot="1" noChangeAspect="1"/>
+          </p:cNvSpPr>
+          <p:nvPr>
+            <p:ph type="sldImg"/>
+          </p:nvPr>
+        </p:nvSpPr>
+        <p:spPr/>
+      </p:sp>
+      <p:sp>
+        <p:nvSpPr>
+          <p:cNvPr id="3" name="Notizenplatzhalter 2"/>
+          <p:cNvSpPr>
+            <a:spLocks noGrp="1"/>
+          </p:cNvSpPr>
+          <p:nvPr>
+            <p:ph type="body" idx="1"/>
+          </p:nvPr>
+        </p:nvSpPr>
+        <p:spPr/>
+        <p:txBody>
+          <a:bodyPr/>
+          <a:lstStyle/>
+          <a:p>
+            <a:endParaRPr lang="de-DE" dirty="0"/>
+          </a:p>
+        </p:txBody>
+      </p:sp>
+      <p:sp>
+        <p:nvSpPr>
+          <p:cNvPr id="4" name="Foliennummernplatzhalter 3"/>
+          <p:cNvSpPr>
+            <a:spLocks noGrp="1"/>
+          </p:cNvSpPr>
+          <p:nvPr>
+            <p:ph type="sldNum" sz="quarter" idx="10"/>
+          </p:nvPr>
+        </p:nvSpPr>
+        <p:spPr/>
+        <p:txBody>
+          <a:bodyPr/>
+          <a:lstStyle/>
+          <a:p>
+            <a:fld id="{E122D142-E42D-4994-9E2C-07523AF9A7C9}" type="slidenum">
+              <a:rPr lang="de-DE" smtClean="0"/>
+              <a:t>12</a:t>
+            </a:fld>
+            <a:endParaRPr lang="de-DE"/>
+          </a:p>
+        </p:txBody>
+      </p:sp>
+    </p:spTree>
+    <p:extLst>
+      <p:ext uri="{BB962C8B-B14F-4D97-AF65-F5344CB8AC3E}">
+        <p14:creationId xmlns:p14="http://schemas.microsoft.com/office/powerpoint/2010/main" val="1893119131"/>
+      </p:ext>
+    </p:extLst>
+  </p:cSld>
+  <p:clrMapOvr>
+    <a:masterClrMapping/>
+  </p:clrMapOvr>
+</p:notes>
+</file>
+
 <file path=ppt/slideLayouts/slideLayout1.xml><?xml version="1.0" encoding="utf-8"?>
 <p:sldLayout xmlns:a="http://schemas.openxmlformats.org/drawingml/2006/main" xmlns:r="http://schemas.openxmlformats.org/officeDocument/2006/relationships" xmlns:p="http://schemas.openxmlformats.org/presentationml/2006/main" type="title" preserve="1">
   <p:cSld name="Titelfolie">
@@ -255,7 +696,7 @@
           <a:p>
             <a:fld id="{41257651-B64F-43FB-9868-05B8EA16BD84}" type="datetimeFigureOut">
               <a:rPr lang="de-DE" smtClean="0"/>
-              <a:t>14.12.2019</a:t>
+              <a:t>18.01.2020</a:t>
             </a:fld>
             <a:endParaRPr lang="de-DE"/>
           </a:p>
@@ -313,6 +754,13 @@
   <p:clrMapOvr>
     <a:masterClrMapping/>
   </p:clrMapOvr>
+  <p:timing>
+    <p:tnLst>
+      <p:par>
+        <p:cTn id="1" dur="indefinite" restart="never" nodeType="tmRoot"/>
+      </p:par>
+    </p:tnLst>
+  </p:timing>
 </p:sldLayout>
 </file>
 
@@ -423,7 +871,7 @@
           <a:p>
             <a:fld id="{41257651-B64F-43FB-9868-05B8EA16BD84}" type="datetimeFigureOut">
               <a:rPr lang="de-DE" smtClean="0"/>
-              <a:t>14.12.2019</a:t>
+              <a:t>18.01.2020</a:t>
             </a:fld>
             <a:endParaRPr lang="de-DE"/>
           </a:p>
@@ -601,7 +1049,7 @@
           <a:p>
             <a:fld id="{41257651-B64F-43FB-9868-05B8EA16BD84}" type="datetimeFigureOut">
               <a:rPr lang="de-DE" smtClean="0"/>
-              <a:t>14.12.2019</a:t>
+              <a:t>18.01.2020</a:t>
             </a:fld>
             <a:endParaRPr lang="de-DE"/>
           </a:p>
@@ -696,7 +1144,7 @@
             <a:lvl1pPr>
               <a:defRPr>
                 <a:solidFill>
-                  <a:srgbClr val="036564"/>
+                  <a:srgbClr val="0D6F6E"/>
                 </a:solidFill>
               </a:defRPr>
             </a:lvl1pPr>
@@ -818,7 +1266,7 @@
           <a:p>
             <a:fld id="{41257651-B64F-43FB-9868-05B8EA16BD84}" type="datetimeFigureOut">
               <a:rPr lang="de-DE" smtClean="0"/>
-              <a:t>14.12.2019</a:t>
+              <a:t>18.01.2020</a:t>
             </a:fld>
             <a:endParaRPr lang="de-DE"/>
           </a:p>
@@ -887,9 +1335,17 @@
             <a:avLst/>
           </a:prstGeom>
           <a:ln w="57150">
-            <a:solidFill>
-              <a:srgbClr val="CDB380"/>
-            </a:solidFill>
+            <a:gradFill>
+              <a:gsLst>
+                <a:gs pos="100000">
+                  <a:srgbClr val="BF9659"/>
+                </a:gs>
+                <a:gs pos="0">
+                  <a:srgbClr val="CDB380"/>
+                </a:gs>
+              </a:gsLst>
+              <a:lin ang="5400000" scaled="1"/>
+            </a:gradFill>
           </a:ln>
         </p:spPr>
         <p:style>
@@ -917,6 +1373,13 @@
   <p:clrMapOvr>
     <a:masterClrMapping/>
   </p:clrMapOvr>
+  <p:timing>
+    <p:tnLst>
+      <p:par>
+        <p:cTn id="1" dur="indefinite" restart="never" nodeType="tmRoot"/>
+      </p:par>
+    </p:tnLst>
+  </p:timing>
 </p:sldLayout>
 </file>
 
@@ -1104,7 +1567,7 @@
           <a:p>
             <a:fld id="{41257651-B64F-43FB-9868-05B8EA16BD84}" type="datetimeFigureOut">
               <a:rPr lang="de-DE" smtClean="0"/>
-              <a:t>14.12.2019</a:t>
+              <a:t>18.01.2020</a:t>
             </a:fld>
             <a:endParaRPr lang="de-DE"/>
           </a:p>
@@ -1333,7 +1796,7 @@
           <a:p>
             <a:fld id="{41257651-B64F-43FB-9868-05B8EA16BD84}" type="datetimeFigureOut">
               <a:rPr lang="de-DE" smtClean="0"/>
-              <a:t>14.12.2019</a:t>
+              <a:t>18.01.2020</a:t>
             </a:fld>
             <a:endParaRPr lang="de-DE"/>
           </a:p>
@@ -1697,7 +2160,7 @@
           <a:p>
             <a:fld id="{41257651-B64F-43FB-9868-05B8EA16BD84}" type="datetimeFigureOut">
               <a:rPr lang="de-DE" smtClean="0"/>
-              <a:t>14.12.2019</a:t>
+              <a:t>18.01.2020</a:t>
             </a:fld>
             <a:endParaRPr lang="de-DE"/>
           </a:p>
@@ -1814,7 +2277,7 @@
           <a:p>
             <a:fld id="{41257651-B64F-43FB-9868-05B8EA16BD84}" type="datetimeFigureOut">
               <a:rPr lang="de-DE" smtClean="0"/>
-              <a:t>14.12.2019</a:t>
+              <a:t>18.01.2020</a:t>
             </a:fld>
             <a:endParaRPr lang="de-DE"/>
           </a:p>
@@ -1909,7 +2372,7 @@
           <a:p>
             <a:fld id="{41257651-B64F-43FB-9868-05B8EA16BD84}" type="datetimeFigureOut">
               <a:rPr lang="de-DE" smtClean="0"/>
-              <a:t>14.12.2019</a:t>
+              <a:t>18.01.2020</a:t>
             </a:fld>
             <a:endParaRPr lang="de-DE"/>
           </a:p>
@@ -2184,7 +2647,7 @@
           <a:p>
             <a:fld id="{41257651-B64F-43FB-9868-05B8EA16BD84}" type="datetimeFigureOut">
               <a:rPr lang="de-DE" smtClean="0"/>
-              <a:t>14.12.2019</a:t>
+              <a:t>18.01.2020</a:t>
             </a:fld>
             <a:endParaRPr lang="de-DE"/>
           </a:p>
@@ -2436,7 +2899,7 @@
           <a:p>
             <a:fld id="{41257651-B64F-43FB-9868-05B8EA16BD84}" type="datetimeFigureOut">
               <a:rPr lang="de-DE" smtClean="0"/>
-              <a:t>14.12.2019</a:t>
+              <a:t>18.01.2020</a:t>
             </a:fld>
             <a:endParaRPr lang="de-DE"/>
           </a:p>
@@ -2502,9 +2965,17 @@
   <p:cSld>
     <p:bg>
       <p:bgPr>
-        <a:solidFill>
-          <a:srgbClr val="031634"/>
-        </a:solidFill>
+        <a:gradFill>
+          <a:gsLst>
+            <a:gs pos="0">
+              <a:srgbClr val="2A2A3C"/>
+            </a:gs>
+            <a:gs pos="100000">
+              <a:srgbClr val="2B2B2D"/>
+            </a:gs>
+          </a:gsLst>
+          <a:lin ang="1800000" scaled="0"/>
+        </a:gradFill>
         <a:effectLst/>
       </p:bgPr>
     </p:bg>
@@ -2650,7 +3121,7 @@
             <a:fld id="{41257651-B64F-43FB-9868-05B8EA16BD84}" type="datetimeFigureOut">
               <a:rPr lang="de-DE" smtClean="0"/>
               <a:pPr/>
-              <a:t>14.12.2019</a:t>
+              <a:t>18.01.2020</a:t>
             </a:fld>
             <a:endParaRPr lang="de-DE"/>
           </a:p>
@@ -2729,6 +3200,809 @@
               <a:pPr/>
               <a:t>‹Nr.›</a:t>
             </a:fld>
+            <a:endParaRPr lang="de-DE"/>
+          </a:p>
+        </p:txBody>
+      </p:sp>
+      <p:sp>
+        <p:nvSpPr>
+          <p:cNvPr id="7" name="Ellipse 6"/>
+          <p:cNvSpPr/>
+          <p:nvPr userDrawn="1"/>
+        </p:nvSpPr>
+        <p:spPr>
+          <a:xfrm>
+            <a:off x="266400" y="1260000"/>
+            <a:ext cx="108000" cy="108000"/>
+          </a:xfrm>
+          <a:prstGeom prst="ellipse">
+            <a:avLst/>
+          </a:prstGeom>
+          <a:gradFill flip="none" rotWithShape="1">
+            <a:gsLst>
+              <a:gs pos="0">
+                <a:schemeClr val="accent4">
+                  <a:lumMod val="89000"/>
+                  <a:alpha val="79000"/>
+                </a:schemeClr>
+              </a:gs>
+              <a:gs pos="23000">
+                <a:schemeClr val="accent4">
+                  <a:lumMod val="89000"/>
+                  <a:alpha val="64000"/>
+                </a:schemeClr>
+              </a:gs>
+              <a:gs pos="69000">
+                <a:schemeClr val="accent4">
+                  <a:lumMod val="75000"/>
+                  <a:alpha val="19000"/>
+                </a:schemeClr>
+              </a:gs>
+              <a:gs pos="100000">
+                <a:schemeClr val="accent4">
+                  <a:lumMod val="70000"/>
+                  <a:alpha val="0"/>
+                </a:schemeClr>
+              </a:gs>
+            </a:gsLst>
+            <a:path path="circle">
+              <a:fillToRect l="50000" t="50000" r="50000" b="50000"/>
+            </a:path>
+            <a:tileRect/>
+          </a:gradFill>
+          <a:ln>
+            <a:noFill/>
+          </a:ln>
+        </p:spPr>
+        <p:style>
+          <a:lnRef idx="2">
+            <a:schemeClr val="accent1">
+              <a:shade val="50000"/>
+            </a:schemeClr>
+          </a:lnRef>
+          <a:fillRef idx="1">
+            <a:schemeClr val="accent1"/>
+          </a:fillRef>
+          <a:effectRef idx="0">
+            <a:schemeClr val="accent1"/>
+          </a:effectRef>
+          <a:fontRef idx="minor">
+            <a:schemeClr val="lt1"/>
+          </a:fontRef>
+        </p:style>
+        <p:txBody>
+          <a:bodyPr rtlCol="0" anchor="ctr"/>
+          <a:lstStyle/>
+          <a:p>
+            <a:pPr algn="ctr"/>
+            <a:endParaRPr lang="de-DE"/>
+          </a:p>
+        </p:txBody>
+      </p:sp>
+      <p:sp>
+        <p:nvSpPr>
+          <p:cNvPr id="8" name="Ellipse 7"/>
+          <p:cNvSpPr/>
+          <p:nvPr userDrawn="1"/>
+        </p:nvSpPr>
+        <p:spPr>
+          <a:xfrm>
+            <a:off x="10808400" y="2802000"/>
+            <a:ext cx="108000" cy="108000"/>
+          </a:xfrm>
+          <a:prstGeom prst="ellipse">
+            <a:avLst/>
+          </a:prstGeom>
+          <a:gradFill flip="none" rotWithShape="1">
+            <a:gsLst>
+              <a:gs pos="0">
+                <a:schemeClr val="accent4">
+                  <a:lumMod val="89000"/>
+                  <a:alpha val="79000"/>
+                </a:schemeClr>
+              </a:gs>
+              <a:gs pos="23000">
+                <a:schemeClr val="accent4">
+                  <a:lumMod val="89000"/>
+                  <a:alpha val="64000"/>
+                </a:schemeClr>
+              </a:gs>
+              <a:gs pos="69000">
+                <a:schemeClr val="accent4">
+                  <a:lumMod val="75000"/>
+                  <a:alpha val="19000"/>
+                </a:schemeClr>
+              </a:gs>
+              <a:gs pos="100000">
+                <a:schemeClr val="accent4">
+                  <a:lumMod val="70000"/>
+                  <a:alpha val="0"/>
+                </a:schemeClr>
+              </a:gs>
+            </a:gsLst>
+            <a:path path="circle">
+              <a:fillToRect l="50000" t="50000" r="50000" b="50000"/>
+            </a:path>
+            <a:tileRect/>
+          </a:gradFill>
+          <a:ln>
+            <a:noFill/>
+          </a:ln>
+        </p:spPr>
+        <p:style>
+          <a:lnRef idx="2">
+            <a:schemeClr val="accent1">
+              <a:shade val="50000"/>
+            </a:schemeClr>
+          </a:lnRef>
+          <a:fillRef idx="1">
+            <a:schemeClr val="accent1"/>
+          </a:fillRef>
+          <a:effectRef idx="0">
+            <a:schemeClr val="accent1"/>
+          </a:effectRef>
+          <a:fontRef idx="minor">
+            <a:schemeClr val="lt1"/>
+          </a:fontRef>
+        </p:style>
+        <p:txBody>
+          <a:bodyPr rtlCol="0" anchor="ctr"/>
+          <a:lstStyle/>
+          <a:p>
+            <a:pPr algn="ctr"/>
+            <a:endParaRPr lang="de-DE"/>
+          </a:p>
+        </p:txBody>
+      </p:sp>
+      <p:sp>
+        <p:nvSpPr>
+          <p:cNvPr id="9" name="Ellipse 8"/>
+          <p:cNvSpPr/>
+          <p:nvPr userDrawn="1"/>
+        </p:nvSpPr>
+        <p:spPr>
+          <a:xfrm>
+            <a:off x="2745608" y="5754778"/>
+            <a:ext cx="45719" cy="45719"/>
+          </a:xfrm>
+          <a:prstGeom prst="ellipse">
+            <a:avLst/>
+          </a:prstGeom>
+          <a:gradFill flip="none" rotWithShape="1">
+            <a:gsLst>
+              <a:gs pos="0">
+                <a:schemeClr val="accent4">
+                  <a:lumMod val="89000"/>
+                  <a:alpha val="79000"/>
+                </a:schemeClr>
+              </a:gs>
+              <a:gs pos="23000">
+                <a:schemeClr val="accent4">
+                  <a:lumMod val="89000"/>
+                  <a:alpha val="64000"/>
+                </a:schemeClr>
+              </a:gs>
+              <a:gs pos="69000">
+                <a:schemeClr val="accent4">
+                  <a:lumMod val="75000"/>
+                  <a:alpha val="19000"/>
+                </a:schemeClr>
+              </a:gs>
+              <a:gs pos="100000">
+                <a:schemeClr val="accent4">
+                  <a:lumMod val="70000"/>
+                  <a:alpha val="0"/>
+                </a:schemeClr>
+              </a:gs>
+            </a:gsLst>
+            <a:path path="circle">
+              <a:fillToRect l="50000" t="50000" r="50000" b="50000"/>
+            </a:path>
+            <a:tileRect/>
+          </a:gradFill>
+          <a:ln>
+            <a:noFill/>
+          </a:ln>
+        </p:spPr>
+        <p:style>
+          <a:lnRef idx="2">
+            <a:schemeClr val="accent1">
+              <a:shade val="50000"/>
+            </a:schemeClr>
+          </a:lnRef>
+          <a:fillRef idx="1">
+            <a:schemeClr val="accent1"/>
+          </a:fillRef>
+          <a:effectRef idx="0">
+            <a:schemeClr val="accent1"/>
+          </a:effectRef>
+          <a:fontRef idx="minor">
+            <a:schemeClr val="lt1"/>
+          </a:fontRef>
+        </p:style>
+        <p:txBody>
+          <a:bodyPr rtlCol="0" anchor="ctr"/>
+          <a:lstStyle/>
+          <a:p>
+            <a:pPr algn="ctr"/>
+            <a:endParaRPr lang="de-DE"/>
+          </a:p>
+        </p:txBody>
+      </p:sp>
+      <p:sp>
+        <p:nvSpPr>
+          <p:cNvPr id="10" name="Ellipse 9"/>
+          <p:cNvSpPr/>
+          <p:nvPr userDrawn="1"/>
+        </p:nvSpPr>
+        <p:spPr>
+          <a:xfrm>
+            <a:off x="8556600" y="1413164"/>
+            <a:ext cx="62836" cy="62836"/>
+          </a:xfrm>
+          <a:prstGeom prst="ellipse">
+            <a:avLst/>
+          </a:prstGeom>
+          <a:gradFill flip="none" rotWithShape="1">
+            <a:gsLst>
+              <a:gs pos="0">
+                <a:schemeClr val="accent4">
+                  <a:lumMod val="89000"/>
+                  <a:alpha val="79000"/>
+                </a:schemeClr>
+              </a:gs>
+              <a:gs pos="23000">
+                <a:schemeClr val="accent4">
+                  <a:lumMod val="89000"/>
+                  <a:alpha val="64000"/>
+                </a:schemeClr>
+              </a:gs>
+              <a:gs pos="69000">
+                <a:schemeClr val="accent4">
+                  <a:lumMod val="75000"/>
+                  <a:alpha val="19000"/>
+                </a:schemeClr>
+              </a:gs>
+              <a:gs pos="100000">
+                <a:schemeClr val="accent4">
+                  <a:lumMod val="70000"/>
+                  <a:alpha val="0"/>
+                </a:schemeClr>
+              </a:gs>
+            </a:gsLst>
+            <a:path path="circle">
+              <a:fillToRect l="50000" t="50000" r="50000" b="50000"/>
+            </a:path>
+            <a:tileRect/>
+          </a:gradFill>
+          <a:ln>
+            <a:noFill/>
+          </a:ln>
+        </p:spPr>
+        <p:style>
+          <a:lnRef idx="2">
+            <a:schemeClr val="accent1">
+              <a:shade val="50000"/>
+            </a:schemeClr>
+          </a:lnRef>
+          <a:fillRef idx="1">
+            <a:schemeClr val="accent1"/>
+          </a:fillRef>
+          <a:effectRef idx="0">
+            <a:schemeClr val="accent1"/>
+          </a:effectRef>
+          <a:fontRef idx="minor">
+            <a:schemeClr val="lt1"/>
+          </a:fontRef>
+        </p:style>
+        <p:txBody>
+          <a:bodyPr rtlCol="0" anchor="ctr"/>
+          <a:lstStyle/>
+          <a:p>
+            <a:pPr algn="ctr"/>
+            <a:endParaRPr lang="de-DE"/>
+          </a:p>
+        </p:txBody>
+      </p:sp>
+      <p:sp>
+        <p:nvSpPr>
+          <p:cNvPr id="11" name="Ellipse 10"/>
+          <p:cNvSpPr/>
+          <p:nvPr userDrawn="1"/>
+        </p:nvSpPr>
+        <p:spPr>
+          <a:xfrm>
+            <a:off x="5784915" y="2657247"/>
+            <a:ext cx="68835" cy="68835"/>
+          </a:xfrm>
+          <a:prstGeom prst="ellipse">
+            <a:avLst/>
+          </a:prstGeom>
+          <a:gradFill flip="none" rotWithShape="1">
+            <a:gsLst>
+              <a:gs pos="0">
+                <a:srgbClr val="FF00FF">
+                  <a:alpha val="83000"/>
+                </a:srgbClr>
+              </a:gs>
+              <a:gs pos="23000">
+                <a:srgbClr val="FF00FF">
+                  <a:alpha val="46000"/>
+                </a:srgbClr>
+              </a:gs>
+              <a:gs pos="69000">
+                <a:srgbClr val="FF00FF">
+                  <a:alpha val="20000"/>
+                  <a:lumMod val="82000"/>
+                </a:srgbClr>
+              </a:gs>
+              <a:gs pos="100000">
+                <a:srgbClr val="FF00FF">
+                  <a:lumMod val="58000"/>
+                  <a:alpha val="0"/>
+                </a:srgbClr>
+              </a:gs>
+            </a:gsLst>
+            <a:path path="circle">
+              <a:fillToRect l="50000" t="50000" r="50000" b="50000"/>
+            </a:path>
+            <a:tileRect/>
+          </a:gradFill>
+          <a:ln>
+            <a:noFill/>
+          </a:ln>
+        </p:spPr>
+        <p:style>
+          <a:lnRef idx="2">
+            <a:schemeClr val="accent1">
+              <a:shade val="50000"/>
+            </a:schemeClr>
+          </a:lnRef>
+          <a:fillRef idx="1">
+            <a:schemeClr val="accent1"/>
+          </a:fillRef>
+          <a:effectRef idx="0">
+            <a:schemeClr val="accent1"/>
+          </a:effectRef>
+          <a:fontRef idx="minor">
+            <a:schemeClr val="lt1"/>
+          </a:fontRef>
+        </p:style>
+        <p:txBody>
+          <a:bodyPr rtlCol="0" anchor="ctr"/>
+          <a:lstStyle/>
+          <a:p>
+            <a:pPr algn="ctr"/>
+            <a:endParaRPr lang="de-DE"/>
+          </a:p>
+        </p:txBody>
+      </p:sp>
+      <p:sp>
+        <p:nvSpPr>
+          <p:cNvPr id="12" name="Ellipse 11"/>
+          <p:cNvSpPr/>
+          <p:nvPr userDrawn="1"/>
+        </p:nvSpPr>
+        <p:spPr>
+          <a:xfrm>
+            <a:off x="10337865" y="5800497"/>
+            <a:ext cx="68835" cy="68835"/>
+          </a:xfrm>
+          <a:prstGeom prst="ellipse">
+            <a:avLst/>
+          </a:prstGeom>
+          <a:gradFill flip="none" rotWithShape="1">
+            <a:gsLst>
+              <a:gs pos="0">
+                <a:srgbClr val="FF00FF">
+                  <a:alpha val="83000"/>
+                </a:srgbClr>
+              </a:gs>
+              <a:gs pos="23000">
+                <a:srgbClr val="FF00FF">
+                  <a:alpha val="46000"/>
+                </a:srgbClr>
+              </a:gs>
+              <a:gs pos="69000">
+                <a:srgbClr val="FF00FF">
+                  <a:alpha val="20000"/>
+                  <a:lumMod val="82000"/>
+                </a:srgbClr>
+              </a:gs>
+              <a:gs pos="100000">
+                <a:srgbClr val="FF00FF">
+                  <a:lumMod val="58000"/>
+                  <a:alpha val="0"/>
+                </a:srgbClr>
+              </a:gs>
+            </a:gsLst>
+            <a:path path="circle">
+              <a:fillToRect l="50000" t="50000" r="50000" b="50000"/>
+            </a:path>
+            <a:tileRect/>
+          </a:gradFill>
+          <a:ln>
+            <a:noFill/>
+          </a:ln>
+        </p:spPr>
+        <p:style>
+          <a:lnRef idx="2">
+            <a:schemeClr val="accent1">
+              <a:shade val="50000"/>
+            </a:schemeClr>
+          </a:lnRef>
+          <a:fillRef idx="1">
+            <a:schemeClr val="accent1"/>
+          </a:fillRef>
+          <a:effectRef idx="0">
+            <a:schemeClr val="accent1"/>
+          </a:effectRef>
+          <a:fontRef idx="minor">
+            <a:schemeClr val="lt1"/>
+          </a:fontRef>
+        </p:style>
+        <p:txBody>
+          <a:bodyPr rtlCol="0" anchor="ctr"/>
+          <a:lstStyle/>
+          <a:p>
+            <a:pPr algn="ctr"/>
+            <a:endParaRPr lang="de-DE"/>
+          </a:p>
+        </p:txBody>
+      </p:sp>
+      <p:sp>
+        <p:nvSpPr>
+          <p:cNvPr id="13" name="Ellipse 12"/>
+          <p:cNvSpPr/>
+          <p:nvPr userDrawn="1"/>
+        </p:nvSpPr>
+        <p:spPr>
+          <a:xfrm>
+            <a:off x="2091120" y="5175657"/>
+            <a:ext cx="68835" cy="68835"/>
+          </a:xfrm>
+          <a:prstGeom prst="ellipse">
+            <a:avLst/>
+          </a:prstGeom>
+          <a:gradFill flip="none" rotWithShape="1">
+            <a:gsLst>
+              <a:gs pos="0">
+                <a:srgbClr val="FF00FF">
+                  <a:alpha val="83000"/>
+                </a:srgbClr>
+              </a:gs>
+              <a:gs pos="23000">
+                <a:srgbClr val="FF00FF">
+                  <a:alpha val="46000"/>
+                </a:srgbClr>
+              </a:gs>
+              <a:gs pos="69000">
+                <a:srgbClr val="FF00FF">
+                  <a:alpha val="20000"/>
+                  <a:lumMod val="82000"/>
+                </a:srgbClr>
+              </a:gs>
+              <a:gs pos="100000">
+                <a:srgbClr val="FF00FF">
+                  <a:lumMod val="58000"/>
+                  <a:alpha val="0"/>
+                </a:srgbClr>
+              </a:gs>
+            </a:gsLst>
+            <a:path path="circle">
+              <a:fillToRect l="50000" t="50000" r="50000" b="50000"/>
+            </a:path>
+            <a:tileRect/>
+          </a:gradFill>
+          <a:ln>
+            <a:noFill/>
+          </a:ln>
+        </p:spPr>
+        <p:style>
+          <a:lnRef idx="2">
+            <a:schemeClr val="accent1">
+              <a:shade val="50000"/>
+            </a:schemeClr>
+          </a:lnRef>
+          <a:fillRef idx="1">
+            <a:schemeClr val="accent1"/>
+          </a:fillRef>
+          <a:effectRef idx="0">
+            <a:schemeClr val="accent1"/>
+          </a:effectRef>
+          <a:fontRef idx="minor">
+            <a:schemeClr val="lt1"/>
+          </a:fontRef>
+        </p:style>
+        <p:txBody>
+          <a:bodyPr rtlCol="0" anchor="ctr"/>
+          <a:lstStyle/>
+          <a:p>
+            <a:pPr algn="ctr"/>
+            <a:endParaRPr lang="de-DE"/>
+          </a:p>
+        </p:txBody>
+      </p:sp>
+      <p:sp>
+        <p:nvSpPr>
+          <p:cNvPr id="14" name="Ellipse 13"/>
+          <p:cNvSpPr/>
+          <p:nvPr userDrawn="1"/>
+        </p:nvSpPr>
+        <p:spPr>
+          <a:xfrm>
+            <a:off x="9008175" y="5027067"/>
+            <a:ext cx="45719" cy="45719"/>
+          </a:xfrm>
+          <a:prstGeom prst="ellipse">
+            <a:avLst/>
+          </a:prstGeom>
+          <a:gradFill flip="none" rotWithShape="1">
+            <a:gsLst>
+              <a:gs pos="0">
+                <a:srgbClr val="00FFCC">
+                  <a:alpha val="77000"/>
+                </a:srgbClr>
+              </a:gs>
+              <a:gs pos="23000">
+                <a:srgbClr val="00FFCC">
+                  <a:alpha val="44000"/>
+                </a:srgbClr>
+              </a:gs>
+              <a:gs pos="70000">
+                <a:srgbClr val="00FFCC">
+                  <a:alpha val="19000"/>
+                </a:srgbClr>
+              </a:gs>
+              <a:gs pos="100000">
+                <a:srgbClr val="00FFCC">
+                  <a:alpha val="0"/>
+                </a:srgbClr>
+              </a:gs>
+            </a:gsLst>
+            <a:path path="circle">
+              <a:fillToRect l="50000" t="50000" r="50000" b="50000"/>
+            </a:path>
+            <a:tileRect/>
+          </a:gradFill>
+          <a:ln>
+            <a:noFill/>
+          </a:ln>
+        </p:spPr>
+        <p:style>
+          <a:lnRef idx="2">
+            <a:schemeClr val="accent1">
+              <a:shade val="50000"/>
+            </a:schemeClr>
+          </a:lnRef>
+          <a:fillRef idx="1">
+            <a:schemeClr val="accent1"/>
+          </a:fillRef>
+          <a:effectRef idx="0">
+            <a:schemeClr val="accent1"/>
+          </a:effectRef>
+          <a:fontRef idx="minor">
+            <a:schemeClr val="lt1"/>
+          </a:fontRef>
+        </p:style>
+        <p:txBody>
+          <a:bodyPr rtlCol="0" anchor="ctr"/>
+          <a:lstStyle/>
+          <a:p>
+            <a:pPr algn="ctr"/>
+            <a:endParaRPr lang="de-DE"/>
+          </a:p>
+        </p:txBody>
+      </p:sp>
+      <p:sp>
+        <p:nvSpPr>
+          <p:cNvPr id="15" name="Ellipse 14"/>
+          <p:cNvSpPr/>
+          <p:nvPr userDrawn="1"/>
+        </p:nvSpPr>
+        <p:spPr>
+          <a:xfrm>
+            <a:off x="7645465" y="2887140"/>
+            <a:ext cx="45719" cy="45719"/>
+          </a:xfrm>
+          <a:prstGeom prst="ellipse">
+            <a:avLst/>
+          </a:prstGeom>
+          <a:gradFill flip="none" rotWithShape="1">
+            <a:gsLst>
+              <a:gs pos="0">
+                <a:srgbClr val="00FFCC">
+                  <a:alpha val="77000"/>
+                </a:srgbClr>
+              </a:gs>
+              <a:gs pos="23000">
+                <a:srgbClr val="00FFCC">
+                  <a:alpha val="44000"/>
+                </a:srgbClr>
+              </a:gs>
+              <a:gs pos="70000">
+                <a:srgbClr val="00FFCC">
+                  <a:alpha val="19000"/>
+                </a:srgbClr>
+              </a:gs>
+              <a:gs pos="100000">
+                <a:srgbClr val="00FFCC">
+                  <a:alpha val="0"/>
+                </a:srgbClr>
+              </a:gs>
+            </a:gsLst>
+            <a:path path="circle">
+              <a:fillToRect l="50000" t="50000" r="50000" b="50000"/>
+            </a:path>
+            <a:tileRect/>
+          </a:gradFill>
+          <a:ln>
+            <a:noFill/>
+          </a:ln>
+        </p:spPr>
+        <p:style>
+          <a:lnRef idx="2">
+            <a:schemeClr val="accent1">
+              <a:shade val="50000"/>
+            </a:schemeClr>
+          </a:lnRef>
+          <a:fillRef idx="1">
+            <a:schemeClr val="accent1"/>
+          </a:fillRef>
+          <a:effectRef idx="0">
+            <a:schemeClr val="accent1"/>
+          </a:effectRef>
+          <a:fontRef idx="minor">
+            <a:schemeClr val="lt1"/>
+          </a:fontRef>
+        </p:style>
+        <p:txBody>
+          <a:bodyPr rtlCol="0" anchor="ctr"/>
+          <a:lstStyle/>
+          <a:p>
+            <a:pPr algn="ctr"/>
+            <a:endParaRPr lang="de-DE"/>
+          </a:p>
+        </p:txBody>
+      </p:sp>
+      <p:sp>
+        <p:nvSpPr>
+          <p:cNvPr id="16" name="Ellipse 15"/>
+          <p:cNvSpPr/>
+          <p:nvPr userDrawn="1"/>
+        </p:nvSpPr>
+        <p:spPr>
+          <a:xfrm>
+            <a:off x="1080000" y="1800000"/>
+            <a:ext cx="45719" cy="45719"/>
+          </a:xfrm>
+          <a:prstGeom prst="ellipse">
+            <a:avLst/>
+          </a:prstGeom>
+          <a:gradFill flip="none" rotWithShape="1">
+            <a:gsLst>
+              <a:gs pos="0">
+                <a:srgbClr val="00FFCC">
+                  <a:alpha val="77000"/>
+                </a:srgbClr>
+              </a:gs>
+              <a:gs pos="23000">
+                <a:srgbClr val="00FFCC">
+                  <a:alpha val="44000"/>
+                </a:srgbClr>
+              </a:gs>
+              <a:gs pos="70000">
+                <a:srgbClr val="00FFCC">
+                  <a:alpha val="19000"/>
+                </a:srgbClr>
+              </a:gs>
+              <a:gs pos="100000">
+                <a:srgbClr val="00FFCC">
+                  <a:alpha val="0"/>
+                </a:srgbClr>
+              </a:gs>
+            </a:gsLst>
+            <a:path path="circle">
+              <a:fillToRect l="50000" t="50000" r="50000" b="50000"/>
+            </a:path>
+            <a:tileRect/>
+          </a:gradFill>
+          <a:ln>
+            <a:noFill/>
+          </a:ln>
+        </p:spPr>
+        <p:style>
+          <a:lnRef idx="2">
+            <a:schemeClr val="accent1">
+              <a:shade val="50000"/>
+            </a:schemeClr>
+          </a:lnRef>
+          <a:fillRef idx="1">
+            <a:schemeClr val="accent1"/>
+          </a:fillRef>
+          <a:effectRef idx="0">
+            <a:schemeClr val="accent1"/>
+          </a:effectRef>
+          <a:fontRef idx="minor">
+            <a:schemeClr val="lt1"/>
+          </a:fontRef>
+        </p:style>
+        <p:txBody>
+          <a:bodyPr rtlCol="0" anchor="ctr"/>
+          <a:lstStyle/>
+          <a:p>
+            <a:pPr algn="ctr"/>
+            <a:endParaRPr lang="de-DE"/>
+          </a:p>
+        </p:txBody>
+      </p:sp>
+      <p:sp>
+        <p:nvSpPr>
+          <p:cNvPr id="17" name="Ellipse 16"/>
+          <p:cNvSpPr/>
+          <p:nvPr userDrawn="1"/>
+        </p:nvSpPr>
+        <p:spPr>
+          <a:xfrm>
+            <a:off x="4320000" y="720000"/>
+            <a:ext cx="45719" cy="45719"/>
+          </a:xfrm>
+          <a:prstGeom prst="ellipse">
+            <a:avLst/>
+          </a:prstGeom>
+          <a:gradFill flip="none" rotWithShape="1">
+            <a:gsLst>
+              <a:gs pos="0">
+                <a:srgbClr val="00FFCC">
+                  <a:alpha val="77000"/>
+                </a:srgbClr>
+              </a:gs>
+              <a:gs pos="23000">
+                <a:srgbClr val="00FFCC">
+                  <a:alpha val="44000"/>
+                </a:srgbClr>
+              </a:gs>
+              <a:gs pos="70000">
+                <a:srgbClr val="00FFCC">
+                  <a:alpha val="19000"/>
+                </a:srgbClr>
+              </a:gs>
+              <a:gs pos="100000">
+                <a:srgbClr val="00FFCC">
+                  <a:alpha val="0"/>
+                </a:srgbClr>
+              </a:gs>
+            </a:gsLst>
+            <a:path path="circle">
+              <a:fillToRect l="50000" t="50000" r="50000" b="50000"/>
+            </a:path>
+            <a:tileRect/>
+          </a:gradFill>
+          <a:ln>
+            <a:noFill/>
+          </a:ln>
+        </p:spPr>
+        <p:style>
+          <a:lnRef idx="2">
+            <a:schemeClr val="accent1">
+              <a:shade val="50000"/>
+            </a:schemeClr>
+          </a:lnRef>
+          <a:fillRef idx="1">
+            <a:schemeClr val="accent1"/>
+          </a:fillRef>
+          <a:effectRef idx="0">
+            <a:schemeClr val="accent1"/>
+          </a:effectRef>
+          <a:fontRef idx="minor">
+            <a:schemeClr val="lt1"/>
+          </a:fontRef>
+        </p:style>
+        <p:txBody>
+          <a:bodyPr rtlCol="0" anchor="ctr"/>
+          <a:lstStyle/>
+          <a:p>
+            <a:pPr algn="ctr"/>
             <a:endParaRPr lang="de-DE"/>
           </a:p>
         </p:txBody>
@@ -2754,6 +4028,13 @@
     <p:sldLayoutId id="2147483658" r:id="rId10"/>
     <p:sldLayoutId id="2147483659" r:id="rId11"/>
   </p:sldLayoutIdLst>
+  <p:timing>
+    <p:tnLst>
+      <p:par>
+        <p:cTn id="1" dur="indefinite" restart="never" nodeType="tmRoot"/>
+      </p:par>
+    </p:tnLst>
+  </p:timing>
   <p:txStyles>
     <p:titleStyle>
       <a:lvl1pPr algn="l" defTabSz="914400" rtl="0" eaLnBrk="1" latinLnBrk="0" hangingPunct="1">
@@ -3124,6 +4405,13 @@
   <p:clrMapOvr>
     <a:masterClrMapping/>
   </p:clrMapOvr>
+  <p:timing>
+    <p:tnLst>
+      <p:par>
+        <p:cTn id="1" dur="indefinite" restart="never" nodeType="tmRoot"/>
+      </p:par>
+    </p:tnLst>
+  </p:timing>
 </p:sld>
 </file>
 
@@ -3210,6 +4498,13 @@
   <p:clrMapOvr>
     <a:masterClrMapping/>
   </p:clrMapOvr>
+  <p:timing>
+    <p:tnLst>
+      <p:par>
+        <p:cTn id="1" dur="indefinite" restart="never" nodeType="tmRoot"/>
+      </p:par>
+    </p:tnLst>
+  </p:timing>
 </p:sld>
 </file>
 
@@ -3296,6 +4591,13 @@
   <p:clrMapOvr>
     <a:masterClrMapping/>
   </p:clrMapOvr>
+  <p:timing>
+    <p:tnLst>
+      <p:par>
+        <p:cTn id="1" dur="indefinite" restart="never" nodeType="tmRoot"/>
+      </p:par>
+    </p:tnLst>
+  </p:timing>
 </p:sld>
 </file>
 
@@ -3318,73 +4620,145 @@
       </p:grpSpPr>
       <p:sp>
         <p:nvSpPr>
-          <p:cNvPr id="5" name="Titel 4">
+          <p:cNvPr id="2" name="Titel 1"/>
+          <p:cNvSpPr>
+            <a:spLocks noGrp="1"/>
+          </p:cNvSpPr>
+          <p:nvPr>
+            <p:ph type="title"/>
+          </p:nvPr>
+        </p:nvSpPr>
+        <p:spPr/>
+        <p:txBody>
+          <a:bodyPr/>
+          <a:lstStyle/>
+          <a:p>
+            <a:r>
+              <a:rPr lang="de-DE" dirty="0"/>
+              <a:t>Aufgaben </a:t>
+            </a:r>
+            <a:r>
+              <a:rPr lang="de-DE" dirty="0" smtClean="0"/>
+              <a:t>(</a:t>
+            </a:r>
+            <a:r>
+              <a:rPr lang="de-DE" dirty="0"/>
+              <a:t>4</a:t>
+            </a:r>
+            <a:r>
+              <a:rPr lang="de-DE" dirty="0" smtClean="0"/>
+              <a:t>/5)</a:t>
+            </a:r>
+            <a:endParaRPr lang="de-DE" dirty="0"/>
+          </a:p>
+        </p:txBody>
+      </p:sp>
+      <p:pic>
+        <p:nvPicPr>
+          <p:cNvPr id="4" name="Inhaltsplatzhalter 3"/>
+          <p:cNvPicPr>
+            <a:picLocks noGrp="1" noChangeAspect="1"/>
+          </p:cNvPicPr>
+          <p:nvPr>
+            <p:ph idx="1"/>
+          </p:nvPr>
+        </p:nvPicPr>
+        <p:blipFill>
+          <a:blip r:embed="rId3" cstate="print">
             <a:extLst>
-              <a:ext uri="{FF2B5EF4-FFF2-40B4-BE49-F238E27FC236}">
-                <a16:creationId xmlns:a16="http://schemas.microsoft.com/office/drawing/2014/main" id="{D3B3AA58-6A5E-4BF4-8CA0-E6B0BBBF57BD}"/>
+              <a:ext uri="{28A0092B-C50C-407E-A947-70E740481C1C}">
+                <a14:useLocalDpi xmlns:a14="http://schemas.microsoft.com/office/drawing/2010/main" val="0"/>
               </a:ext>
             </a:extLst>
-          </p:cNvPr>
-          <p:cNvSpPr>
-            <a:spLocks noGrp="1"/>
-          </p:cNvSpPr>
-          <p:nvPr>
-            <p:ph type="title"/>
-          </p:nvPr>
-        </p:nvSpPr>
-        <p:spPr/>
-        <p:txBody>
-          <a:bodyPr/>
-          <a:lstStyle/>
-          <a:p>
-            <a:r>
-              <a:rPr lang="de-DE" dirty="0"/>
-              <a:t>Aufgaben (4/4)</a:t>
-            </a:r>
-          </a:p>
-        </p:txBody>
-      </p:sp>
-      <p:sp>
-        <p:nvSpPr>
-          <p:cNvPr id="3" name="Inhaltsplatzhalter 2">
+          </a:blip>
+          <a:stretch>
+            <a:fillRect/>
+          </a:stretch>
+        </p:blipFill>
+        <p:spPr>
+          <a:xfrm>
+            <a:off x="1927432" y="1481294"/>
+            <a:ext cx="3970481" cy="2520000"/>
+          </a:xfrm>
+        </p:spPr>
+      </p:pic>
+      <p:pic>
+        <p:nvPicPr>
+          <p:cNvPr id="5" name="Grafik 4"/>
+          <p:cNvPicPr>
+            <a:picLocks noChangeAspect="1"/>
+          </p:cNvPicPr>
+          <p:nvPr/>
+        </p:nvPicPr>
+        <p:blipFill>
+          <a:blip r:embed="rId4" cstate="print">
             <a:extLst>
-              <a:ext uri="{FF2B5EF4-FFF2-40B4-BE49-F238E27FC236}">
-                <a16:creationId xmlns:a16="http://schemas.microsoft.com/office/drawing/2014/main" id="{CA552B51-2B65-4706-BCBA-EFA42B1145C0}"/>
+              <a:ext uri="{28A0092B-C50C-407E-A947-70E740481C1C}">
+                <a14:useLocalDpi xmlns:a14="http://schemas.microsoft.com/office/drawing/2010/main" val="0"/>
               </a:ext>
             </a:extLst>
-          </p:cNvPr>
-          <p:cNvSpPr>
-            <a:spLocks noGrp="1"/>
-          </p:cNvSpPr>
-          <p:nvPr>
-            <p:ph idx="1"/>
-          </p:nvPr>
-        </p:nvSpPr>
-        <p:spPr/>
-        <p:txBody>
-          <a:bodyPr/>
-          <a:lstStyle/>
-          <a:p>
-            <a:r>
-              <a:rPr lang="de-DE"/>
-              <a:t>Video</a:t>
-            </a:r>
-          </a:p>
-          <a:p>
-            <a:endParaRPr lang="de-DE"/>
-          </a:p>
-        </p:txBody>
-      </p:sp>
+          </a:blip>
+          <a:stretch>
+            <a:fillRect/>
+          </a:stretch>
+        </p:blipFill>
+        <p:spPr>
+          <a:xfrm>
+            <a:off x="5971945" y="1481294"/>
+            <a:ext cx="3970481" cy="2520000"/>
+          </a:xfrm>
+          <a:prstGeom prst="rect">
+            <a:avLst/>
+          </a:prstGeom>
+        </p:spPr>
+      </p:pic>
+      <p:pic>
+        <p:nvPicPr>
+          <p:cNvPr id="6" name="Grafik 5"/>
+          <p:cNvPicPr>
+            <a:picLocks noChangeAspect="1"/>
+          </p:cNvPicPr>
+          <p:nvPr/>
+        </p:nvPicPr>
+        <p:blipFill>
+          <a:blip r:embed="rId5" cstate="print">
+            <a:extLst>
+              <a:ext uri="{28A0092B-C50C-407E-A947-70E740481C1C}">
+                <a14:useLocalDpi xmlns:a14="http://schemas.microsoft.com/office/drawing/2010/main" val="0"/>
+              </a:ext>
+            </a:extLst>
+          </a:blip>
+          <a:stretch>
+            <a:fillRect/>
+          </a:stretch>
+        </p:blipFill>
+        <p:spPr>
+          <a:xfrm>
+            <a:off x="1927432" y="4088130"/>
+            <a:ext cx="3970481" cy="2520000"/>
+          </a:xfrm>
+          <a:prstGeom prst="rect">
+            <a:avLst/>
+          </a:prstGeom>
+        </p:spPr>
+      </p:pic>
     </p:spTree>
     <p:extLst>
       <p:ext uri="{BB962C8B-B14F-4D97-AF65-F5344CB8AC3E}">
-        <p14:creationId xmlns:p14="http://schemas.microsoft.com/office/powerpoint/2010/main" val="182811933"/>
+        <p14:creationId xmlns:p14="http://schemas.microsoft.com/office/powerpoint/2010/main" val="3637224668"/>
       </p:ext>
     </p:extLst>
   </p:cSld>
   <p:clrMapOvr>
     <a:masterClrMapping/>
   </p:clrMapOvr>
+  <p:timing>
+    <p:tnLst>
+      <p:par>
+        <p:cTn id="1" dur="indefinite" restart="never" nodeType="tmRoot"/>
+      </p:par>
+    </p:tnLst>
+  </p:timing>
 </p:sld>
 </file>
 
@@ -3407,7 +4781,13 @@
       </p:grpSpPr>
       <p:sp>
         <p:nvSpPr>
-          <p:cNvPr id="2" name="Titel 1"/>
+          <p:cNvPr id="5" name="Titel 4">
+            <a:extLst>
+              <a:ext uri="{FF2B5EF4-FFF2-40B4-BE49-F238E27FC236}">
+                <a16:creationId xmlns:a16="http://schemas.microsoft.com/office/drawing/2014/main" id="{D3B3AA58-6A5E-4BF4-8CA0-E6B0BBBF57BD}"/>
+              </a:ext>
+            </a:extLst>
+          </p:cNvPr>
           <p:cNvSpPr>
             <a:spLocks noGrp="1"/>
           </p:cNvSpPr>
@@ -3422,14 +4802,33 @@
           <a:p>
             <a:r>
               <a:rPr lang="de-DE" dirty="0"/>
-              <a:t>Ergebnisse</a:t>
-            </a:r>
-          </a:p>
-        </p:txBody>
-      </p:sp>
-      <p:sp>
-        <p:nvSpPr>
-          <p:cNvPr id="3" name="Inhaltsplatzhalter 2"/>
+              <a:t>Aufgaben </a:t>
+            </a:r>
+            <a:r>
+              <a:rPr lang="de-DE" dirty="0" smtClean="0"/>
+              <a:t>(</a:t>
+            </a:r>
+            <a:r>
+              <a:rPr lang="de-DE" dirty="0" smtClean="0"/>
+              <a:t>5</a:t>
+            </a:r>
+            <a:r>
+              <a:rPr lang="de-DE" dirty="0" smtClean="0"/>
+              <a:t>/5)</a:t>
+            </a:r>
+            <a:endParaRPr lang="de-DE" dirty="0"/>
+          </a:p>
+        </p:txBody>
+      </p:sp>
+      <p:sp>
+        <p:nvSpPr>
+          <p:cNvPr id="3" name="Inhaltsplatzhalter 2">
+            <a:extLst>
+              <a:ext uri="{FF2B5EF4-FFF2-40B4-BE49-F238E27FC236}">
+                <a16:creationId xmlns:a16="http://schemas.microsoft.com/office/drawing/2014/main" id="{CA552B51-2B65-4706-BCBA-EFA42B1145C0}"/>
+              </a:ext>
+            </a:extLst>
+          </p:cNvPr>
           <p:cNvSpPr>
             <a:spLocks noGrp="1"/>
           </p:cNvSpPr>
@@ -3443,78 +4842,32 @@
           <a:lstStyle/>
           <a:p>
             <a:r>
-              <a:rPr lang="de-DE" dirty="0"/>
-              <a:t>Demografisch (Alter, Erfahrung, Geschlecht)</a:t>
-            </a:r>
-          </a:p>
-          <a:p>
-            <a:r>
-              <a:rPr lang="de-DE" dirty="0"/>
-              <a:t>Umgebungsvariablen (Stuhleinstellungen)</a:t>
-            </a:r>
-          </a:p>
-          <a:p>
-            <a:r>
-              <a:rPr lang="de-DE" dirty="0"/>
-              <a:t>Dauer des </a:t>
-            </a:r>
-            <a:r>
-              <a:rPr lang="de-DE" dirty="0" err="1"/>
-              <a:t>Wecktons</a:t>
-            </a:r>
-            <a:r>
-              <a:rPr lang="de-DE" dirty="0"/>
-              <a:t> zum Abstellen</a:t>
-            </a:r>
-          </a:p>
-          <a:p>
-            <a:r>
-              <a:rPr lang="de-DE" dirty="0"/>
-              <a:t>Aufgabenergebnisse (Fehlerraten, Zeiten in Gruppen)</a:t>
-            </a:r>
-          </a:p>
-          <a:p>
-            <a:r>
-              <a:rPr lang="de-DE" dirty="0"/>
-              <a:t>Fragebögen (Sam, RSME)</a:t>
-            </a:r>
-          </a:p>
-          <a:p>
-            <a:r>
-              <a:rPr lang="de-DE" dirty="0"/>
-              <a:t>Schlafstatus</a:t>
-            </a:r>
-          </a:p>
-          <a:p>
-            <a:r>
-              <a:rPr lang="de-DE" dirty="0" err="1"/>
-              <a:t>Limesurvey</a:t>
-            </a:r>
-            <a:r>
-              <a:rPr lang="de-DE" dirty="0"/>
-              <a:t> (Müdigkeit vorher/</a:t>
-            </a:r>
-            <a:r>
-              <a:rPr lang="de-DE" dirty="0" err="1"/>
-              <a:t>nachehr</a:t>
-            </a:r>
-            <a:r>
-              <a:rPr lang="de-DE" dirty="0"/>
-              <a:t>, Aufgabenschwierigkeit, Komfort mit VR Brille, ..)</a:t>
-            </a:r>
+              <a:rPr lang="de-DE"/>
+              <a:t>Video</a:t>
+            </a:r>
+          </a:p>
+          <a:p>
+            <a:endParaRPr lang="de-DE"/>
           </a:p>
         </p:txBody>
       </p:sp>
     </p:spTree>
     <p:extLst>
       <p:ext uri="{BB962C8B-B14F-4D97-AF65-F5344CB8AC3E}">
-        <p14:creationId xmlns:p14="http://schemas.microsoft.com/office/powerpoint/2010/main" val="2021924618"/>
+        <p14:creationId xmlns:p14="http://schemas.microsoft.com/office/powerpoint/2010/main" val="182811933"/>
       </p:ext>
     </p:extLst>
   </p:cSld>
   <p:clrMapOvr>
     <a:masterClrMapping/>
   </p:clrMapOvr>
+  <p:timing>
+    <p:tnLst>
+      <p:par>
+        <p:cTn id="1" dur="indefinite" restart="never" nodeType="tmRoot"/>
+      </p:par>
+    </p:tnLst>
+  </p:timing>
 </p:sld>
 </file>
 
@@ -3552,7 +4905,7 @@
           <a:p>
             <a:r>
               <a:rPr lang="de-DE" dirty="0"/>
-              <a:t>Diskussion</a:t>
+              <a:t>Ergebnisse</a:t>
             </a:r>
           </a:p>
         </p:txBody>
@@ -3574,58 +4927,84 @@
           <a:p>
             <a:r>
               <a:rPr lang="de-DE" dirty="0"/>
-              <a:t>Art und Weise des Aufwachens beeinträchtigt die anschließende Aufgabenbewältigung nicht signifikant</a:t>
+              <a:t>Demografisch (Alter, Erfahrung, Geschlecht)</a:t>
             </a:r>
           </a:p>
           <a:p>
             <a:r>
               <a:rPr lang="de-DE" dirty="0"/>
-              <a:t>Demografie</a:t>
+              <a:t>Umgebungsvariablen (Stuhleinstellungen)</a:t>
             </a:r>
           </a:p>
           <a:p>
             <a:r>
               <a:rPr lang="de-DE" dirty="0"/>
-              <a:t>Studiendurchführung und Umgebung</a:t>
-            </a:r>
-          </a:p>
-          <a:p>
+              <a:t>Dauer des </a:t>
+            </a:r>
+            <a:r>
+              <a:rPr lang="de-DE" dirty="0" err="1"/>
+              <a:t>Wecktons</a:t>
+            </a:r>
             <a:r>
               <a:rPr lang="de-DE" dirty="0"/>
-              <a:t>Aufgaben gut gewählt, warum diese Ergebnisse?</a:t>
+              <a:t> zum Abstellen</a:t>
+            </a:r>
+          </a:p>
+          <a:p>
+            <a:r>
+              <a:rPr lang="de-DE" dirty="0"/>
+              <a:t>Aufgabenergebnisse (Fehlerraten, Zeiten in Gruppen)</a:t>
+            </a:r>
+          </a:p>
+          <a:p>
+            <a:r>
+              <a:rPr lang="de-DE" dirty="0"/>
+              <a:t>Fragebögen (Sam, RSME)</a:t>
+            </a:r>
+          </a:p>
+          <a:p>
+            <a:r>
+              <a:rPr lang="de-DE" dirty="0"/>
+              <a:t>Schlafstatus</a:t>
             </a:r>
           </a:p>
           <a:p>
             <a:r>
               <a:rPr lang="de-DE" dirty="0" err="1"/>
-              <a:t>Implentierung</a:t>
+              <a:t>Limesurvey</a:t>
             </a:r>
             <a:r>
               <a:rPr lang="de-DE" dirty="0"/>
-              <a:t> gut gemacht? </a:t>
-            </a:r>
-          </a:p>
-          <a:p>
+              <a:t> (Müdigkeit vorher/</a:t>
+            </a:r>
+            <a:r>
+              <a:rPr lang="de-DE" dirty="0" err="1"/>
+              <a:t>nachehr</a:t>
+            </a:r>
             <a:r>
               <a:rPr lang="de-DE" dirty="0"/>
-              <a:t>Zukunftsaussicht</a:t>
-            </a:r>
-          </a:p>
-          <a:p>
-            <a:endParaRPr lang="de-DE" dirty="0"/>
+              <a:t>, Aufgabenschwierigkeit, Komfort mit VR Brille, ..)</a:t>
+            </a:r>
           </a:p>
         </p:txBody>
       </p:sp>
     </p:spTree>
     <p:extLst>
       <p:ext uri="{BB962C8B-B14F-4D97-AF65-F5344CB8AC3E}">
-        <p14:creationId xmlns:p14="http://schemas.microsoft.com/office/powerpoint/2010/main" val="1692567459"/>
+        <p14:creationId xmlns:p14="http://schemas.microsoft.com/office/powerpoint/2010/main" val="2021924618"/>
       </p:ext>
     </p:extLst>
   </p:cSld>
   <p:clrMapOvr>
     <a:masterClrMapping/>
   </p:clrMapOvr>
+  <p:timing>
+    <p:tnLst>
+      <p:par>
+        <p:cTn id="1" dur="indefinite" restart="never" nodeType="tmRoot"/>
+      </p:par>
+    </p:tnLst>
+  </p:timing>
 </p:sld>
 </file>
 
@@ -3663,6 +5042,411 @@
           <a:p>
             <a:r>
               <a:rPr lang="de-DE" dirty="0"/>
+              <a:t>Diskussion</a:t>
+            </a:r>
+          </a:p>
+        </p:txBody>
+      </p:sp>
+      <p:sp>
+        <p:nvSpPr>
+          <p:cNvPr id="3" name="Inhaltsplatzhalter 2"/>
+          <p:cNvSpPr>
+            <a:spLocks noGrp="1"/>
+          </p:cNvSpPr>
+          <p:nvPr>
+            <p:ph idx="1"/>
+          </p:nvPr>
+        </p:nvSpPr>
+        <p:spPr/>
+        <p:txBody>
+          <a:bodyPr/>
+          <a:lstStyle/>
+          <a:p>
+            <a:r>
+              <a:rPr lang="de-DE" dirty="0" smtClean="0"/>
+              <a:t>Erfahrung und Demografie der Teilnehmer</a:t>
+            </a:r>
+          </a:p>
+          <a:p>
+            <a:pPr lvl="1"/>
+            <a:r>
+              <a:rPr lang="de-DE" dirty="0" smtClean="0"/>
+              <a:t>Vorhandene Affinität zur Technik</a:t>
+            </a:r>
+          </a:p>
+          <a:p>
+            <a:pPr lvl="1"/>
+            <a:r>
+              <a:rPr lang="de-DE" dirty="0" smtClean="0"/>
+              <a:t>Vorhandene VR Erfahrung</a:t>
+            </a:r>
+          </a:p>
+          <a:p>
+            <a:pPr lvl="1"/>
+            <a:r>
+              <a:rPr lang="de-DE" dirty="0" smtClean="0"/>
+              <a:t>Vorhandene Fahrerfahrung</a:t>
+            </a:r>
+            <a:endParaRPr lang="de-DE" dirty="0"/>
+          </a:p>
+        </p:txBody>
+      </p:sp>
+    </p:spTree>
+    <p:extLst>
+      <p:ext uri="{BB962C8B-B14F-4D97-AF65-F5344CB8AC3E}">
+        <p14:creationId xmlns:p14="http://schemas.microsoft.com/office/powerpoint/2010/main" val="3554098313"/>
+      </p:ext>
+    </p:extLst>
+  </p:cSld>
+  <p:clrMapOvr>
+    <a:masterClrMapping/>
+  </p:clrMapOvr>
+  <p:timing>
+    <p:tnLst>
+      <p:par>
+        <p:cTn id="1" dur="indefinite" restart="never" nodeType="tmRoot"/>
+      </p:par>
+    </p:tnLst>
+  </p:timing>
+</p:sld>
+</file>
+
+<file path=ppt/slides/slide16.xml><?xml version="1.0" encoding="utf-8"?>
+<p:sld xmlns:a="http://schemas.openxmlformats.org/drawingml/2006/main" xmlns:r="http://schemas.openxmlformats.org/officeDocument/2006/relationships" xmlns:p="http://schemas.openxmlformats.org/presentationml/2006/main">
+  <p:cSld>
+    <p:spTree>
+      <p:nvGrpSpPr>
+        <p:cNvPr id="1" name=""/>
+        <p:cNvGrpSpPr/>
+        <p:nvPr/>
+      </p:nvGrpSpPr>
+      <p:grpSpPr>
+        <a:xfrm>
+          <a:off x="0" y="0"/>
+          <a:ext cx="0" cy="0"/>
+          <a:chOff x="0" y="0"/>
+          <a:chExt cx="0" cy="0"/>
+        </a:xfrm>
+      </p:grpSpPr>
+      <p:sp>
+        <p:nvSpPr>
+          <p:cNvPr id="2" name="Titel 1"/>
+          <p:cNvSpPr>
+            <a:spLocks noGrp="1"/>
+          </p:cNvSpPr>
+          <p:nvPr>
+            <p:ph type="title"/>
+          </p:nvPr>
+        </p:nvSpPr>
+        <p:spPr/>
+        <p:txBody>
+          <a:bodyPr/>
+          <a:lstStyle/>
+          <a:p>
+            <a:r>
+              <a:rPr lang="de-DE" dirty="0"/>
+              <a:t>Diskussion</a:t>
+            </a:r>
+          </a:p>
+        </p:txBody>
+      </p:sp>
+      <p:sp>
+        <p:nvSpPr>
+          <p:cNvPr id="3" name="Inhaltsplatzhalter 2"/>
+          <p:cNvSpPr>
+            <a:spLocks noGrp="1"/>
+          </p:cNvSpPr>
+          <p:nvPr>
+            <p:ph idx="1"/>
+          </p:nvPr>
+        </p:nvSpPr>
+        <p:spPr/>
+        <p:txBody>
+          <a:bodyPr/>
+          <a:lstStyle/>
+          <a:p>
+            <a:r>
+              <a:rPr lang="de-DE" dirty="0" smtClean="0"/>
+              <a:t>Studiendurchführung</a:t>
+            </a:r>
+          </a:p>
+          <a:p>
+            <a:pPr lvl="1"/>
+            <a:r>
+              <a:rPr lang="de-DE" dirty="0" smtClean="0"/>
+              <a:t>Ort und Zeit</a:t>
+            </a:r>
+          </a:p>
+          <a:p>
+            <a:pPr lvl="1"/>
+            <a:r>
+              <a:rPr lang="de-DE" dirty="0" smtClean="0"/>
+              <a:t>‚Störende‘ Faktoren</a:t>
+            </a:r>
+          </a:p>
+          <a:p>
+            <a:pPr lvl="1"/>
+            <a:r>
+              <a:rPr lang="de-DE" dirty="0" smtClean="0"/>
+              <a:t>Realitätsnähe</a:t>
+            </a:r>
+            <a:endParaRPr lang="de-DE" dirty="0"/>
+          </a:p>
+        </p:txBody>
+      </p:sp>
+    </p:spTree>
+    <p:extLst>
+      <p:ext uri="{BB962C8B-B14F-4D97-AF65-F5344CB8AC3E}">
+        <p14:creationId xmlns:p14="http://schemas.microsoft.com/office/powerpoint/2010/main" val="1683365169"/>
+      </p:ext>
+    </p:extLst>
+  </p:cSld>
+  <p:clrMapOvr>
+    <a:masterClrMapping/>
+  </p:clrMapOvr>
+  <p:timing>
+    <p:tnLst>
+      <p:par>
+        <p:cTn id="1" dur="indefinite" restart="never" nodeType="tmRoot"/>
+      </p:par>
+    </p:tnLst>
+  </p:timing>
+</p:sld>
+</file>
+
+<file path=ppt/slides/slide17.xml><?xml version="1.0" encoding="utf-8"?>
+<p:sld xmlns:a="http://schemas.openxmlformats.org/drawingml/2006/main" xmlns:r="http://schemas.openxmlformats.org/officeDocument/2006/relationships" xmlns:p="http://schemas.openxmlformats.org/presentationml/2006/main">
+  <p:cSld>
+    <p:spTree>
+      <p:nvGrpSpPr>
+        <p:cNvPr id="1" name=""/>
+        <p:cNvGrpSpPr/>
+        <p:nvPr/>
+      </p:nvGrpSpPr>
+      <p:grpSpPr>
+        <a:xfrm>
+          <a:off x="0" y="0"/>
+          <a:ext cx="0" cy="0"/>
+          <a:chOff x="0" y="0"/>
+          <a:chExt cx="0" cy="0"/>
+        </a:xfrm>
+      </p:grpSpPr>
+      <p:sp>
+        <p:nvSpPr>
+          <p:cNvPr id="2" name="Titel 1"/>
+          <p:cNvSpPr>
+            <a:spLocks noGrp="1"/>
+          </p:cNvSpPr>
+          <p:nvPr>
+            <p:ph type="title"/>
+          </p:nvPr>
+        </p:nvSpPr>
+        <p:spPr/>
+        <p:txBody>
+          <a:bodyPr/>
+          <a:lstStyle/>
+          <a:p>
+            <a:r>
+              <a:rPr lang="de-DE" dirty="0"/>
+              <a:t>Diskussion</a:t>
+            </a:r>
+          </a:p>
+        </p:txBody>
+      </p:sp>
+      <p:sp>
+        <p:nvSpPr>
+          <p:cNvPr id="3" name="Inhaltsplatzhalter 2"/>
+          <p:cNvSpPr>
+            <a:spLocks noGrp="1"/>
+          </p:cNvSpPr>
+          <p:nvPr>
+            <p:ph idx="1"/>
+          </p:nvPr>
+        </p:nvSpPr>
+        <p:spPr/>
+        <p:txBody>
+          <a:bodyPr/>
+          <a:lstStyle/>
+          <a:p>
+            <a:r>
+              <a:rPr lang="de-DE" dirty="0" smtClean="0"/>
+              <a:t>Aufgaben</a:t>
+            </a:r>
+          </a:p>
+          <a:p>
+            <a:pPr lvl="1"/>
+            <a:r>
+              <a:rPr lang="de-DE" dirty="0" smtClean="0"/>
+              <a:t>Aufgabenwahl</a:t>
+            </a:r>
+          </a:p>
+          <a:p>
+            <a:pPr lvl="1"/>
+            <a:r>
+              <a:rPr lang="de-DE" dirty="0" smtClean="0"/>
+              <a:t>Aufgabenbeschreibung</a:t>
+            </a:r>
+            <a:endParaRPr lang="de-DE" dirty="0"/>
+          </a:p>
+        </p:txBody>
+      </p:sp>
+    </p:spTree>
+    <p:extLst>
+      <p:ext uri="{BB962C8B-B14F-4D97-AF65-F5344CB8AC3E}">
+        <p14:creationId xmlns:p14="http://schemas.microsoft.com/office/powerpoint/2010/main" val="2513655209"/>
+      </p:ext>
+    </p:extLst>
+  </p:cSld>
+  <p:clrMapOvr>
+    <a:masterClrMapping/>
+  </p:clrMapOvr>
+  <p:timing>
+    <p:tnLst>
+      <p:par>
+        <p:cTn id="1" dur="indefinite" restart="never" nodeType="tmRoot"/>
+      </p:par>
+    </p:tnLst>
+  </p:timing>
+</p:sld>
+</file>
+
+<file path=ppt/slides/slide18.xml><?xml version="1.0" encoding="utf-8"?>
+<p:sld xmlns:a="http://schemas.openxmlformats.org/drawingml/2006/main" xmlns:r="http://schemas.openxmlformats.org/officeDocument/2006/relationships" xmlns:p="http://schemas.openxmlformats.org/presentationml/2006/main">
+  <p:cSld>
+    <p:spTree>
+      <p:nvGrpSpPr>
+        <p:cNvPr id="1" name=""/>
+        <p:cNvGrpSpPr/>
+        <p:nvPr/>
+      </p:nvGrpSpPr>
+      <p:grpSpPr>
+        <a:xfrm>
+          <a:off x="0" y="0"/>
+          <a:ext cx="0" cy="0"/>
+          <a:chOff x="0" y="0"/>
+          <a:chExt cx="0" cy="0"/>
+        </a:xfrm>
+      </p:grpSpPr>
+      <p:sp>
+        <p:nvSpPr>
+          <p:cNvPr id="2" name="Titel 1"/>
+          <p:cNvSpPr>
+            <a:spLocks noGrp="1"/>
+          </p:cNvSpPr>
+          <p:nvPr>
+            <p:ph type="title"/>
+          </p:nvPr>
+        </p:nvSpPr>
+        <p:spPr/>
+        <p:txBody>
+          <a:bodyPr/>
+          <a:lstStyle/>
+          <a:p>
+            <a:r>
+              <a:rPr lang="de-DE" dirty="0"/>
+              <a:t>Diskussion</a:t>
+            </a:r>
+          </a:p>
+        </p:txBody>
+      </p:sp>
+      <p:sp>
+        <p:nvSpPr>
+          <p:cNvPr id="3" name="Inhaltsplatzhalter 2"/>
+          <p:cNvSpPr>
+            <a:spLocks noGrp="1"/>
+          </p:cNvSpPr>
+          <p:nvPr>
+            <p:ph idx="1"/>
+          </p:nvPr>
+        </p:nvSpPr>
+        <p:spPr/>
+        <p:txBody>
+          <a:bodyPr/>
+          <a:lstStyle/>
+          <a:p>
+            <a:r>
+              <a:rPr lang="de-DE" dirty="0" smtClean="0"/>
+              <a:t>Zukunftsaussicht</a:t>
+            </a:r>
+          </a:p>
+          <a:p>
+            <a:pPr lvl="1"/>
+            <a:r>
+              <a:rPr lang="de-DE" dirty="0" smtClean="0"/>
+              <a:t>Demografie</a:t>
+            </a:r>
+          </a:p>
+          <a:p>
+            <a:pPr lvl="1"/>
+            <a:r>
+              <a:rPr lang="de-DE" dirty="0" smtClean="0"/>
+              <a:t>Studiendurchführung</a:t>
+            </a:r>
+          </a:p>
+          <a:p>
+            <a:pPr lvl="1"/>
+            <a:r>
+              <a:rPr lang="de-DE" dirty="0" smtClean="0"/>
+              <a:t>Aufgabenwahl</a:t>
+            </a:r>
+            <a:endParaRPr lang="de-DE" dirty="0"/>
+          </a:p>
+        </p:txBody>
+      </p:sp>
+    </p:spTree>
+    <p:extLst>
+      <p:ext uri="{BB962C8B-B14F-4D97-AF65-F5344CB8AC3E}">
+        <p14:creationId xmlns:p14="http://schemas.microsoft.com/office/powerpoint/2010/main" val="397659059"/>
+      </p:ext>
+    </p:extLst>
+  </p:cSld>
+  <p:clrMapOvr>
+    <a:masterClrMapping/>
+  </p:clrMapOvr>
+  <p:timing>
+    <p:tnLst>
+      <p:par>
+        <p:cTn id="1" dur="indefinite" restart="never" nodeType="tmRoot"/>
+      </p:par>
+    </p:tnLst>
+  </p:timing>
+</p:sld>
+</file>
+
+<file path=ppt/slides/slide19.xml><?xml version="1.0" encoding="utf-8"?>
+<p:sld xmlns:a="http://schemas.openxmlformats.org/drawingml/2006/main" xmlns:r="http://schemas.openxmlformats.org/officeDocument/2006/relationships" xmlns:p="http://schemas.openxmlformats.org/presentationml/2006/main">
+  <p:cSld>
+    <p:spTree>
+      <p:nvGrpSpPr>
+        <p:cNvPr id="1" name=""/>
+        <p:cNvGrpSpPr/>
+        <p:nvPr/>
+      </p:nvGrpSpPr>
+      <p:grpSpPr>
+        <a:xfrm>
+          <a:off x="0" y="0"/>
+          <a:ext cx="0" cy="0"/>
+          <a:chOff x="0" y="0"/>
+          <a:chExt cx="0" cy="0"/>
+        </a:xfrm>
+      </p:grpSpPr>
+      <p:sp>
+        <p:nvSpPr>
+          <p:cNvPr id="2" name="Titel 1"/>
+          <p:cNvSpPr>
+            <a:spLocks noGrp="1"/>
+          </p:cNvSpPr>
+          <p:nvPr>
+            <p:ph type="title"/>
+          </p:nvPr>
+        </p:nvSpPr>
+        <p:spPr/>
+        <p:txBody>
+          <a:bodyPr/>
+          <a:lstStyle/>
+          <a:p>
+            <a:r>
+              <a:rPr lang="de-DE" dirty="0"/>
               <a:t>Schlussfolgerung</a:t>
             </a:r>
           </a:p>
@@ -3722,6 +5506,13 @@
   <p:clrMapOvr>
     <a:masterClrMapping/>
   </p:clrMapOvr>
+  <p:timing>
+    <p:tnLst>
+      <p:par>
+        <p:cTn id="1" dur="indefinite" restart="never" nodeType="tmRoot"/>
+      </p:par>
+    </p:tnLst>
+  </p:timing>
 </p:sld>
 </file>
 
@@ -3837,6 +5628,13 @@
   <p:clrMapOvr>
     <a:masterClrMapping/>
   </p:clrMapOvr>
+  <p:timing>
+    <p:tnLst>
+      <p:par>
+        <p:cTn id="1" dur="indefinite" restart="never" nodeType="tmRoot"/>
+      </p:par>
+    </p:tnLst>
+  </p:timing>
 </p:sld>
 </file>
 
@@ -3938,6 +5736,13 @@
   <p:clrMapOvr>
     <a:masterClrMapping/>
   </p:clrMapOvr>
+  <p:timing>
+    <p:tnLst>
+      <p:par>
+        <p:cTn id="1" dur="indefinite" restart="never" nodeType="tmRoot"/>
+      </p:par>
+    </p:tnLst>
+  </p:timing>
 </p:sld>
 </file>
 
@@ -4123,6 +5928,13 @@
   <p:clrMapOvr>
     <a:masterClrMapping/>
   </p:clrMapOvr>
+  <p:timing>
+    <p:tnLst>
+      <p:par>
+        <p:cTn id="1" dur="indefinite" restart="never" nodeType="tmRoot"/>
+      </p:par>
+    </p:tnLst>
+  </p:timing>
 </p:sld>
 </file>
 
@@ -4247,6 +6059,13 @@
   <p:clrMapOvr>
     <a:masterClrMapping/>
   </p:clrMapOvr>
+  <p:timing>
+    <p:tnLst>
+      <p:par>
+        <p:cTn id="1" dur="indefinite" restart="never" nodeType="tmRoot"/>
+      </p:par>
+    </p:tnLst>
+  </p:timing>
 </p:sld>
 </file>
 
@@ -4333,6 +6152,13 @@
   <p:clrMapOvr>
     <a:masterClrMapping/>
   </p:clrMapOvr>
+  <p:timing>
+    <p:tnLst>
+      <p:par>
+        <p:cTn id="1" dur="indefinite" restart="never" nodeType="tmRoot"/>
+      </p:par>
+    </p:tnLst>
+  </p:timing>
 </p:sld>
 </file>
 
@@ -4446,6 +6272,13 @@
   <p:clrMapOvr>
     <a:masterClrMapping/>
   </p:clrMapOvr>
+  <p:timing>
+    <p:tnLst>
+      <p:par>
+        <p:cTn id="1" dur="indefinite" restart="never" nodeType="tmRoot"/>
+      </p:par>
+    </p:tnLst>
+  </p:timing>
 </p:sld>
 </file>
 
@@ -5552,6 +7385,13 @@
   <p:clrMapOvr>
     <a:masterClrMapping/>
   </p:clrMapOvr>
+  <p:timing>
+    <p:tnLst>
+      <p:par>
+        <p:cTn id="1" dur="indefinite" restart="never" nodeType="tmRoot"/>
+      </p:par>
+    </p:tnLst>
+  </p:timing>
 </p:sld>
 </file>
 
@@ -5814,4 +7654,265 @@
     </a:ext>
   </a:extLst>
 </a:theme>
+</file>
+
+<file path=ppt/theme/theme2.xml><?xml version="1.0" encoding="utf-8"?>
+<a:theme xmlns:a="http://schemas.openxmlformats.org/drawingml/2006/main" name="Office">
+  <a:themeElements>
+    <a:clrScheme name="Office">
+      <a:dk1>
+        <a:sysClr val="windowText" lastClr="000000"/>
+      </a:dk1>
+      <a:lt1>
+        <a:sysClr val="window" lastClr="FFFFFF"/>
+      </a:lt1>
+      <a:dk2>
+        <a:srgbClr val="44546A"/>
+      </a:dk2>
+      <a:lt2>
+        <a:srgbClr val="E7E6E6"/>
+      </a:lt2>
+      <a:accent1>
+        <a:srgbClr val="5B9BD5"/>
+      </a:accent1>
+      <a:accent2>
+        <a:srgbClr val="ED7D31"/>
+      </a:accent2>
+      <a:accent3>
+        <a:srgbClr val="A5A5A5"/>
+      </a:accent3>
+      <a:accent4>
+        <a:srgbClr val="FFC000"/>
+      </a:accent4>
+      <a:accent5>
+        <a:srgbClr val="4472C4"/>
+      </a:accent5>
+      <a:accent6>
+        <a:srgbClr val="70AD47"/>
+      </a:accent6>
+      <a:hlink>
+        <a:srgbClr val="0563C1"/>
+      </a:hlink>
+      <a:folHlink>
+        <a:srgbClr val="954F72"/>
+      </a:folHlink>
+    </a:clrScheme>
+    <a:fontScheme name="Office">
+      <a:majorFont>
+        <a:latin typeface="Calibri Light" panose="020F0302020204030204"/>
+        <a:ea typeface=""/>
+        <a:cs typeface=""/>
+        <a:font script="Jpan" typeface="游ゴシック Light"/>
+        <a:font script="Hang" typeface="맑은 고딕"/>
+        <a:font script="Hans" typeface="等线 Light"/>
+        <a:font script="Hant" typeface="新細明體"/>
+        <a:font script="Arab" typeface="Times New Roman"/>
+        <a:font script="Hebr" typeface="Times New Roman"/>
+        <a:font script="Thai" typeface="Angsana New"/>
+        <a:font script="Ethi" typeface="Nyala"/>
+        <a:font script="Beng" typeface="Vrinda"/>
+        <a:font script="Gujr" typeface="Shruti"/>
+        <a:font script="Khmr" typeface="MoolBoran"/>
+        <a:font script="Knda" typeface="Tunga"/>
+        <a:font script="Guru" typeface="Raavi"/>
+        <a:font script="Cans" typeface="Euphemia"/>
+        <a:font script="Cher" typeface="Plantagenet Cherokee"/>
+        <a:font script="Yiii" typeface="Microsoft Yi Baiti"/>
+        <a:font script="Tibt" typeface="Microsoft Himalaya"/>
+        <a:font script="Thaa" typeface="MV Boli"/>
+        <a:font script="Deva" typeface="Mangal"/>
+        <a:font script="Telu" typeface="Gautami"/>
+        <a:font script="Taml" typeface="Latha"/>
+        <a:font script="Syrc" typeface="Estrangelo Edessa"/>
+        <a:font script="Orya" typeface="Kalinga"/>
+        <a:font script="Mlym" typeface="Kartika"/>
+        <a:font script="Laoo" typeface="DokChampa"/>
+        <a:font script="Sinh" typeface="Iskoola Pota"/>
+        <a:font script="Mong" typeface="Mongolian Baiti"/>
+        <a:font script="Viet" typeface="Times New Roman"/>
+        <a:font script="Uigh" typeface="Microsoft Uighur"/>
+        <a:font script="Geor" typeface="Sylfaen"/>
+      </a:majorFont>
+      <a:minorFont>
+        <a:latin typeface="Calibri" panose="020F0502020204030204"/>
+        <a:ea typeface=""/>
+        <a:cs typeface=""/>
+        <a:font script="Jpan" typeface="游ゴシック"/>
+        <a:font script="Hang" typeface="맑은 고딕"/>
+        <a:font script="Hans" typeface="等线"/>
+        <a:font script="Hant" typeface="新細明體"/>
+        <a:font script="Arab" typeface="Arial"/>
+        <a:font script="Hebr" typeface="Arial"/>
+        <a:font script="Thai" typeface="Cordia New"/>
+        <a:font script="Ethi" typeface="Nyala"/>
+        <a:font script="Beng" typeface="Vrinda"/>
+        <a:font script="Gujr" typeface="Shruti"/>
+        <a:font script="Khmr" typeface="DaunPenh"/>
+        <a:font script="Knda" typeface="Tunga"/>
+        <a:font script="Guru" typeface="Raavi"/>
+        <a:font script="Cans" typeface="Euphemia"/>
+        <a:font script="Cher" typeface="Plantagenet Cherokee"/>
+        <a:font script="Yiii" typeface="Microsoft Yi Baiti"/>
+        <a:font script="Tibt" typeface="Microsoft Himalaya"/>
+        <a:font script="Thaa" typeface="MV Boli"/>
+        <a:font script="Deva" typeface="Mangal"/>
+        <a:font script="Telu" typeface="Gautami"/>
+        <a:font script="Taml" typeface="Latha"/>
+        <a:font script="Syrc" typeface="Estrangelo Edessa"/>
+        <a:font script="Orya" typeface="Kalinga"/>
+        <a:font script="Mlym" typeface="Kartika"/>
+        <a:font script="Laoo" typeface="DokChampa"/>
+        <a:font script="Sinh" typeface="Iskoola Pota"/>
+        <a:font script="Mong" typeface="Mongolian Baiti"/>
+        <a:font script="Viet" typeface="Arial"/>
+        <a:font script="Uigh" typeface="Microsoft Uighur"/>
+        <a:font script="Geor" typeface="Sylfaen"/>
+      </a:minorFont>
+    </a:fontScheme>
+    <a:fmtScheme name="Office">
+      <a:fillStyleLst>
+        <a:solidFill>
+          <a:schemeClr val="phClr"/>
+        </a:solidFill>
+        <a:gradFill rotWithShape="1">
+          <a:gsLst>
+            <a:gs pos="0">
+              <a:schemeClr val="phClr">
+                <a:lumMod val="110000"/>
+                <a:satMod val="105000"/>
+                <a:tint val="67000"/>
+              </a:schemeClr>
+            </a:gs>
+            <a:gs pos="50000">
+              <a:schemeClr val="phClr">
+                <a:lumMod val="105000"/>
+                <a:satMod val="103000"/>
+                <a:tint val="73000"/>
+              </a:schemeClr>
+            </a:gs>
+            <a:gs pos="100000">
+              <a:schemeClr val="phClr">
+                <a:lumMod val="105000"/>
+                <a:satMod val="109000"/>
+                <a:tint val="81000"/>
+              </a:schemeClr>
+            </a:gs>
+          </a:gsLst>
+          <a:lin ang="5400000" scaled="0"/>
+        </a:gradFill>
+        <a:gradFill rotWithShape="1">
+          <a:gsLst>
+            <a:gs pos="0">
+              <a:schemeClr val="phClr">
+                <a:satMod val="103000"/>
+                <a:lumMod val="102000"/>
+                <a:tint val="94000"/>
+              </a:schemeClr>
+            </a:gs>
+            <a:gs pos="50000">
+              <a:schemeClr val="phClr">
+                <a:satMod val="110000"/>
+                <a:lumMod val="100000"/>
+                <a:shade val="100000"/>
+              </a:schemeClr>
+            </a:gs>
+            <a:gs pos="100000">
+              <a:schemeClr val="phClr">
+                <a:lumMod val="99000"/>
+                <a:satMod val="120000"/>
+                <a:shade val="78000"/>
+              </a:schemeClr>
+            </a:gs>
+          </a:gsLst>
+          <a:lin ang="5400000" scaled="0"/>
+        </a:gradFill>
+      </a:fillStyleLst>
+      <a:lnStyleLst>
+        <a:ln w="6350" cap="flat" cmpd="sng" algn="ctr">
+          <a:solidFill>
+            <a:schemeClr val="phClr"/>
+          </a:solidFill>
+          <a:prstDash val="solid"/>
+          <a:miter lim="800000"/>
+        </a:ln>
+        <a:ln w="12700" cap="flat" cmpd="sng" algn="ctr">
+          <a:solidFill>
+            <a:schemeClr val="phClr"/>
+          </a:solidFill>
+          <a:prstDash val="solid"/>
+          <a:miter lim="800000"/>
+        </a:ln>
+        <a:ln w="19050" cap="flat" cmpd="sng" algn="ctr">
+          <a:solidFill>
+            <a:schemeClr val="phClr"/>
+          </a:solidFill>
+          <a:prstDash val="solid"/>
+          <a:miter lim="800000"/>
+        </a:ln>
+      </a:lnStyleLst>
+      <a:effectStyleLst>
+        <a:effectStyle>
+          <a:effectLst/>
+        </a:effectStyle>
+        <a:effectStyle>
+          <a:effectLst/>
+        </a:effectStyle>
+        <a:effectStyle>
+          <a:effectLst>
+            <a:outerShdw blurRad="57150" dist="19050" dir="5400000" algn="ctr" rotWithShape="0">
+              <a:srgbClr val="000000">
+                <a:alpha val="63000"/>
+              </a:srgbClr>
+            </a:outerShdw>
+          </a:effectLst>
+        </a:effectStyle>
+      </a:effectStyleLst>
+      <a:bgFillStyleLst>
+        <a:solidFill>
+          <a:schemeClr val="phClr"/>
+        </a:solidFill>
+        <a:solidFill>
+          <a:schemeClr val="phClr">
+            <a:tint val="95000"/>
+            <a:satMod val="170000"/>
+          </a:schemeClr>
+        </a:solidFill>
+        <a:gradFill rotWithShape="1">
+          <a:gsLst>
+            <a:gs pos="0">
+              <a:schemeClr val="phClr">
+                <a:tint val="93000"/>
+                <a:satMod val="150000"/>
+                <a:shade val="98000"/>
+                <a:lumMod val="102000"/>
+              </a:schemeClr>
+            </a:gs>
+            <a:gs pos="50000">
+              <a:schemeClr val="phClr">
+                <a:tint val="98000"/>
+                <a:satMod val="130000"/>
+                <a:shade val="90000"/>
+                <a:lumMod val="103000"/>
+              </a:schemeClr>
+            </a:gs>
+            <a:gs pos="100000">
+              <a:schemeClr val="phClr">
+                <a:shade val="63000"/>
+                <a:satMod val="120000"/>
+              </a:schemeClr>
+            </a:gs>
+          </a:gsLst>
+          <a:lin ang="5400000" scaled="0"/>
+        </a:gradFill>
+      </a:bgFillStyleLst>
+    </a:fmtScheme>
+  </a:themeElements>
+  <a:objectDefaults/>
+  <a:extraClrSchemeLst/>
+  <a:extLst>
+    <a:ext uri="{05A4C25C-085E-4340-85A3-A5531E510DB2}">
+      <thm15:themeFamily xmlns:thm15="http://schemas.microsoft.com/office/thememl/2012/main" name="Office Theme" id="{62F939B6-93AF-4DB8-9C6B-D6C7DFDC589F}" vid="{4A3C46E8-61CC-4603-A589-7422A47A8E4A}"/>
+    </a:ext>
+  </a:extLst>
+</a:theme>
 </file>
</xml_diff>

<commit_message>
Fix SAM results visualization
</commit_message>
<xml_diff>
--- a/presentation/Resync Studie.pptx
+++ b/presentation/Resync Studie.pptx
@@ -548,6 +548,11 @@
             <a:solidFill>
               <a:srgbClr val="FC8D59"/>
             </a:solidFill>
+            <a:ln>
+              <a:solidFill>
+                <a:srgbClr val="FC8D59"/>
+              </a:solidFill>
+            </a:ln>
           </cx:spPr>
           <cx:dataId val="0"/>
           <cx:layoutPr>
@@ -622,140 +627,133 @@
     <cx:externalData r:id="rId1" cx:autoUpdate="0"/>
     <cx:data id="0">
       <cx:strDim type="cat">
-        <cx:f>Tabelle1!$A$2:$A$46</cx:f>
-        <cx:lvl ptCount="45">
-          <cx:pt idx="0">20</cx:pt>
-          <cx:pt idx="1">20</cx:pt>
-          <cx:pt idx="2">20</cx:pt>
-          <cx:pt idx="3">20</cx:pt>
-          <cx:pt idx="4">5</cx:pt>
-          <cx:pt idx="5">5</cx:pt>
-          <cx:pt idx="6">5</cx:pt>
-          <cx:pt idx="7">20</cx:pt>
-          <cx:pt idx="8">20</cx:pt>
-          <cx:pt idx="9">5</cx:pt>
-          <cx:pt idx="10">20</cx:pt>
-          <cx:pt idx="11">5</cx:pt>
-          <cx:pt idx="12">20</cx:pt>
-          <cx:pt idx="13">5</cx:pt>
-          <cx:pt idx="14">5</cx:pt>
-          <cx:pt idx="15">20</cx:pt>
-          <cx:pt idx="16">5</cx:pt>
-          <cx:pt idx="17">5</cx:pt>
-          <cx:pt idx="18">20</cx:pt>
-          <cx:pt idx="19">5</cx:pt>
-          <cx:pt idx="20">20</cx:pt>
-          <cx:pt idx="21">5</cx:pt>
-          <cx:pt idx="22">5</cx:pt>
-          <cx:pt idx="23">20</cx:pt>
-          <cx:pt idx="24">5</cx:pt>
-          <cx:pt idx="25">5</cx:pt>
-          <cx:pt idx="26">20</cx:pt>
-          <cx:pt idx="27">20</cx:pt>
-          <cx:pt idx="28">20</cx:pt>
-          <cx:pt idx="29">5</cx:pt>
-          <cx:pt idx="30">-1</cx:pt>
-          <cx:pt idx="31">-1</cx:pt>
-          <cx:pt idx="32">-1</cx:pt>
-          <cx:pt idx="33">-1</cx:pt>
-          <cx:pt idx="34">-1</cx:pt>
-          <cx:pt idx="35">-1</cx:pt>
-          <cx:pt idx="36">-1</cx:pt>
-          <cx:pt idx="37">-1</cx:pt>
-          <cx:pt idx="38">-1</cx:pt>
-          <cx:pt idx="39">-1</cx:pt>
-          <cx:pt idx="40">-1</cx:pt>
-          <cx:pt idx="41">-1</cx:pt>
-          <cx:pt idx="42">-1</cx:pt>
-          <cx:pt idx="43">-1</cx:pt>
-          <cx:pt idx="44">-1</cx:pt>
+        <cx:f>Tabelle1!$A$2:$A$91</cx:f>
+        <cx:lvl ptCount="90">
+          <cx:pt idx="0">Pleasure (pre)</cx:pt>
+          <cx:pt idx="1">Pleasure (pre)</cx:pt>
+          <cx:pt idx="2">Pleasure (pre)</cx:pt>
+          <cx:pt idx="3">Pleasure (pre)</cx:pt>
+          <cx:pt idx="4">Pleasure (pre)</cx:pt>
+          <cx:pt idx="5">Pleasure (pre)</cx:pt>
+          <cx:pt idx="6">Pleasure (pre)</cx:pt>
+          <cx:pt idx="7">Pleasure (pre)</cx:pt>
+          <cx:pt idx="8">Pleasure (pre)</cx:pt>
+          <cx:pt idx="9">Pleasure (pre)</cx:pt>
+          <cx:pt idx="10">Pleasure (pre)</cx:pt>
+          <cx:pt idx="11">Pleasure (pre)</cx:pt>
+          <cx:pt idx="12">Pleasure (pre)</cx:pt>
+          <cx:pt idx="13">Pleasure (pre)</cx:pt>
+          <cx:pt idx="14">Pleasure (pre)</cx:pt>
+          <cx:pt idx="15">Pleasure (post)</cx:pt>
+          <cx:pt idx="16">Pleasure (post)</cx:pt>
+          <cx:pt idx="17">Pleasure (post)</cx:pt>
+          <cx:pt idx="18">Pleasure (post)</cx:pt>
+          <cx:pt idx="19">Pleasure (post)</cx:pt>
+          <cx:pt idx="20">Pleasure (post)</cx:pt>
+          <cx:pt idx="21">Pleasure (post)</cx:pt>
+          <cx:pt idx="22">Pleasure (post)</cx:pt>
+          <cx:pt idx="23">Pleasure (post)</cx:pt>
+          <cx:pt idx="24">Pleasure (post)</cx:pt>
+          <cx:pt idx="25">Pleasure (post)</cx:pt>
+          <cx:pt idx="26">Pleasure (post)</cx:pt>
+          <cx:pt idx="27">Pleasure (post)</cx:pt>
+          <cx:pt idx="28">Pleasure (post)</cx:pt>
+          <cx:pt idx="29">Pleasure (post)</cx:pt>
+          <cx:pt idx="30">Arousal (pre)</cx:pt>
+          <cx:pt idx="31">Arousal (pre)</cx:pt>
+          <cx:pt idx="32">Arousal (pre)</cx:pt>
+          <cx:pt idx="33">Arousal (pre)</cx:pt>
+          <cx:pt idx="34">Arousal (pre)</cx:pt>
+          <cx:pt idx="35">Arousal (pre)</cx:pt>
+          <cx:pt idx="36">Arousal (pre)</cx:pt>
+          <cx:pt idx="37">Arousal (pre)</cx:pt>
+          <cx:pt idx="38">Arousal (pre)</cx:pt>
+          <cx:pt idx="39">Arousal (pre)</cx:pt>
+          <cx:pt idx="40">Arousal (pre)</cx:pt>
+          <cx:pt idx="41">Arousal (pre)</cx:pt>
+          <cx:pt idx="42">Arousal (pre)</cx:pt>
+          <cx:pt idx="43">Arousal (pre)</cx:pt>
+          <cx:pt idx="44">Arousal (pre)</cx:pt>
+          <cx:pt idx="45">Arousal (post)</cx:pt>
+          <cx:pt idx="46">Arousal (post)</cx:pt>
+          <cx:pt idx="47">Arousal (post)</cx:pt>
+          <cx:pt idx="48">Arousal (post)</cx:pt>
+          <cx:pt idx="49">Arousal (post)</cx:pt>
+          <cx:pt idx="50">Arousal (post)</cx:pt>
+          <cx:pt idx="51">Arousal (post)</cx:pt>
+          <cx:pt idx="52">Arousal (post)</cx:pt>
+          <cx:pt idx="53">Arousal (post)</cx:pt>
+          <cx:pt idx="54">Arousal (post)</cx:pt>
+          <cx:pt idx="55">Arousal (post)</cx:pt>
+          <cx:pt idx="56">Arousal (post)</cx:pt>
+          <cx:pt idx="57">Arousal (post)</cx:pt>
+          <cx:pt idx="58">Arousal (post)</cx:pt>
+          <cx:pt idx="59">Arousal (post)</cx:pt>
+          <cx:pt idx="60">Dominance (pre)</cx:pt>
+          <cx:pt idx="61">Dominance (pre)</cx:pt>
+          <cx:pt idx="62">Dominance (pre)</cx:pt>
+          <cx:pt idx="63">Dominance (pre)</cx:pt>
+          <cx:pt idx="64">Dominance (pre)</cx:pt>
+          <cx:pt idx="65">Dominance (pre)</cx:pt>
+          <cx:pt idx="66">Dominance (pre)</cx:pt>
+          <cx:pt idx="67">Dominance (pre)</cx:pt>
+          <cx:pt idx="68">Dominance (pre)</cx:pt>
+          <cx:pt idx="69">Dominance (pre)</cx:pt>
+          <cx:pt idx="70">Dominance (pre)</cx:pt>
+          <cx:pt idx="71">Dominance (pre)</cx:pt>
+          <cx:pt idx="72">Dominance (pre)</cx:pt>
+          <cx:pt idx="73">Dominance (pre)</cx:pt>
+          <cx:pt idx="74">Dominance (pre)</cx:pt>
+          <cx:pt idx="75">Dominance (post)</cx:pt>
+          <cx:pt idx="76">Dominance (post)</cx:pt>
+          <cx:pt idx="77">Dominance (post)</cx:pt>
+          <cx:pt idx="78">Dominance (post)</cx:pt>
+          <cx:pt idx="79">Dominance (post)</cx:pt>
+          <cx:pt idx="80">Dominance (post)</cx:pt>
+          <cx:pt idx="81">Dominance (post)</cx:pt>
+          <cx:pt idx="82">Dominance (post)</cx:pt>
+          <cx:pt idx="83">Dominance (post)</cx:pt>
+          <cx:pt idx="84">Dominance (post)</cx:pt>
+          <cx:pt idx="85">Dominance (post)</cx:pt>
+          <cx:pt idx="86">Dominance (post)</cx:pt>
+          <cx:pt idx="87">Dominance (post)</cx:pt>
+          <cx:pt idx="88">Dominance (post)</cx:pt>
+          <cx:pt idx="89">Dominance (post)</cx:pt>
         </cx:lvl>
       </cx:strDim>
       <cx:numDim type="val">
-        <cx:f>Tabelle1!$B$2:$B$46</cx:f>
-        <cx:lvl ptCount="45" formatCode="Standard">
+        <cx:f>Tabelle1!$B$2:$B$91</cx:f>
+        <cx:lvl ptCount="90" formatCode="Standard">
           <cx:pt idx="0">4</cx:pt>
-          <cx:pt idx="1">5</cx:pt>
+          <cx:pt idx="1">4</cx:pt>
           <cx:pt idx="2">4</cx:pt>
           <cx:pt idx="3">4</cx:pt>
-          <cx:pt idx="4">5</cx:pt>
-          <cx:pt idx="5">5</cx:pt>
-          <cx:pt idx="6">3</cx:pt>
+          <cx:pt idx="4">3</cx:pt>
+          <cx:pt idx="5">3</cx:pt>
+          <cx:pt idx="6">4</cx:pt>
           <cx:pt idx="7">4</cx:pt>
           <cx:pt idx="8">4</cx:pt>
           <cx:pt idx="9">4</cx:pt>
           <cx:pt idx="10">4</cx:pt>
-          <cx:pt idx="11">4</cx:pt>
+          <cx:pt idx="11">5</cx:pt>
           <cx:pt idx="12">4</cx:pt>
-          <cx:pt idx="13">2</cx:pt>
-          <cx:pt idx="14">4</cx:pt>
+          <cx:pt idx="13">4</cx:pt>
+          <cx:pt idx="14">5</cx:pt>
           <cx:pt idx="15">4</cx:pt>
           <cx:pt idx="16">4</cx:pt>
-          <cx:pt idx="17">5</cx:pt>
+          <cx:pt idx="17">4</cx:pt>
           <cx:pt idx="18">4</cx:pt>
-          <cx:pt idx="19">4</cx:pt>
-          <cx:pt idx="20">5</cx:pt>
+          <cx:pt idx="19">2</cx:pt>
+          <cx:pt idx="20">3</cx:pt>
           <cx:pt idx="21">4</cx:pt>
-          <cx:pt idx="22">5</cx:pt>
+          <cx:pt idx="22">4</cx:pt>
           <cx:pt idx="23">4</cx:pt>
-          <cx:pt idx="24">5</cx:pt>
-          <cx:pt idx="25">5</cx:pt>
-          <cx:pt idx="26">3</cx:pt>
-          <cx:pt idx="27">5</cx:pt>
-          <cx:pt idx="28">5</cx:pt>
+          <cx:pt idx="24">4</cx:pt>
+          <cx:pt idx="25">4</cx:pt>
+          <cx:pt idx="26">5</cx:pt>
+          <cx:pt idx="27">4</cx:pt>
+          <cx:pt idx="28">4</cx:pt>
           <cx:pt idx="29">4</cx:pt>
-          <cx:pt idx="30">4</cx:pt>
-          <cx:pt idx="31">4</cx:pt>
-          <cx:pt idx="32">4</cx:pt>
-          <cx:pt idx="33">4</cx:pt>
-          <cx:pt idx="34">3</cx:pt>
-          <cx:pt idx="35">3</cx:pt>
-          <cx:pt idx="36">4</cx:pt>
-          <cx:pt idx="37">4</cx:pt>
-          <cx:pt idx="38">4</cx:pt>
-          <cx:pt idx="39">4</cx:pt>
-          <cx:pt idx="40">4</cx:pt>
-          <cx:pt idx="41">5</cx:pt>
-          <cx:pt idx="42">4</cx:pt>
-          <cx:pt idx="43">4</cx:pt>
-          <cx:pt idx="44">5</cx:pt>
-        </cx:lvl>
-      </cx:numDim>
-    </cx:data>
-    <cx:data id="1">
-      <cx:numDim type="val">
-        <cx:f>Tabelle1!$C$2:$C$46</cx:f>
-        <cx:lvl ptCount="45" formatCode="Standard">
-          <cx:pt idx="0">3</cx:pt>
-          <cx:pt idx="1">2</cx:pt>
-          <cx:pt idx="2">1</cx:pt>
-          <cx:pt idx="3">1</cx:pt>
-          <cx:pt idx="4">1</cx:pt>
-          <cx:pt idx="5">1</cx:pt>
-          <cx:pt idx="6">2</cx:pt>
-          <cx:pt idx="7">3</cx:pt>
-          <cx:pt idx="8">3</cx:pt>
-          <cx:pt idx="9">2</cx:pt>
-          <cx:pt idx="10">1</cx:pt>
-          <cx:pt idx="11">2</cx:pt>
-          <cx:pt idx="12">1</cx:pt>
-          <cx:pt idx="13">5</cx:pt>
-          <cx:pt idx="14">3</cx:pt>
-          <cx:pt idx="15">3</cx:pt>
-          <cx:pt idx="16">3</cx:pt>
-          <cx:pt idx="17">3</cx:pt>
-          <cx:pt idx="18">2</cx:pt>
-          <cx:pt idx="19">3</cx:pt>
-          <cx:pt idx="20">3</cx:pt>
-          <cx:pt idx="21">2</cx:pt>
-          <cx:pt idx="22">2</cx:pt>
-          <cx:pt idx="23">1</cx:pt>
-          <cx:pt idx="24">2</cx:pt>
-          <cx:pt idx="25">2</cx:pt>
-          <cx:pt idx="26">1</cx:pt>
-          <cx:pt idx="27">2</cx:pt>
-          <cx:pt idx="28">4</cx:pt>
-          <cx:pt idx="29">2</cx:pt>
           <cx:pt idx="30">3</cx:pt>
           <cx:pt idx="31">2</cx:pt>
           <cx:pt idx="32">1</cx:pt>
@@ -771,264 +769,435 @@
           <cx:pt idx="42">3</cx:pt>
           <cx:pt idx="43">3</cx:pt>
           <cx:pt idx="44">1</cx:pt>
+          <cx:pt idx="45">3</cx:pt>
+          <cx:pt idx="46">1</cx:pt>
+          <cx:pt idx="47">2</cx:pt>
+          <cx:pt idx="48">1</cx:pt>
+          <cx:pt idx="49">2</cx:pt>
+          <cx:pt idx="50">3</cx:pt>
+          <cx:pt idx="51">2</cx:pt>
+          <cx:pt idx="52">1</cx:pt>
+          <cx:pt idx="53">2</cx:pt>
+          <cx:pt idx="54">2</cx:pt>
+          <cx:pt idx="55">3</cx:pt>
+          <cx:pt idx="56">1</cx:pt>
+          <cx:pt idx="57">4</cx:pt>
+          <cx:pt idx="58">2</cx:pt>
+          <cx:pt idx="59">1</cx:pt>
+          <cx:pt idx="60">4</cx:pt>
+          <cx:pt idx="61">3</cx:pt>
+          <cx:pt idx="62">3</cx:pt>
+          <cx:pt idx="63">2</cx:pt>
+          <cx:pt idx="64">3</cx:pt>
+          <cx:pt idx="65">3</cx:pt>
+          <cx:pt idx="66">5</cx:pt>
+          <cx:pt idx="67">4</cx:pt>
+          <cx:pt idx="68">3</cx:pt>
+          <cx:pt idx="69">3</cx:pt>
+          <cx:pt idx="70">3</cx:pt>
+          <cx:pt idx="71">3</cx:pt>
+          <cx:pt idx="72">3</cx:pt>
+          <cx:pt idx="73">2</cx:pt>
+          <cx:pt idx="74">5</cx:pt>
+          <cx:pt idx="75">4</cx:pt>
+          <cx:pt idx="76">2</cx:pt>
+          <cx:pt idx="77">3</cx:pt>
+          <cx:pt idx="78">2</cx:pt>
+          <cx:pt idx="79">2</cx:pt>
+          <cx:pt idx="80">3</cx:pt>
+          <cx:pt idx="81">2</cx:pt>
+          <cx:pt idx="82">3</cx:pt>
+          <cx:pt idx="83">2</cx:pt>
+          <cx:pt idx="84">3</cx:pt>
+          <cx:pt idx="85">2</cx:pt>
+          <cx:pt idx="86">3</cx:pt>
+          <cx:pt idx="87">2</cx:pt>
+          <cx:pt idx="88">2</cx:pt>
+          <cx:pt idx="89">5</cx:pt>
+        </cx:lvl>
+      </cx:numDim>
+    </cx:data>
+    <cx:data id="1">
+      <cx:strDim type="cat">
+        <cx:f>Tabelle1!$A$2:$A$91</cx:f>
+        <cx:lvl ptCount="90">
+          <cx:pt idx="0">Pleasure (pre)</cx:pt>
+          <cx:pt idx="1">Pleasure (pre)</cx:pt>
+          <cx:pt idx="2">Pleasure (pre)</cx:pt>
+          <cx:pt idx="3">Pleasure (pre)</cx:pt>
+          <cx:pt idx="4">Pleasure (pre)</cx:pt>
+          <cx:pt idx="5">Pleasure (pre)</cx:pt>
+          <cx:pt idx="6">Pleasure (pre)</cx:pt>
+          <cx:pt idx="7">Pleasure (pre)</cx:pt>
+          <cx:pt idx="8">Pleasure (pre)</cx:pt>
+          <cx:pt idx="9">Pleasure (pre)</cx:pt>
+          <cx:pt idx="10">Pleasure (pre)</cx:pt>
+          <cx:pt idx="11">Pleasure (pre)</cx:pt>
+          <cx:pt idx="12">Pleasure (pre)</cx:pt>
+          <cx:pt idx="13">Pleasure (pre)</cx:pt>
+          <cx:pt idx="14">Pleasure (pre)</cx:pt>
+          <cx:pt idx="15">Pleasure (post)</cx:pt>
+          <cx:pt idx="16">Pleasure (post)</cx:pt>
+          <cx:pt idx="17">Pleasure (post)</cx:pt>
+          <cx:pt idx="18">Pleasure (post)</cx:pt>
+          <cx:pt idx="19">Pleasure (post)</cx:pt>
+          <cx:pt idx="20">Pleasure (post)</cx:pt>
+          <cx:pt idx="21">Pleasure (post)</cx:pt>
+          <cx:pt idx="22">Pleasure (post)</cx:pt>
+          <cx:pt idx="23">Pleasure (post)</cx:pt>
+          <cx:pt idx="24">Pleasure (post)</cx:pt>
+          <cx:pt idx="25">Pleasure (post)</cx:pt>
+          <cx:pt idx="26">Pleasure (post)</cx:pt>
+          <cx:pt idx="27">Pleasure (post)</cx:pt>
+          <cx:pt idx="28">Pleasure (post)</cx:pt>
+          <cx:pt idx="29">Pleasure (post)</cx:pt>
+          <cx:pt idx="30">Arousal (pre)</cx:pt>
+          <cx:pt idx="31">Arousal (pre)</cx:pt>
+          <cx:pt idx="32">Arousal (pre)</cx:pt>
+          <cx:pt idx="33">Arousal (pre)</cx:pt>
+          <cx:pt idx="34">Arousal (pre)</cx:pt>
+          <cx:pt idx="35">Arousal (pre)</cx:pt>
+          <cx:pt idx="36">Arousal (pre)</cx:pt>
+          <cx:pt idx="37">Arousal (pre)</cx:pt>
+          <cx:pt idx="38">Arousal (pre)</cx:pt>
+          <cx:pt idx="39">Arousal (pre)</cx:pt>
+          <cx:pt idx="40">Arousal (pre)</cx:pt>
+          <cx:pt idx="41">Arousal (pre)</cx:pt>
+          <cx:pt idx="42">Arousal (pre)</cx:pt>
+          <cx:pt idx="43">Arousal (pre)</cx:pt>
+          <cx:pt idx="44">Arousal (pre)</cx:pt>
+          <cx:pt idx="45">Arousal (post)</cx:pt>
+          <cx:pt idx="46">Arousal (post)</cx:pt>
+          <cx:pt idx="47">Arousal (post)</cx:pt>
+          <cx:pt idx="48">Arousal (post)</cx:pt>
+          <cx:pt idx="49">Arousal (post)</cx:pt>
+          <cx:pt idx="50">Arousal (post)</cx:pt>
+          <cx:pt idx="51">Arousal (post)</cx:pt>
+          <cx:pt idx="52">Arousal (post)</cx:pt>
+          <cx:pt idx="53">Arousal (post)</cx:pt>
+          <cx:pt idx="54">Arousal (post)</cx:pt>
+          <cx:pt idx="55">Arousal (post)</cx:pt>
+          <cx:pt idx="56">Arousal (post)</cx:pt>
+          <cx:pt idx="57">Arousal (post)</cx:pt>
+          <cx:pt idx="58">Arousal (post)</cx:pt>
+          <cx:pt idx="59">Arousal (post)</cx:pt>
+          <cx:pt idx="60">Dominance (pre)</cx:pt>
+          <cx:pt idx="61">Dominance (pre)</cx:pt>
+          <cx:pt idx="62">Dominance (pre)</cx:pt>
+          <cx:pt idx="63">Dominance (pre)</cx:pt>
+          <cx:pt idx="64">Dominance (pre)</cx:pt>
+          <cx:pt idx="65">Dominance (pre)</cx:pt>
+          <cx:pt idx="66">Dominance (pre)</cx:pt>
+          <cx:pt idx="67">Dominance (pre)</cx:pt>
+          <cx:pt idx="68">Dominance (pre)</cx:pt>
+          <cx:pt idx="69">Dominance (pre)</cx:pt>
+          <cx:pt idx="70">Dominance (pre)</cx:pt>
+          <cx:pt idx="71">Dominance (pre)</cx:pt>
+          <cx:pt idx="72">Dominance (pre)</cx:pt>
+          <cx:pt idx="73">Dominance (pre)</cx:pt>
+          <cx:pt idx="74">Dominance (pre)</cx:pt>
+          <cx:pt idx="75">Dominance (post)</cx:pt>
+          <cx:pt idx="76">Dominance (post)</cx:pt>
+          <cx:pt idx="77">Dominance (post)</cx:pt>
+          <cx:pt idx="78">Dominance (post)</cx:pt>
+          <cx:pt idx="79">Dominance (post)</cx:pt>
+          <cx:pt idx="80">Dominance (post)</cx:pt>
+          <cx:pt idx="81">Dominance (post)</cx:pt>
+          <cx:pt idx="82">Dominance (post)</cx:pt>
+          <cx:pt idx="83">Dominance (post)</cx:pt>
+          <cx:pt idx="84">Dominance (post)</cx:pt>
+          <cx:pt idx="85">Dominance (post)</cx:pt>
+          <cx:pt idx="86">Dominance (post)</cx:pt>
+          <cx:pt idx="87">Dominance (post)</cx:pt>
+          <cx:pt idx="88">Dominance (post)</cx:pt>
+          <cx:pt idx="89">Dominance (post)</cx:pt>
+        </cx:lvl>
+      </cx:strDim>
+      <cx:numDim type="val">
+        <cx:f>Tabelle1!$C$2:$C$91</cx:f>
+        <cx:lvl ptCount="90" formatCode="Standard">
+          <cx:pt idx="0">4</cx:pt>
+          <cx:pt idx="1">5</cx:pt>
+          <cx:pt idx="2">4</cx:pt>
+          <cx:pt idx="3">4</cx:pt>
+          <cx:pt idx="4">4</cx:pt>
+          <cx:pt idx="5">4</cx:pt>
+          <cx:pt idx="6">4</cx:pt>
+          <cx:pt idx="7">4</cx:pt>
+          <cx:pt idx="8">4</cx:pt>
+          <cx:pt idx="9">4</cx:pt>
+          <cx:pt idx="10">5</cx:pt>
+          <cx:pt idx="11">4</cx:pt>
+          <cx:pt idx="12">3</cx:pt>
+          <cx:pt idx="13">5</cx:pt>
+          <cx:pt idx="14">5</cx:pt>
+          <cx:pt idx="15">3</cx:pt>
+          <cx:pt idx="16">5</cx:pt>
+          <cx:pt idx="17">4</cx:pt>
+          <cx:pt idx="18">3</cx:pt>
+          <cx:pt idx="19">4</cx:pt>
+          <cx:pt idx="20">2</cx:pt>
+          <cx:pt idx="21">4</cx:pt>
+          <cx:pt idx="22">3</cx:pt>
+          <cx:pt idx="23">5</cx:pt>
+          <cx:pt idx="24">4</cx:pt>
+          <cx:pt idx="25">4</cx:pt>
+          <cx:pt idx="26">4</cx:pt>
+          <cx:pt idx="27">3</cx:pt>
+          <cx:pt idx="28">4</cx:pt>
+          <cx:pt idx="29">4</cx:pt>
+          <cx:pt idx="30">1</cx:pt>
+          <cx:pt idx="31">1</cx:pt>
+          <cx:pt idx="32">2</cx:pt>
+          <cx:pt idx="33">2</cx:pt>
+          <cx:pt idx="34">2</cx:pt>
+          <cx:pt idx="35">5</cx:pt>
+          <cx:pt idx="36">3</cx:pt>
+          <cx:pt idx="37">3</cx:pt>
+          <cx:pt idx="38">3</cx:pt>
+          <cx:pt idx="39">3</cx:pt>
+          <cx:pt idx="40">2</cx:pt>
+          <cx:pt idx="41">2</cx:pt>
+          <cx:pt idx="42">2</cx:pt>
+          <cx:pt idx="43">2</cx:pt>
+          <cx:pt idx="44">2</cx:pt>
+          <cx:pt idx="45">1</cx:pt>
+          <cx:pt idx="46">1</cx:pt>
+          <cx:pt idx="47">2</cx:pt>
+          <cx:pt idx="48">1</cx:pt>
+          <cx:pt idx="49">2</cx:pt>
+          <cx:pt idx="50">2</cx:pt>
+          <cx:pt idx="51">4</cx:pt>
+          <cx:pt idx="52">1</cx:pt>
+          <cx:pt idx="53">3</cx:pt>
+          <cx:pt idx="54">2</cx:pt>
+          <cx:pt idx="55">1</cx:pt>
+          <cx:pt idx="56">3</cx:pt>
+          <cx:pt idx="57">1</cx:pt>
+          <cx:pt idx="58">2</cx:pt>
+          <cx:pt idx="59">3</cx:pt>
+          <cx:pt idx="60">5</cx:pt>
+          <cx:pt idx="61">1</cx:pt>
+          <cx:pt idx="62">3</cx:pt>
+          <cx:pt idx="63">2</cx:pt>
+          <cx:pt idx="64">4</cx:pt>
+          <cx:pt idx="65">3</cx:pt>
+          <cx:pt idx="66">3</cx:pt>
+          <cx:pt idx="67">3</cx:pt>
+          <cx:pt idx="68">4</cx:pt>
+          <cx:pt idx="69">2</cx:pt>
+          <cx:pt idx="70">4</cx:pt>
+          <cx:pt idx="71">3</cx:pt>
+          <cx:pt idx="72">3</cx:pt>
+          <cx:pt idx="73">3</cx:pt>
+          <cx:pt idx="74">3</cx:pt>
+          <cx:pt idx="75">3</cx:pt>
+          <cx:pt idx="76">2</cx:pt>
+          <cx:pt idx="77">3</cx:pt>
+          <cx:pt idx="78">3</cx:pt>
+          <cx:pt idx="79">4</cx:pt>
+          <cx:pt idx="80">1</cx:pt>
+          <cx:pt idx="81">3</cx:pt>
+          <cx:pt idx="82">2</cx:pt>
+          <cx:pt idx="83">3</cx:pt>
+          <cx:pt idx="84">2</cx:pt>
+          <cx:pt idx="85">3</cx:pt>
+          <cx:pt idx="86">3</cx:pt>
+          <cx:pt idx="87">2</cx:pt>
+          <cx:pt idx="88">3</cx:pt>
+          <cx:pt idx="89">3</cx:pt>
         </cx:lvl>
       </cx:numDim>
     </cx:data>
     <cx:data id="2">
+      <cx:strDim type="cat">
+        <cx:f>Tabelle1!$A$2:$A$91</cx:f>
+        <cx:lvl ptCount="90">
+          <cx:pt idx="0">Pleasure (pre)</cx:pt>
+          <cx:pt idx="1">Pleasure (pre)</cx:pt>
+          <cx:pt idx="2">Pleasure (pre)</cx:pt>
+          <cx:pt idx="3">Pleasure (pre)</cx:pt>
+          <cx:pt idx="4">Pleasure (pre)</cx:pt>
+          <cx:pt idx="5">Pleasure (pre)</cx:pt>
+          <cx:pt idx="6">Pleasure (pre)</cx:pt>
+          <cx:pt idx="7">Pleasure (pre)</cx:pt>
+          <cx:pt idx="8">Pleasure (pre)</cx:pt>
+          <cx:pt idx="9">Pleasure (pre)</cx:pt>
+          <cx:pt idx="10">Pleasure (pre)</cx:pt>
+          <cx:pt idx="11">Pleasure (pre)</cx:pt>
+          <cx:pt idx="12">Pleasure (pre)</cx:pt>
+          <cx:pt idx="13">Pleasure (pre)</cx:pt>
+          <cx:pt idx="14">Pleasure (pre)</cx:pt>
+          <cx:pt idx="15">Pleasure (post)</cx:pt>
+          <cx:pt idx="16">Pleasure (post)</cx:pt>
+          <cx:pt idx="17">Pleasure (post)</cx:pt>
+          <cx:pt idx="18">Pleasure (post)</cx:pt>
+          <cx:pt idx="19">Pleasure (post)</cx:pt>
+          <cx:pt idx="20">Pleasure (post)</cx:pt>
+          <cx:pt idx="21">Pleasure (post)</cx:pt>
+          <cx:pt idx="22">Pleasure (post)</cx:pt>
+          <cx:pt idx="23">Pleasure (post)</cx:pt>
+          <cx:pt idx="24">Pleasure (post)</cx:pt>
+          <cx:pt idx="25">Pleasure (post)</cx:pt>
+          <cx:pt idx="26">Pleasure (post)</cx:pt>
+          <cx:pt idx="27">Pleasure (post)</cx:pt>
+          <cx:pt idx="28">Pleasure (post)</cx:pt>
+          <cx:pt idx="29">Pleasure (post)</cx:pt>
+          <cx:pt idx="30">Arousal (pre)</cx:pt>
+          <cx:pt idx="31">Arousal (pre)</cx:pt>
+          <cx:pt idx="32">Arousal (pre)</cx:pt>
+          <cx:pt idx="33">Arousal (pre)</cx:pt>
+          <cx:pt idx="34">Arousal (pre)</cx:pt>
+          <cx:pt idx="35">Arousal (pre)</cx:pt>
+          <cx:pt idx="36">Arousal (pre)</cx:pt>
+          <cx:pt idx="37">Arousal (pre)</cx:pt>
+          <cx:pt idx="38">Arousal (pre)</cx:pt>
+          <cx:pt idx="39">Arousal (pre)</cx:pt>
+          <cx:pt idx="40">Arousal (pre)</cx:pt>
+          <cx:pt idx="41">Arousal (pre)</cx:pt>
+          <cx:pt idx="42">Arousal (pre)</cx:pt>
+          <cx:pt idx="43">Arousal (pre)</cx:pt>
+          <cx:pt idx="44">Arousal (pre)</cx:pt>
+          <cx:pt idx="45">Arousal (post)</cx:pt>
+          <cx:pt idx="46">Arousal (post)</cx:pt>
+          <cx:pt idx="47">Arousal (post)</cx:pt>
+          <cx:pt idx="48">Arousal (post)</cx:pt>
+          <cx:pt idx="49">Arousal (post)</cx:pt>
+          <cx:pt idx="50">Arousal (post)</cx:pt>
+          <cx:pt idx="51">Arousal (post)</cx:pt>
+          <cx:pt idx="52">Arousal (post)</cx:pt>
+          <cx:pt idx="53">Arousal (post)</cx:pt>
+          <cx:pt idx="54">Arousal (post)</cx:pt>
+          <cx:pt idx="55">Arousal (post)</cx:pt>
+          <cx:pt idx="56">Arousal (post)</cx:pt>
+          <cx:pt idx="57">Arousal (post)</cx:pt>
+          <cx:pt idx="58">Arousal (post)</cx:pt>
+          <cx:pt idx="59">Arousal (post)</cx:pt>
+          <cx:pt idx="60">Dominance (pre)</cx:pt>
+          <cx:pt idx="61">Dominance (pre)</cx:pt>
+          <cx:pt idx="62">Dominance (pre)</cx:pt>
+          <cx:pt idx="63">Dominance (pre)</cx:pt>
+          <cx:pt idx="64">Dominance (pre)</cx:pt>
+          <cx:pt idx="65">Dominance (pre)</cx:pt>
+          <cx:pt idx="66">Dominance (pre)</cx:pt>
+          <cx:pt idx="67">Dominance (pre)</cx:pt>
+          <cx:pt idx="68">Dominance (pre)</cx:pt>
+          <cx:pt idx="69">Dominance (pre)</cx:pt>
+          <cx:pt idx="70">Dominance (pre)</cx:pt>
+          <cx:pt idx="71">Dominance (pre)</cx:pt>
+          <cx:pt idx="72">Dominance (pre)</cx:pt>
+          <cx:pt idx="73">Dominance (pre)</cx:pt>
+          <cx:pt idx="74">Dominance (pre)</cx:pt>
+          <cx:pt idx="75">Dominance (post)</cx:pt>
+          <cx:pt idx="76">Dominance (post)</cx:pt>
+          <cx:pt idx="77">Dominance (post)</cx:pt>
+          <cx:pt idx="78">Dominance (post)</cx:pt>
+          <cx:pt idx="79">Dominance (post)</cx:pt>
+          <cx:pt idx="80">Dominance (post)</cx:pt>
+          <cx:pt idx="81">Dominance (post)</cx:pt>
+          <cx:pt idx="82">Dominance (post)</cx:pt>
+          <cx:pt idx="83">Dominance (post)</cx:pt>
+          <cx:pt idx="84">Dominance (post)</cx:pt>
+          <cx:pt idx="85">Dominance (post)</cx:pt>
+          <cx:pt idx="86">Dominance (post)</cx:pt>
+          <cx:pt idx="87">Dominance (post)</cx:pt>
+          <cx:pt idx="88">Dominance (post)</cx:pt>
+          <cx:pt idx="89">Dominance (post)</cx:pt>
+        </cx:lvl>
+      </cx:strDim>
       <cx:numDim type="val">
-        <cx:f>Tabelle1!$D$2:$D$46</cx:f>
-        <cx:lvl ptCount="45" formatCode="Standard">
+        <cx:f>Tabelle1!$D$2:$D$91</cx:f>
+        <cx:lvl ptCount="90" formatCode="Standard">
           <cx:pt idx="0">5</cx:pt>
-          <cx:pt idx="1">3</cx:pt>
-          <cx:pt idx="2">5</cx:pt>
-          <cx:pt idx="3">3</cx:pt>
-          <cx:pt idx="4">5</cx:pt>
-          <cx:pt idx="5">1</cx:pt>
-          <cx:pt idx="6">3</cx:pt>
-          <cx:pt idx="7">3</cx:pt>
-          <cx:pt idx="8">3</cx:pt>
-          <cx:pt idx="9">2</cx:pt>
+          <cx:pt idx="1">5</cx:pt>
+          <cx:pt idx="2">3</cx:pt>
+          <cx:pt idx="3">4</cx:pt>
+          <cx:pt idx="4">4</cx:pt>
+          <cx:pt idx="5">2</cx:pt>
+          <cx:pt idx="6">4</cx:pt>
+          <cx:pt idx="7">4</cx:pt>
+          <cx:pt idx="8">5</cx:pt>
+          <cx:pt idx="9">4</cx:pt>
           <cx:pt idx="10">4</cx:pt>
-          <cx:pt idx="11">4</cx:pt>
-          <cx:pt idx="12">4</cx:pt>
-          <cx:pt idx="13">3</cx:pt>
-          <cx:pt idx="14">3</cx:pt>
+          <cx:pt idx="11">5</cx:pt>
+          <cx:pt idx="12">5</cx:pt>
+          <cx:pt idx="13">5</cx:pt>
+          <cx:pt idx="14">4</cx:pt>
           <cx:pt idx="15">3</cx:pt>
-          <cx:pt idx="16">3</cx:pt>
+          <cx:pt idx="16">4</cx:pt>
           <cx:pt idx="17">4</cx:pt>
-          <cx:pt idx="18">3</cx:pt>
-          <cx:pt idx="19">2</cx:pt>
-          <cx:pt idx="20">3</cx:pt>
-          <cx:pt idx="21">4</cx:pt>
-          <cx:pt idx="22">3</cx:pt>
-          <cx:pt idx="23">3</cx:pt>
-          <cx:pt idx="24">3</cx:pt>
-          <cx:pt idx="25">3</cx:pt>
-          <cx:pt idx="26">2</cx:pt>
+          <cx:pt idx="18">4</cx:pt>
+          <cx:pt idx="19">4</cx:pt>
+          <cx:pt idx="20">4</cx:pt>
+          <cx:pt idx="21">3</cx:pt>
+          <cx:pt idx="22">5</cx:pt>
+          <cx:pt idx="23">4</cx:pt>
+          <cx:pt idx="24">4</cx:pt>
+          <cx:pt idx="25">5</cx:pt>
+          <cx:pt idx="26">4</cx:pt>
           <cx:pt idx="27">3</cx:pt>
-          <cx:pt idx="28">2</cx:pt>
-          <cx:pt idx="29">3</cx:pt>
-          <cx:pt idx="30">4</cx:pt>
-          <cx:pt idx="31">3</cx:pt>
-          <cx:pt idx="32">3</cx:pt>
-          <cx:pt idx="33">2</cx:pt>
+          <cx:pt idx="28">4</cx:pt>
+          <cx:pt idx="29">4</cx:pt>
+          <cx:pt idx="30">3</cx:pt>
+          <cx:pt idx="31">2</cx:pt>
+          <cx:pt idx="32">1</cx:pt>
+          <cx:pt idx="33">1</cx:pt>
           <cx:pt idx="34">3</cx:pt>
           <cx:pt idx="35">3</cx:pt>
-          <cx:pt idx="36">5</cx:pt>
-          <cx:pt idx="37">4</cx:pt>
+          <cx:pt idx="36">1</cx:pt>
+          <cx:pt idx="37">1</cx:pt>
           <cx:pt idx="38">3</cx:pt>
-          <cx:pt idx="39">3</cx:pt>
-          <cx:pt idx="40">3</cx:pt>
-          <cx:pt idx="41">3</cx:pt>
-          <cx:pt idx="42">3</cx:pt>
-          <cx:pt idx="43">2</cx:pt>
-          <cx:pt idx="44">5</cx:pt>
-        </cx:lvl>
-      </cx:numDim>
-    </cx:data>
-    <cx:data id="3">
-      <cx:numDim type="val">
-        <cx:f>Tabelle1!$E$2:$E$46</cx:f>
-        <cx:lvl ptCount="45" formatCode="Standard">
-          <cx:pt idx="0">3</cx:pt>
-          <cx:pt idx="1">4</cx:pt>
-          <cx:pt idx="2">4</cx:pt>
-          <cx:pt idx="3">4</cx:pt>
-          <cx:pt idx="4">3</cx:pt>
-          <cx:pt idx="5">5</cx:pt>
-          <cx:pt idx="6">4</cx:pt>
-          <cx:pt idx="7">4</cx:pt>
-          <cx:pt idx="8">4</cx:pt>
-          <cx:pt idx="9">3</cx:pt>
-          <cx:pt idx="10">3</cx:pt>
-          <cx:pt idx="11">4</cx:pt>
-          <cx:pt idx="12">5</cx:pt>
-          <cx:pt idx="13">2</cx:pt>
-          <cx:pt idx="14">4</cx:pt>
-          <cx:pt idx="15">4</cx:pt>
-          <cx:pt idx="16">3</cx:pt>
-          <cx:pt idx="17">5</cx:pt>
-          <cx:pt idx="18">4</cx:pt>
-          <cx:pt idx="19">4</cx:pt>
-          <cx:pt idx="20">5</cx:pt>
-          <cx:pt idx="21">4</cx:pt>
-          <cx:pt idx="22">4</cx:pt>
-          <cx:pt idx="23">4</cx:pt>
-          <cx:pt idx="24">3</cx:pt>
-          <cx:pt idx="25">4</cx:pt>
-          <cx:pt idx="26">3</cx:pt>
-          <cx:pt idx="27">4</cx:pt>
-          <cx:pt idx="28">4</cx:pt>
-          <cx:pt idx="29">4</cx:pt>
-          <cx:pt idx="30">4</cx:pt>
-          <cx:pt idx="31">4</cx:pt>
-          <cx:pt idx="32">4</cx:pt>
-          <cx:pt idx="33">4</cx:pt>
-          <cx:pt idx="34">2</cx:pt>
-          <cx:pt idx="35">3</cx:pt>
-          <cx:pt idx="36">4</cx:pt>
-          <cx:pt idx="37">4</cx:pt>
-          <cx:pt idx="38">4</cx:pt>
-          <cx:pt idx="39">4</cx:pt>
-          <cx:pt idx="40">4</cx:pt>
-          <cx:pt idx="41">5</cx:pt>
-          <cx:pt idx="42">4</cx:pt>
-          <cx:pt idx="43">4</cx:pt>
-          <cx:pt idx="44">4</cx:pt>
-        </cx:lvl>
-      </cx:numDim>
-    </cx:data>
-    <cx:data id="4">
-      <cx:numDim type="val">
-        <cx:f>Tabelle1!$F$2:$F$46</cx:f>
-        <cx:lvl ptCount="45" formatCode="Standard">
-          <cx:pt idx="0">2</cx:pt>
-          <cx:pt idx="1">1</cx:pt>
-          <cx:pt idx="2">1</cx:pt>
-          <cx:pt idx="3">1</cx:pt>
-          <cx:pt idx="4">1</cx:pt>
-          <cx:pt idx="5">1</cx:pt>
-          <cx:pt idx="6">2</cx:pt>
-          <cx:pt idx="7">3</cx:pt>
-          <cx:pt idx="8">2</cx:pt>
-          <cx:pt idx="9">1</cx:pt>
-          <cx:pt idx="10">2</cx:pt>
-          <cx:pt idx="11">2</cx:pt>
-          <cx:pt idx="12">1</cx:pt>
-          <cx:pt idx="13">2</cx:pt>
-          <cx:pt idx="14">4</cx:pt>
-          <cx:pt idx="15">2</cx:pt>
-          <cx:pt idx="16">1</cx:pt>
-          <cx:pt idx="17">3</cx:pt>
-          <cx:pt idx="18">1</cx:pt>
-          <cx:pt idx="19">2</cx:pt>
-          <cx:pt idx="20">2</cx:pt>
-          <cx:pt idx="21">1</cx:pt>
-          <cx:pt idx="22">3</cx:pt>
-          <cx:pt idx="23">1</cx:pt>
-          <cx:pt idx="24">1</cx:pt>
-          <cx:pt idx="25">2</cx:pt>
-          <cx:pt idx="26">1</cx:pt>
-          <cx:pt idx="27">1</cx:pt>
-          <cx:pt idx="28">2</cx:pt>
-          <cx:pt idx="29">3</cx:pt>
-          <cx:pt idx="30">3</cx:pt>
-          <cx:pt idx="31">1</cx:pt>
-          <cx:pt idx="32">2</cx:pt>
-          <cx:pt idx="33">1</cx:pt>
-          <cx:pt idx="34">2</cx:pt>
-          <cx:pt idx="35">3</cx:pt>
-          <cx:pt idx="36">2</cx:pt>
-          <cx:pt idx="37">1</cx:pt>
-          <cx:pt idx="38">2</cx:pt>
           <cx:pt idx="39">2</cx:pt>
           <cx:pt idx="40">3</cx:pt>
           <cx:pt idx="41">1</cx:pt>
-          <cx:pt idx="42">4</cx:pt>
+          <cx:pt idx="42">1</cx:pt>
           <cx:pt idx="43">2</cx:pt>
-          <cx:pt idx="44">1</cx:pt>
-        </cx:lvl>
-      </cx:numDim>
-    </cx:data>
-    <cx:data id="5">
-      <cx:strDim type="cat">
-        <cx:f>Tabelle1!$A$2:$A$46</cx:f>
-        <cx:lvl ptCount="45">
-          <cx:pt idx="0">20</cx:pt>
-          <cx:pt idx="1">20</cx:pt>
-          <cx:pt idx="2">20</cx:pt>
-          <cx:pt idx="3">20</cx:pt>
-          <cx:pt idx="4">5</cx:pt>
-          <cx:pt idx="5">5</cx:pt>
-          <cx:pt idx="6">5</cx:pt>
-          <cx:pt idx="7">20</cx:pt>
-          <cx:pt idx="8">20</cx:pt>
-          <cx:pt idx="9">5</cx:pt>
-          <cx:pt idx="10">20</cx:pt>
-          <cx:pt idx="11">5</cx:pt>
-          <cx:pt idx="12">20</cx:pt>
-          <cx:pt idx="13">5</cx:pt>
-          <cx:pt idx="14">5</cx:pt>
-          <cx:pt idx="15">20</cx:pt>
-          <cx:pt idx="16">5</cx:pt>
-          <cx:pt idx="17">5</cx:pt>
-          <cx:pt idx="18">20</cx:pt>
-          <cx:pt idx="19">5</cx:pt>
-          <cx:pt idx="20">20</cx:pt>
-          <cx:pt idx="21">5</cx:pt>
-          <cx:pt idx="22">5</cx:pt>
-          <cx:pt idx="23">20</cx:pt>
-          <cx:pt idx="24">5</cx:pt>
-          <cx:pt idx="25">5</cx:pt>
-          <cx:pt idx="26">20</cx:pt>
-          <cx:pt idx="27">20</cx:pt>
-          <cx:pt idx="28">20</cx:pt>
-          <cx:pt idx="29">5</cx:pt>
-          <cx:pt idx="30">-1</cx:pt>
-          <cx:pt idx="31">-1</cx:pt>
-          <cx:pt idx="32">-1</cx:pt>
-          <cx:pt idx="33">-1</cx:pt>
-          <cx:pt idx="34">-1</cx:pt>
-          <cx:pt idx="35">-1</cx:pt>
-          <cx:pt idx="36">-1</cx:pt>
-          <cx:pt idx="37">-1</cx:pt>
-          <cx:pt idx="38">-1</cx:pt>
-          <cx:pt idx="39">-1</cx:pt>
-          <cx:pt idx="40">-1</cx:pt>
-          <cx:pt idx="41">-1</cx:pt>
-          <cx:pt idx="42">-1</cx:pt>
-          <cx:pt idx="43">-1</cx:pt>
-          <cx:pt idx="44">-1</cx:pt>
-        </cx:lvl>
-      </cx:strDim>
-      <cx:numDim type="val">
-        <cx:f>Tabelle1!$G$2:$G$46</cx:f>
-        <cx:lvl ptCount="45" formatCode="Standard">
-          <cx:pt idx="0">3</cx:pt>
-          <cx:pt idx="1">3</cx:pt>
-          <cx:pt idx="2">5</cx:pt>
-          <cx:pt idx="3">3</cx:pt>
-          <cx:pt idx="4">3</cx:pt>
-          <cx:pt idx="5">2</cx:pt>
-          <cx:pt idx="6">3</cx:pt>
-          <cx:pt idx="7">3</cx:pt>
-          <cx:pt idx="8">3</cx:pt>
-          <cx:pt idx="9">3</cx:pt>
-          <cx:pt idx="10">3</cx:pt>
-          <cx:pt idx="11">4</cx:pt>
-          <cx:pt idx="12">4</cx:pt>
-          <cx:pt idx="13">1</cx:pt>
-          <cx:pt idx="14">3</cx:pt>
-          <cx:pt idx="15">2</cx:pt>
-          <cx:pt idx="16">2</cx:pt>
-          <cx:pt idx="17">3</cx:pt>
-          <cx:pt idx="18">2</cx:pt>
-          <cx:pt idx="19">2</cx:pt>
-          <cx:pt idx="20">2</cx:pt>
-          <cx:pt idx="21">3</cx:pt>
-          <cx:pt idx="22">3</cx:pt>
-          <cx:pt idx="23">2</cx:pt>
-          <cx:pt idx="24">2</cx:pt>
-          <cx:pt idx="25">3</cx:pt>
-          <cx:pt idx="26">2</cx:pt>
-          <cx:pt idx="27">2</cx:pt>
-          <cx:pt idx="28">3</cx:pt>
-          <cx:pt idx="29">3</cx:pt>
-          <cx:pt idx="30">4</cx:pt>
-          <cx:pt idx="31">2</cx:pt>
-          <cx:pt idx="32">3</cx:pt>
-          <cx:pt idx="33">2</cx:pt>
-          <cx:pt idx="34">2</cx:pt>
-          <cx:pt idx="35">3</cx:pt>
-          <cx:pt idx="36">2</cx:pt>
-          <cx:pt idx="37">3</cx:pt>
-          <cx:pt idx="38">2</cx:pt>
-          <cx:pt idx="39">3</cx:pt>
-          <cx:pt idx="40">2</cx:pt>
-          <cx:pt idx="41">3</cx:pt>
-          <cx:pt idx="42">2</cx:pt>
-          <cx:pt idx="43">2</cx:pt>
-          <cx:pt idx="44">5</cx:pt>
+          <cx:pt idx="44">4</cx:pt>
+          <cx:pt idx="45">2</cx:pt>
+          <cx:pt idx="46">1</cx:pt>
+          <cx:pt idx="47">1</cx:pt>
+          <cx:pt idx="48">1</cx:pt>
+          <cx:pt idx="49">3</cx:pt>
+          <cx:pt idx="50">2</cx:pt>
+          <cx:pt idx="51">2</cx:pt>
+          <cx:pt idx="52">1</cx:pt>
+          <cx:pt idx="53">2</cx:pt>
+          <cx:pt idx="54">1</cx:pt>
+          <cx:pt idx="55">2</cx:pt>
+          <cx:pt idx="56">1</cx:pt>
+          <cx:pt idx="57">1</cx:pt>
+          <cx:pt idx="58">1</cx:pt>
+          <cx:pt idx="59">2</cx:pt>
+          <cx:pt idx="60">5</cx:pt>
+          <cx:pt idx="61">3</cx:pt>
+          <cx:pt idx="62">5</cx:pt>
+          <cx:pt idx="63">3</cx:pt>
+          <cx:pt idx="64">3</cx:pt>
+          <cx:pt idx="65">3</cx:pt>
+          <cx:pt idx="66">4</cx:pt>
+          <cx:pt idx="67">4</cx:pt>
+          <cx:pt idx="68">3</cx:pt>
+          <cx:pt idx="69">3</cx:pt>
+          <cx:pt idx="70">3</cx:pt>
+          <cx:pt idx="71">3</cx:pt>
+          <cx:pt idx="72">2</cx:pt>
+          <cx:pt idx="73">3</cx:pt>
+          <cx:pt idx="74">2</cx:pt>
+          <cx:pt idx="75">3</cx:pt>
+          <cx:pt idx="76">3</cx:pt>
+          <cx:pt idx="77">5</cx:pt>
+          <cx:pt idx="78">3</cx:pt>
+          <cx:pt idx="79">3</cx:pt>
+          <cx:pt idx="80">3</cx:pt>
+          <cx:pt idx="81">3</cx:pt>
+          <cx:pt idx="82">4</cx:pt>
+          <cx:pt idx="83">2</cx:pt>
+          <cx:pt idx="84">2</cx:pt>
+          <cx:pt idx="85">2</cx:pt>
+          <cx:pt idx="86">2</cx:pt>
+          <cx:pt idx="87">2</cx:pt>
+          <cx:pt idx="88">2</cx:pt>
+          <cx:pt idx="89">3</cx:pt>
         </cx:lvl>
       </cx:numDim>
     </cx:data>
@@ -1058,11 +1227,11 @@
     </cx:title>
     <cx:plotArea>
       <cx:plotAreaRegion>
-        <cx:series layoutId="boxWhisker" uniqueId="{CC58AE55-BFF7-468A-A7E3-B588CF9A5CC5}" formatIdx="0">
+        <cx:series layoutId="boxWhisker" uniqueId="{00000000-90B0-4515-B9A2-2CE9492DD0DD}">
           <cx:tx>
             <cx:txData>
               <cx:f>Tabelle1!$B$1</cx:f>
-              <cx:v>SAM_pleasure_pre</cx:v>
+              <cx:v>Alarm</cx:v>
             </cx:txData>
           </cx:tx>
           <cx:spPr>
@@ -1077,37 +1246,14 @@
           </cx:spPr>
           <cx:dataId val="0"/>
           <cx:layoutPr>
-            <cx:visibility meanLine="0" meanMarker="1" nonoutliers="0" outliers="1"/>
             <cx:statistics quartileMethod="exclusive"/>
           </cx:layoutPr>
         </cx:series>
-        <cx:series layoutId="boxWhisker" uniqueId="{00000000-B00C-4E83-82C4-0B039529356D}">
+        <cx:series layoutId="boxWhisker" uniqueId="{00000001-90B0-4515-B9A2-2CE9492DD0DD}">
           <cx:tx>
             <cx:txData>
               <cx:f>Tabelle1!$C$1</cx:f>
-              <cx:v>SAM_arousal_pre</cx:v>
-            </cx:txData>
-          </cx:tx>
-          <cx:spPr>
-            <a:solidFill>
-              <a:srgbClr val="3288BD"/>
-            </a:solidFill>
-            <a:ln>
-              <a:solidFill>
-                <a:srgbClr val="3288BD"/>
-              </a:solidFill>
-            </a:ln>
-          </cx:spPr>
-          <cx:dataId val="1"/>
-          <cx:layoutPr>
-            <cx:statistics quartileMethod="exclusive"/>
-          </cx:layoutPr>
-        </cx:series>
-        <cx:series layoutId="boxWhisker" uniqueId="{00000001-B00C-4E83-82C4-0B039529356D}">
-          <cx:tx>
-            <cx:txData>
-              <cx:f>Tabelle1!$D$1</cx:f>
-              <cx:v>SAM_dominance_pre</cx:v>
+              <cx:v>Fade 20</cx:v>
             </cx:txData>
           </cx:tx>
           <cx:spPr>
@@ -1120,38 +1266,16 @@
               </a:solidFill>
             </a:ln>
           </cx:spPr>
-          <cx:dataId val="2"/>
+          <cx:dataId val="1"/>
           <cx:layoutPr>
             <cx:statistics quartileMethod="exclusive"/>
           </cx:layoutPr>
         </cx:series>
-        <cx:series layoutId="boxWhisker" uniqueId="{00000002-B00C-4E83-82C4-0B039529356D}">
+        <cx:series layoutId="boxWhisker" uniqueId="{00000002-90B0-4515-B9A2-2CE9492DD0DD}">
           <cx:tx>
             <cx:txData>
-              <cx:f>Tabelle1!$E$1</cx:f>
-              <cx:v>SAM_pleasure_post</cx:v>
-            </cx:txData>
-          </cx:tx>
-          <cx:spPr>
-            <a:solidFill>
-              <a:srgbClr val="D53E4F"/>
-            </a:solidFill>
-            <a:ln>
-              <a:solidFill>
-                <a:srgbClr val="D53E4F"/>
-              </a:solidFill>
-            </a:ln>
-          </cx:spPr>
-          <cx:dataId val="3"/>
-          <cx:layoutPr>
-            <cx:statistics quartileMethod="exclusive"/>
-          </cx:layoutPr>
-        </cx:series>
-        <cx:series layoutId="boxWhisker" uniqueId="{00000003-B00C-4E83-82C4-0B039529356D}">
-          <cx:tx>
-            <cx:txData>
-              <cx:f>Tabelle1!$F$1</cx:f>
-              <cx:v>SAM_arousal_post</cx:v>
+              <cx:f>Tabelle1!$D$1</cx:f>
+              <cx:v>Fade 5</cx:v>
             </cx:txData>
           </cx:tx>
           <cx:spPr>
@@ -1164,29 +1288,7 @@
               </a:solidFill>
             </a:ln>
           </cx:spPr>
-          <cx:dataId val="4"/>
-          <cx:layoutPr>
-            <cx:statistics quartileMethod="exclusive"/>
-          </cx:layoutPr>
-        </cx:series>
-        <cx:series layoutId="boxWhisker" uniqueId="{00000004-B00C-4E83-82C4-0B039529356D}">
-          <cx:tx>
-            <cx:txData>
-              <cx:f>Tabelle1!$G$1</cx:f>
-              <cx:v>SAM_dominance_post</cx:v>
-            </cx:txData>
-          </cx:tx>
-          <cx:spPr>
-            <a:solidFill>
-              <a:srgbClr val="FC8D59"/>
-            </a:solidFill>
-            <a:ln>
-              <a:solidFill>
-                <a:srgbClr val="FC8D59"/>
-              </a:solidFill>
-            </a:ln>
-          </cx:spPr>
-          <cx:dataId val="5"/>
+          <cx:dataId val="2"/>
           <cx:layoutPr>
             <cx:statistics quartileMethod="exclusive"/>
           </cx:layoutPr>
@@ -7128,7 +7230,11 @@
           <a:p>
             <a:r>
               <a:rPr lang="de-DE" dirty="0"/>
-              <a:t>Aufgaben (2/4)</a:t>
+              <a:t>Aufgaben </a:t>
+            </a:r>
+            <a:r>
+              <a:rPr lang="de-DE" sz="2400" dirty="0"/>
+              <a:t>(2/4)</a:t>
             </a:r>
           </a:p>
         </p:txBody>
@@ -7221,7 +7327,11 @@
           <a:p>
             <a:r>
               <a:rPr lang="de-DE" dirty="0"/>
-              <a:t>Aufgaben (3/4)</a:t>
+              <a:t>Aufgaben </a:t>
+            </a:r>
+            <a:r>
+              <a:rPr lang="de-DE" sz="2400" dirty="0"/>
+              <a:t>(3/4)</a:t>
             </a:r>
           </a:p>
         </p:txBody>
@@ -7317,18 +7427,18 @@
               <a:t>Aufgaben </a:t>
             </a:r>
             <a:r>
-              <a:rPr lang="de-DE" dirty="0" smtClean="0"/>
+              <a:rPr lang="de-DE" sz="2400" dirty="0" smtClean="0"/>
               <a:t>(</a:t>
             </a:r>
             <a:r>
-              <a:rPr lang="de-DE" dirty="0"/>
+              <a:rPr lang="de-DE" sz="2400" dirty="0"/>
               <a:t>4</a:t>
             </a:r>
             <a:r>
-              <a:rPr lang="de-DE" dirty="0" smtClean="0"/>
+              <a:rPr lang="de-DE" sz="2400" dirty="0" smtClean="0"/>
               <a:t>/5)</a:t>
             </a:r>
-            <a:endParaRPr lang="de-DE" dirty="0"/>
+            <a:endParaRPr lang="de-DE" sz="2400" dirty="0"/>
           </a:p>
         </p:txBody>
       </p:sp>
@@ -7484,10 +7594,10 @@
               <a:t>Aufgaben </a:t>
             </a:r>
             <a:r>
-              <a:rPr lang="de-DE" dirty="0" smtClean="0"/>
+              <a:rPr lang="de-DE" sz="2400" dirty="0" smtClean="0"/>
               <a:t>(5/5)</a:t>
             </a:r>
-            <a:endParaRPr lang="de-DE" dirty="0"/>
+            <a:endParaRPr lang="de-DE" sz="2400" dirty="0"/>
           </a:p>
         </p:txBody>
       </p:sp>
@@ -7575,9 +7685,14 @@
           <a:lstStyle/>
           <a:p>
             <a:r>
-              <a:rPr lang="de-DE" dirty="0"/>
-              <a:t>Ergebnisse</a:t>
-            </a:r>
+              <a:rPr lang="de-DE" dirty="0" smtClean="0"/>
+              <a:t>Ergebnisse </a:t>
+            </a:r>
+            <a:r>
+              <a:rPr lang="de-DE" sz="2400" dirty="0" smtClean="0"/>
+              <a:t>(1/5)</a:t>
+            </a:r>
+            <a:endParaRPr lang="de-DE" sz="2400" dirty="0"/>
           </a:p>
         </p:txBody>
       </p:sp>
@@ -7615,7 +7730,7 @@
               <p:nvPr>
                 <p:extLst>
                   <p:ext uri="{D42A27DB-BD31-4B8C-83A1-F6EECF244321}">
-                    <p14:modId xmlns:p14="http://schemas.microsoft.com/office/powerpoint/2010/main" val="210739064"/>
+                    <p14:modId xmlns:p14="http://schemas.microsoft.com/office/powerpoint/2010/main" val="4221848938"/>
                   </p:ext>
                 </p:extLst>
               </p:nvPr>
@@ -7667,14 +7782,14 @@
               <p:nvPr>
                 <p:extLst>
                   <p:ext uri="{D42A27DB-BD31-4B8C-83A1-F6EECF244321}">
-                    <p14:modId xmlns:p14="http://schemas.microsoft.com/office/powerpoint/2010/main" val="1989765849"/>
+                    <p14:modId xmlns:p14="http://schemas.microsoft.com/office/powerpoint/2010/main" val="106344335"/>
                   </p:ext>
                 </p:extLst>
               </p:nvPr>
             </p:nvGraphicFramePr>
             <p:xfrm>
               <a:off x="8003634" y="1879200"/>
-              <a:ext cx="3350166" cy="3048400"/>
+              <a:ext cx="3350166" cy="3938400"/>
             </p:xfrm>
             <a:graphic>
               <a:graphicData uri="http://schemas.microsoft.com/office/drawing/2014/chartex">
@@ -7701,7 +7816,7 @@
             <p:spPr>
               <a:xfrm>
                 <a:off x="8003634" y="1879200"/>
-                <a:ext cx="3350166" cy="3048400"/>
+                <a:ext cx="3350166" cy="3938400"/>
               </a:xfrm>
               <a:prstGeom prst="rect">
                 <a:avLst/>
@@ -7710,54 +7825,6 @@
           </p:pic>
         </mc:Fallback>
       </mc:AlternateContent>
-      <p:sp>
-        <p:nvSpPr>
-          <p:cNvPr id="22" name="Textfeld 21"/>
-          <p:cNvSpPr txBox="1"/>
-          <p:nvPr/>
-        </p:nvSpPr>
-        <p:spPr>
-          <a:xfrm>
-            <a:off x="8336281" y="4927600"/>
-            <a:ext cx="2857500" cy="1477328"/>
-          </a:xfrm>
-          <a:prstGeom prst="rect">
-            <a:avLst/>
-          </a:prstGeom>
-          <a:noFill/>
-        </p:spPr>
-        <p:txBody>
-          <a:bodyPr wrap="square" rtlCol="0">
-            <a:spAutoFit/>
-          </a:bodyPr>
-          <a:lstStyle/>
-          <a:p>
-            <a:r>
-              <a:rPr lang="de-DE" dirty="0" smtClean="0">
-                <a:solidFill>
-                  <a:srgbClr val="FF00FF"/>
-                </a:solidFill>
-              </a:rPr>
-              <a:t>DIESE VISUALISIERUNG IST MIST. </a:t>
-            </a:r>
-          </a:p>
-          <a:p>
-            <a:r>
-              <a:rPr lang="de-DE" dirty="0" smtClean="0">
-                <a:solidFill>
-                  <a:srgbClr val="FF00FF"/>
-                </a:solidFill>
-              </a:rPr>
-              <a:t>Eigentlich müssen die zugrundeliegenden Daten angepasst werden</a:t>
-            </a:r>
-            <a:endParaRPr lang="de-DE" dirty="0">
-              <a:solidFill>
-                <a:srgbClr val="FF00FF"/>
-              </a:solidFill>
-            </a:endParaRPr>
-          </a:p>
-        </p:txBody>
-      </p:sp>
     </p:spTree>
     <p:extLst>
       <p:ext uri="{BB962C8B-B14F-4D97-AF65-F5344CB8AC3E}">
@@ -7811,9 +7878,18 @@
           <a:lstStyle/>
           <a:p>
             <a:r>
-              <a:rPr lang="de-DE" dirty="0"/>
-              <a:t>Ergebnisse</a:t>
-            </a:r>
+              <a:rPr lang="de-DE" dirty="0" smtClean="0"/>
+              <a:t>Ergebnisse </a:t>
+            </a:r>
+            <a:r>
+              <a:rPr lang="de-DE" sz="2400" dirty="0" smtClean="0"/>
+              <a:t>(2/5</a:t>
+            </a:r>
+            <a:r>
+              <a:rPr lang="de-DE" sz="2400" dirty="0"/>
+              <a:t>)</a:t>
+            </a:r>
+            <a:endParaRPr lang="de-DE" sz="2400" dirty="0"/>
           </a:p>
         </p:txBody>
       </p:sp>
@@ -7858,7 +7934,7 @@
           <a:graphicData uri="http://schemas.openxmlformats.org/presentationml/2006/ole">
             <mc:AlternateContent xmlns:mc="http://schemas.openxmlformats.org/markup-compatibility/2006">
               <mc:Choice xmlns:v="urn:schemas-microsoft-com:vml" Requires="v">
-                <p:oleObj spid="_x0000_s1026" name="Acrobat Document" r:id="rId3" imgW="4800253" imgH="3428735" progId="AcroExch.Document.7">
+                <p:oleObj spid="_x0000_s1031" name="Acrobat Document" r:id="rId3" imgW="4800253" imgH="3428735" progId="AcroExch.Document.7">
                   <p:embed/>
                 </p:oleObj>
               </mc:Choice>
@@ -7946,9 +8022,18 @@
           <a:lstStyle/>
           <a:p>
             <a:r>
-              <a:rPr lang="de-DE" dirty="0"/>
-              <a:t>Ergebnisse</a:t>
-            </a:r>
+              <a:rPr lang="de-DE" dirty="0" smtClean="0"/>
+              <a:t>Ergebnisse </a:t>
+            </a:r>
+            <a:r>
+              <a:rPr lang="de-DE" sz="2400" dirty="0" smtClean="0"/>
+              <a:t>(3/5</a:t>
+            </a:r>
+            <a:r>
+              <a:rPr lang="de-DE" sz="2400" dirty="0"/>
+              <a:t>)</a:t>
+            </a:r>
+            <a:endParaRPr lang="de-DE" sz="2400" dirty="0"/>
           </a:p>
         </p:txBody>
       </p:sp>
@@ -7993,7 +8078,7 @@
           <a:graphicData uri="http://schemas.openxmlformats.org/presentationml/2006/ole">
             <mc:AlternateContent xmlns:mc="http://schemas.openxmlformats.org/markup-compatibility/2006">
               <mc:Choice xmlns:v="urn:schemas-microsoft-com:vml" Requires="v">
-                <p:oleObj spid="_x0000_s2050" name="Acrobat Document" r:id="rId3" imgW="4800253" imgH="3428735" progId="AcroExch.Document.7">
+                <p:oleObj spid="_x0000_s2055" name="Acrobat Document" r:id="rId3" imgW="4800253" imgH="3428735" progId="AcroExch.Document.7">
                   <p:embed/>
                 </p:oleObj>
               </mc:Choice>
@@ -8081,9 +8166,18 @@
           <a:lstStyle/>
           <a:p>
             <a:r>
-              <a:rPr lang="de-DE" dirty="0"/>
-              <a:t>Ergebnisse</a:t>
-            </a:r>
+              <a:rPr lang="de-DE" dirty="0" smtClean="0"/>
+              <a:t>Ergebnisse </a:t>
+            </a:r>
+            <a:r>
+              <a:rPr lang="de-DE" sz="2400" dirty="0" smtClean="0"/>
+              <a:t>(4/5</a:t>
+            </a:r>
+            <a:r>
+              <a:rPr lang="de-DE" sz="2400" dirty="0"/>
+              <a:t>)</a:t>
+            </a:r>
+            <a:endParaRPr lang="de-DE" sz="2400" dirty="0"/>
           </a:p>
         </p:txBody>
       </p:sp>
@@ -8128,7 +8222,7 @@
           <a:graphicData uri="http://schemas.openxmlformats.org/presentationml/2006/ole">
             <mc:AlternateContent xmlns:mc="http://schemas.openxmlformats.org/markup-compatibility/2006">
               <mc:Choice xmlns:v="urn:schemas-microsoft-com:vml" Requires="v">
-                <p:oleObj spid="_x0000_s3074" name="Acrobat Document" r:id="rId3" imgW="4800253" imgH="3428735" progId="AcroExch.Document.7">
+                <p:oleObj spid="_x0000_s3079" name="Acrobat Document" r:id="rId3" imgW="4800253" imgH="3428735" progId="AcroExch.Document.7">
                   <p:embed/>
                 </p:oleObj>
               </mc:Choice>
@@ -8216,9 +8310,26 @@
           <a:lstStyle/>
           <a:p>
             <a:r>
-              <a:rPr lang="de-DE" dirty="0"/>
-              <a:t>Ergebnisse</a:t>
-            </a:r>
+              <a:rPr lang="de-DE" dirty="0" smtClean="0"/>
+              <a:t>Ergebnisse </a:t>
+            </a:r>
+            <a:r>
+              <a:rPr lang="de-DE" sz="2400" dirty="0" smtClean="0"/>
+              <a:t>(</a:t>
+            </a:r>
+            <a:r>
+              <a:rPr lang="de-DE" sz="2400" dirty="0"/>
+              <a:t>5</a:t>
+            </a:r>
+            <a:r>
+              <a:rPr lang="de-DE" sz="2400" dirty="0" smtClean="0"/>
+              <a:t>/5</a:t>
+            </a:r>
+            <a:r>
+              <a:rPr lang="de-DE" sz="2400" dirty="0"/>
+              <a:t>)</a:t>
+            </a:r>
+            <a:endParaRPr lang="de-DE" sz="2400" dirty="0"/>
           </a:p>
         </p:txBody>
       </p:sp>
@@ -8415,7 +8526,6 @@
               <a:rPr lang="de-DE" dirty="0"/>
               <a:t>Vorhandener Bildungsstand</a:t>
             </a:r>
-            <a:endParaRPr lang="de-DE" dirty="0"/>
           </a:p>
         </p:txBody>
       </p:sp>
@@ -8605,7 +8715,6 @@
               <a:rPr lang="de-DE" sz="2400" dirty="0"/>
               <a:t>)</a:t>
             </a:r>
-            <a:endParaRPr lang="de-DE" sz="2400" dirty="0"/>
           </a:p>
         </p:txBody>
       </p:sp>
@@ -8717,7 +8826,6 @@
               <a:rPr lang="de-DE" sz="2400" dirty="0"/>
               <a:t>)</a:t>
             </a:r>
-            <a:endParaRPr lang="de-DE" sz="2400" dirty="0"/>
           </a:p>
         </p:txBody>
       </p:sp>
@@ -8822,7 +8930,6 @@
               <a:rPr lang="de-DE" sz="2400" dirty="0"/>
               <a:t>)</a:t>
             </a:r>
-            <a:endParaRPr lang="de-DE" sz="2400" dirty="0"/>
           </a:p>
         </p:txBody>
       </p:sp>
@@ -10690,7 +10797,11 @@
           <a:p>
             <a:r>
               <a:rPr lang="de-DE" dirty="0"/>
-              <a:t>Aufgaben (1/4)</a:t>
+              <a:t>Aufgaben </a:t>
+            </a:r>
+            <a:r>
+              <a:rPr lang="de-DE" sz="2400" dirty="0"/>
+              <a:t>(1/4)</a:t>
             </a:r>
           </a:p>
         </p:txBody>

</xml_diff>

<commit_message>
Change colors of the study design groups
</commit_message>
<xml_diff>
--- a/presentation/Resync Studie.pptx
+++ b/presentation/Resync Studie.pptx
@@ -11133,8 +11133,8 @@
           </a:graphicData>
         </a:graphic>
       </p:graphicFrame>
-      <mc:AlternateContent xmlns:mc="http://schemas.openxmlformats.org/markup-compatibility/2006">
-        <mc:Choice xmlns:cx="http://schemas.microsoft.com/office/drawing/2014/chartex" Requires="cx">
+      <mc:AlternateContent xmlns:mc="http://schemas.openxmlformats.org/markup-compatibility/2006" xmlns:cx="http://schemas.microsoft.com/office/drawing/2014/chartex">
+        <mc:Choice Requires="cx">
           <p:graphicFrame>
             <p:nvGraphicFramePr>
               <p:cNvPr id="15" name="Diagramm 14"/>
@@ -11158,7 +11158,7 @@
             </a:graphic>
           </p:graphicFrame>
         </mc:Choice>
-        <mc:Fallback>
+        <mc:Fallback xmlns="">
           <p:pic>
             <p:nvPicPr>
               <p:cNvPr id="15" name="Diagramm 14"/>
@@ -11185,8 +11185,8 @@
           </p:pic>
         </mc:Fallback>
       </mc:AlternateContent>
-      <mc:AlternateContent xmlns:mc="http://schemas.openxmlformats.org/markup-compatibility/2006">
-        <mc:Choice xmlns:cx="http://schemas.microsoft.com/office/drawing/2014/chartex" Requires="cx">
+      <mc:AlternateContent xmlns:mc="http://schemas.openxmlformats.org/markup-compatibility/2006" xmlns:cx="http://schemas.microsoft.com/office/drawing/2014/chartex">
+        <mc:Choice Requires="cx">
           <p:graphicFrame>
             <p:nvGraphicFramePr>
               <p:cNvPr id="21" name="Diagramm 20"/>
@@ -11210,7 +11210,7 @@
             </a:graphic>
           </p:graphicFrame>
         </mc:Choice>
-        <mc:Fallback>
+        <mc:Fallback xmlns="">
           <p:pic>
             <p:nvPicPr>
               <p:cNvPr id="21" name="Diagramm 20"/>
@@ -11301,7 +11301,6 @@
               <a:rPr lang="de-DE" sz="2400" dirty="0"/>
               <a:t>)</a:t>
             </a:r>
-            <a:endParaRPr lang="de-DE" sz="2400" dirty="0"/>
           </a:p>
         </p:txBody>
       </p:sp>
@@ -11394,7 +11393,6 @@
               <a:rPr lang="de-DE" sz="2400" dirty="0"/>
               <a:t>)</a:t>
             </a:r>
-            <a:endParaRPr lang="de-DE" sz="2400" dirty="0"/>
           </a:p>
         </p:txBody>
       </p:sp>
@@ -11487,7 +11485,6 @@
               <a:rPr lang="de-DE" sz="2400" dirty="0"/>
               <a:t>)</a:t>
             </a:r>
-            <a:endParaRPr lang="de-DE" sz="2400" dirty="0"/>
           </a:p>
         </p:txBody>
       </p:sp>
@@ -11588,7 +11585,6 @@
               <a:rPr lang="de-DE" sz="2400" dirty="0"/>
               <a:t>)</a:t>
             </a:r>
-            <a:endParaRPr lang="de-DE" sz="2400" dirty="0"/>
           </a:p>
         </p:txBody>
       </p:sp>
@@ -13386,32 +13382,20 @@
               <a:buNone/>
             </a:pPr>
             <a:r>
-              <a:rPr lang="de-DE" sz="2000" dirty="0">
+              <a:rPr lang="de-DE" sz="2000" dirty="0" smtClean="0">
                 <a:solidFill>
                   <a:srgbClr val="CDB380"/>
                 </a:solidFill>
                 <a:latin typeface="Futura Lt BT" panose="020B0402020204020303" pitchFamily="34" charset="0"/>
               </a:rPr>
-              <a:t>5 </a:t>
-            </a:r>
-            <a:r>
-              <a:rPr lang="de-DE" sz="2000" dirty="0" err="1">
-                <a:solidFill>
-                  <a:srgbClr val="CDB380"/>
-                </a:solidFill>
-                <a:latin typeface="Futura Lt BT" panose="020B0402020204020303" pitchFamily="34" charset="0"/>
-              </a:rPr>
-              <a:t>seconds</a:t>
-            </a:r>
-            <a:r>
-              <a:rPr lang="de-DE" sz="2000" dirty="0">
-                <a:solidFill>
-                  <a:srgbClr val="CDB380"/>
-                </a:solidFill>
-                <a:latin typeface="Futura Lt BT" panose="020B0402020204020303" pitchFamily="34" charset="0"/>
-              </a:rPr>
-              <a:t> fade</a:t>
-            </a:r>
+              <a:t>Alarm</a:t>
+            </a:r>
+            <a:endParaRPr lang="de-DE" sz="2000" dirty="0">
+              <a:solidFill>
+                <a:srgbClr val="CDB380"/>
+              </a:solidFill>
+              <a:latin typeface="Futura Lt BT" panose="020B0402020204020303" pitchFamily="34" charset="0"/>
+            </a:endParaRPr>
           </a:p>
         </p:txBody>
       </p:sp>
@@ -13606,32 +13590,20 @@
               <a:buNone/>
             </a:pPr>
             <a:r>
-              <a:rPr lang="de-DE" sz="2000" dirty="0">
+              <a:rPr lang="de-DE" sz="2000" dirty="0" smtClean="0">
                 <a:solidFill>
                   <a:srgbClr val="CDB380"/>
                 </a:solidFill>
                 <a:latin typeface="Futura Lt BT" panose="020B0402020204020303" pitchFamily="34" charset="0"/>
               </a:rPr>
-              <a:t>20 </a:t>
-            </a:r>
-            <a:r>
-              <a:rPr lang="de-DE" sz="2000" dirty="0" err="1">
-                <a:solidFill>
-                  <a:srgbClr val="CDB380"/>
-                </a:solidFill>
-                <a:latin typeface="Futura Lt BT" panose="020B0402020204020303" pitchFamily="34" charset="0"/>
-              </a:rPr>
-              <a:t>seconds</a:t>
-            </a:r>
-            <a:r>
-              <a:rPr lang="de-DE" sz="2000" dirty="0">
-                <a:solidFill>
-                  <a:srgbClr val="CDB380"/>
-                </a:solidFill>
-                <a:latin typeface="Futura Lt BT" panose="020B0402020204020303" pitchFamily="34" charset="0"/>
-              </a:rPr>
-              <a:t> fade</a:t>
-            </a:r>
+              <a:t>Fade 20</a:t>
+            </a:r>
+            <a:endParaRPr lang="de-DE" sz="2000" dirty="0">
+              <a:solidFill>
+                <a:srgbClr val="CDB380"/>
+              </a:solidFill>
+              <a:latin typeface="Futura Lt BT" panose="020B0402020204020303" pitchFamily="34" charset="0"/>
+            </a:endParaRPr>
           </a:p>
         </p:txBody>
       </p:sp>
@@ -13831,13 +13803,13 @@
               <a:buNone/>
             </a:pPr>
             <a:r>
-              <a:rPr lang="de-DE" sz="2000" dirty="0" err="1">
+              <a:rPr lang="de-DE" sz="2000" dirty="0" smtClean="0">
                 <a:solidFill>
                   <a:srgbClr val="CDB380"/>
                 </a:solidFill>
                 <a:latin typeface="Futura Lt BT" panose="020B0402020204020303" pitchFamily="34" charset="0"/>
               </a:rPr>
-              <a:t>alarm</a:t>
+              <a:t>Fade 5</a:t>
             </a:r>
             <a:endParaRPr lang="de-DE" sz="2000" dirty="0">
               <a:solidFill>

</xml_diff>

<commit_message>
vorläufig alle Punkte zu - gemacht in Aufzählungen
</commit_message>
<xml_diff>
--- a/presentation/Resync Studie.pptx
+++ b/presentation/Resync Studie.pptx
@@ -5,7 +5,7 @@
     <p:sldMasterId id="2147483648" r:id="rId1"/>
   </p:sldMasterIdLst>
   <p:notesMasterIdLst>
-    <p:notesMasterId r:id="rId40"/>
+    <p:notesMasterId r:id="rId39"/>
   </p:notesMasterIdLst>
   <p:sldIdLst>
     <p:sldId id="256" r:id="rId2"/>
@@ -27,25 +27,24 @@
     <p:sldId id="288" r:id="rId18"/>
     <p:sldId id="286" r:id="rId19"/>
     <p:sldId id="290" r:id="rId20"/>
-    <p:sldId id="280" r:id="rId21"/>
-    <p:sldId id="291" r:id="rId22"/>
-    <p:sldId id="292" r:id="rId23"/>
-    <p:sldId id="274" r:id="rId24"/>
-    <p:sldId id="275" r:id="rId25"/>
-    <p:sldId id="276" r:id="rId26"/>
-    <p:sldId id="277" r:id="rId27"/>
-    <p:sldId id="267" r:id="rId28"/>
-    <p:sldId id="293" r:id="rId29"/>
-    <p:sldId id="295" r:id="rId30"/>
-    <p:sldId id="294" r:id="rId31"/>
-    <p:sldId id="296" r:id="rId32"/>
-    <p:sldId id="297" r:id="rId33"/>
-    <p:sldId id="298" r:id="rId34"/>
-    <p:sldId id="299" r:id="rId35"/>
-    <p:sldId id="300" r:id="rId36"/>
-    <p:sldId id="301" r:id="rId37"/>
-    <p:sldId id="302" r:id="rId38"/>
-    <p:sldId id="303" r:id="rId39"/>
+    <p:sldId id="291" r:id="rId21"/>
+    <p:sldId id="292" r:id="rId22"/>
+    <p:sldId id="274" r:id="rId23"/>
+    <p:sldId id="275" r:id="rId24"/>
+    <p:sldId id="276" r:id="rId25"/>
+    <p:sldId id="277" r:id="rId26"/>
+    <p:sldId id="267" r:id="rId27"/>
+    <p:sldId id="293" r:id="rId28"/>
+    <p:sldId id="295" r:id="rId29"/>
+    <p:sldId id="294" r:id="rId30"/>
+    <p:sldId id="296" r:id="rId31"/>
+    <p:sldId id="297" r:id="rId32"/>
+    <p:sldId id="298" r:id="rId33"/>
+    <p:sldId id="299" r:id="rId34"/>
+    <p:sldId id="300" r:id="rId35"/>
+    <p:sldId id="301" r:id="rId36"/>
+    <p:sldId id="302" r:id="rId37"/>
+    <p:sldId id="303" r:id="rId38"/>
   </p:sldIdLst>
   <p:sldSz cx="12192000" cy="6858000"/>
   <p:notesSz cx="6858000" cy="9144000"/>
@@ -12045,9 +12044,21 @@
             </a:r>
             <a:r>
               <a:rPr lang="de-DE" sz="2400" dirty="0" smtClean="0"/>
-              <a:t>(2/11)</a:t>
-            </a:r>
-            <a:endParaRPr lang="de-DE" sz="2400" dirty="0"/>
+              <a:t>(2/11) </a:t>
+            </a:r>
+            <a:r>
+              <a:rPr lang="de-DE" sz="2400" dirty="0" smtClean="0">
+                <a:solidFill>
+                  <a:srgbClr val="FF0000"/>
+                </a:solidFill>
+              </a:rPr>
+              <a:t>in wie weit das hier aufführen?</a:t>
+            </a:r>
+            <a:endParaRPr lang="de-DE" sz="2400" dirty="0">
+              <a:solidFill>
+                <a:srgbClr val="FF0000"/>
+              </a:solidFill>
+            </a:endParaRPr>
           </a:p>
         </p:txBody>
       </p:sp>
@@ -12068,30 +12079,51 @@
           </a:bodyPr>
           <a:lstStyle/>
           <a:p>
+            <a:pPr>
+              <a:buFontTx/>
+              <a:buChar char="-"/>
+            </a:pPr>
             <a:r>
               <a:rPr lang="de-DE" dirty="0" smtClean="0"/>
               <a:t>RSME</a:t>
             </a:r>
           </a:p>
           <a:p>
+            <a:pPr>
+              <a:buFontTx/>
+              <a:buChar char="-"/>
+            </a:pPr>
             <a:r>
               <a:rPr lang="de-DE" dirty="0" smtClean="0"/>
               <a:t>SAM vor und nach der Ruhephase</a:t>
             </a:r>
           </a:p>
           <a:p>
+            <a:pPr>
+              <a:buFontTx/>
+              <a:buChar char="-"/>
+            </a:pPr>
             <a:r>
               <a:rPr lang="de-DE" dirty="0" smtClean="0"/>
               <a:t>Stuhlwinkeleinstellungen</a:t>
             </a:r>
           </a:p>
           <a:p>
+            <a:pPr>
+              <a:buFontTx/>
+              <a:buChar char="-"/>
+            </a:pPr>
             <a:r>
               <a:rPr lang="de-DE" dirty="0" smtClean="0"/>
               <a:t>Kopfbewegungen</a:t>
             </a:r>
-          </a:p>
-          <a:p>
+            <a:endParaRPr lang="de-DE" dirty="0"/>
+          </a:p>
+          <a:p>
+            <a:pPr>
+              <a:buFontTx/>
+              <a:buChar char="-"/>
+            </a:pPr>
             <a:r>
               <a:rPr lang="de-DE" dirty="0" smtClean="0"/>
               <a:t>Dauer des </a:t>
@@ -12110,9 +12142,17 @@
             </a:r>
           </a:p>
           <a:p>
+            <a:pPr>
+              <a:buFontTx/>
+              <a:buChar char="-"/>
+            </a:pPr>
+            <a:r>
+              <a:rPr lang="de-DE" dirty="0" smtClean="0"/>
+              <a:t>Fehlerraten </a:t>
+            </a:r>
             <a:r>
               <a:rPr lang="de-DE" dirty="0"/>
-              <a:t>Fehlerraten und </a:t>
+              <a:t>und </a:t>
             </a:r>
             <a:r>
               <a:rPr lang="de-DE" dirty="0" smtClean="0"/>
@@ -12120,24 +12160,40 @@
             </a:r>
           </a:p>
           <a:p>
+            <a:pPr>
+              <a:buFontTx/>
+              <a:buChar char="-"/>
+            </a:pPr>
             <a:r>
               <a:rPr lang="de-DE" dirty="0" smtClean="0"/>
               <a:t>Schlafstatus und subjektive Einschätzung der Schlafdauer</a:t>
             </a:r>
           </a:p>
           <a:p>
+            <a:pPr>
+              <a:buFontTx/>
+              <a:buChar char="-"/>
+            </a:pPr>
             <a:r>
               <a:rPr lang="de-DE" dirty="0" smtClean="0"/>
               <a:t>Demografische Ergebnisse</a:t>
             </a:r>
           </a:p>
           <a:p>
+            <a:pPr>
+              <a:buFontTx/>
+              <a:buChar char="-"/>
+            </a:pPr>
             <a:r>
               <a:rPr lang="de-DE" dirty="0" smtClean="0"/>
               <a:t>VR/AR Erfahrung</a:t>
             </a:r>
           </a:p>
           <a:p>
+            <a:pPr>
+              <a:buFontTx/>
+              <a:buChar char="-"/>
+            </a:pPr>
             <a:r>
               <a:rPr lang="de-DE" dirty="0" smtClean="0"/>
               <a:t>Fragebogen Inhalte:</a:t>
@@ -12668,10 +12724,9 @@
               <a:t>meditation</a:t>
             </a:r>
             <a:r>
-              <a:rPr lang="de-DE" smtClean="0"/>
+              <a:rPr lang="de-DE" dirty="0" smtClean="0"/>
               <a:t>.“</a:t>
             </a:r>
-            <a:endParaRPr lang="de-DE" dirty="0" smtClean="0"/>
           </a:p>
         </p:txBody>
       </p:sp>
@@ -13294,35 +13349,57 @@
           <a:bodyPr/>
           <a:lstStyle/>
           <a:p>
+            <a:pPr marL="0" indent="0">
+              <a:buNone/>
+            </a:pPr>
             <a:r>
               <a:rPr lang="de-DE" dirty="0" smtClean="0"/>
-              <a:t>Motivation</a:t>
-            </a:r>
-          </a:p>
-          <a:p>
-            <a:r>
-              <a:rPr lang="de-DE" dirty="0"/>
-              <a:t>Herangehensweise</a:t>
-            </a:r>
-          </a:p>
-          <a:p>
+              <a:t>- Motivation</a:t>
+            </a:r>
+          </a:p>
+          <a:p>
+            <a:pPr marL="0" indent="0">
+              <a:buNone/>
+            </a:pPr>
             <a:r>
               <a:rPr lang="de-DE" dirty="0" smtClean="0"/>
-              <a:t>Ergebnisse</a:t>
+              <a:t>- Herangehensweise</a:t>
             </a:r>
             <a:endParaRPr lang="de-DE" dirty="0"/>
           </a:p>
           <a:p>
-            <a:r>
-              <a:rPr lang="de-DE" dirty="0"/>
-              <a:t>Diskussion</a:t>
-            </a:r>
-          </a:p>
-          <a:p>
-            <a:r>
-              <a:rPr lang="de-DE" dirty="0"/>
+            <a:pPr marL="0" indent="0">
+              <a:buNone/>
+            </a:pPr>
+            <a:r>
+              <a:rPr lang="de-DE" dirty="0" smtClean="0"/>
+              <a:t>- Ergebnisse</a:t>
+            </a:r>
+            <a:endParaRPr lang="de-DE" dirty="0"/>
+          </a:p>
+          <a:p>
+            <a:pPr marL="0" indent="0">
+              <a:buNone/>
+            </a:pPr>
+            <a:r>
+              <a:rPr lang="de-DE" dirty="0" smtClean="0"/>
+              <a:t>- Diskussion</a:t>
+            </a:r>
+            <a:endParaRPr lang="de-DE" dirty="0"/>
+          </a:p>
+          <a:p>
+            <a:pPr marL="0" indent="0">
+              <a:buNone/>
+            </a:pPr>
+            <a:r>
+              <a:rPr lang="de-DE" dirty="0" smtClean="0"/>
+              <a:t>- </a:t>
+            </a:r>
+            <a:r>
+              <a:rPr lang="de-DE" dirty="0" smtClean="0"/>
               <a:t>Schlussfolgerung</a:t>
             </a:r>
+            <a:endParaRPr lang="de-DE" dirty="0"/>
           </a:p>
           <a:p>
             <a:endParaRPr lang="de-DE" dirty="0"/>
@@ -13387,7 +13464,7 @@
             </a:r>
             <a:r>
               <a:rPr lang="de-DE" sz="2400" dirty="0" smtClean="0"/>
-              <a:t>(9/11)</a:t>
+              <a:t>(10/11)</a:t>
             </a:r>
             <a:endParaRPr lang="de-DE" sz="2400" dirty="0"/>
           </a:p>
@@ -13409,85 +13486,89 @@
           <a:lstStyle/>
           <a:p>
             <a:r>
-              <a:rPr lang="de-DE" dirty="0"/>
-              <a:t>Demografisch (Alter, Erfahrung, Geschlecht)</a:t>
-            </a:r>
-          </a:p>
-          <a:p>
-            <a:r>
-              <a:rPr lang="de-DE" dirty="0"/>
-              <a:t>Umgebungsvariablen (Stuhleinstellungen)</a:t>
-            </a:r>
-          </a:p>
-          <a:p>
-            <a:r>
-              <a:rPr lang="de-DE" dirty="0"/>
-              <a:t>Dauer des </a:t>
-            </a:r>
-            <a:r>
-              <a:rPr lang="de-DE" dirty="0" err="1"/>
-              <a:t>Wecktons</a:t>
-            </a:r>
-            <a:r>
-              <a:rPr lang="de-DE" dirty="0"/>
-              <a:t> zum Abstellen</a:t>
-            </a:r>
-          </a:p>
-          <a:p>
-            <a:r>
-              <a:rPr lang="de-DE" dirty="0"/>
-              <a:t>Aufgabenergebnisse (Fehlerraten, Zeiten in Gruppen)</a:t>
-            </a:r>
-          </a:p>
-          <a:p>
-            <a:r>
-              <a:rPr lang="de-DE" dirty="0"/>
-              <a:t>Fragebögen (Sam, RSME)</a:t>
-            </a:r>
-          </a:p>
-          <a:p>
-            <a:r>
-              <a:rPr lang="de-DE" dirty="0"/>
-              <a:t>Schlafstatus</a:t>
-            </a:r>
-          </a:p>
-          <a:p>
-            <a:r>
-              <a:rPr lang="de-DE" dirty="0" err="1"/>
-              <a:t>Limesurvey</a:t>
-            </a:r>
-            <a:r>
-              <a:rPr lang="de-DE" dirty="0"/>
-              <a:t> (Müdigkeit vorher/</a:t>
-            </a:r>
-            <a:r>
-              <a:rPr lang="de-DE" dirty="0" err="1"/>
-              <a:t>nachehr</a:t>
-            </a:r>
-            <a:r>
-              <a:rPr lang="de-DE" dirty="0"/>
-              <a:t>, Aufgabenschwierigkeit, Komfort mit VR Brille, ..)</a:t>
-            </a:r>
+              <a:rPr lang="de-DE" dirty="0" smtClean="0">
+                <a:solidFill>
+                  <a:srgbClr val="FF0000"/>
+                </a:solidFill>
+              </a:rPr>
+              <a:t>Hier links geschlafen/nicht geschlafen/meditiert Diagramm</a:t>
+            </a:r>
+          </a:p>
+          <a:p>
+            <a:endParaRPr lang="de-DE" dirty="0">
+              <a:solidFill>
+                <a:srgbClr val="FF0000"/>
+              </a:solidFill>
+            </a:endParaRPr>
+          </a:p>
+          <a:p>
+            <a:r>
+              <a:rPr lang="de-DE" dirty="0">
+                <a:solidFill>
+                  <a:srgbClr val="FF0000"/>
+                </a:solidFill>
+              </a:rPr>
+              <a:t>Und rechts subjektive Schätzung der </a:t>
+            </a:r>
+            <a:r>
+              <a:rPr lang="de-DE" dirty="0" smtClean="0">
+                <a:solidFill>
+                  <a:srgbClr val="FF0000"/>
+                </a:solidFill>
+              </a:rPr>
+              <a:t>Schlafdauer</a:t>
+            </a:r>
+          </a:p>
+          <a:p>
+            <a:r>
+              <a:rPr lang="de-DE" dirty="0" smtClean="0">
+                <a:solidFill>
+                  <a:srgbClr val="FF0000"/>
+                </a:solidFill>
+              </a:rPr>
+              <a:t>(</a:t>
+            </a:r>
+            <a:r>
+              <a:rPr lang="de-DE" dirty="0" err="1" smtClean="0">
+                <a:solidFill>
+                  <a:srgbClr val="FF0000"/>
+                </a:solidFill>
+              </a:rPr>
+              <a:t>empfungen</a:t>
+            </a:r>
+            <a:r>
+              <a:rPr lang="de-DE" dirty="0" smtClean="0">
+                <a:solidFill>
+                  <a:srgbClr val="FF0000"/>
+                </a:solidFill>
+              </a:rPr>
+              <a:t> Schlafdauer unterteilt nach Gruppen?)</a:t>
+            </a:r>
+            <a:endParaRPr lang="de-DE" dirty="0">
+              <a:solidFill>
+                <a:srgbClr val="FF0000"/>
+              </a:solidFill>
+            </a:endParaRPr>
+          </a:p>
+          <a:p>
+            <a:endParaRPr lang="de-DE" dirty="0">
+              <a:solidFill>
+                <a:srgbClr val="FF0000"/>
+              </a:solidFill>
+            </a:endParaRPr>
           </a:p>
         </p:txBody>
       </p:sp>
     </p:spTree>
     <p:extLst>
       <p:ext uri="{BB962C8B-B14F-4D97-AF65-F5344CB8AC3E}">
-        <p14:creationId xmlns:p14="http://schemas.microsoft.com/office/powerpoint/2010/main" val="2393554626"/>
+        <p14:creationId xmlns:p14="http://schemas.microsoft.com/office/powerpoint/2010/main" val="669866523"/>
       </p:ext>
     </p:extLst>
   </p:cSld>
   <p:clrMapOvr>
     <a:masterClrMapping/>
   </p:clrMapOvr>
-  <p:timing>
-    <p:tnLst>
-      <p:par>
-        <p:cTn id="1" dur="indefinite" restart="never" nodeType="tmRoot"/>
-      </p:par>
-    </p:tnLst>
-  </p:timing>
 </p:sld>
 </file>
 
@@ -13529,7 +13610,7 @@
             </a:r>
             <a:r>
               <a:rPr lang="de-DE" sz="2400" dirty="0" smtClean="0"/>
-              <a:t>(10/11)</a:t>
+              <a:t>(11/11)</a:t>
             </a:r>
             <a:endParaRPr lang="de-DE" sz="2400" dirty="0"/>
           </a:p>
@@ -13556,7 +13637,71 @@
                   <a:srgbClr val="FF0000"/>
                 </a:solidFill>
               </a:rPr>
-              <a:t>Hier links geschlafen/nicht geschlafen/meditiert Diagramm</a:t>
+              <a:t>Hier links Übergang Schlafen </a:t>
+            </a:r>
+            <a:r>
+              <a:rPr lang="de-DE" dirty="0" err="1" smtClean="0">
+                <a:solidFill>
+                  <a:srgbClr val="FF0000"/>
+                </a:solidFill>
+              </a:rPr>
+              <a:t>transition</a:t>
+            </a:r>
+            <a:r>
+              <a:rPr lang="de-DE" dirty="0" smtClean="0">
+                <a:solidFill>
+                  <a:srgbClr val="FF0000"/>
+                </a:solidFill>
+              </a:rPr>
+              <a:t> </a:t>
+            </a:r>
+            <a:r>
+              <a:rPr lang="de-DE" dirty="0" err="1" smtClean="0">
+                <a:solidFill>
+                  <a:srgbClr val="FF0000"/>
+                </a:solidFill>
+              </a:rPr>
+              <a:t>sleep</a:t>
+            </a:r>
+            <a:r>
+              <a:rPr lang="de-DE" dirty="0" smtClean="0">
+                <a:solidFill>
+                  <a:srgbClr val="FF0000"/>
+                </a:solidFill>
+              </a:rPr>
+              <a:t> </a:t>
+            </a:r>
+            <a:r>
+              <a:rPr lang="de-DE" dirty="0" err="1" smtClean="0">
+                <a:solidFill>
+                  <a:srgbClr val="FF0000"/>
+                </a:solidFill>
+              </a:rPr>
+              <a:t>solving</a:t>
+            </a:r>
+            <a:r>
+              <a:rPr lang="de-DE" dirty="0" smtClean="0">
+                <a:solidFill>
+                  <a:srgbClr val="FF0000"/>
+                </a:solidFill>
+              </a:rPr>
+              <a:t> </a:t>
+            </a:r>
+            <a:r>
+              <a:rPr lang="de-DE" dirty="0" err="1" smtClean="0">
+                <a:solidFill>
+                  <a:srgbClr val="FF0000"/>
+                </a:solidFill>
+              </a:rPr>
+              <a:t>tasks</a:t>
+            </a:r>
+            <a:r>
+              <a:rPr lang="de-DE" dirty="0" smtClean="0">
+                <a:solidFill>
+                  <a:srgbClr val="FF0000"/>
+                </a:solidFill>
+              </a:rPr>
+              <a:t> Diagramm Balken</a:t>
             </a:r>
           </a:p>
           <a:p>
@@ -13566,68 +13711,12 @@
               </a:solidFill>
             </a:endParaRPr>
           </a:p>
-          <a:p>
-            <a:r>
-              <a:rPr lang="de-DE" dirty="0">
-                <a:solidFill>
-                  <a:srgbClr val="FF0000"/>
-                </a:solidFill>
-              </a:rPr>
-              <a:t>Und rechts subjektive Schätzung der </a:t>
-            </a:r>
-            <a:r>
-              <a:rPr lang="de-DE" dirty="0" smtClean="0">
-                <a:solidFill>
-                  <a:srgbClr val="FF0000"/>
-                </a:solidFill>
-              </a:rPr>
-              <a:t>Schlafdauer</a:t>
-            </a:r>
-          </a:p>
-          <a:p>
-            <a:r>
-              <a:rPr lang="de-DE" dirty="0" smtClean="0">
-                <a:solidFill>
-                  <a:srgbClr val="FF0000"/>
-                </a:solidFill>
-              </a:rPr>
-              <a:t>(</a:t>
-            </a:r>
-            <a:r>
-              <a:rPr lang="de-DE" dirty="0" err="1" smtClean="0">
-                <a:solidFill>
-                  <a:srgbClr val="FF0000"/>
-                </a:solidFill>
-              </a:rPr>
-              <a:t>empfungen</a:t>
-            </a:r>
-            <a:r>
-              <a:rPr lang="de-DE" dirty="0" smtClean="0">
-                <a:solidFill>
-                  <a:srgbClr val="FF0000"/>
-                </a:solidFill>
-              </a:rPr>
-              <a:t> Schlafdauer unterteilt nach Gruppen?)</a:t>
-            </a:r>
-            <a:endParaRPr lang="de-DE" dirty="0">
-              <a:solidFill>
-                <a:srgbClr val="FF0000"/>
-              </a:solidFill>
-            </a:endParaRPr>
-          </a:p>
-          <a:p>
-            <a:endParaRPr lang="de-DE" dirty="0">
-              <a:solidFill>
-                <a:srgbClr val="FF0000"/>
-              </a:solidFill>
-            </a:endParaRPr>
-          </a:p>
         </p:txBody>
       </p:sp>
     </p:spTree>
     <p:extLst>
       <p:ext uri="{BB962C8B-B14F-4D97-AF65-F5344CB8AC3E}">
-        <p14:creationId xmlns:p14="http://schemas.microsoft.com/office/powerpoint/2010/main" val="669866523"/>
+        <p14:creationId xmlns:p14="http://schemas.microsoft.com/office/powerpoint/2010/main" val="3259930981"/>
       </p:ext>
     </p:extLst>
   </p:cSld>
@@ -13671,11 +13760,11 @@
           <a:p>
             <a:r>
               <a:rPr lang="de-DE" dirty="0" smtClean="0"/>
-              <a:t>Ergebnisse </a:t>
+              <a:t>Diskussion </a:t>
             </a:r>
             <a:r>
               <a:rPr lang="de-DE" sz="2400" dirty="0" smtClean="0"/>
-              <a:t>(11/11)</a:t>
+              <a:t>(1/4)</a:t>
             </a:r>
             <a:endParaRPr lang="de-DE" sz="2400" dirty="0"/>
           </a:p>
@@ -13696,98 +13785,69 @@
           <a:bodyPr/>
           <a:lstStyle/>
           <a:p>
-            <a:r>
-              <a:rPr lang="de-DE" dirty="0" smtClean="0">
-                <a:solidFill>
-                  <a:srgbClr val="FF0000"/>
-                </a:solidFill>
-              </a:rPr>
-              <a:t>Hier links Übergang Schlafen </a:t>
-            </a:r>
-            <a:r>
-              <a:rPr lang="de-DE" dirty="0" err="1" smtClean="0">
-                <a:solidFill>
-                  <a:srgbClr val="FF0000"/>
-                </a:solidFill>
-              </a:rPr>
-              <a:t>transition</a:t>
-            </a:r>
-            <a:r>
-              <a:rPr lang="de-DE" dirty="0" smtClean="0">
-                <a:solidFill>
-                  <a:srgbClr val="FF0000"/>
-                </a:solidFill>
-              </a:rPr>
-              <a:t> </a:t>
-            </a:r>
-            <a:r>
-              <a:rPr lang="de-DE" dirty="0" err="1" smtClean="0">
-                <a:solidFill>
-                  <a:srgbClr val="FF0000"/>
-                </a:solidFill>
-              </a:rPr>
-              <a:t>sleep</a:t>
-            </a:r>
-            <a:r>
-              <a:rPr lang="de-DE" dirty="0" smtClean="0">
-                <a:solidFill>
-                  <a:srgbClr val="FF0000"/>
-                </a:solidFill>
-              </a:rPr>
-              <a:t> </a:t>
-            </a:r>
-            <a:r>
-              <a:rPr lang="de-DE" dirty="0" err="1" smtClean="0">
-                <a:solidFill>
-                  <a:srgbClr val="FF0000"/>
-                </a:solidFill>
-              </a:rPr>
-              <a:t>solving</a:t>
-            </a:r>
-            <a:r>
-              <a:rPr lang="de-DE" dirty="0" smtClean="0">
-                <a:solidFill>
-                  <a:srgbClr val="FF0000"/>
-                </a:solidFill>
-              </a:rPr>
-              <a:t> </a:t>
-            </a:r>
-            <a:r>
-              <a:rPr lang="de-DE" dirty="0" err="1" smtClean="0">
-                <a:solidFill>
-                  <a:srgbClr val="FF0000"/>
-                </a:solidFill>
-              </a:rPr>
-              <a:t>tasks</a:t>
-            </a:r>
-            <a:r>
-              <a:rPr lang="de-DE" dirty="0" smtClean="0">
-                <a:solidFill>
-                  <a:srgbClr val="FF0000"/>
-                </a:solidFill>
-              </a:rPr>
-              <a:t> Diagramm Balken</a:t>
-            </a:r>
-          </a:p>
-          <a:p>
-            <a:endParaRPr lang="de-DE" dirty="0">
-              <a:solidFill>
-                <a:srgbClr val="FF0000"/>
-              </a:solidFill>
-            </a:endParaRPr>
+            <a:pPr marL="0" indent="0">
+              <a:buNone/>
+            </a:pPr>
+            <a:r>
+              <a:rPr lang="de-DE" dirty="0" smtClean="0"/>
+              <a:t>- Erfahrung </a:t>
+            </a:r>
+            <a:r>
+              <a:rPr lang="de-DE" dirty="0" smtClean="0"/>
+              <a:t>und Demografie der Teilnehmer</a:t>
+            </a:r>
+          </a:p>
+          <a:p>
+            <a:pPr lvl="1"/>
+            <a:r>
+              <a:rPr lang="de-DE" dirty="0" smtClean="0"/>
+              <a:t>Vorhandene </a:t>
+            </a:r>
+            <a:r>
+              <a:rPr lang="de-DE" dirty="0"/>
+              <a:t>Affinität zur Technik</a:t>
+            </a:r>
+          </a:p>
+          <a:p>
+            <a:pPr lvl="1"/>
+            <a:r>
+              <a:rPr lang="de-DE" dirty="0"/>
+              <a:t>Vorhandene VR Erfahrung</a:t>
+            </a:r>
+          </a:p>
+          <a:p>
+            <a:pPr lvl="1"/>
+            <a:r>
+              <a:rPr lang="de-DE" dirty="0"/>
+              <a:t>Vorhandene Fahrerfahrung</a:t>
+            </a:r>
+          </a:p>
+          <a:p>
+            <a:pPr lvl="1"/>
+            <a:r>
+              <a:rPr lang="de-DE" dirty="0"/>
+              <a:t>Vorhandener Bildungsstand</a:t>
+            </a:r>
           </a:p>
         </p:txBody>
       </p:sp>
     </p:spTree>
     <p:extLst>
       <p:ext uri="{BB962C8B-B14F-4D97-AF65-F5344CB8AC3E}">
-        <p14:creationId xmlns:p14="http://schemas.microsoft.com/office/powerpoint/2010/main" val="3259930981"/>
+        <p14:creationId xmlns:p14="http://schemas.microsoft.com/office/powerpoint/2010/main" val="3554098313"/>
       </p:ext>
     </p:extLst>
   </p:cSld>
   <p:clrMapOvr>
     <a:masterClrMapping/>
   </p:clrMapOvr>
+  <p:timing>
+    <p:tnLst>
+      <p:par>
+        <p:cTn id="1" dur="indefinite" restart="never" nodeType="tmRoot"/>
+      </p:par>
+    </p:tnLst>
+  </p:timing>
 </p:sld>
 </file>
 
@@ -13824,14 +13884,17 @@
           <a:lstStyle/>
           <a:p>
             <a:r>
-              <a:rPr lang="de-DE" dirty="0" smtClean="0"/>
+              <a:rPr lang="de-DE" dirty="0"/>
               <a:t>Diskussion </a:t>
             </a:r>
             <a:r>
               <a:rPr lang="de-DE" sz="2400" dirty="0" smtClean="0"/>
-              <a:t>(1/4)</a:t>
-            </a:r>
-            <a:endParaRPr lang="de-DE" sz="2400" dirty="0"/>
+              <a:t>(2/4</a:t>
+            </a:r>
+            <a:r>
+              <a:rPr lang="de-DE" sz="2400" dirty="0"/>
+              <a:t>)</a:t>
+            </a:r>
           </a:p>
         </p:txBody>
       </p:sp>
@@ -13850,49 +13913,43 @@
           <a:bodyPr/>
           <a:lstStyle/>
           <a:p>
+            <a:pPr marL="0" indent="0">
+              <a:buNone/>
+            </a:pPr>
             <a:r>
               <a:rPr lang="de-DE" dirty="0" smtClean="0"/>
-              <a:t>Erfahrung und Demografie der Teilnehmer</a:t>
-            </a:r>
+              <a:t>- Studiendurchführung</a:t>
+            </a:r>
+            <a:endParaRPr lang="de-DE" dirty="0" smtClean="0"/>
           </a:p>
           <a:p>
             <a:pPr lvl="1"/>
             <a:r>
               <a:rPr lang="de-DE" dirty="0" smtClean="0"/>
-              <a:t>Vorhandene </a:t>
-            </a:r>
-            <a:r>
-              <a:rPr lang="de-DE" dirty="0"/>
-              <a:t>Affinität zur Technik</a:t>
+              <a:t>Ort und Zeit</a:t>
             </a:r>
           </a:p>
           <a:p>
             <a:pPr lvl="1"/>
             <a:r>
-              <a:rPr lang="de-DE" dirty="0"/>
-              <a:t>Vorhandene VR Erfahrung</a:t>
+              <a:rPr lang="de-DE" dirty="0" smtClean="0"/>
+              <a:t>‚Störende‘ Faktoren</a:t>
             </a:r>
           </a:p>
           <a:p>
             <a:pPr lvl="1"/>
             <a:r>
-              <a:rPr lang="de-DE" dirty="0"/>
-              <a:t>Vorhandene Fahrerfahrung</a:t>
-            </a:r>
-          </a:p>
-          <a:p>
-            <a:pPr lvl="1"/>
-            <a:r>
-              <a:rPr lang="de-DE" dirty="0"/>
-              <a:t>Vorhandener Bildungsstand</a:t>
-            </a:r>
+              <a:rPr lang="de-DE" dirty="0" smtClean="0"/>
+              <a:t>Realitätsnähe</a:t>
+            </a:r>
+            <a:endParaRPr lang="de-DE" dirty="0"/>
           </a:p>
         </p:txBody>
       </p:sp>
     </p:spTree>
     <p:extLst>
       <p:ext uri="{BB962C8B-B14F-4D97-AF65-F5344CB8AC3E}">
-        <p14:creationId xmlns:p14="http://schemas.microsoft.com/office/powerpoint/2010/main" val="3554098313"/>
+        <p14:creationId xmlns:p14="http://schemas.microsoft.com/office/powerpoint/2010/main" val="1683365169"/>
       </p:ext>
     </p:extLst>
   </p:cSld>
@@ -13947,7 +14004,7 @@
             </a:r>
             <a:r>
               <a:rPr lang="de-DE" sz="2400" dirty="0" smtClean="0"/>
-              <a:t>(2/4</a:t>
+              <a:t>(3/4</a:t>
             </a:r>
             <a:r>
               <a:rPr lang="de-DE" sz="2400" dirty="0"/>
@@ -13971,30 +14028,27 @@
           <a:bodyPr/>
           <a:lstStyle/>
           <a:p>
+            <a:pPr marL="0" indent="0">
+              <a:buNone/>
+            </a:pPr>
             <a:r>
               <a:rPr lang="de-DE" dirty="0" smtClean="0"/>
-              <a:t>Studiendurchführung</a:t>
-            </a:r>
+              <a:t>- Aufgaben</a:t>
+            </a:r>
+            <a:endParaRPr lang="de-DE" dirty="0" smtClean="0"/>
           </a:p>
           <a:p>
             <a:pPr lvl="1"/>
             <a:r>
               <a:rPr lang="de-DE" dirty="0" smtClean="0"/>
-              <a:t>Ort und Zeit</a:t>
+              <a:t>Aufgabenwahl</a:t>
             </a:r>
           </a:p>
           <a:p>
             <a:pPr lvl="1"/>
             <a:r>
               <a:rPr lang="de-DE" dirty="0" smtClean="0"/>
-              <a:t>‚Störende‘ Faktoren</a:t>
-            </a:r>
-          </a:p>
-          <a:p>
-            <a:pPr lvl="1"/>
-            <a:r>
-              <a:rPr lang="de-DE" dirty="0" smtClean="0"/>
-              <a:t>Realitätsnähe</a:t>
+              <a:t>Aufgabenbeschreibung</a:t>
             </a:r>
             <a:endParaRPr lang="de-DE" dirty="0"/>
           </a:p>
@@ -14003,7 +14057,7 @@
     </p:spTree>
     <p:extLst>
       <p:ext uri="{BB962C8B-B14F-4D97-AF65-F5344CB8AC3E}">
-        <p14:creationId xmlns:p14="http://schemas.microsoft.com/office/powerpoint/2010/main" val="1683365169"/>
+        <p14:creationId xmlns:p14="http://schemas.microsoft.com/office/powerpoint/2010/main" val="2513655209"/>
       </p:ext>
     </p:extLst>
   </p:cSld>
@@ -14058,7 +14112,7 @@
             </a:r>
             <a:r>
               <a:rPr lang="de-DE" sz="2400" dirty="0" smtClean="0"/>
-              <a:t>(3/4</a:t>
+              <a:t>(4/4</a:t>
             </a:r>
             <a:r>
               <a:rPr lang="de-DE" sz="2400" dirty="0"/>
@@ -14082,9 +14136,27 @@
           <a:bodyPr/>
           <a:lstStyle/>
           <a:p>
+            <a:pPr marL="0" indent="0">
+              <a:buNone/>
+            </a:pPr>
             <a:r>
               <a:rPr lang="de-DE" dirty="0" smtClean="0"/>
-              <a:t>Aufgaben</a:t>
+              <a:t>- Zukunftsaussicht</a:t>
+            </a:r>
+            <a:endParaRPr lang="de-DE" dirty="0" smtClean="0"/>
+          </a:p>
+          <a:p>
+            <a:pPr lvl="1"/>
+            <a:r>
+              <a:rPr lang="de-DE" dirty="0" smtClean="0"/>
+              <a:t>Demografie</a:t>
+            </a:r>
+          </a:p>
+          <a:p>
+            <a:pPr lvl="1"/>
+            <a:r>
+              <a:rPr lang="de-DE" dirty="0" smtClean="0"/>
+              <a:t>Studiendurchführung</a:t>
             </a:r>
           </a:p>
           <a:p>
@@ -14092,13 +14164,6 @@
             <a:r>
               <a:rPr lang="de-DE" dirty="0" smtClean="0"/>
               <a:t>Aufgabenwahl</a:t>
-            </a:r>
-          </a:p>
-          <a:p>
-            <a:pPr lvl="1"/>
-            <a:r>
-              <a:rPr lang="de-DE" dirty="0" smtClean="0"/>
-              <a:t>Aufgabenbeschreibung</a:t>
             </a:r>
             <a:endParaRPr lang="de-DE" dirty="0"/>
           </a:p>
@@ -14107,7 +14172,7 @@
     </p:spTree>
     <p:extLst>
       <p:ext uri="{BB962C8B-B14F-4D97-AF65-F5344CB8AC3E}">
-        <p14:creationId xmlns:p14="http://schemas.microsoft.com/office/powerpoint/2010/main" val="2513655209"/>
+        <p14:creationId xmlns:p14="http://schemas.microsoft.com/office/powerpoint/2010/main" val="397659059"/>
       </p:ext>
     </p:extLst>
   </p:cSld>
@@ -14158,15 +14223,7 @@
           <a:p>
             <a:r>
               <a:rPr lang="de-DE" dirty="0"/>
-              <a:t>Diskussion </a:t>
-            </a:r>
-            <a:r>
-              <a:rPr lang="de-DE" sz="2400" dirty="0" smtClean="0"/>
-              <a:t>(4/4</a:t>
-            </a:r>
-            <a:r>
-              <a:rPr lang="de-DE" sz="2400" dirty="0"/>
-              <a:t>)</a:t>
+              <a:t>Schlussfolgerung</a:t>
             </a:r>
           </a:p>
         </p:txBody>
@@ -14186,39 +14243,71 @@
           <a:bodyPr/>
           <a:lstStyle/>
           <a:p>
+            <a:pPr>
+              <a:buFontTx/>
+              <a:buChar char="-"/>
+            </a:pPr>
             <a:r>
               <a:rPr lang="de-DE" dirty="0" smtClean="0"/>
-              <a:t>Zukunftsaussicht</a:t>
-            </a:r>
-          </a:p>
-          <a:p>
-            <a:pPr lvl="1"/>
+              <a:t>VR</a:t>
+            </a:r>
+          </a:p>
+          <a:p>
+            <a:pPr>
+              <a:buFontTx/>
+              <a:buChar char="-"/>
+            </a:pPr>
             <a:r>
               <a:rPr lang="de-DE" dirty="0" smtClean="0"/>
-              <a:t>Demografie</a:t>
-            </a:r>
-          </a:p>
-          <a:p>
-            <a:pPr lvl="1"/>
+              <a:t>Hypothesen </a:t>
+            </a:r>
+            <a:r>
+              <a:rPr lang="de-DE" dirty="0"/>
+              <a:t>und Parameter und </a:t>
+            </a:r>
             <a:r>
               <a:rPr lang="de-DE" dirty="0" smtClean="0"/>
-              <a:t>Studiendurchführung</a:t>
-            </a:r>
-          </a:p>
-          <a:p>
-            <a:pPr lvl="1"/>
+              <a:t>Gruppen</a:t>
+            </a:r>
+          </a:p>
+          <a:p>
+            <a:pPr>
+              <a:buFontTx/>
+              <a:buChar char="-"/>
+            </a:pPr>
             <a:r>
               <a:rPr lang="de-DE" dirty="0" smtClean="0"/>
-              <a:t>Aufgabenwahl</a:t>
-            </a:r>
-            <a:endParaRPr lang="de-DE" dirty="0"/>
+              <a:t>Bewertung </a:t>
+            </a:r>
+            <a:r>
+              <a:rPr lang="de-DE" dirty="0"/>
+              <a:t>der </a:t>
+            </a:r>
+            <a:r>
+              <a:rPr lang="de-DE" dirty="0" smtClean="0"/>
+              <a:t>Ergebnisse</a:t>
+            </a:r>
+          </a:p>
+          <a:p>
+            <a:pPr>
+              <a:buFontTx/>
+              <a:buChar char="-"/>
+            </a:pPr>
+            <a:r>
+              <a:rPr lang="de-DE" dirty="0" smtClean="0"/>
+              <a:t>Zukünftige </a:t>
+            </a:r>
+            <a:r>
+              <a:rPr lang="de-DE" dirty="0"/>
+              <a:t>Forschung</a:t>
+            </a:r>
           </a:p>
         </p:txBody>
       </p:sp>
     </p:spTree>
     <p:extLst>
       <p:ext uri="{BB962C8B-B14F-4D97-AF65-F5344CB8AC3E}">
-        <p14:creationId xmlns:p14="http://schemas.microsoft.com/office/powerpoint/2010/main" val="397659059"/>
+        <p14:creationId xmlns:p14="http://schemas.microsoft.com/office/powerpoint/2010/main" val="284220317"/>
       </p:ext>
     </p:extLst>
   </p:cSld>
@@ -14267,105 +14356,6 @@
           <a:bodyPr/>
           <a:lstStyle/>
           <a:p>
-            <a:r>
-              <a:rPr lang="de-DE" dirty="0"/>
-              <a:t>Schlussfolgerung</a:t>
-            </a:r>
-          </a:p>
-        </p:txBody>
-      </p:sp>
-      <p:sp>
-        <p:nvSpPr>
-          <p:cNvPr id="3" name="Inhaltsplatzhalter 2"/>
-          <p:cNvSpPr>
-            <a:spLocks noGrp="1"/>
-          </p:cNvSpPr>
-          <p:nvPr>
-            <p:ph idx="1"/>
-          </p:nvPr>
-        </p:nvSpPr>
-        <p:spPr/>
-        <p:txBody>
-          <a:bodyPr/>
-          <a:lstStyle/>
-          <a:p>
-            <a:r>
-              <a:rPr lang="de-DE" dirty="0"/>
-              <a:t>VR</a:t>
-            </a:r>
-          </a:p>
-          <a:p>
-            <a:r>
-              <a:rPr lang="de-DE" dirty="0"/>
-              <a:t>Hypothesen und Parameter und Gruppen</a:t>
-            </a:r>
-          </a:p>
-          <a:p>
-            <a:r>
-              <a:rPr lang="de-DE" dirty="0"/>
-              <a:t>Bewertung der Ergebnisse</a:t>
-            </a:r>
-          </a:p>
-          <a:p>
-            <a:r>
-              <a:rPr lang="de-DE" dirty="0"/>
-              <a:t>Zukünftige Forschung</a:t>
-            </a:r>
-          </a:p>
-        </p:txBody>
-      </p:sp>
-    </p:spTree>
-    <p:extLst>
-      <p:ext uri="{BB962C8B-B14F-4D97-AF65-F5344CB8AC3E}">
-        <p14:creationId xmlns:p14="http://schemas.microsoft.com/office/powerpoint/2010/main" val="284220317"/>
-      </p:ext>
-    </p:extLst>
-  </p:cSld>
-  <p:clrMapOvr>
-    <a:masterClrMapping/>
-  </p:clrMapOvr>
-  <p:timing>
-    <p:tnLst>
-      <p:par>
-        <p:cTn id="1" dur="indefinite" restart="never" nodeType="tmRoot"/>
-      </p:par>
-    </p:tnLst>
-  </p:timing>
-</p:sld>
-</file>
-
-<file path=ppt/slides/slide28.xml><?xml version="1.0" encoding="utf-8"?>
-<p:sld xmlns:a="http://schemas.openxmlformats.org/drawingml/2006/main" xmlns:r="http://schemas.openxmlformats.org/officeDocument/2006/relationships" xmlns:p="http://schemas.openxmlformats.org/presentationml/2006/main">
-  <p:cSld>
-    <p:spTree>
-      <p:nvGrpSpPr>
-        <p:cNvPr id="1" name=""/>
-        <p:cNvGrpSpPr/>
-        <p:nvPr/>
-      </p:nvGrpSpPr>
-      <p:grpSpPr>
-        <a:xfrm>
-          <a:off x="0" y="0"/>
-          <a:ext cx="0" cy="0"/>
-          <a:chOff x="0" y="0"/>
-          <a:chExt cx="0" cy="0"/>
-        </a:xfrm>
-      </p:grpSpPr>
-      <p:sp>
-        <p:nvSpPr>
-          <p:cNvPr id="2" name="Titel 1"/>
-          <p:cNvSpPr>
-            <a:spLocks noGrp="1"/>
-          </p:cNvSpPr>
-          <p:nvPr>
-            <p:ph type="title"/>
-          </p:nvPr>
-        </p:nvSpPr>
-        <p:spPr/>
-        <p:txBody>
-          <a:bodyPr/>
-          <a:lstStyle/>
-          <a:p>
             <a:endParaRPr lang="de-DE"/>
           </a:p>
         </p:txBody>
@@ -14447,6 +14437,94 @@
 </p:sld>
 </file>
 
+<file path=ppt/slides/slide28.xml><?xml version="1.0" encoding="utf-8"?>
+<p:sld xmlns:a="http://schemas.openxmlformats.org/drawingml/2006/main" xmlns:r="http://schemas.openxmlformats.org/officeDocument/2006/relationships" xmlns:p="http://schemas.openxmlformats.org/presentationml/2006/main">
+  <p:cSld>
+    <p:spTree>
+      <p:nvGrpSpPr>
+        <p:cNvPr id="1" name=""/>
+        <p:cNvGrpSpPr/>
+        <p:nvPr/>
+      </p:nvGrpSpPr>
+      <p:grpSpPr>
+        <a:xfrm>
+          <a:off x="0" y="0"/>
+          <a:ext cx="0" cy="0"/>
+          <a:chOff x="0" y="0"/>
+          <a:chExt cx="0" cy="0"/>
+        </a:xfrm>
+      </p:grpSpPr>
+      <p:sp>
+        <p:nvSpPr>
+          <p:cNvPr id="2" name="Titel 1"/>
+          <p:cNvSpPr>
+            <a:spLocks noGrp="1"/>
+          </p:cNvSpPr>
+          <p:nvPr>
+            <p:ph type="title"/>
+          </p:nvPr>
+        </p:nvSpPr>
+        <p:spPr/>
+        <p:txBody>
+          <a:bodyPr/>
+          <a:lstStyle/>
+          <a:p>
+            <a:r>
+              <a:rPr lang="de-DE" dirty="0" smtClean="0"/>
+              <a:t>Anhang </a:t>
+            </a:r>
+            <a:r>
+              <a:rPr lang="de-DE" sz="2400" dirty="0" smtClean="0"/>
+              <a:t>(1/10)</a:t>
+            </a:r>
+            <a:endParaRPr lang="de-DE" sz="2400" dirty="0"/>
+          </a:p>
+        </p:txBody>
+      </p:sp>
+      <p:sp>
+        <p:nvSpPr>
+          <p:cNvPr id="3" name="Inhaltsplatzhalter 2"/>
+          <p:cNvSpPr>
+            <a:spLocks noGrp="1"/>
+          </p:cNvSpPr>
+          <p:nvPr>
+            <p:ph idx="1"/>
+          </p:nvPr>
+        </p:nvSpPr>
+        <p:spPr/>
+        <p:txBody>
+          <a:bodyPr/>
+          <a:lstStyle/>
+          <a:p>
+            <a:r>
+              <a:rPr lang="de-DE" dirty="0" smtClean="0">
+                <a:solidFill>
+                  <a:srgbClr val="FF0000"/>
+                </a:solidFill>
+              </a:rPr>
+              <a:t>Hier VR/AR Erfahrung</a:t>
+            </a:r>
+            <a:endParaRPr lang="de-DE" dirty="0">
+              <a:solidFill>
+                <a:srgbClr val="FF0000"/>
+              </a:solidFill>
+            </a:endParaRPr>
+          </a:p>
+        </p:txBody>
+      </p:sp>
+    </p:spTree>
+    <p:extLst>
+      <p:ext uri="{BB962C8B-B14F-4D97-AF65-F5344CB8AC3E}">
+        <p14:creationId xmlns:p14="http://schemas.microsoft.com/office/powerpoint/2010/main" val="2071044175"/>
+      </p:ext>
+    </p:extLst>
+  </p:cSld>
+  <p:clrMapOvr>
+    <a:masterClrMapping/>
+  </p:clrMapOvr>
+</p:sld>
+</file>
+
 <file path=ppt/slides/slide29.xml><?xml version="1.0" encoding="utf-8"?>
 <p:sld xmlns:a="http://schemas.openxmlformats.org/drawingml/2006/main" xmlns:r="http://schemas.openxmlformats.org/officeDocument/2006/relationships" xmlns:p="http://schemas.openxmlformats.org/presentationml/2006/main">
   <p:cSld>
@@ -14485,7 +14563,7 @@
             </a:r>
             <a:r>
               <a:rPr lang="de-DE" sz="2400" dirty="0" smtClean="0"/>
-              <a:t>(1/10)</a:t>
+              <a:t>(2/10)</a:t>
             </a:r>
             <a:endParaRPr lang="de-DE" sz="2400" dirty="0"/>
           </a:p>
@@ -14512,7 +14590,7 @@
                   <a:srgbClr val="FF0000"/>
                 </a:solidFill>
               </a:rPr>
-              <a:t>Hier VR/AR Erfahrung</a:t>
+              <a:t>hier SAM vorhernachher /RSME (nach Gruppen Tabelle)</a:t>
             </a:r>
             <a:endParaRPr lang="de-DE" dirty="0">
               <a:solidFill>
@@ -14525,7 +14603,7 @@
     </p:spTree>
     <p:extLst>
       <p:ext uri="{BB962C8B-B14F-4D97-AF65-F5344CB8AC3E}">
-        <p14:creationId xmlns:p14="http://schemas.microsoft.com/office/powerpoint/2010/main" val="2071044175"/>
+        <p14:creationId xmlns:p14="http://schemas.microsoft.com/office/powerpoint/2010/main" val="1368395424"/>
       </p:ext>
     </p:extLst>
   </p:cSld>
@@ -14591,24 +14669,41 @@
           </a:bodyPr>
           <a:lstStyle/>
           <a:p>
+            <a:pPr marL="0" indent="0">
+              <a:buNone/>
+            </a:pPr>
+            <a:r>
+              <a:rPr lang="de-DE" dirty="0" smtClean="0"/>
+              <a:t>- Schnittstelle </a:t>
+            </a:r>
             <a:r>
               <a:rPr lang="de-DE" dirty="0"/>
-              <a:t>Schnittstelle VR und Realität</a:t>
-            </a:r>
-          </a:p>
-          <a:p>
+              <a:t>VR und Realität</a:t>
+            </a:r>
+          </a:p>
+          <a:p>
+            <a:pPr marL="0" indent="0">
+              <a:buNone/>
+            </a:pPr>
+            <a:r>
+              <a:rPr lang="de-DE" dirty="0" smtClean="0"/>
+              <a:t>- AR/VR </a:t>
+            </a:r>
             <a:r>
               <a:rPr lang="de-DE" dirty="0"/>
-              <a:t>AR/VR fester Bestandteil im Alltag</a:t>
-            </a:r>
-          </a:p>
-          <a:p>
-            <a:r>
-              <a:rPr lang="de-DE" dirty="0"/>
-              <a:t>Smart-</a:t>
-            </a:r>
-            <a:r>
-              <a:rPr lang="de-DE" dirty="0" err="1"/>
+              <a:t>fester Bestandteil im Alltag</a:t>
+            </a:r>
+          </a:p>
+          <a:p>
+            <a:pPr marL="0" indent="0">
+              <a:buNone/>
+            </a:pPr>
+            <a:r>
+              <a:rPr lang="de-DE" dirty="0" smtClean="0"/>
+              <a:t>- Smart-</a:t>
+            </a:r>
+            <a:r>
+              <a:rPr lang="de-DE" dirty="0" err="1" smtClean="0"/>
               <a:t>Mirrors</a:t>
             </a:r>
             <a:r>
@@ -14625,36 +14720,77 @@
             </a:r>
           </a:p>
           <a:p>
+            <a:pPr marL="0" indent="0">
+              <a:buNone/>
+            </a:pPr>
+            <a:r>
+              <a:rPr lang="de-DE" dirty="0" smtClean="0"/>
+              <a:t>- Autonomes </a:t>
+            </a:r>
             <a:r>
               <a:rPr lang="de-DE" dirty="0"/>
-              <a:t>Autonomes Fahren</a:t>
+              <a:t>Fahren</a:t>
             </a:r>
           </a:p>
           <a:p>
             <a:endParaRPr lang="de-DE" dirty="0"/>
           </a:p>
           <a:p>
+            <a:pPr marL="0" indent="0">
+              <a:buNone/>
+            </a:pPr>
+            <a:r>
+              <a:rPr lang="de-DE" dirty="0" smtClean="0"/>
+              <a:t>- Übergang </a:t>
+            </a:r>
             <a:r>
               <a:rPr lang="de-DE" dirty="0"/>
-              <a:t>Übergang Ruhephase und Arbeitsphase</a:t>
-            </a:r>
-          </a:p>
-          <a:p>
+              <a:t>Ruhephase und Arbeitsphase</a:t>
+            </a:r>
+          </a:p>
+          <a:p>
+            <a:pPr>
+              <a:buFontTx/>
+              <a:buChar char="-"/>
+            </a:pPr>
+            <a:r>
+              <a:rPr lang="de-DE" dirty="0" smtClean="0"/>
+              <a:t>Leistungsfähigkeit </a:t>
+            </a:r>
             <a:r>
               <a:rPr lang="de-DE" dirty="0"/>
-              <a:t>Leistungsfähigkeit nach Ruhephase</a:t>
-            </a:r>
-          </a:p>
-          <a:p>
+              <a:t>nach </a:t>
+            </a:r>
+            <a:r>
+              <a:rPr lang="de-DE" dirty="0" smtClean="0"/>
+              <a:t>Ruhephase</a:t>
+            </a:r>
+          </a:p>
+          <a:p>
+            <a:pPr>
+              <a:buFontTx/>
+              <a:buChar char="-"/>
+            </a:pPr>
+            <a:r>
+              <a:rPr lang="de-DE" dirty="0" smtClean="0"/>
+              <a:t>Aufmerksamkeit</a:t>
+            </a:r>
             <a:r>
               <a:rPr lang="de-DE" dirty="0"/>
-              <a:t>Aufmerksamkeit, Wachsamkeit, Zuverlässigkeit</a:t>
-            </a:r>
-          </a:p>
-          <a:p>
+              <a:t>, Wachsamkeit, Zuverlässigkeit</a:t>
+            </a:r>
+          </a:p>
+          <a:p>
+            <a:pPr marL="0" indent="0">
+              <a:buNone/>
+            </a:pPr>
+            <a:r>
+              <a:rPr lang="de-DE" dirty="0" smtClean="0"/>
+              <a:t>- Vorbereitung </a:t>
+            </a:r>
             <a:r>
               <a:rPr lang="de-DE" dirty="0"/>
-              <a:t>Vorbereitung auf Aufgabe</a:t>
+              <a:t>auf Aufgabe</a:t>
             </a:r>
           </a:p>
           <a:p>
@@ -14720,7 +14856,7 @@
             </a:r>
             <a:r>
               <a:rPr lang="de-DE" sz="2400" dirty="0" smtClean="0"/>
-              <a:t>(2/10)</a:t>
+              <a:t>(3/10)</a:t>
             </a:r>
             <a:endParaRPr lang="de-DE" sz="2400" dirty="0"/>
           </a:p>
@@ -14747,7 +14883,7 @@
                   <a:srgbClr val="FF0000"/>
                 </a:solidFill>
               </a:rPr>
-              <a:t>hier SAM vorhernachher /RSME (nach Gruppen Tabelle)</a:t>
+              <a:t>Hier links Stuhlgrafik, rechts Tabelle Stuhlwinkeleinstellungen</a:t>
             </a:r>
             <a:endParaRPr lang="de-DE" dirty="0">
               <a:solidFill>
@@ -14760,7 +14896,7 @@
     </p:spTree>
     <p:extLst>
       <p:ext uri="{BB962C8B-B14F-4D97-AF65-F5344CB8AC3E}">
-        <p14:creationId xmlns:p14="http://schemas.microsoft.com/office/powerpoint/2010/main" val="1368395424"/>
+        <p14:creationId xmlns:p14="http://schemas.microsoft.com/office/powerpoint/2010/main" val="1801311271"/>
       </p:ext>
     </p:extLst>
   </p:cSld>
@@ -14808,7 +14944,7 @@
             </a:r>
             <a:r>
               <a:rPr lang="de-DE" sz="2400" dirty="0" smtClean="0"/>
-              <a:t>(3/10)</a:t>
+              <a:t>(4/10)</a:t>
             </a:r>
             <a:endParaRPr lang="de-DE" sz="2400" dirty="0"/>
           </a:p>
@@ -14835,7 +14971,62 @@
                   <a:srgbClr val="FF0000"/>
                 </a:solidFill>
               </a:rPr>
-              <a:t>Hier links Stuhlgrafik, rechts Tabelle Stuhlwinkeleinstellungen</a:t>
+              <a:t>Hier Dauer des </a:t>
+            </a:r>
+            <a:r>
+              <a:rPr lang="de-DE" dirty="0" err="1" smtClean="0">
+                <a:solidFill>
+                  <a:srgbClr val="FF0000"/>
+                </a:solidFill>
+              </a:rPr>
+              <a:t>Wecktons</a:t>
+            </a:r>
+            <a:endParaRPr lang="de-DE" dirty="0" smtClean="0">
+              <a:solidFill>
+                <a:srgbClr val="FF0000"/>
+              </a:solidFill>
+            </a:endParaRPr>
+          </a:p>
+          <a:p>
+            <a:r>
+              <a:rPr lang="de-DE" dirty="0" smtClean="0">
+                <a:solidFill>
+                  <a:srgbClr val="FF0000"/>
+                </a:solidFill>
+              </a:rPr>
+              <a:t>(Zu wenig für eine </a:t>
+            </a:r>
+            <a:r>
+              <a:rPr lang="de-DE" dirty="0" err="1" smtClean="0">
+                <a:solidFill>
+                  <a:srgbClr val="FF0000"/>
+                </a:solidFill>
+              </a:rPr>
+              <a:t>seite</a:t>
+            </a:r>
+            <a:r>
+              <a:rPr lang="de-DE" dirty="0" smtClean="0">
+                <a:solidFill>
+                  <a:srgbClr val="FF0000"/>
+                </a:solidFill>
+              </a:rPr>
+              <a:t> oder egal weil eh nur </a:t>
+            </a:r>
+            <a:r>
+              <a:rPr lang="de-DE" dirty="0" err="1" smtClean="0">
+                <a:solidFill>
+                  <a:srgbClr val="FF0000"/>
+                </a:solidFill>
+              </a:rPr>
+              <a:t>anhang</a:t>
+            </a:r>
+            <a:r>
+              <a:rPr lang="de-DE" dirty="0" smtClean="0">
+                <a:solidFill>
+                  <a:srgbClr val="FF0000"/>
+                </a:solidFill>
+              </a:rPr>
+              <a:t>?)</a:t>
             </a:r>
             <a:endParaRPr lang="de-DE" dirty="0">
               <a:solidFill>
@@ -14848,7 +15039,7 @@
     </p:spTree>
     <p:extLst>
       <p:ext uri="{BB962C8B-B14F-4D97-AF65-F5344CB8AC3E}">
-        <p14:creationId xmlns:p14="http://schemas.microsoft.com/office/powerpoint/2010/main" val="1801311271"/>
+        <p14:creationId xmlns:p14="http://schemas.microsoft.com/office/powerpoint/2010/main" val="134662178"/>
       </p:ext>
     </p:extLst>
   </p:cSld>
@@ -14896,7 +15087,7 @@
             </a:r>
             <a:r>
               <a:rPr lang="de-DE" sz="2400" dirty="0" smtClean="0"/>
-              <a:t>(4/10)</a:t>
+              <a:t>(5/10)</a:t>
             </a:r>
             <a:endParaRPr lang="de-DE" sz="2400" dirty="0"/>
           </a:p>
@@ -14923,62 +15114,7 @@
                   <a:srgbClr val="FF0000"/>
                 </a:solidFill>
               </a:rPr>
-              <a:t>Hier Dauer des </a:t>
-            </a:r>
-            <a:r>
-              <a:rPr lang="de-DE" dirty="0" err="1" smtClean="0">
-                <a:solidFill>
-                  <a:srgbClr val="FF0000"/>
-                </a:solidFill>
-              </a:rPr>
-              <a:t>Wecktons</a:t>
-            </a:r>
-            <a:endParaRPr lang="de-DE" dirty="0" smtClean="0">
-              <a:solidFill>
-                <a:srgbClr val="FF0000"/>
-              </a:solidFill>
-            </a:endParaRPr>
-          </a:p>
-          <a:p>
-            <a:r>
-              <a:rPr lang="de-DE" dirty="0" smtClean="0">
-                <a:solidFill>
-                  <a:srgbClr val="FF0000"/>
-                </a:solidFill>
-              </a:rPr>
-              <a:t>(Zu wenig für eine </a:t>
-            </a:r>
-            <a:r>
-              <a:rPr lang="de-DE" dirty="0" err="1" smtClean="0">
-                <a:solidFill>
-                  <a:srgbClr val="FF0000"/>
-                </a:solidFill>
-              </a:rPr>
-              <a:t>seite</a:t>
-            </a:r>
-            <a:r>
-              <a:rPr lang="de-DE" dirty="0" smtClean="0">
-                <a:solidFill>
-                  <a:srgbClr val="FF0000"/>
-                </a:solidFill>
-              </a:rPr>
-              <a:t> oder egal weil eh nur </a:t>
-            </a:r>
-            <a:r>
-              <a:rPr lang="de-DE" dirty="0" err="1" smtClean="0">
-                <a:solidFill>
-                  <a:srgbClr val="FF0000"/>
-                </a:solidFill>
-              </a:rPr>
-              <a:t>anhang</a:t>
-            </a:r>
-            <a:r>
-              <a:rPr lang="de-DE" dirty="0" smtClean="0">
-                <a:solidFill>
-                  <a:srgbClr val="FF0000"/>
-                </a:solidFill>
-              </a:rPr>
-              <a:t>?)</a:t>
+              <a:t>Hier vorher nachher müde Balkendiagramm</a:t>
             </a:r>
             <a:endParaRPr lang="de-DE" dirty="0">
               <a:solidFill>
@@ -14991,7 +15127,7 @@
     </p:spTree>
     <p:extLst>
       <p:ext uri="{BB962C8B-B14F-4D97-AF65-F5344CB8AC3E}">
-        <p14:creationId xmlns:p14="http://schemas.microsoft.com/office/powerpoint/2010/main" val="134662178"/>
+        <p14:creationId xmlns:p14="http://schemas.microsoft.com/office/powerpoint/2010/main" val="4247055615"/>
       </p:ext>
     </p:extLst>
   </p:cSld>
@@ -15039,7 +15175,7 @@
             </a:r>
             <a:r>
               <a:rPr lang="de-DE" sz="2400" dirty="0" smtClean="0"/>
-              <a:t>(5/10)</a:t>
+              <a:t>(6/10)</a:t>
             </a:r>
             <a:endParaRPr lang="de-DE" sz="2400" dirty="0"/>
           </a:p>
@@ -15066,7 +15202,71 @@
                   <a:srgbClr val="FF0000"/>
                 </a:solidFill>
               </a:rPr>
-              <a:t>Hier vorher nachher müde Balkendiagramm</a:t>
+              <a:t>Hier </a:t>
+            </a:r>
+            <a:r>
+              <a:rPr lang="de-DE" dirty="0" err="1" smtClean="0">
+                <a:solidFill>
+                  <a:srgbClr val="FF0000"/>
+                </a:solidFill>
+              </a:rPr>
+              <a:t>felt</a:t>
+            </a:r>
+            <a:r>
+              <a:rPr lang="de-DE" dirty="0" smtClean="0">
+                <a:solidFill>
+                  <a:srgbClr val="FF0000"/>
+                </a:solidFill>
+              </a:rPr>
+              <a:t> </a:t>
+            </a:r>
+            <a:r>
+              <a:rPr lang="de-DE" dirty="0" err="1" smtClean="0">
+                <a:solidFill>
+                  <a:srgbClr val="FF0000"/>
+                </a:solidFill>
+              </a:rPr>
+              <a:t>comfortable</a:t>
+            </a:r>
+            <a:r>
+              <a:rPr lang="de-DE" dirty="0" smtClean="0">
+                <a:solidFill>
+                  <a:srgbClr val="FF0000"/>
+                </a:solidFill>
+              </a:rPr>
+              <a:t> </a:t>
+            </a:r>
+            <a:r>
+              <a:rPr lang="de-DE" dirty="0" err="1" smtClean="0">
+                <a:solidFill>
+                  <a:srgbClr val="FF0000"/>
+                </a:solidFill>
+              </a:rPr>
+              <a:t>sleeping</a:t>
+            </a:r>
+            <a:r>
+              <a:rPr lang="de-DE" dirty="0" smtClean="0">
+                <a:solidFill>
+                  <a:srgbClr val="FF0000"/>
+                </a:solidFill>
+              </a:rPr>
+              <a:t> </a:t>
+            </a:r>
+            <a:r>
+              <a:rPr lang="de-DE" dirty="0" err="1" smtClean="0">
+                <a:solidFill>
+                  <a:srgbClr val="FF0000"/>
+                </a:solidFill>
+              </a:rPr>
+              <a:t>with</a:t>
+            </a:r>
+            <a:r>
+              <a:rPr lang="de-DE" dirty="0" smtClean="0">
+                <a:solidFill>
+                  <a:srgbClr val="FF0000"/>
+                </a:solidFill>
+              </a:rPr>
+              <a:t> VR</a:t>
             </a:r>
             <a:endParaRPr lang="de-DE" dirty="0">
               <a:solidFill>
@@ -15079,7 +15279,7 @@
     </p:spTree>
     <p:extLst>
       <p:ext uri="{BB962C8B-B14F-4D97-AF65-F5344CB8AC3E}">
-        <p14:creationId xmlns:p14="http://schemas.microsoft.com/office/powerpoint/2010/main" val="4247055615"/>
+        <p14:creationId xmlns:p14="http://schemas.microsoft.com/office/powerpoint/2010/main" val="394906128"/>
       </p:ext>
     </p:extLst>
   </p:cSld>
@@ -15127,7 +15327,7 @@
             </a:r>
             <a:r>
               <a:rPr lang="de-DE" sz="2400" dirty="0" smtClean="0"/>
-              <a:t>(6/10)</a:t>
+              <a:t>(7/10)</a:t>
             </a:r>
             <a:endParaRPr lang="de-DE" sz="2400" dirty="0"/>
           </a:p>
@@ -15154,7 +15354,7 @@
                   <a:srgbClr val="FF0000"/>
                 </a:solidFill>
               </a:rPr>
-              <a:t>Hier </a:t>
+              <a:t>Can </a:t>
             </a:r>
             <a:r>
               <a:rPr lang="de-DE" dirty="0" err="1" smtClean="0">
@@ -15162,7 +15362,7 @@
                   <a:srgbClr val="FF0000"/>
                 </a:solidFill>
               </a:rPr>
-              <a:t>felt</a:t>
+              <a:t>imagine</a:t>
             </a:r>
             <a:r>
               <a:rPr lang="de-DE" dirty="0" smtClean="0">
@@ -15178,7 +15378,7 @@
                   <a:srgbClr val="FF0000"/>
                 </a:solidFill>
               </a:rPr>
-              <a:t>comfortable</a:t>
+              <a:t>woken</a:t>
             </a:r>
             <a:r>
               <a:rPr lang="de-DE" dirty="0" smtClean="0">
@@ -15194,7 +15394,39 @@
                   <a:srgbClr val="FF0000"/>
                 </a:solidFill>
               </a:rPr>
-              <a:t>sleeping</a:t>
+              <a:t>up</a:t>
+            </a:r>
+            <a:r>
+              <a:rPr lang="de-DE" dirty="0" smtClean="0">
+                <a:solidFill>
+                  <a:srgbClr val="FF0000"/>
+                </a:solidFill>
+              </a:rPr>
+              <a:t> like </a:t>
+            </a:r>
+            <a:r>
+              <a:rPr lang="de-DE" dirty="0" err="1" smtClean="0">
+                <a:solidFill>
+                  <a:srgbClr val="FF0000"/>
+                </a:solidFill>
+              </a:rPr>
+              <a:t>this</a:t>
+            </a:r>
+            <a:r>
+              <a:rPr lang="de-DE" dirty="0" smtClean="0">
+                <a:solidFill>
+                  <a:srgbClr val="FF0000"/>
+                </a:solidFill>
+              </a:rPr>
+              <a:t> in </a:t>
+            </a:r>
+            <a:r>
+              <a:rPr lang="de-DE" dirty="0" err="1" smtClean="0">
+                <a:solidFill>
+                  <a:srgbClr val="FF0000"/>
+                </a:solidFill>
+              </a:rPr>
+              <a:t>situations</a:t>
             </a:r>
             <a:r>
               <a:rPr lang="de-DE" dirty="0" smtClean="0">
@@ -15210,15 +15442,7 @@
                   <a:srgbClr val="FF0000"/>
                 </a:solidFill>
               </a:rPr>
-              <a:t>with</a:t>
-            </a:r>
-            <a:r>
-              <a:rPr lang="de-DE" dirty="0" smtClean="0">
-                <a:solidFill>
-                  <a:srgbClr val="FF0000"/>
-                </a:solidFill>
-              </a:rPr>
-              <a:t> VR</a:t>
+              <a:t>blabla</a:t>
             </a:r>
             <a:endParaRPr lang="de-DE" dirty="0">
               <a:solidFill>
@@ -15231,7 +15455,7 @@
     </p:spTree>
     <p:extLst>
       <p:ext uri="{BB962C8B-B14F-4D97-AF65-F5344CB8AC3E}">
-        <p14:creationId xmlns:p14="http://schemas.microsoft.com/office/powerpoint/2010/main" val="394906128"/>
+        <p14:creationId xmlns:p14="http://schemas.microsoft.com/office/powerpoint/2010/main" val="1424030833"/>
       </p:ext>
     </p:extLst>
   </p:cSld>
@@ -15279,7 +15503,7 @@
             </a:r>
             <a:r>
               <a:rPr lang="de-DE" sz="2400" dirty="0" smtClean="0"/>
-              <a:t>(7/10)</a:t>
+              <a:t>(8/10)</a:t>
             </a:r>
             <a:endParaRPr lang="de-DE" sz="2400" dirty="0"/>
           </a:p>
@@ -15306,7 +15530,7 @@
                   <a:srgbClr val="FF0000"/>
                 </a:solidFill>
               </a:rPr>
-              <a:t>Can </a:t>
+              <a:t>Hier permanent </a:t>
             </a:r>
             <a:r>
               <a:rPr lang="de-DE" dirty="0" err="1" smtClean="0">
@@ -15314,7 +15538,7 @@
                   <a:srgbClr val="FF0000"/>
                 </a:solidFill>
               </a:rPr>
-              <a:t>imagine</a:t>
+              <a:t>wearing</a:t>
             </a:r>
             <a:r>
               <a:rPr lang="de-DE" dirty="0" smtClean="0">
@@ -15322,7 +15546,7 @@
                   <a:srgbClr val="FF0000"/>
                 </a:solidFill>
               </a:rPr>
-              <a:t> </a:t>
+              <a:t> VR Brille wenn die </a:t>
             </a:r>
             <a:r>
               <a:rPr lang="de-DE" dirty="0" err="1" smtClean="0">
@@ -15330,7 +15554,7 @@
                   <a:srgbClr val="FF0000"/>
                 </a:solidFill>
               </a:rPr>
-              <a:t>woken</a:t>
+              <a:t>tiny</a:t>
             </a:r>
             <a:r>
               <a:rPr lang="de-DE" dirty="0" smtClean="0">
@@ -15338,63 +15562,7 @@
                   <a:srgbClr val="FF0000"/>
                 </a:solidFill>
               </a:rPr>
-              <a:t> </a:t>
-            </a:r>
-            <a:r>
-              <a:rPr lang="de-DE" dirty="0" err="1" smtClean="0">
-                <a:solidFill>
-                  <a:srgbClr val="FF0000"/>
-                </a:solidFill>
-              </a:rPr>
-              <a:t>up</a:t>
-            </a:r>
-            <a:r>
-              <a:rPr lang="de-DE" dirty="0" smtClean="0">
-                <a:solidFill>
-                  <a:srgbClr val="FF0000"/>
-                </a:solidFill>
-              </a:rPr>
-              <a:t> like </a:t>
-            </a:r>
-            <a:r>
-              <a:rPr lang="de-DE" dirty="0" err="1" smtClean="0">
-                <a:solidFill>
-                  <a:srgbClr val="FF0000"/>
-                </a:solidFill>
-              </a:rPr>
-              <a:t>this</a:t>
-            </a:r>
-            <a:r>
-              <a:rPr lang="de-DE" dirty="0" smtClean="0">
-                <a:solidFill>
-                  <a:srgbClr val="FF0000"/>
-                </a:solidFill>
-              </a:rPr>
-              <a:t> in </a:t>
-            </a:r>
-            <a:r>
-              <a:rPr lang="de-DE" dirty="0" err="1" smtClean="0">
-                <a:solidFill>
-                  <a:srgbClr val="FF0000"/>
-                </a:solidFill>
-              </a:rPr>
-              <a:t>situations</a:t>
-            </a:r>
-            <a:r>
-              <a:rPr lang="de-DE" dirty="0" smtClean="0">
-                <a:solidFill>
-                  <a:srgbClr val="FF0000"/>
-                </a:solidFill>
-              </a:rPr>
-              <a:t> </a:t>
-            </a:r>
-            <a:r>
-              <a:rPr lang="de-DE" dirty="0" err="1" smtClean="0">
-                <a:solidFill>
-                  <a:srgbClr val="FF0000"/>
-                </a:solidFill>
-              </a:rPr>
-              <a:t>blabla</a:t>
+              <a:t> und so sind</a:t>
             </a:r>
             <a:endParaRPr lang="de-DE" dirty="0">
               <a:solidFill>
@@ -15407,7 +15575,7 @@
     </p:spTree>
     <p:extLst>
       <p:ext uri="{BB962C8B-B14F-4D97-AF65-F5344CB8AC3E}">
-        <p14:creationId xmlns:p14="http://schemas.microsoft.com/office/powerpoint/2010/main" val="1424030833"/>
+        <p14:creationId xmlns:p14="http://schemas.microsoft.com/office/powerpoint/2010/main" val="1556204967"/>
       </p:ext>
     </p:extLst>
   </p:cSld>
@@ -15455,126 +15623,6 @@
             </a:r>
             <a:r>
               <a:rPr lang="de-DE" sz="2400" dirty="0" smtClean="0"/>
-              <a:t>(8/10)</a:t>
-            </a:r>
-            <a:endParaRPr lang="de-DE" sz="2400" dirty="0"/>
-          </a:p>
-        </p:txBody>
-      </p:sp>
-      <p:sp>
-        <p:nvSpPr>
-          <p:cNvPr id="3" name="Inhaltsplatzhalter 2"/>
-          <p:cNvSpPr>
-            <a:spLocks noGrp="1"/>
-          </p:cNvSpPr>
-          <p:nvPr>
-            <p:ph idx="1"/>
-          </p:nvPr>
-        </p:nvSpPr>
-        <p:spPr/>
-        <p:txBody>
-          <a:bodyPr/>
-          <a:lstStyle/>
-          <a:p>
-            <a:r>
-              <a:rPr lang="de-DE" dirty="0" smtClean="0">
-                <a:solidFill>
-                  <a:srgbClr val="FF0000"/>
-                </a:solidFill>
-              </a:rPr>
-              <a:t>Hier permanent </a:t>
-            </a:r>
-            <a:r>
-              <a:rPr lang="de-DE" dirty="0" err="1" smtClean="0">
-                <a:solidFill>
-                  <a:srgbClr val="FF0000"/>
-                </a:solidFill>
-              </a:rPr>
-              <a:t>wearing</a:t>
-            </a:r>
-            <a:r>
-              <a:rPr lang="de-DE" dirty="0" smtClean="0">
-                <a:solidFill>
-                  <a:srgbClr val="FF0000"/>
-                </a:solidFill>
-              </a:rPr>
-              <a:t> VR Brille wenn die </a:t>
-            </a:r>
-            <a:r>
-              <a:rPr lang="de-DE" dirty="0" err="1" smtClean="0">
-                <a:solidFill>
-                  <a:srgbClr val="FF0000"/>
-                </a:solidFill>
-              </a:rPr>
-              <a:t>tiny</a:t>
-            </a:r>
-            <a:r>
-              <a:rPr lang="de-DE" dirty="0" smtClean="0">
-                <a:solidFill>
-                  <a:srgbClr val="FF0000"/>
-                </a:solidFill>
-              </a:rPr>
-              <a:t> und so sind</a:t>
-            </a:r>
-            <a:endParaRPr lang="de-DE" dirty="0">
-              <a:solidFill>
-                <a:srgbClr val="FF0000"/>
-              </a:solidFill>
-            </a:endParaRPr>
-          </a:p>
-        </p:txBody>
-      </p:sp>
-    </p:spTree>
-    <p:extLst>
-      <p:ext uri="{BB962C8B-B14F-4D97-AF65-F5344CB8AC3E}">
-        <p14:creationId xmlns:p14="http://schemas.microsoft.com/office/powerpoint/2010/main" val="1556204967"/>
-      </p:ext>
-    </p:extLst>
-  </p:cSld>
-  <p:clrMapOvr>
-    <a:masterClrMapping/>
-  </p:clrMapOvr>
-</p:sld>
-</file>
-
-<file path=ppt/slides/slide37.xml><?xml version="1.0" encoding="utf-8"?>
-<p:sld xmlns:a="http://schemas.openxmlformats.org/drawingml/2006/main" xmlns:r="http://schemas.openxmlformats.org/officeDocument/2006/relationships" xmlns:p="http://schemas.openxmlformats.org/presentationml/2006/main">
-  <p:cSld>
-    <p:spTree>
-      <p:nvGrpSpPr>
-        <p:cNvPr id="1" name=""/>
-        <p:cNvGrpSpPr/>
-        <p:nvPr/>
-      </p:nvGrpSpPr>
-      <p:grpSpPr>
-        <a:xfrm>
-          <a:off x="0" y="0"/>
-          <a:ext cx="0" cy="0"/>
-          <a:chOff x="0" y="0"/>
-          <a:chExt cx="0" cy="0"/>
-        </a:xfrm>
-      </p:grpSpPr>
-      <p:sp>
-        <p:nvSpPr>
-          <p:cNvPr id="2" name="Titel 1"/>
-          <p:cNvSpPr>
-            <a:spLocks noGrp="1"/>
-          </p:cNvSpPr>
-          <p:nvPr>
-            <p:ph type="title"/>
-          </p:nvPr>
-        </p:nvSpPr>
-        <p:spPr/>
-        <p:txBody>
-          <a:bodyPr/>
-          <a:lstStyle/>
-          <a:p>
-            <a:r>
-              <a:rPr lang="de-DE" dirty="0" smtClean="0"/>
-              <a:t>Anhang </a:t>
-            </a:r>
-            <a:r>
-              <a:rPr lang="de-DE" sz="2400" dirty="0" smtClean="0"/>
               <a:t>(9/10)</a:t>
             </a:r>
             <a:endParaRPr lang="de-DE" sz="2400" dirty="0"/>
@@ -15621,6 +15669,10 @@
             </a:endParaRPr>
           </a:p>
           <a:p>
+            <a:pPr>
+              <a:buFontTx/>
+              <a:buChar char="-"/>
+            </a:pPr>
             <a:r>
               <a:rPr lang="de-DE" dirty="0" smtClean="0">
                 <a:solidFill>
@@ -15647,13 +15699,25 @@
             </a:r>
           </a:p>
           <a:p>
+            <a:pPr>
+              <a:buFontTx/>
+              <a:buChar char="-"/>
+            </a:pPr>
+            <a:r>
+              <a:rPr lang="de-DE" dirty="0" smtClean="0">
+                <a:solidFill>
+                  <a:schemeClr val="bg2"/>
+                </a:solidFill>
+              </a:rPr>
+              <a:t>„</a:t>
+            </a:r>
             <a:r>
               <a:rPr lang="de-DE" dirty="0">
                 <a:solidFill>
                   <a:schemeClr val="bg2"/>
                 </a:solidFill>
               </a:rPr>
-              <a:t>„Die VR Umgebung war schön gestaltet, aber die rumschwebenden Partikel waren eher verwirrend, ich dachte ich kann mit diesen </a:t>
+              <a:t>Die VR Umgebung war schön gestaltet, aber die rumschwebenden Partikel waren eher verwirrend, ich dachte ich kann mit diesen </a:t>
             </a:r>
             <a:r>
               <a:rPr lang="de-DE" dirty="0" smtClean="0">
@@ -15665,13 +15729,25 @@
             </a:r>
           </a:p>
           <a:p>
+            <a:pPr>
+              <a:buFontTx/>
+              <a:buChar char="-"/>
+            </a:pPr>
+            <a:r>
+              <a:rPr lang="de-DE" dirty="0" smtClean="0">
+                <a:solidFill>
+                  <a:schemeClr val="bg2"/>
+                </a:solidFill>
+              </a:rPr>
+              <a:t>„</a:t>
+            </a:r>
             <a:r>
               <a:rPr lang="de-DE" dirty="0">
                 <a:solidFill>
                   <a:schemeClr val="bg2"/>
                 </a:solidFill>
               </a:rPr>
-              <a:t>„Der Stuhl war sehr entspannend und </a:t>
+              <a:t>Der Stuhl war sehr entspannend und </a:t>
             </a:r>
             <a:r>
               <a:rPr lang="de-DE" dirty="0" smtClean="0">
@@ -15683,13 +15759,25 @@
             </a:r>
           </a:p>
           <a:p>
+            <a:pPr>
+              <a:buFontTx/>
+              <a:buChar char="-"/>
+            </a:pPr>
+            <a:r>
+              <a:rPr lang="de-DE" dirty="0" smtClean="0">
+                <a:solidFill>
+                  <a:schemeClr val="bg2"/>
+                </a:solidFill>
+              </a:rPr>
+              <a:t>„</a:t>
+            </a:r>
             <a:r>
               <a:rPr lang="de-DE" dirty="0">
                 <a:solidFill>
                   <a:schemeClr val="bg2"/>
                 </a:solidFill>
               </a:rPr>
-              <a:t>„Es fiel mir schwer einzuschlafen, da ich zum 1. mal VR gemacht habe und dann neugierig </a:t>
+              <a:t>Es fiel mir schwer einzuschlafen, da ich zum 1. mal VR gemacht habe und dann neugierig </a:t>
             </a:r>
             <a:r>
               <a:rPr lang="de-DE" dirty="0" smtClean="0">
@@ -15701,13 +15789,25 @@
             </a:r>
           </a:p>
           <a:p>
+            <a:pPr>
+              <a:buFontTx/>
+              <a:buChar char="-"/>
+            </a:pPr>
+            <a:r>
+              <a:rPr lang="de-DE" dirty="0" smtClean="0">
+                <a:solidFill>
+                  <a:schemeClr val="bg2"/>
+                </a:solidFill>
+              </a:rPr>
+              <a:t>„</a:t>
+            </a:r>
             <a:r>
               <a:rPr lang="de-DE" dirty="0">
                 <a:solidFill>
                   <a:schemeClr val="bg2"/>
                 </a:solidFill>
               </a:rPr>
-              <a:t>„Die Musik war sehr </a:t>
+              <a:t>Die Musik war sehr </a:t>
             </a:r>
             <a:r>
               <a:rPr lang="de-DE" dirty="0" smtClean="0">
@@ -15719,13 +15819,25 @@
             </a:r>
           </a:p>
           <a:p>
+            <a:pPr>
+              <a:buFontTx/>
+              <a:buChar char="-"/>
+            </a:pPr>
+            <a:r>
+              <a:rPr lang="de-DE" dirty="0" smtClean="0">
+                <a:solidFill>
+                  <a:schemeClr val="bg2"/>
+                </a:solidFill>
+              </a:rPr>
+              <a:t>„</a:t>
+            </a:r>
             <a:r>
               <a:rPr lang="de-DE" dirty="0">
                 <a:solidFill>
                   <a:schemeClr val="bg2"/>
                 </a:solidFill>
               </a:rPr>
-              <a:t>„Das lange gedrückt halten zur Interaktion war </a:t>
+              <a:t>Das lange gedrückt halten zur Interaktion war </a:t>
             </a:r>
             <a:r>
               <a:rPr lang="de-DE" dirty="0" smtClean="0">
@@ -15737,6 +15849,10 @@
             </a:r>
           </a:p>
           <a:p>
+            <a:pPr>
+              <a:buFontTx/>
+              <a:buChar char="-"/>
+            </a:pPr>
             <a:r>
               <a:rPr lang="de-DE" dirty="0" smtClean="0">
                 <a:solidFill>
@@ -15763,16 +15879,28 @@
             </a:r>
           </a:p>
           <a:p>
+            <a:pPr>
+              <a:buFontTx/>
+              <a:buChar char="-"/>
+            </a:pPr>
+            <a:r>
+              <a:rPr lang="de-DE" smtClean="0">
+                <a:solidFill>
+                  <a:schemeClr val="bg2"/>
+                </a:solidFill>
+              </a:rPr>
+              <a:t>„</a:t>
+            </a:r>
             <a:r>
               <a:rPr lang="de-DE" dirty="0">
                 <a:solidFill>
                   <a:schemeClr val="bg2"/>
                 </a:solidFill>
               </a:rPr>
-              <a:t>„Die Brille war sehr </a:t>
-            </a:r>
-            <a:r>
-              <a:rPr lang="de-DE" dirty="0" smtClean="0">
+              <a:t>Die Brille war sehr </a:t>
+            </a:r>
+            <a:r>
+              <a:rPr lang="de-DE" smtClean="0">
                 <a:solidFill>
                   <a:schemeClr val="bg2"/>
                 </a:solidFill>
@@ -15781,8 +15909,12 @@
             </a:r>
           </a:p>
           <a:p>
-            <a:r>
-              <a:rPr lang="de-DE" dirty="0" smtClean="0">
+            <a:pPr>
+              <a:buFontTx/>
+              <a:buChar char="-"/>
+            </a:pPr>
+            <a:r>
+              <a:rPr lang="de-DE" smtClean="0">
                 <a:solidFill>
                   <a:schemeClr val="bg2"/>
                 </a:solidFill>
@@ -15810,7 +15942,7 @@
 </p:sld>
 </file>
 
-<file path=ppt/slides/slide38.xml><?xml version="1.0" encoding="utf-8"?>
+<file path=ppt/slides/slide37.xml><?xml version="1.0" encoding="utf-8"?>
 <p:sld xmlns:a="http://schemas.openxmlformats.org/drawingml/2006/main" xmlns:r="http://schemas.openxmlformats.org/officeDocument/2006/relationships" xmlns:p="http://schemas.openxmlformats.org/presentationml/2006/main">
   <p:cSld>
     <p:spTree>
@@ -16829,11 +16961,14 @@
           <a:bodyPr/>
           <a:lstStyle/>
           <a:p>
-            <a:r>
-              <a:rPr lang="de-DE" dirty="0">
+            <a:pPr marL="0" indent="0">
+              <a:buNone/>
+            </a:pPr>
+            <a:r>
+              <a:rPr lang="de-DE" dirty="0" smtClean="0">
                 <a:sym typeface="Wingdings" panose="05000000000000000000" pitchFamily="2" charset="2"/>
               </a:rPr>
-              <a:t> </a:t>
+              <a:t>-  </a:t>
             </a:r>
             <a:r>
               <a:rPr lang="de-DE" dirty="0" err="1">
@@ -16880,9 +17015,12 @@
             <a:endParaRPr lang="de-DE" dirty="0" smtClean="0"/>
           </a:p>
           <a:p>
+            <a:pPr marL="0" indent="0">
+              <a:buNone/>
+            </a:pPr>
             <a:r>
               <a:rPr lang="de-DE" dirty="0" smtClean="0"/>
-              <a:t>VR </a:t>
+              <a:t>- VR </a:t>
             </a:r>
             <a:r>
               <a:rPr lang="de-DE" dirty="0"/>
@@ -16890,9 +17028,16 @@
             </a:r>
           </a:p>
           <a:p>
+            <a:pPr marL="0" indent="0">
+              <a:buNone/>
+            </a:pPr>
+            <a:r>
+              <a:rPr lang="de-DE" dirty="0" smtClean="0"/>
+              <a:t>- Werte </a:t>
+            </a:r>
             <a:r>
               <a:rPr lang="de-DE" dirty="0"/>
-              <a:t>Werte aufzeichnen Kopfbewegung, Zeiten </a:t>
+              <a:t>aufzeichnen Kopfbewegung, Zeiten </a:t>
             </a:r>
             <a:r>
               <a:rPr lang="de-DE" dirty="0" err="1"/>
@@ -16912,15 +17057,21 @@
             </a:r>
           </a:p>
           <a:p>
+            <a:pPr marL="0" indent="0">
+              <a:buNone/>
+            </a:pPr>
             <a:r>
               <a:rPr lang="de-DE" dirty="0" smtClean="0"/>
-              <a:t>Gaming-Stuhl</a:t>
-            </a:r>
-          </a:p>
-          <a:p>
+              <a:t>- Gaming-Stuhl</a:t>
+            </a:r>
+          </a:p>
+          <a:p>
+            <a:pPr marL="0" indent="0">
+              <a:buNone/>
+            </a:pPr>
             <a:r>
               <a:rPr lang="de-DE" dirty="0" smtClean="0"/>
-              <a:t>Python, R Skripte, SPSS </a:t>
+              <a:t>- Python, R Skripte, SPSS </a:t>
             </a:r>
             <a:r>
               <a:rPr lang="de-DE" dirty="0" err="1" smtClean="0"/>
@@ -16982,31 +17133,55 @@
           <a:bodyPr/>
           <a:lstStyle/>
           <a:p>
+            <a:pPr marL="0" indent="0">
+              <a:buNone/>
+            </a:pPr>
             <a:r>
               <a:rPr lang="de-DE" dirty="0" smtClean="0"/>
-              <a:t>Lösungsansatz</a:t>
-            </a:r>
-          </a:p>
-          <a:p>
+              <a:t>- Lösungsansatz</a:t>
+            </a:r>
+          </a:p>
+          <a:p>
+            <a:pPr>
+              <a:buFontTx/>
+              <a:buChar char="-"/>
+            </a:pPr>
             <a:r>
               <a:rPr lang="de-DE" dirty="0" smtClean="0"/>
               <a:t>Übergang </a:t>
             </a:r>
             <a:r>
               <a:rPr lang="de-DE" dirty="0"/>
-              <a:t>schläfriger Zustand, ohne kognitive Belastung, und wacher Zustand, in dem Aufgaben erledigt werden müssen</a:t>
-            </a:r>
-          </a:p>
-          <a:p>
+              <a:t>schläfriger Zustand, ohne kognitive Belastung, und wacher Zustand, in dem Aufgaben erledigt werden </a:t>
+            </a:r>
+            <a:r>
+              <a:rPr lang="de-DE" dirty="0" smtClean="0"/>
+              <a:t>müssen</a:t>
+            </a:r>
+          </a:p>
+          <a:p>
+            <a:pPr>
+              <a:buFontTx/>
+              <a:buChar char="-"/>
+            </a:pPr>
+            <a:r>
+              <a:rPr lang="de-DE" dirty="0" smtClean="0"/>
+              <a:t>Hypothesen</a:t>
+            </a:r>
+            <a:endParaRPr lang="de-DE" dirty="0"/>
+          </a:p>
+          <a:p>
+            <a:pPr>
+              <a:buFontTx/>
+              <a:buChar char="-"/>
+            </a:pPr>
+            <a:r>
+              <a:rPr lang="de-DE" dirty="0" smtClean="0"/>
+              <a:t>Erfasste </a:t>
+            </a:r>
             <a:r>
               <a:rPr lang="de-DE" dirty="0"/>
-              <a:t>Hypothesen</a:t>
-            </a:r>
-          </a:p>
-          <a:p>
-            <a:r>
-              <a:rPr lang="de-DE" dirty="0"/>
-              <a:t>Erfasste Parameter: Zeit, Fehlerrate, Blickrichtung</a:t>
+              <a:t>Parameter: Zeit, Fehlerrate, Blickrichtung</a:t>
             </a:r>
           </a:p>
         </p:txBody>

</xml_diff>

<commit_message>
Fehler in Ergebnisse korrigiert
</commit_message>
<xml_diff>
--- a/presentation/Resync Studie.pptx
+++ b/presentation/Resync Studie.pptx
@@ -200,7 +200,6 @@
           </a:p>
         </c:rich>
       </c:tx>
-      <c:layout/>
       <c:overlay val="0"/>
       <c:spPr>
         <a:noFill/>
@@ -355,9 +354,7 @@
               </c:spPr>
             </c:leaderLines>
             <c:extLst>
-              <c:ext xmlns:c15="http://schemas.microsoft.com/office/drawing/2012/chart" uri="{CE6537A1-D6FC-4f65-9D91-7224C49458BB}">
-                <c15:layout/>
-              </c:ext>
+              <c:ext xmlns:c15="http://schemas.microsoft.com/office/drawing/2012/chart" uri="{CE6537A1-D6FC-4f65-9D91-7224C49458BB}"/>
             </c:extLst>
           </c:dLbls>
           <c:cat>
@@ -422,7 +419,6 @@
     </c:plotArea>
     <c:legend>
       <c:legendPos val="b"/>
-      <c:layout/>
       <c:overlay val="0"/>
       <c:spPr>
         <a:noFill/>
@@ -4474,7 +4470,6 @@
           </a:p>
         </c:rich>
       </c:tx>
-      <c:layout/>
       <c:overlay val="0"/>
       <c:spPr>
         <a:noFill/>
@@ -4997,7 +4992,6 @@
     </c:plotArea>
     <c:legend>
       <c:legendPos val="b"/>
-      <c:layout/>
       <c:overlay val="0"/>
       <c:spPr>
         <a:noFill/>
@@ -5119,7 +5113,6 @@
           </a:p>
         </c:rich>
       </c:tx>
-      <c:layout/>
       <c:overlay val="0"/>
       <c:spPr>
         <a:noFill/>
@@ -5995,7 +5988,6 @@
     </c:plotArea>
     <c:legend>
       <c:legendPos val="b"/>
-      <c:layout/>
       <c:overlay val="0"/>
       <c:spPr>
         <a:noFill/>
@@ -6117,7 +6109,6 @@
           </a:p>
         </c:rich>
       </c:tx>
-      <c:layout/>
       <c:overlay val="0"/>
       <c:spPr>
         <a:noFill/>
@@ -6640,7 +6631,6 @@
     </c:plotArea>
     <c:legend>
       <c:legendPos val="b"/>
-      <c:layout/>
       <c:overlay val="0"/>
       <c:spPr>
         <a:noFill/>
@@ -6742,7 +6732,6 @@
           </a:p>
         </c:rich>
       </c:tx>
-      <c:layout/>
       <c:overlay val="0"/>
       <c:spPr>
         <a:noFill/>
@@ -7618,7 +7607,6 @@
     </c:plotArea>
     <c:legend>
       <c:legendPos val="b"/>
-      <c:layout/>
       <c:overlay val="0"/>
       <c:spPr>
         <a:noFill/>
@@ -7806,7 +7794,7 @@
                 <c:formatCode>General</c:formatCode>
                 <c:ptCount val="3"/>
                 <c:pt idx="0">
-                  <c:v>7.7050000000000001</c:v>
+                  <c:v>8.81</c:v>
                 </c:pt>
                 <c:pt idx="1">
                   <c:v>9.5419999999999998</c:v>
@@ -8225,7 +8213,6 @@
           </a:p>
         </c:rich>
       </c:tx>
-      <c:layout/>
       <c:overlay val="0"/>
       <c:spPr>
         <a:noFill/>
@@ -9102,7 +9089,6 @@
     </c:plotArea>
     <c:legend>
       <c:legendPos val="b"/>
-      <c:layout/>
       <c:overlay val="0"/>
       <c:spPr>
         <a:noFill/>
@@ -9207,7 +9193,6 @@
           </a:p>
         </c:rich>
       </c:tx>
-      <c:layout/>
       <c:overlay val="0"/>
       <c:spPr>
         <a:noFill/>
@@ -9379,9 +9364,7 @@
               </c:spPr>
             </c:leaderLines>
             <c:extLst>
-              <c:ext xmlns:c15="http://schemas.microsoft.com/office/drawing/2012/chart" uri="{CE6537A1-D6FC-4f65-9D91-7224C49458BB}">
-                <c15:layout/>
-              </c:ext>
+              <c:ext xmlns:c15="http://schemas.microsoft.com/office/drawing/2012/chart" uri="{CE6537A1-D6FC-4f65-9D91-7224C49458BB}"/>
             </c:extLst>
           </c:dLbls>
           <c:cat>
@@ -9452,7 +9435,6 @@
     </c:plotArea>
     <c:legend>
       <c:legendPos val="b"/>
-      <c:layout/>
       <c:overlay val="0"/>
       <c:spPr>
         <a:noFill/>
@@ -29877,7 +29859,7 @@
         </a:graphic>
       </p:graphicFrame>
       <mc:AlternateContent xmlns:mc="http://schemas.openxmlformats.org/markup-compatibility/2006">
-        <mc:Choice xmlns:cx1="http://schemas.microsoft.com/office/drawing/2015/9/8/chartex" xmlns="" Requires="cx1">
+        <mc:Choice xmlns="" xmlns:cx1="http://schemas.microsoft.com/office/drawing/2015/9/8/chartex" Requires="cx1">
           <p:graphicFrame>
             <p:nvGraphicFramePr>
               <p:cNvPr id="15" name="Diagramm 14"/>
@@ -31436,7 +31418,7 @@
             <p:ph idx="1"/>
             <p:extLst>
               <p:ext uri="{D42A27DB-BD31-4B8C-83A1-F6EECF244321}">
-                <p14:modId xmlns:p14="http://schemas.microsoft.com/office/powerpoint/2010/main" val="905604088"/>
+                <p14:modId xmlns:p14="http://schemas.microsoft.com/office/powerpoint/2010/main" val="1483677911"/>
               </p:ext>
             </p:extLst>
           </p:nvPr>
@@ -31735,7 +31717,7 @@
         </a:graphic>
       </p:graphicFrame>
       <mc:AlternateContent xmlns:mc="http://schemas.openxmlformats.org/markup-compatibility/2006">
-        <mc:Choice xmlns:cx1="http://schemas.microsoft.com/office/drawing/2015/9/8/chartex" xmlns="" Requires="cx1">
+        <mc:Choice xmlns="" xmlns:cx1="http://schemas.microsoft.com/office/drawing/2015/9/8/chartex" Requires="cx1">
           <p:graphicFrame>
             <p:nvGraphicFramePr>
               <p:cNvPr id="8" name="Diagramm 7">
@@ -32745,7 +32727,7 @@
         </p:txBody>
       </p:sp>
       <mc:AlternateContent xmlns:mc="http://schemas.openxmlformats.org/markup-compatibility/2006">
-        <mc:Choice xmlns:cx1="http://schemas.microsoft.com/office/drawing/2015/9/8/chartex" xmlns="" Requires="cx1">
+        <mc:Choice xmlns="" xmlns:cx1="http://schemas.microsoft.com/office/drawing/2015/9/8/chartex" Requires="cx1">
           <p:graphicFrame>
             <p:nvGraphicFramePr>
               <p:cNvPr id="4" name="Diagramm 3">
@@ -32809,7 +32791,7 @@
         </mc:Fallback>
       </mc:AlternateContent>
       <mc:AlternateContent xmlns:mc="http://schemas.openxmlformats.org/markup-compatibility/2006">
-        <mc:Choice xmlns:cx1="http://schemas.microsoft.com/office/drawing/2015/9/8/chartex" xmlns="" Requires="cx1">
+        <mc:Choice xmlns="" xmlns:cx1="http://schemas.microsoft.com/office/drawing/2015/9/8/chartex" Requires="cx1">
           <p:graphicFrame>
             <p:nvGraphicFramePr>
               <p:cNvPr id="5" name="Diagramm 4">
@@ -32947,7 +32929,7 @@
           <a:graphicData uri="http://schemas.openxmlformats.org/presentationml/2006/ole">
             <mc:AlternateContent xmlns:mc="http://schemas.openxmlformats.org/markup-compatibility/2006">
               <mc:Choice xmlns:v="urn:schemas-microsoft-com:vml" Requires="v">
-                <p:oleObj spid="_x0000_s1067" name="Acrobat Document" r:id="rId3" imgW="7800763" imgH="6857824" progId="AcroExch.Document.7">
+                <p:oleObj spid="_x0000_s1068" name="Acrobat Document" r:id="rId3" imgW="7800763" imgH="6857824" progId="AcroExch.Document.7">
                   <p:embed/>
                 </p:oleObj>
               </mc:Choice>
@@ -33195,7 +33177,7 @@
         </p:txBody>
       </p:sp>
       <mc:AlternateContent xmlns:mc="http://schemas.openxmlformats.org/markup-compatibility/2006">
-        <mc:Choice xmlns:cx1="http://schemas.microsoft.com/office/drawing/2015/9/8/chartex" xmlns="" Requires="cx1">
+        <mc:Choice xmlns="" xmlns:cx1="http://schemas.microsoft.com/office/drawing/2015/9/8/chartex" Requires="cx1">
           <p:graphicFrame>
             <p:nvGraphicFramePr>
               <p:cNvPr id="4" name="Diagramm 3">

</xml_diff>